<commit_message>
Added a bunch of content to the powerpoint presentation.
</commit_message>
<xml_diff>
--- a/PreBuild Systems.pptx
+++ b/PreBuild Systems.pptx
@@ -4,6 +4,9 @@
   <p:sldMasterIdLst>
     <p:sldMasterId id="2147483949" r:id="rId1"/>
   </p:sldMasterIdLst>
+  <p:notesMasterIdLst>
+    <p:notesMasterId r:id="rId31"/>
+  </p:notesMasterIdLst>
   <p:sldIdLst>
     <p:sldId id="256" r:id="rId2"/>
     <p:sldId id="319" r:id="rId3"/>
@@ -15,16 +18,25 @@
     <p:sldId id="326" r:id="rId9"/>
     <p:sldId id="327" r:id="rId10"/>
     <p:sldId id="264" r:id="rId11"/>
-    <p:sldId id="333" r:id="rId12"/>
-    <p:sldId id="329" r:id="rId13"/>
-    <p:sldId id="265" r:id="rId14"/>
-    <p:sldId id="330" r:id="rId15"/>
-    <p:sldId id="335" r:id="rId16"/>
-    <p:sldId id="337" r:id="rId17"/>
-    <p:sldId id="336" r:id="rId18"/>
-    <p:sldId id="331" r:id="rId19"/>
-    <p:sldId id="332" r:id="rId20"/>
-    <p:sldId id="334" r:id="rId21"/>
+    <p:sldId id="338" r:id="rId12"/>
+    <p:sldId id="339" r:id="rId13"/>
+    <p:sldId id="340" r:id="rId14"/>
+    <p:sldId id="346" r:id="rId15"/>
+    <p:sldId id="341" r:id="rId16"/>
+    <p:sldId id="343" r:id="rId17"/>
+    <p:sldId id="344" r:id="rId18"/>
+    <p:sldId id="342" r:id="rId19"/>
+    <p:sldId id="345" r:id="rId20"/>
+    <p:sldId id="333" r:id="rId21"/>
+    <p:sldId id="329" r:id="rId22"/>
+    <p:sldId id="265" r:id="rId23"/>
+    <p:sldId id="330" r:id="rId24"/>
+    <p:sldId id="335" r:id="rId25"/>
+    <p:sldId id="337" r:id="rId26"/>
+    <p:sldId id="336" r:id="rId27"/>
+    <p:sldId id="331" r:id="rId28"/>
+    <p:sldId id="332" r:id="rId29"/>
+    <p:sldId id="334" r:id="rId30"/>
   </p:sldIdLst>
   <p:sldSz cx="12192000" cy="6858000"/>
   <p:notesSz cx="6858000" cy="9144000"/>
@@ -129,6 +141,529 @@
     </p:ext>
   </p:extLst>
 </p:presentation>
+</file>
+
+<file path=ppt/notesMasters/notesMaster1.xml><?xml version="1.0" encoding="utf-8"?>
+<p:notesMaster xmlns:a="http://schemas.openxmlformats.org/drawingml/2006/main" xmlns:r="http://schemas.openxmlformats.org/officeDocument/2006/relationships" xmlns:p="http://schemas.openxmlformats.org/presentationml/2006/main">
+  <p:cSld>
+    <p:bg>
+      <p:bgRef idx="1001">
+        <a:schemeClr val="bg1"/>
+      </p:bgRef>
+    </p:bg>
+    <p:spTree>
+      <p:nvGrpSpPr>
+        <p:cNvPr id="1" name=""/>
+        <p:cNvGrpSpPr/>
+        <p:nvPr/>
+      </p:nvGrpSpPr>
+      <p:grpSpPr>
+        <a:xfrm>
+          <a:off x="0" y="0"/>
+          <a:ext cx="0" cy="0"/>
+          <a:chOff x="0" y="0"/>
+          <a:chExt cx="0" cy="0"/>
+        </a:xfrm>
+      </p:grpSpPr>
+      <p:sp>
+        <p:nvSpPr>
+          <p:cNvPr id="2" name="Header Placeholder 1"/>
+          <p:cNvSpPr>
+            <a:spLocks noGrp="1"/>
+          </p:cNvSpPr>
+          <p:nvPr>
+            <p:ph type="hdr" sz="quarter"/>
+          </p:nvPr>
+        </p:nvSpPr>
+        <p:spPr>
+          <a:xfrm>
+            <a:off x="0" y="0"/>
+            <a:ext cx="2971800" cy="458788"/>
+          </a:xfrm>
+          <a:prstGeom prst="rect">
+            <a:avLst/>
+          </a:prstGeom>
+        </p:spPr>
+        <p:txBody>
+          <a:bodyPr vert="horz" lIns="91440" tIns="45720" rIns="91440" bIns="45720" rtlCol="0"/>
+          <a:lstStyle>
+            <a:lvl1pPr algn="l">
+              <a:defRPr sz="1200"/>
+            </a:lvl1pPr>
+          </a:lstStyle>
+          <a:p>
+            <a:endParaRPr lang="en-US"/>
+          </a:p>
+        </p:txBody>
+      </p:sp>
+      <p:sp>
+        <p:nvSpPr>
+          <p:cNvPr id="3" name="Date Placeholder 2"/>
+          <p:cNvSpPr>
+            <a:spLocks noGrp="1"/>
+          </p:cNvSpPr>
+          <p:nvPr>
+            <p:ph type="dt" idx="1"/>
+          </p:nvPr>
+        </p:nvSpPr>
+        <p:spPr>
+          <a:xfrm>
+            <a:off x="3884613" y="0"/>
+            <a:ext cx="2971800" cy="458788"/>
+          </a:xfrm>
+          <a:prstGeom prst="rect">
+            <a:avLst/>
+          </a:prstGeom>
+        </p:spPr>
+        <p:txBody>
+          <a:bodyPr vert="horz" lIns="91440" tIns="45720" rIns="91440" bIns="45720" rtlCol="0"/>
+          <a:lstStyle>
+            <a:lvl1pPr algn="r">
+              <a:defRPr sz="1200"/>
+            </a:lvl1pPr>
+          </a:lstStyle>
+          <a:p>
+            <a:fld id="{70F6FF9A-81B4-4162-AD96-D5958648E4E9}" type="datetimeFigureOut">
+              <a:rPr lang="en-US" smtClean="0"/>
+              <a:t>7/9/2018</a:t>
+            </a:fld>
+            <a:endParaRPr lang="en-US"/>
+          </a:p>
+        </p:txBody>
+      </p:sp>
+      <p:sp>
+        <p:nvSpPr>
+          <p:cNvPr id="4" name="Slide Image Placeholder 3"/>
+          <p:cNvSpPr>
+            <a:spLocks noGrp="1" noRot="1" noChangeAspect="1"/>
+          </p:cNvSpPr>
+          <p:nvPr>
+            <p:ph type="sldImg" idx="2"/>
+          </p:nvPr>
+        </p:nvSpPr>
+        <p:spPr>
+          <a:xfrm>
+            <a:off x="685800" y="1143000"/>
+            <a:ext cx="5486400" cy="3086100"/>
+          </a:xfrm>
+          <a:prstGeom prst="rect">
+            <a:avLst/>
+          </a:prstGeom>
+          <a:noFill/>
+          <a:ln w="12700">
+            <a:solidFill>
+              <a:prstClr val="black"/>
+            </a:solidFill>
+          </a:ln>
+        </p:spPr>
+        <p:txBody>
+          <a:bodyPr vert="horz" lIns="91440" tIns="45720" rIns="91440" bIns="45720" rtlCol="0" anchor="ctr"/>
+          <a:lstStyle/>
+          <a:p>
+            <a:endParaRPr lang="en-US"/>
+          </a:p>
+        </p:txBody>
+      </p:sp>
+      <p:sp>
+        <p:nvSpPr>
+          <p:cNvPr id="5" name="Notes Placeholder 4"/>
+          <p:cNvSpPr>
+            <a:spLocks noGrp="1"/>
+          </p:cNvSpPr>
+          <p:nvPr>
+            <p:ph type="body" sz="quarter" idx="3"/>
+          </p:nvPr>
+        </p:nvSpPr>
+        <p:spPr>
+          <a:xfrm>
+            <a:off x="685800" y="4400550"/>
+            <a:ext cx="5486400" cy="3600450"/>
+          </a:xfrm>
+          <a:prstGeom prst="rect">
+            <a:avLst/>
+          </a:prstGeom>
+        </p:spPr>
+        <p:txBody>
+          <a:bodyPr vert="horz" lIns="91440" tIns="45720" rIns="91440" bIns="45720" rtlCol="0"/>
+          <a:lstStyle/>
+          <a:p>
+            <a:pPr lvl="0"/>
+            <a:r>
+              <a:rPr lang="en-US"/>
+              <a:t>Edit Master text styles</a:t>
+            </a:r>
+          </a:p>
+          <a:p>
+            <a:pPr lvl="1"/>
+            <a:r>
+              <a:rPr lang="en-US"/>
+              <a:t>Second level</a:t>
+            </a:r>
+          </a:p>
+          <a:p>
+            <a:pPr lvl="2"/>
+            <a:r>
+              <a:rPr lang="en-US"/>
+              <a:t>Third level</a:t>
+            </a:r>
+          </a:p>
+          <a:p>
+            <a:pPr lvl="3"/>
+            <a:r>
+              <a:rPr lang="en-US"/>
+              <a:t>Fourth level</a:t>
+            </a:r>
+          </a:p>
+          <a:p>
+            <a:pPr lvl="4"/>
+            <a:r>
+              <a:rPr lang="en-US"/>
+              <a:t>Fifth level</a:t>
+            </a:r>
+          </a:p>
+        </p:txBody>
+      </p:sp>
+      <p:sp>
+        <p:nvSpPr>
+          <p:cNvPr id="6" name="Footer Placeholder 5"/>
+          <p:cNvSpPr>
+            <a:spLocks noGrp="1"/>
+          </p:cNvSpPr>
+          <p:nvPr>
+            <p:ph type="ftr" sz="quarter" idx="4"/>
+          </p:nvPr>
+        </p:nvSpPr>
+        <p:spPr>
+          <a:xfrm>
+            <a:off x="0" y="8685213"/>
+            <a:ext cx="2971800" cy="458787"/>
+          </a:xfrm>
+          <a:prstGeom prst="rect">
+            <a:avLst/>
+          </a:prstGeom>
+        </p:spPr>
+        <p:txBody>
+          <a:bodyPr vert="horz" lIns="91440" tIns="45720" rIns="91440" bIns="45720" rtlCol="0" anchor="b"/>
+          <a:lstStyle>
+            <a:lvl1pPr algn="l">
+              <a:defRPr sz="1200"/>
+            </a:lvl1pPr>
+          </a:lstStyle>
+          <a:p>
+            <a:endParaRPr lang="en-US"/>
+          </a:p>
+        </p:txBody>
+      </p:sp>
+      <p:sp>
+        <p:nvSpPr>
+          <p:cNvPr id="7" name="Slide Number Placeholder 6"/>
+          <p:cNvSpPr>
+            <a:spLocks noGrp="1"/>
+          </p:cNvSpPr>
+          <p:nvPr>
+            <p:ph type="sldNum" sz="quarter" idx="5"/>
+          </p:nvPr>
+        </p:nvSpPr>
+        <p:spPr>
+          <a:xfrm>
+            <a:off x="3884613" y="8685213"/>
+            <a:ext cx="2971800" cy="458787"/>
+          </a:xfrm>
+          <a:prstGeom prst="rect">
+            <a:avLst/>
+          </a:prstGeom>
+        </p:spPr>
+        <p:txBody>
+          <a:bodyPr vert="horz" lIns="91440" tIns="45720" rIns="91440" bIns="45720" rtlCol="0" anchor="b"/>
+          <a:lstStyle>
+            <a:lvl1pPr algn="r">
+              <a:defRPr sz="1200"/>
+            </a:lvl1pPr>
+          </a:lstStyle>
+          <a:p>
+            <a:fld id="{88235DDB-0FEF-4EB2-BCD8-815B0819EAD1}" type="slidenum">
+              <a:rPr lang="en-US" smtClean="0"/>
+              <a:t>‹#›</a:t>
+            </a:fld>
+            <a:endParaRPr lang="en-US"/>
+          </a:p>
+        </p:txBody>
+      </p:sp>
+    </p:spTree>
+    <p:extLst>
+      <p:ext uri="{BB962C8B-B14F-4D97-AF65-F5344CB8AC3E}">
+        <p14:creationId xmlns:p14="http://schemas.microsoft.com/office/powerpoint/2010/main" val="524025816"/>
+      </p:ext>
+    </p:extLst>
+  </p:cSld>
+  <p:clrMap bg1="lt1" tx1="dk1" bg2="lt2" tx2="dk2" accent1="accent1" accent2="accent2" accent3="accent3" accent4="accent4" accent5="accent5" accent6="accent6" hlink="hlink" folHlink="folHlink"/>
+  <p:notesStyle>
+    <a:lvl1pPr marL="0" algn="l" defTabSz="914400" rtl="0" eaLnBrk="1" latinLnBrk="0" hangingPunct="1">
+      <a:defRPr sz="1200" kern="1200">
+        <a:solidFill>
+          <a:schemeClr val="tx1"/>
+        </a:solidFill>
+        <a:latin typeface="+mn-lt"/>
+        <a:ea typeface="+mn-ea"/>
+        <a:cs typeface="+mn-cs"/>
+      </a:defRPr>
+    </a:lvl1pPr>
+    <a:lvl2pPr marL="457200" algn="l" defTabSz="914400" rtl="0" eaLnBrk="1" latinLnBrk="0" hangingPunct="1">
+      <a:defRPr sz="1200" kern="1200">
+        <a:solidFill>
+          <a:schemeClr val="tx1"/>
+        </a:solidFill>
+        <a:latin typeface="+mn-lt"/>
+        <a:ea typeface="+mn-ea"/>
+        <a:cs typeface="+mn-cs"/>
+      </a:defRPr>
+    </a:lvl2pPr>
+    <a:lvl3pPr marL="914400" algn="l" defTabSz="914400" rtl="0" eaLnBrk="1" latinLnBrk="0" hangingPunct="1">
+      <a:defRPr sz="1200" kern="1200">
+        <a:solidFill>
+          <a:schemeClr val="tx1"/>
+        </a:solidFill>
+        <a:latin typeface="+mn-lt"/>
+        <a:ea typeface="+mn-ea"/>
+        <a:cs typeface="+mn-cs"/>
+      </a:defRPr>
+    </a:lvl3pPr>
+    <a:lvl4pPr marL="1371600" algn="l" defTabSz="914400" rtl="0" eaLnBrk="1" latinLnBrk="0" hangingPunct="1">
+      <a:defRPr sz="1200" kern="1200">
+        <a:solidFill>
+          <a:schemeClr val="tx1"/>
+        </a:solidFill>
+        <a:latin typeface="+mn-lt"/>
+        <a:ea typeface="+mn-ea"/>
+        <a:cs typeface="+mn-cs"/>
+      </a:defRPr>
+    </a:lvl4pPr>
+    <a:lvl5pPr marL="1828800" algn="l" defTabSz="914400" rtl="0" eaLnBrk="1" latinLnBrk="0" hangingPunct="1">
+      <a:defRPr sz="1200" kern="1200">
+        <a:solidFill>
+          <a:schemeClr val="tx1"/>
+        </a:solidFill>
+        <a:latin typeface="+mn-lt"/>
+        <a:ea typeface="+mn-ea"/>
+        <a:cs typeface="+mn-cs"/>
+      </a:defRPr>
+    </a:lvl5pPr>
+    <a:lvl6pPr marL="2286000" algn="l" defTabSz="914400" rtl="0" eaLnBrk="1" latinLnBrk="0" hangingPunct="1">
+      <a:defRPr sz="1200" kern="1200">
+        <a:solidFill>
+          <a:schemeClr val="tx1"/>
+        </a:solidFill>
+        <a:latin typeface="+mn-lt"/>
+        <a:ea typeface="+mn-ea"/>
+        <a:cs typeface="+mn-cs"/>
+      </a:defRPr>
+    </a:lvl6pPr>
+    <a:lvl7pPr marL="2743200" algn="l" defTabSz="914400" rtl="0" eaLnBrk="1" latinLnBrk="0" hangingPunct="1">
+      <a:defRPr sz="1200" kern="1200">
+        <a:solidFill>
+          <a:schemeClr val="tx1"/>
+        </a:solidFill>
+        <a:latin typeface="+mn-lt"/>
+        <a:ea typeface="+mn-ea"/>
+        <a:cs typeface="+mn-cs"/>
+      </a:defRPr>
+    </a:lvl7pPr>
+    <a:lvl8pPr marL="3200400" algn="l" defTabSz="914400" rtl="0" eaLnBrk="1" latinLnBrk="0" hangingPunct="1">
+      <a:defRPr sz="1200" kern="1200">
+        <a:solidFill>
+          <a:schemeClr val="tx1"/>
+        </a:solidFill>
+        <a:latin typeface="+mn-lt"/>
+        <a:ea typeface="+mn-ea"/>
+        <a:cs typeface="+mn-cs"/>
+      </a:defRPr>
+    </a:lvl8pPr>
+    <a:lvl9pPr marL="3657600" algn="l" defTabSz="914400" rtl="0" eaLnBrk="1" latinLnBrk="0" hangingPunct="1">
+      <a:defRPr sz="1200" kern="1200">
+        <a:solidFill>
+          <a:schemeClr val="tx1"/>
+        </a:solidFill>
+        <a:latin typeface="+mn-lt"/>
+        <a:ea typeface="+mn-ea"/>
+        <a:cs typeface="+mn-cs"/>
+      </a:defRPr>
+    </a:lvl9pPr>
+  </p:notesStyle>
+</p:notesMaster>
+</file>
+
+<file path=ppt/notesSlides/notesSlide1.xml><?xml version="1.0" encoding="utf-8"?>
+<p:notes xmlns:a="http://schemas.openxmlformats.org/drawingml/2006/main" xmlns:r="http://schemas.openxmlformats.org/officeDocument/2006/relationships" xmlns:p="http://schemas.openxmlformats.org/presentationml/2006/main">
+  <p:cSld>
+    <p:spTree>
+      <p:nvGrpSpPr>
+        <p:cNvPr id="1" name=""/>
+        <p:cNvGrpSpPr/>
+        <p:nvPr/>
+      </p:nvGrpSpPr>
+      <p:grpSpPr>
+        <a:xfrm>
+          <a:off x="0" y="0"/>
+          <a:ext cx="0" cy="0"/>
+          <a:chOff x="0" y="0"/>
+          <a:chExt cx="0" cy="0"/>
+        </a:xfrm>
+      </p:grpSpPr>
+      <p:sp>
+        <p:nvSpPr>
+          <p:cNvPr id="2" name="Slide Image Placeholder 1"/>
+          <p:cNvSpPr>
+            <a:spLocks noGrp="1" noRot="1" noChangeAspect="1"/>
+          </p:cNvSpPr>
+          <p:nvPr>
+            <p:ph type="sldImg"/>
+          </p:nvPr>
+        </p:nvSpPr>
+        <p:spPr/>
+      </p:sp>
+      <p:sp>
+        <p:nvSpPr>
+          <p:cNvPr id="3" name="Notes Placeholder 2"/>
+          <p:cNvSpPr>
+            <a:spLocks noGrp="1"/>
+          </p:cNvSpPr>
+          <p:nvPr>
+            <p:ph type="body" idx="1"/>
+          </p:nvPr>
+        </p:nvSpPr>
+        <p:spPr/>
+        <p:txBody>
+          <a:bodyPr/>
+          <a:lstStyle/>
+          <a:p>
+            <a:r>
+              <a:rPr lang="en-US" dirty="0"/>
+              <a:t>Just pointing out that it is basically one layer above a build system</a:t>
+            </a:r>
+          </a:p>
+        </p:txBody>
+      </p:sp>
+      <p:sp>
+        <p:nvSpPr>
+          <p:cNvPr id="4" name="Slide Number Placeholder 3"/>
+          <p:cNvSpPr>
+            <a:spLocks noGrp="1"/>
+          </p:cNvSpPr>
+          <p:nvPr>
+            <p:ph type="sldNum" sz="quarter" idx="10"/>
+          </p:nvPr>
+        </p:nvSpPr>
+        <p:spPr/>
+        <p:txBody>
+          <a:bodyPr/>
+          <a:lstStyle/>
+          <a:p>
+            <a:fld id="{88235DDB-0FEF-4EB2-BCD8-815B0819EAD1}" type="slidenum">
+              <a:rPr lang="en-US" smtClean="0"/>
+              <a:t>4</a:t>
+            </a:fld>
+            <a:endParaRPr lang="en-US"/>
+          </a:p>
+        </p:txBody>
+      </p:sp>
+    </p:spTree>
+    <p:extLst>
+      <p:ext uri="{BB962C8B-B14F-4D97-AF65-F5344CB8AC3E}">
+        <p14:creationId xmlns:p14="http://schemas.microsoft.com/office/powerpoint/2010/main" val="2942868354"/>
+      </p:ext>
+    </p:extLst>
+  </p:cSld>
+  <p:clrMapOvr>
+    <a:masterClrMapping/>
+  </p:clrMapOvr>
+</p:notes>
+</file>
+
+<file path=ppt/notesSlides/notesSlide2.xml><?xml version="1.0" encoding="utf-8"?>
+<p:notes xmlns:a="http://schemas.openxmlformats.org/drawingml/2006/main" xmlns:r="http://schemas.openxmlformats.org/officeDocument/2006/relationships" xmlns:p="http://schemas.openxmlformats.org/presentationml/2006/main">
+  <p:cSld>
+    <p:spTree>
+      <p:nvGrpSpPr>
+        <p:cNvPr id="1" name=""/>
+        <p:cNvGrpSpPr/>
+        <p:nvPr/>
+      </p:nvGrpSpPr>
+      <p:grpSpPr>
+        <a:xfrm>
+          <a:off x="0" y="0"/>
+          <a:ext cx="0" cy="0"/>
+          <a:chOff x="0" y="0"/>
+          <a:chExt cx="0" cy="0"/>
+        </a:xfrm>
+      </p:grpSpPr>
+      <p:sp>
+        <p:nvSpPr>
+          <p:cNvPr id="2" name="Slide Image Placeholder 1"/>
+          <p:cNvSpPr>
+            <a:spLocks noGrp="1" noRot="1" noChangeAspect="1"/>
+          </p:cNvSpPr>
+          <p:nvPr>
+            <p:ph type="sldImg"/>
+          </p:nvPr>
+        </p:nvSpPr>
+        <p:spPr/>
+      </p:sp>
+      <p:sp>
+        <p:nvSpPr>
+          <p:cNvPr id="3" name="Notes Placeholder 2"/>
+          <p:cNvSpPr>
+            <a:spLocks noGrp="1"/>
+          </p:cNvSpPr>
+          <p:nvPr>
+            <p:ph type="body" idx="1"/>
+          </p:nvPr>
+        </p:nvSpPr>
+        <p:spPr/>
+        <p:txBody>
+          <a:bodyPr/>
+          <a:lstStyle/>
+          <a:p>
+            <a:r>
+              <a:rPr lang="en-US" dirty="0"/>
+              <a:t>You already use the language that hates you the most, why not use the prebuild system that hates you the most?</a:t>
+            </a:r>
+          </a:p>
+        </p:txBody>
+      </p:sp>
+      <p:sp>
+        <p:nvSpPr>
+          <p:cNvPr id="4" name="Slide Number Placeholder 3"/>
+          <p:cNvSpPr>
+            <a:spLocks noGrp="1"/>
+          </p:cNvSpPr>
+          <p:nvPr>
+            <p:ph type="sldNum" sz="quarter" idx="10"/>
+          </p:nvPr>
+        </p:nvSpPr>
+        <p:spPr/>
+        <p:txBody>
+          <a:bodyPr/>
+          <a:lstStyle/>
+          <a:p>
+            <a:fld id="{88235DDB-0FEF-4EB2-BCD8-815B0819EAD1}" type="slidenum">
+              <a:rPr lang="en-US" smtClean="0"/>
+              <a:t>9</a:t>
+            </a:fld>
+            <a:endParaRPr lang="en-US"/>
+          </a:p>
+        </p:txBody>
+      </p:sp>
+    </p:spTree>
+    <p:extLst>
+      <p:ext uri="{BB962C8B-B14F-4D97-AF65-F5344CB8AC3E}">
+        <p14:creationId xmlns:p14="http://schemas.microsoft.com/office/powerpoint/2010/main" val="4117134760"/>
+      </p:ext>
+    </p:extLst>
+  </p:cSld>
+  <p:clrMapOvr>
+    <a:masterClrMapping/>
+  </p:clrMapOvr>
+</p:notes>
 </file>
 
 <file path=ppt/slideLayouts/slideLayout1.xml><?xml version="1.0" encoding="utf-8"?>
@@ -4312,6 +4847,7 @@
             </a:r>
           </a:p>
           <a:p>
+            <a:pPr lvl="1"/>
             <a:r>
               <a:rPr lang="en-US" dirty="0"/>
               <a:t>CMake can simplify this enormously.</a:t>
@@ -4320,7 +4856,13 @@
           <a:p>
             <a:r>
               <a:rPr lang="en-US" dirty="0"/>
-              <a:t>(Fairly)Easy CMake project dependency integration</a:t>
+              <a:t>(Fairly) Easy CMake project dependency integration</a:t>
+            </a:r>
+          </a:p>
+          <a:p>
+            <a:r>
+              <a:rPr lang="en-US" dirty="0"/>
+              <a:t>The rest of the world uses it, so are you going to end up using it anyway</a:t>
             </a:r>
           </a:p>
           <a:p>
@@ -4363,7 +4905,7 @@
           <p:cNvPr id="2" name="Title 1">
             <a:extLst>
               <a:ext uri="{FF2B5EF4-FFF2-40B4-BE49-F238E27FC236}">
-                <a16:creationId xmlns:a16="http://schemas.microsoft.com/office/drawing/2014/main" id="{5A51E9F4-2D05-45CB-87FC-C2B791FD1FCC}"/>
+                <a16:creationId xmlns:a16="http://schemas.microsoft.com/office/drawing/2014/main" id="{95F2B381-BA5F-4382-B2D2-C4B00F28D0CB}"/>
               </a:ext>
             </a:extLst>
           </p:cNvPr>
@@ -4371,22 +4913,81 @@
             <a:spLocks noGrp="1"/>
           </p:cNvSpPr>
           <p:nvPr>
-            <p:ph type="ctrTitle"/>
-          </p:nvPr>
-        </p:nvSpPr>
-        <p:spPr>
-          <a:xfrm>
-            <a:off x="1066800" y="2825750"/>
-            <a:ext cx="10058400" cy="1206500"/>
-          </a:xfrm>
-        </p:spPr>
-        <p:txBody>
-          <a:bodyPr/>
-          <a:lstStyle/>
-          <a:p>
-            <a:r>
-              <a:rPr lang="en-US" dirty="0"/>
-              <a:t>Live Demo</a:t>
+            <p:ph type="title"/>
+          </p:nvPr>
+        </p:nvSpPr>
+        <p:spPr/>
+        <p:txBody>
+          <a:bodyPr/>
+          <a:lstStyle/>
+          <a:p>
+            <a:r>
+              <a:rPr lang="en-US" dirty="0"/>
+              <a:t>Overview</a:t>
+            </a:r>
+          </a:p>
+        </p:txBody>
+      </p:sp>
+      <p:sp>
+        <p:nvSpPr>
+          <p:cNvPr id="3" name="Content Placeholder 2">
+            <a:extLst>
+              <a:ext uri="{FF2B5EF4-FFF2-40B4-BE49-F238E27FC236}">
+                <a16:creationId xmlns:a16="http://schemas.microsoft.com/office/drawing/2014/main" id="{523430B4-ED6C-4692-92C6-839A7BDF338A}"/>
+              </a:ext>
+            </a:extLst>
+          </p:cNvPr>
+          <p:cNvSpPr>
+            <a:spLocks noGrp="1"/>
+          </p:cNvSpPr>
+          <p:nvPr>
+            <p:ph idx="1"/>
+          </p:nvPr>
+        </p:nvSpPr>
+        <p:spPr/>
+        <p:txBody>
+          <a:bodyPr/>
+          <a:lstStyle/>
+          <a:p>
+            <a:r>
+              <a:rPr lang="en-US" dirty="0"/>
+              <a:t>Targets</a:t>
+            </a:r>
+          </a:p>
+          <a:p>
+            <a:r>
+              <a:rPr lang="en-US" dirty="0"/>
+              <a:t>Variables</a:t>
+            </a:r>
+          </a:p>
+          <a:p>
+            <a:r>
+              <a:rPr lang="en-US" dirty="0"/>
+              <a:t>Properties</a:t>
+            </a:r>
+          </a:p>
+          <a:p>
+            <a:r>
+              <a:rPr lang="en-US" dirty="0"/>
+              <a:t>Functions</a:t>
+            </a:r>
+          </a:p>
+          <a:p>
+            <a:r>
+              <a:rPr lang="en-US" dirty="0"/>
+              <a:t>Macros</a:t>
+            </a:r>
+          </a:p>
+          <a:p>
+            <a:r>
+              <a:rPr lang="en-US" dirty="0"/>
+              <a:t>Generator Expressions</a:t>
+            </a:r>
+          </a:p>
+          <a:p>
+            <a:r>
+              <a:rPr lang="en-US" dirty="0"/>
+              <a:t>Old way versus new way</a:t>
             </a:r>
           </a:p>
         </p:txBody>
@@ -4394,7 +4995,7 @@
     </p:spTree>
     <p:extLst>
       <p:ext uri="{BB962C8B-B14F-4D97-AF65-F5344CB8AC3E}">
-        <p14:creationId xmlns:p14="http://schemas.microsoft.com/office/powerpoint/2010/main" val="2381102007"/>
+        <p14:creationId xmlns:p14="http://schemas.microsoft.com/office/powerpoint/2010/main" val="2570490713"/>
       </p:ext>
     </p:extLst>
   </p:cSld>
@@ -4426,7 +5027,7 @@
           <p:cNvPr id="2" name="Title 1">
             <a:extLst>
               <a:ext uri="{FF2B5EF4-FFF2-40B4-BE49-F238E27FC236}">
-                <a16:creationId xmlns:a16="http://schemas.microsoft.com/office/drawing/2014/main" id="{5439A42F-D69F-41B9-8D3A-125EEAB813ED}"/>
+                <a16:creationId xmlns:a16="http://schemas.microsoft.com/office/drawing/2014/main" id="{87C8EFB4-92B1-4554-BFB1-C37C800EECBD}"/>
               </a:ext>
             </a:extLst>
           </p:cNvPr>
@@ -4444,7 +5045,7 @@
           <a:p>
             <a:r>
               <a:rPr lang="en-US" dirty="0"/>
-              <a:t>Fisher’s Experience</a:t>
+              <a:t>Targets</a:t>
             </a:r>
           </a:p>
         </p:txBody>
@@ -4454,7 +5055,7 @@
           <p:cNvPr id="3" name="Content Placeholder 2">
             <a:extLst>
               <a:ext uri="{FF2B5EF4-FFF2-40B4-BE49-F238E27FC236}">
-                <a16:creationId xmlns:a16="http://schemas.microsoft.com/office/drawing/2014/main" id="{AED144B3-C042-4459-8D4E-0DA70C5E68DB}"/>
+                <a16:creationId xmlns:a16="http://schemas.microsoft.com/office/drawing/2014/main" id="{1F8F38F5-5CB3-42C8-839D-ABFAEF60853C}"/>
               </a:ext>
             </a:extLst>
           </p:cNvPr>
@@ -4465,122 +5066,62 @@
             <p:ph idx="1"/>
           </p:nvPr>
         </p:nvSpPr>
-        <p:spPr>
-          <a:xfrm>
-            <a:off x="1371600" y="2286000"/>
-            <a:ext cx="9601200" cy="4226668"/>
-          </a:xfrm>
-        </p:spPr>
-        <p:txBody>
-          <a:bodyPr>
-            <a:normAutofit/>
-          </a:bodyPr>
-          <a:lstStyle/>
-          <a:p>
-            <a:r>
-              <a:rPr lang="en-US" dirty="0"/>
-              <a:t>Ripple (2014 – 2015)</a:t>
+        <p:spPr/>
+        <p:txBody>
+          <a:bodyPr/>
+          <a:lstStyle/>
+          <a:p>
+            <a:r>
+              <a:rPr lang="en-US" dirty="0"/>
+              <a:t>Core building block of modern CMake.</a:t>
+            </a:r>
+          </a:p>
+          <a:p>
+            <a:r>
+              <a:rPr lang="en-US" dirty="0"/>
+              <a:t>Defines projects</a:t>
             </a:r>
           </a:p>
           <a:p>
             <a:pPr lvl="1"/>
             <a:r>
               <a:rPr lang="en-US" dirty="0"/>
-              <a:t>Used GLOB Syntax (bad)</a:t>
+              <a:t>A thing you want to build, that has source files, linker flags, etc.</a:t>
             </a:r>
           </a:p>
           <a:p>
             <a:pPr lvl="1"/>
             <a:r>
               <a:rPr lang="en-US" dirty="0"/>
-              <a:t>Completely manual dependency management</a:t>
-            </a:r>
-          </a:p>
-          <a:p>
-            <a:pPr lvl="1"/>
-            <a:r>
-              <a:rPr lang="en-US" dirty="0"/>
-              <a:t>All global property management</a:t>
-            </a:r>
-          </a:p>
-          <a:p>
+              <a:t>A library, an executable, a shared library, object library, </a:t>
+            </a:r>
             <a:r>
               <a:rPr lang="en-US" dirty="0" err="1"/>
-              <a:t>Synethesia</a:t>
-            </a:r>
-            <a:r>
-              <a:rPr lang="en-US" dirty="0"/>
-              <a:t> (2015 – 2016)</a:t>
-            </a:r>
-          </a:p>
-          <a:p>
-            <a:pPr lvl="1"/>
-            <a:r>
-              <a:rPr lang="en-US" dirty="0"/>
-              <a:t>Moved large dependencies to git </a:t>
-            </a:r>
-            <a:r>
-              <a:rPr lang="en-US" dirty="0" err="1"/>
-              <a:t>lfs</a:t>
-            </a:r>
-            <a:r>
-              <a:rPr lang="en-US" dirty="0"/>
-              <a:t> (git </a:t>
-            </a:r>
-            <a:r>
-              <a:rPr lang="en-US" dirty="0" err="1"/>
-              <a:t>lfs</a:t>
-            </a:r>
-            <a:r>
-              <a:rPr lang="en-US" dirty="0"/>
-              <a:t> is the enemy, do not trust)</a:t>
-            </a:r>
-          </a:p>
-          <a:p>
-            <a:r>
-              <a:rPr lang="en-US" dirty="0"/>
-              <a:t>Lamb Planet (2017 – 2018)</a:t>
-            </a:r>
-          </a:p>
-          <a:p>
-            <a:pPr lvl="1"/>
-            <a:r>
-              <a:rPr lang="en-US" dirty="0"/>
-              <a:t>Converted to using target based commands for most work.</a:t>
-            </a:r>
-          </a:p>
-          <a:p>
-            <a:pPr lvl="1"/>
-            <a:r>
-              <a:rPr lang="en-US" dirty="0"/>
-              <a:t>Started using </a:t>
-            </a:r>
-            <a:r>
-              <a:rPr lang="en-US" dirty="0" err="1"/>
-              <a:t>subrepos</a:t>
-            </a:r>
-            <a:r>
-              <a:rPr lang="en-US" dirty="0"/>
-              <a:t> for most major dependencies.</a:t>
-            </a:r>
-          </a:p>
-          <a:p>
-            <a:pPr lvl="1"/>
-            <a:r>
-              <a:rPr lang="en-US" dirty="0"/>
-              <a:t>Started using recursive functions to hit all targets with flags. (Test your CMake limits, don’t be afraid.)</a:t>
-            </a:r>
-          </a:p>
-          <a:p>
-            <a:pPr lvl="1"/>
-            <a:endParaRPr lang="en-US" dirty="0"/>
+              <a:t>module..HAH</a:t>
+            </a:r>
+            <a:r>
+              <a:rPr lang="en-US" dirty="0"/>
+              <a:t> no</a:t>
+            </a:r>
+          </a:p>
+          <a:p>
+            <a:r>
+              <a:rPr lang="en-US" dirty="0"/>
+              <a:t>Can depend on other targets</a:t>
+            </a:r>
+          </a:p>
+          <a:p>
+            <a:r>
+              <a:rPr lang="en-US" dirty="0"/>
+              <a:t>Can depend on external libraries</a:t>
+            </a:r>
           </a:p>
         </p:txBody>
       </p:sp>
     </p:spTree>
     <p:extLst>
       <p:ext uri="{BB962C8B-B14F-4D97-AF65-F5344CB8AC3E}">
-        <p14:creationId xmlns:p14="http://schemas.microsoft.com/office/powerpoint/2010/main" val="760306334"/>
+        <p14:creationId xmlns:p14="http://schemas.microsoft.com/office/powerpoint/2010/main" val="2511198145"/>
       </p:ext>
     </p:extLst>
   </p:cSld>
@@ -4612,7 +5153,7 @@
           <p:cNvPr id="2" name="Title 1">
             <a:extLst>
               <a:ext uri="{FF2B5EF4-FFF2-40B4-BE49-F238E27FC236}">
-                <a16:creationId xmlns:a16="http://schemas.microsoft.com/office/drawing/2014/main" id="{9CD1B0E8-4A5D-40BC-A74E-FDDDEEB120A8}"/>
+                <a16:creationId xmlns:a16="http://schemas.microsoft.com/office/drawing/2014/main" id="{9B993B0A-59E3-41D5-BB54-900A84ADE99D}"/>
               </a:ext>
             </a:extLst>
           </p:cNvPr>
@@ -4630,7 +5171,7 @@
           <a:p>
             <a:r>
               <a:rPr lang="en-US" dirty="0"/>
-              <a:t>Testimonies (From Fisher’s Team)</a:t>
+              <a:t>Variables</a:t>
             </a:r>
           </a:p>
         </p:txBody>
@@ -4640,7 +5181,7 @@
           <p:cNvPr id="3" name="Content Placeholder 2">
             <a:extLst>
               <a:ext uri="{FF2B5EF4-FFF2-40B4-BE49-F238E27FC236}">
-                <a16:creationId xmlns:a16="http://schemas.microsoft.com/office/drawing/2014/main" id="{BCA3064C-1DF7-4111-BBB3-C115C9DA4727}"/>
+                <a16:creationId xmlns:a16="http://schemas.microsoft.com/office/drawing/2014/main" id="{DEEADC0C-9DE6-42AB-829D-12C9384CB8C2}"/>
               </a:ext>
             </a:extLst>
           </p:cNvPr>
@@ -4658,44 +5199,43 @@
           <a:p>
             <a:r>
               <a:rPr lang="en-US" dirty="0"/>
-              <a:t>“If you ever want a project on multiple computers, you need something, I mean, fuck.” – Nicholas Ammann (Editor Programmer)</a:t>
-            </a:r>
-          </a:p>
-          <a:p>
-            <a:r>
-              <a:rPr lang="en-US" dirty="0"/>
-              <a:t>“It’s better than all the other options.” – Evan Collier (Core Programmer)</a:t>
-            </a:r>
-          </a:p>
-          <a:p>
-            <a:r>
-              <a:rPr lang="en-US" dirty="0"/>
-              <a:t>“I haven't used it a ton </a:t>
+              <a:t>The worst thing</a:t>
+            </a:r>
+          </a:p>
+          <a:p>
+            <a:r>
+              <a:rPr lang="en-US" dirty="0"/>
+              <a:t>They are all strings</a:t>
+            </a:r>
+          </a:p>
+          <a:p>
+            <a:r>
+              <a:rPr lang="en-US" dirty="0"/>
+              <a:t>Yes the numbers are strings, I think we already said that.</a:t>
+            </a:r>
+          </a:p>
+          <a:p>
+            <a:r>
+              <a:rPr lang="en-US" dirty="0"/>
+              <a:t>Inside a string, you can access a string, in your string, to get that string in your string, and save it to another string</a:t>
+            </a:r>
+          </a:p>
+          <a:p>
+            <a:pPr lvl="1"/>
+            <a:r>
+              <a:rPr lang="en-US" dirty="0"/>
+              <a:t>We have an example later, because you do it all the time.</a:t>
+            </a:r>
+          </a:p>
+          <a:p>
+            <a:r>
+              <a:rPr lang="en-US" dirty="0"/>
+              <a:t>CMake becomes a lot easier if you just think of variable access as </a:t>
             </a:r>
             <a:r>
               <a:rPr lang="en-US" dirty="0" err="1"/>
-              <a:t>tho</a:t>
-            </a:r>
-            <a:r>
-              <a:rPr lang="en-US" dirty="0"/>
-              <a:t> like I've used it a bit but have usually had weirdo problems” – </a:t>
-            </a:r>
-            <a:r>
-              <a:rPr lang="en-US" dirty="0" err="1"/>
-              <a:t>Gabryelle</a:t>
-            </a:r>
-            <a:r>
-              <a:rPr lang="en-US" dirty="0"/>
-              <a:t> Chamberlin (Graphics Programmer)</a:t>
-            </a:r>
-          </a:p>
-          <a:p>
-            <a:r>
-              <a:rPr lang="en-US" dirty="0"/>
-              <a:t>“I never think about CMake unless the file I added yesterday isn’t showing up in the Project window today.” – Isaac Dayton (Gameplay Programmer)</a:t>
-            </a:r>
-          </a:p>
-          <a:p>
+              <a:t>hashmaps</a:t>
+            </a:r>
             <a:endParaRPr lang="en-US" dirty="0"/>
           </a:p>
         </p:txBody>
@@ -4703,7 +5243,7 @@
     </p:spTree>
     <p:extLst>
       <p:ext uri="{BB962C8B-B14F-4D97-AF65-F5344CB8AC3E}">
-        <p14:creationId xmlns:p14="http://schemas.microsoft.com/office/powerpoint/2010/main" val="305148900"/>
+        <p14:creationId xmlns:p14="http://schemas.microsoft.com/office/powerpoint/2010/main" val="3710554620"/>
       </p:ext>
     </p:extLst>
   </p:cSld>
@@ -4735,7 +5275,7 @@
           <p:cNvPr id="2" name="Title 1">
             <a:extLst>
               <a:ext uri="{FF2B5EF4-FFF2-40B4-BE49-F238E27FC236}">
-                <a16:creationId xmlns:a16="http://schemas.microsoft.com/office/drawing/2014/main" id="{31EA04C8-0333-41F9-9A98-8A1B134D763A}"/>
+                <a16:creationId xmlns:a16="http://schemas.microsoft.com/office/drawing/2014/main" id="{BC9342A5-A7C5-4876-B825-42946BE0369B}"/>
               </a:ext>
             </a:extLst>
           </p:cNvPr>
@@ -4752,12 +5292,8 @@
           <a:lstStyle/>
           <a:p>
             <a:r>
-              <a:rPr lang="en-US" dirty="0" err="1"/>
-              <a:t>Shlemmer’s</a:t>
-            </a:r>
-            <a:r>
-              <a:rPr lang="en-US" dirty="0"/>
-              <a:t> Experience</a:t>
+              <a:rPr lang="en-US" dirty="0"/>
+              <a:t>Scopes</a:t>
             </a:r>
           </a:p>
         </p:txBody>
@@ -4767,7 +5303,7 @@
           <p:cNvPr id="3" name="Content Placeholder 2">
             <a:extLst>
               <a:ext uri="{FF2B5EF4-FFF2-40B4-BE49-F238E27FC236}">
-                <a16:creationId xmlns:a16="http://schemas.microsoft.com/office/drawing/2014/main" id="{6751B5F3-9FC6-4019-AA56-A83C89018229}"/>
+                <a16:creationId xmlns:a16="http://schemas.microsoft.com/office/drawing/2014/main" id="{DB3066D4-818A-441C-8652-245CE9107663}"/>
               </a:ext>
             </a:extLst>
           </p:cNvPr>
@@ -4784,12 +5320,51 @@
           <a:lstStyle/>
           <a:p>
             <a:r>
+              <a:rPr lang="en-US" dirty="0"/>
+              <a:t>Scopes are basically just </a:t>
+            </a:r>
+            <a:r>
               <a:rPr lang="en-US" dirty="0" err="1"/>
-              <a:t>cmake</a:t>
-            </a:r>
-            <a:r>
-              <a:rPr lang="en-US" dirty="0"/>
-              <a:t> is bad and I hate it lol</a:t>
+              <a:t>HashMaps</a:t>
+            </a:r>
+            <a:endParaRPr lang="en-US" dirty="0"/>
+          </a:p>
+          <a:p>
+            <a:pPr lvl="1"/>
+            <a:r>
+              <a:rPr lang="en-US" dirty="0"/>
+              <a:t>Just a big </a:t>
+            </a:r>
+            <a:r>
+              <a:rPr lang="en-US" dirty="0" err="1"/>
+              <a:t>ol</a:t>
+            </a:r>
+            <a:r>
+              <a:rPr lang="en-US" dirty="0"/>
+              <a:t>’ stack of </a:t>
+            </a:r>
+            <a:r>
+              <a:rPr lang="en-US" dirty="0" err="1"/>
+              <a:t>HashMaps</a:t>
+            </a:r>
+            <a:endParaRPr lang="en-US" dirty="0"/>
+          </a:p>
+          <a:p>
+            <a:r>
+              <a:rPr lang="en-US" dirty="0"/>
+              <a:t>Functions have scopes</a:t>
+            </a:r>
+          </a:p>
+          <a:p>
+            <a:r>
+              <a:rPr lang="en-US" dirty="0"/>
+              <a:t>Directories have scopes</a:t>
+            </a:r>
+          </a:p>
+          <a:p>
+            <a:r>
+              <a:rPr lang="en-US" dirty="0"/>
+              <a:t>Macros and included files do not create new scopes</a:t>
             </a:r>
           </a:p>
         </p:txBody>
@@ -4797,7 +5372,7 @@
     </p:spTree>
     <p:extLst>
       <p:ext uri="{BB962C8B-B14F-4D97-AF65-F5344CB8AC3E}">
-        <p14:creationId xmlns:p14="http://schemas.microsoft.com/office/powerpoint/2010/main" val="2795907999"/>
+        <p14:creationId xmlns:p14="http://schemas.microsoft.com/office/powerpoint/2010/main" val="1904143691"/>
       </p:ext>
     </p:extLst>
   </p:cSld>
@@ -4829,7 +5404,7 @@
           <p:cNvPr id="2" name="Title 1">
             <a:extLst>
               <a:ext uri="{FF2B5EF4-FFF2-40B4-BE49-F238E27FC236}">
-                <a16:creationId xmlns:a16="http://schemas.microsoft.com/office/drawing/2014/main" id="{91DF5347-844B-4C15-B6AE-F284AFD2F324}"/>
+                <a16:creationId xmlns:a16="http://schemas.microsoft.com/office/drawing/2014/main" id="{61F55722-1808-4928-B7BB-7097FF32B19B}"/>
               </a:ext>
             </a:extLst>
           </p:cNvPr>
@@ -4847,7 +5422,7 @@
           <a:p>
             <a:r>
               <a:rPr lang="en-US" dirty="0"/>
-              <a:t>Review</a:t>
+              <a:t>Properties</a:t>
             </a:r>
           </a:p>
         </p:txBody>
@@ -4857,7 +5432,7 @@
           <p:cNvPr id="3" name="Content Placeholder 2">
             <a:extLst>
               <a:ext uri="{FF2B5EF4-FFF2-40B4-BE49-F238E27FC236}">
-                <a16:creationId xmlns:a16="http://schemas.microsoft.com/office/drawing/2014/main" id="{8B61951D-42A5-4407-A6EE-97C22244D142}"/>
+                <a16:creationId xmlns:a16="http://schemas.microsoft.com/office/drawing/2014/main" id="{18175B76-B40C-4E23-9540-CE4B136921B1}"/>
               </a:ext>
             </a:extLst>
           </p:cNvPr>
@@ -4870,56 +5445,59 @@
         </p:nvSpPr>
         <p:spPr/>
         <p:txBody>
-          <a:bodyPr>
-            <a:normAutofit lnSpcReduction="10000"/>
-          </a:bodyPr>
-          <a:lstStyle/>
-          <a:p>
-            <a:r>
-              <a:rPr lang="en-US" dirty="0"/>
-              <a:t>Use (and require) a new version, it’s just helpful to get better versions of commands </a:t>
-            </a:r>
-            <a:r>
-              <a:rPr lang="en-US" dirty="0" err="1"/>
-              <a:t>source_group</a:t>
-            </a:r>
-            <a:r>
-              <a:rPr lang="en-US" dirty="0"/>
-              <a:t>(TREE), despite your bugs, I’m looking at you</a:t>
-            </a:r>
-          </a:p>
-          <a:p>
-            <a:r>
-              <a:rPr lang="en-US" dirty="0"/>
-              <a:t>Use target based commands, be careful of PUBLIC/PRIVATE with each one, PUBLIC is transitive to targets that depend on the given target.</a:t>
-            </a:r>
-          </a:p>
-          <a:p>
-            <a:r>
-              <a:rPr lang="en-US" dirty="0" err="1"/>
-              <a:t>GLOBing</a:t>
-            </a:r>
-            <a:r>
-              <a:rPr lang="en-US" dirty="0"/>
-              <a:t> sources is “considered harmful”, but we won’t tell anyone if you do it. (We will try to talk you out of it though.)</a:t>
-            </a:r>
-          </a:p>
-          <a:p>
-            <a:r>
-              <a:rPr lang="en-US" dirty="0"/>
-              <a:t>Guard your compiler/linker flags based on the compiler (similarly, if you’re manually managing your dependencies, guard your libraries based on platform)</a:t>
-            </a:r>
-          </a:p>
-          <a:p>
-            <a:r>
-              <a:rPr lang="en-US" dirty="0"/>
-              <a:t>Remember that some repetitiveness is okay, some is awful, evaluate and abstract</a:t>
-            </a:r>
-          </a:p>
-          <a:p>
-            <a:r>
-              <a:rPr lang="en-US" dirty="0"/>
-              <a:t>Find a medium sized project that uses modern CMake to base your work off of</a:t>
+          <a:bodyPr/>
+          <a:lstStyle/>
+          <a:p>
+            <a:r>
+              <a:rPr lang="en-US" dirty="0"/>
+              <a:t>Every setting you want to set on the compiler or linker is probably a property</a:t>
+            </a:r>
+          </a:p>
+          <a:p>
+            <a:pPr lvl="1"/>
+            <a:r>
+              <a:rPr lang="en-US" dirty="0"/>
+              <a:t>If it isn’t you are sad, and stare at an unclosed feature request from 2013</a:t>
+            </a:r>
+          </a:p>
+          <a:p>
+            <a:r>
+              <a:rPr lang="en-US" dirty="0"/>
+              <a:t>There are many types of properties, the important three are:</a:t>
+            </a:r>
+          </a:p>
+          <a:p>
+            <a:pPr lvl="1"/>
+            <a:r>
+              <a:rPr lang="en-US" dirty="0"/>
+              <a:t>Target Properties</a:t>
+            </a:r>
+          </a:p>
+          <a:p>
+            <a:pPr lvl="1"/>
+            <a:r>
+              <a:rPr lang="en-US" dirty="0"/>
+              <a:t>Directory Properties</a:t>
+            </a:r>
+          </a:p>
+          <a:p>
+            <a:pPr lvl="1"/>
+            <a:r>
+              <a:rPr lang="en-US" dirty="0"/>
+              <a:t>Global Properties</a:t>
+            </a:r>
+          </a:p>
+          <a:p>
+            <a:r>
+              <a:rPr lang="en-US" dirty="0"/>
+              <a:t>Use Target Properties whenever possible</a:t>
+            </a:r>
+          </a:p>
+          <a:p>
+            <a:pPr lvl="1"/>
+            <a:r>
+              <a:rPr lang="en-US" dirty="0"/>
+              <a:t>It will create a much more maintainable project, you will thank yourself later</a:t>
             </a:r>
           </a:p>
         </p:txBody>
@@ -4927,7 +5505,7 @@
     </p:spTree>
     <p:extLst>
       <p:ext uri="{BB962C8B-B14F-4D97-AF65-F5344CB8AC3E}">
-        <p14:creationId xmlns:p14="http://schemas.microsoft.com/office/powerpoint/2010/main" val="4238354831"/>
+        <p14:creationId xmlns:p14="http://schemas.microsoft.com/office/powerpoint/2010/main" val="3254461425"/>
       </p:ext>
     </p:extLst>
   </p:cSld>
@@ -4959,7 +5537,7 @@
           <p:cNvPr id="2" name="Title 1">
             <a:extLst>
               <a:ext uri="{FF2B5EF4-FFF2-40B4-BE49-F238E27FC236}">
-                <a16:creationId xmlns:a16="http://schemas.microsoft.com/office/drawing/2014/main" id="{67315A8A-8C97-47B9-973E-C95712B9A6F7}"/>
+                <a16:creationId xmlns:a16="http://schemas.microsoft.com/office/drawing/2014/main" id="{0358D2CC-D741-48DD-9C20-88AA94D5A55F}"/>
               </a:ext>
             </a:extLst>
           </p:cNvPr>
@@ -4977,7 +5555,7 @@
           <a:p>
             <a:r>
               <a:rPr lang="en-US" dirty="0"/>
-              <a:t>Review part 2</a:t>
+              <a:t>Functions</a:t>
             </a:r>
           </a:p>
         </p:txBody>
@@ -4987,7 +5565,7 @@
           <p:cNvPr id="3" name="Content Placeholder 2">
             <a:extLst>
               <a:ext uri="{FF2B5EF4-FFF2-40B4-BE49-F238E27FC236}">
-                <a16:creationId xmlns:a16="http://schemas.microsoft.com/office/drawing/2014/main" id="{936103B9-9D0B-4F94-B236-6C52CF2D6E4C}"/>
+                <a16:creationId xmlns:a16="http://schemas.microsoft.com/office/drawing/2014/main" id="{ED209E02-027B-4B3B-968D-986D5103847D}"/>
               </a:ext>
             </a:extLst>
           </p:cNvPr>
@@ -5003,14 +5581,41 @@
           <a:bodyPr/>
           <a:lstStyle/>
           <a:p>
-            <a:endParaRPr lang="en-US"/>
+            <a:r>
+              <a:rPr lang="en-US" dirty="0"/>
+              <a:t>Can’t return values</a:t>
+            </a:r>
+          </a:p>
+          <a:p>
+            <a:r>
+              <a:rPr lang="en-US" dirty="0"/>
+              <a:t>Yes, even with return, and yes, there is a return function…neat</a:t>
+            </a:r>
+          </a:p>
+          <a:p>
+            <a:r>
+              <a:rPr lang="en-US" dirty="0"/>
+              <a:t>What they can do, is take a target as one of the parameters, then set properties on the target.</a:t>
+            </a:r>
+          </a:p>
+          <a:p>
+            <a:r>
+              <a:rPr lang="en-US" dirty="0"/>
+              <a:t>Use them when you can to reduce copy paste code.</a:t>
+            </a:r>
+          </a:p>
+          <a:p>
+            <a:r>
+              <a:rPr lang="en-US" dirty="0"/>
+              <a:t>Oh yea, the parameters are all strings.</a:t>
+            </a:r>
           </a:p>
         </p:txBody>
       </p:sp>
     </p:spTree>
     <p:extLst>
       <p:ext uri="{BB962C8B-B14F-4D97-AF65-F5344CB8AC3E}">
-        <p14:creationId xmlns:p14="http://schemas.microsoft.com/office/powerpoint/2010/main" val="1301922853"/>
+        <p14:creationId xmlns:p14="http://schemas.microsoft.com/office/powerpoint/2010/main" val="3271528606"/>
       </p:ext>
     </p:extLst>
   </p:cSld>
@@ -5042,7 +5647,7 @@
           <p:cNvPr id="2" name="Title 1">
             <a:extLst>
               <a:ext uri="{FF2B5EF4-FFF2-40B4-BE49-F238E27FC236}">
-                <a16:creationId xmlns:a16="http://schemas.microsoft.com/office/drawing/2014/main" id="{B3EB5296-4B53-4E29-B4CC-D988B1170D71}"/>
+                <a16:creationId xmlns:a16="http://schemas.microsoft.com/office/drawing/2014/main" id="{9D97E747-87C8-4456-AE1C-D6126E0908BC}"/>
               </a:ext>
             </a:extLst>
           </p:cNvPr>
@@ -5060,7 +5665,7 @@
           <a:p>
             <a:r>
               <a:rPr lang="en-US" dirty="0"/>
-              <a:t>Going Forward</a:t>
+              <a:t>Macros</a:t>
             </a:r>
           </a:p>
         </p:txBody>
@@ -5070,7 +5675,7 @@
           <p:cNvPr id="3" name="Content Placeholder 2">
             <a:extLst>
               <a:ext uri="{FF2B5EF4-FFF2-40B4-BE49-F238E27FC236}">
-                <a16:creationId xmlns:a16="http://schemas.microsoft.com/office/drawing/2014/main" id="{4A539FCB-5E30-4B26-868B-4EFF5C8C2C5D}"/>
+                <a16:creationId xmlns:a16="http://schemas.microsoft.com/office/drawing/2014/main" id="{6EFA8229-6E7A-4CA0-BCB0-8EB0B5191892}"/>
               </a:ext>
             </a:extLst>
           </p:cNvPr>
@@ -5088,25 +5693,40 @@
           <a:p>
             <a:r>
               <a:rPr lang="en-US" dirty="0"/>
-              <a:t>Watch Danial Pfeifer’s talk, and check out the awesome-</a:t>
-            </a:r>
-            <a:r>
-              <a:rPr lang="en-US" dirty="0" err="1"/>
-              <a:t>cmake</a:t>
-            </a:r>
-            <a:r>
-              <a:rPr lang="en-US" dirty="0"/>
-              <a:t> references</a:t>
-            </a:r>
-          </a:p>
-          <a:p>
-            <a:r>
-              <a:rPr lang="en-US" dirty="0"/>
-              <a:t>Explore some of the package managers, we haven’t had time to evaluate them</a:t>
-            </a:r>
-          </a:p>
-          <a:p>
-            <a:endParaRPr lang="en-US" dirty="0"/>
+              <a:t>Bad functions</a:t>
+            </a:r>
+          </a:p>
+          <a:p>
+            <a:r>
+              <a:rPr lang="en-US" dirty="0"/>
+              <a:t>Don’t give you new scope</a:t>
+            </a:r>
+          </a:p>
+          <a:p>
+            <a:r>
+              <a:rPr lang="en-US" dirty="0"/>
+              <a:t>Will leave whatever garbage you set around after they are called.</a:t>
+            </a:r>
+          </a:p>
+          <a:p>
+            <a:r>
+              <a:rPr lang="en-US" dirty="0"/>
+              <a:t>Some people use this to “return values”, please don’t, just use a function</a:t>
+            </a:r>
+          </a:p>
+          <a:p>
+            <a:pPr lvl="1"/>
+            <a:r>
+              <a:rPr lang="en-US" dirty="0"/>
+              <a:t>You can just pass a return parameter to a function, and the function can set that variable, think of it kind of like passing a return pointer when you want multiple returns from a function in C++</a:t>
+            </a:r>
+          </a:p>
+          <a:p>
+            <a:pPr lvl="1"/>
+            <a:r>
+              <a:rPr lang="en-US" dirty="0"/>
+              <a:t>Otherwise you “have” to unset all your temporaries at the end of the macro</a:t>
+            </a:r>
           </a:p>
           <a:p>
             <a:endParaRPr lang="en-US" dirty="0"/>
@@ -5116,7 +5736,7 @@
     </p:spTree>
     <p:extLst>
       <p:ext uri="{BB962C8B-B14F-4D97-AF65-F5344CB8AC3E}">
-        <p14:creationId xmlns:p14="http://schemas.microsoft.com/office/powerpoint/2010/main" val="674164296"/>
+        <p14:creationId xmlns:p14="http://schemas.microsoft.com/office/powerpoint/2010/main" val="4276146790"/>
       </p:ext>
     </p:extLst>
   </p:cSld>
@@ -5148,7 +5768,7 @@
           <p:cNvPr id="2" name="Title 1">
             <a:extLst>
               <a:ext uri="{FF2B5EF4-FFF2-40B4-BE49-F238E27FC236}">
-                <a16:creationId xmlns:a16="http://schemas.microsoft.com/office/drawing/2014/main" id="{3A192FE3-1AD2-4EA8-8F28-43393CB4BAA5}"/>
+                <a16:creationId xmlns:a16="http://schemas.microsoft.com/office/drawing/2014/main" id="{B2840009-3BC7-4DD3-B8FD-6965A18C5545}"/>
               </a:ext>
             </a:extLst>
           </p:cNvPr>
@@ -5166,7 +5786,7 @@
           <a:p>
             <a:r>
               <a:rPr lang="en-US" dirty="0"/>
-              <a:t>References</a:t>
+              <a:t>Generator Expressions</a:t>
             </a:r>
           </a:p>
         </p:txBody>
@@ -5176,7 +5796,7 @@
           <p:cNvPr id="3" name="Content Placeholder 2">
             <a:extLst>
               <a:ext uri="{FF2B5EF4-FFF2-40B4-BE49-F238E27FC236}">
-                <a16:creationId xmlns:a16="http://schemas.microsoft.com/office/drawing/2014/main" id="{90FD264D-72FB-49FD-9E95-F55D98EB1EDD}"/>
+                <a16:creationId xmlns:a16="http://schemas.microsoft.com/office/drawing/2014/main" id="{8F997BF1-D577-4D55-A836-C5B1646445F7}"/>
               </a:ext>
             </a:extLst>
           </p:cNvPr>
@@ -5194,68 +5814,97 @@
           <a:p>
             <a:r>
               <a:rPr lang="en-US" dirty="0"/>
-              <a:t>Daniel Pfeifer “Effective CMake"</a:t>
+              <a:t>Avoid using these, but you are going to need to for some stuff.</a:t>
+            </a:r>
+          </a:p>
+          <a:p>
+            <a:r>
+              <a:rPr lang="en-US" dirty="0"/>
+              <a:t>The only one you will probably use looks like this:</a:t>
             </a:r>
           </a:p>
           <a:p>
             <a:pPr lvl="1"/>
+            <a:r>
+              <a:rPr lang="en-US" dirty="0">
+                <a:solidFill>
+                  <a:schemeClr val="tx1"/>
+                </a:solidFill>
+                <a:latin typeface="Consolas" panose="020B0609020204030204" pitchFamily="49" charset="0"/>
+              </a:rPr>
+              <a:t>$&lt;$&lt;</a:t>
+            </a:r>
+            <a:r>
+              <a:rPr lang="en-US" dirty="0" err="1">
+                <a:solidFill>
+                  <a:schemeClr val="tx1"/>
+                </a:solidFill>
+                <a:latin typeface="Consolas" panose="020B0609020204030204" pitchFamily="49" charset="0"/>
+              </a:rPr>
+              <a:t>CONFIG:Debug</a:t>
+            </a:r>
+            <a:r>
+              <a:rPr lang="en-US" dirty="0">
+                <a:solidFill>
+                  <a:schemeClr val="tx1"/>
+                </a:solidFill>
+                <a:latin typeface="Consolas" panose="020B0609020204030204" pitchFamily="49" charset="0"/>
+              </a:rPr>
+              <a:t>&gt;:-GS&gt;</a:t>
+            </a:r>
+          </a:p>
+          <a:p>
+            <a:pPr lvl="1"/>
+            <a:r>
+              <a:rPr lang="en-US" dirty="0"/>
+              <a:t>Specifically, this is so you can define flags for just one configuration</a:t>
+            </a:r>
+          </a:p>
+          <a:p>
+            <a:r>
+              <a:rPr lang="en-US" dirty="0"/>
+              <a:t>Generator Expressions are evaluated during build system generation</a:t>
+            </a:r>
+          </a:p>
+          <a:p>
+            <a:pPr lvl="1"/>
+            <a:r>
+              <a:rPr lang="en-US" dirty="0"/>
+              <a:t>They also allow for defining stuff for build systems with multiconfiguration support, like the example above.</a:t>
+            </a:r>
+          </a:p>
+          <a:p>
+            <a:pPr lvl="1"/>
+            <a:r>
+              <a:rPr lang="en-US" dirty="0"/>
+              <a:t>Useful if you really need a condition to be evaluated inside of a function call</a:t>
+            </a:r>
+          </a:p>
+          <a:p>
+            <a:r>
+              <a:rPr lang="en-US" dirty="0"/>
+              <a:t>There are a lot of expressions available, </a:t>
+            </a:r>
             <a:r>
               <a:rPr lang="en-US" dirty="0">
                 <a:hlinkClick r:id="rId2"/>
               </a:rPr>
-              <a:t>https://www.youtube.com/watch?v=bsXLMQ6WgIk</a:t>
+              <a:t>check the doc page for more info.</a:t>
             </a:r>
             <a:endParaRPr lang="en-US" dirty="0"/>
           </a:p>
           <a:p>
-            <a:r>
-              <a:rPr lang="en-US" dirty="0" err="1"/>
-              <a:t>CGold</a:t>
-            </a:r>
-            <a:r>
-              <a:rPr lang="en-US" dirty="0"/>
-              <a:t>: The Hitchhiker’s Guide to the </a:t>
-            </a:r>
-            <a:r>
-              <a:rPr lang="en-US" dirty="0" err="1"/>
-              <a:t>Cmake</a:t>
-            </a:r>
+            <a:pPr marL="530352" lvl="1" indent="0">
+              <a:buNone/>
+            </a:pPr>
             <a:endParaRPr lang="en-US" dirty="0"/>
-          </a:p>
-          <a:p>
-            <a:pPr lvl="1"/>
-            <a:r>
-              <a:rPr lang="en-US" dirty="0">
-                <a:hlinkClick r:id="rId3"/>
-              </a:rPr>
-              <a:t>https://cgold.readthedocs.io/en/latest/</a:t>
-            </a:r>
-            <a:endParaRPr lang="en-US" dirty="0"/>
-          </a:p>
-          <a:p>
-            <a:r>
-              <a:rPr lang="en-US" dirty="0"/>
-              <a:t>awesome-</a:t>
-            </a:r>
-            <a:r>
-              <a:rPr lang="en-US" dirty="0" err="1"/>
-              <a:t>cmake</a:t>
-            </a:r>
-            <a:endParaRPr lang="en-US" dirty="0"/>
-          </a:p>
-          <a:p>
-            <a:pPr lvl="1"/>
-            <a:r>
-              <a:rPr lang="en-US" dirty="0"/>
-              <a:t>https://github.com/onqtam/awesome-cmake</a:t>
-            </a:r>
           </a:p>
         </p:txBody>
       </p:sp>
     </p:spTree>
     <p:extLst>
       <p:ext uri="{BB962C8B-B14F-4D97-AF65-F5344CB8AC3E}">
-        <p14:creationId xmlns:p14="http://schemas.microsoft.com/office/powerpoint/2010/main" val="229397432"/>
+        <p14:creationId xmlns:p14="http://schemas.microsoft.com/office/powerpoint/2010/main" val="4214887178"/>
       </p:ext>
     </p:extLst>
   </p:cSld>
@@ -5287,7 +5936,7 @@
           <p:cNvPr id="2" name="Title 1">
             <a:extLst>
               <a:ext uri="{FF2B5EF4-FFF2-40B4-BE49-F238E27FC236}">
-                <a16:creationId xmlns:a16="http://schemas.microsoft.com/office/drawing/2014/main" id="{DD32FAF3-4508-4D2E-AB89-AEC6552093AB}"/>
+                <a16:creationId xmlns:a16="http://schemas.microsoft.com/office/drawing/2014/main" id="{E0611D94-657B-4FCB-9CAA-145EF0771201}"/>
               </a:ext>
             </a:extLst>
           </p:cNvPr>
@@ -5305,7 +5954,7 @@
           <a:p>
             <a:r>
               <a:rPr lang="en-US" dirty="0"/>
-              <a:t>Presenters and Q&amp;A</a:t>
+              <a:t>Old way versus new way</a:t>
             </a:r>
           </a:p>
         </p:txBody>
@@ -5315,7 +5964,7 @@
           <p:cNvPr id="3" name="Content Placeholder 2">
             <a:extLst>
               <a:ext uri="{FF2B5EF4-FFF2-40B4-BE49-F238E27FC236}">
-                <a16:creationId xmlns:a16="http://schemas.microsoft.com/office/drawing/2014/main" id="{175829B1-6984-4FF3-8A4A-21A22ECF1569}"/>
+                <a16:creationId xmlns:a16="http://schemas.microsoft.com/office/drawing/2014/main" id="{3344F37A-ABD3-4B30-AF92-4970A78B54A9}"/>
               </a:ext>
             </a:extLst>
           </p:cNvPr>
@@ -5333,29 +5982,41 @@
           <a:p>
             <a:r>
               <a:rPr lang="en-US" dirty="0"/>
-              <a:t>Joshua T. Fisher (@</a:t>
-            </a:r>
-            <a:r>
-              <a:rPr lang="en-US" dirty="0" err="1"/>
-              <a:t>Timewatcher</a:t>
-            </a:r>
-            <a:r>
-              <a:rPr lang="en-US" dirty="0"/>
-              <a:t>)</a:t>
-            </a:r>
-          </a:p>
-          <a:p>
-            <a:r>
-              <a:rPr lang="en-US" dirty="0"/>
-              <a:t>Joshua Shlemmer (@</a:t>
-            </a:r>
-            <a:r>
-              <a:rPr lang="en-US" dirty="0" err="1"/>
-              <a:t>joshshlemmer</a:t>
-            </a:r>
-            <a:r>
-              <a:rPr lang="en-US" dirty="0"/>
-              <a:t>)</a:t>
+              <a:t>In the old times, when dinosaurs roamed the earth, and C++14 was still a dream, targets were very limited. At least this is what the lore books say, we never used it during the dark ages.</a:t>
+            </a:r>
+          </a:p>
+          <a:p>
+            <a:pPr lvl="1"/>
+            <a:r>
+              <a:rPr lang="en-US" dirty="0"/>
+              <a:t>Everything was global</a:t>
+            </a:r>
+          </a:p>
+          <a:p>
+            <a:pPr lvl="1"/>
+            <a:r>
+              <a:rPr lang="en-US" dirty="0"/>
+              <a:t>Target properties didn’t exist</a:t>
+            </a:r>
+          </a:p>
+          <a:p>
+            <a:pPr lvl="1"/>
+            <a:r>
+              <a:rPr lang="en-US" dirty="0"/>
+              <a:t>Your dependencies would set variables that you were using, and break your CMake project.</a:t>
+            </a:r>
+          </a:p>
+          <a:p>
+            <a:r>
+              <a:rPr lang="en-US" dirty="0"/>
+              <a:t>Now, you can set almost everything on your targets, and everything is safe, right?</a:t>
+            </a:r>
+          </a:p>
+          <a:p>
+            <a:pPr lvl="1"/>
+            <a:r>
+              <a:rPr lang="en-US" dirty="0"/>
+              <a:t>No because the demons from the past still exist, and sometimes you still need them. </a:t>
             </a:r>
           </a:p>
         </p:txBody>
@@ -5363,7 +6024,7 @@
     </p:spTree>
     <p:extLst>
       <p:ext uri="{BB962C8B-B14F-4D97-AF65-F5344CB8AC3E}">
-        <p14:creationId xmlns:p14="http://schemas.microsoft.com/office/powerpoint/2010/main" val="2758591046"/>
+        <p14:creationId xmlns:p14="http://schemas.microsoft.com/office/powerpoint/2010/main" val="3916434147"/>
       </p:ext>
     </p:extLst>
   </p:cSld>
@@ -5451,7 +6112,7 @@
             </a:r>
             <a:r>
               <a:rPr lang="en-US" dirty="0"/>
-              <a:t>)</a:t>
+              <a:t>, playmer@gmail.com)</a:t>
             </a:r>
           </a:p>
           <a:p>
@@ -5501,7 +6162,7 @@
             </a:r>
             <a:r>
               <a:rPr lang="en-US" dirty="0"/>
-              <a:t>)</a:t>
+              <a:t>, joshua.shlemmer@digipen.edu)</a:t>
             </a:r>
           </a:p>
           <a:p>
@@ -5515,22 +6176,14 @@
             <a:pPr lvl="1"/>
             <a:r>
               <a:rPr lang="en-US" dirty="0"/>
-              <a:t>Converted Zero Engine to </a:t>
-            </a:r>
-            <a:r>
-              <a:rPr lang="en-US" dirty="0" err="1"/>
-              <a:t>Cmake</a:t>
-            </a:r>
-            <a:r>
-              <a:rPr lang="en-US" dirty="0"/>
-              <a:t>.</a:t>
+              <a:t>Converted Zero Engine to CMake.</a:t>
             </a:r>
           </a:p>
           <a:p>
             <a:pPr lvl="1"/>
             <a:r>
               <a:rPr lang="en-US" dirty="0"/>
-              <a:t>Works on Zero Engine’s Documentation Tooling and Continues Integration.</a:t>
+              <a:t>Works on Zero Engine’s Documentation Tooling and Continuous Integration.</a:t>
             </a:r>
           </a:p>
           <a:p>
@@ -5573,6 +6226,1212 @@
           <p:cNvPr id="2" name="Title 1">
             <a:extLst>
               <a:ext uri="{FF2B5EF4-FFF2-40B4-BE49-F238E27FC236}">
+                <a16:creationId xmlns:a16="http://schemas.microsoft.com/office/drawing/2014/main" id="{5A51E9F4-2D05-45CB-87FC-C2B791FD1FCC}"/>
+              </a:ext>
+            </a:extLst>
+          </p:cNvPr>
+          <p:cNvSpPr>
+            <a:spLocks noGrp="1"/>
+          </p:cNvSpPr>
+          <p:nvPr>
+            <p:ph type="ctrTitle"/>
+          </p:nvPr>
+        </p:nvSpPr>
+        <p:spPr>
+          <a:xfrm>
+            <a:off x="1066800" y="2825750"/>
+            <a:ext cx="10058400" cy="1206500"/>
+          </a:xfrm>
+        </p:spPr>
+        <p:txBody>
+          <a:bodyPr/>
+          <a:lstStyle/>
+          <a:p>
+            <a:r>
+              <a:rPr lang="en-US" dirty="0"/>
+              <a:t>Live Demo</a:t>
+            </a:r>
+          </a:p>
+        </p:txBody>
+      </p:sp>
+    </p:spTree>
+    <p:extLst>
+      <p:ext uri="{BB962C8B-B14F-4D97-AF65-F5344CB8AC3E}">
+        <p14:creationId xmlns:p14="http://schemas.microsoft.com/office/powerpoint/2010/main" val="2381102007"/>
+      </p:ext>
+    </p:extLst>
+  </p:cSld>
+  <p:clrMapOvr>
+    <a:masterClrMapping/>
+  </p:clrMapOvr>
+</p:sld>
+</file>
+
+<file path=ppt/slides/slide21.xml><?xml version="1.0" encoding="utf-8"?>
+<p:sld xmlns:a="http://schemas.openxmlformats.org/drawingml/2006/main" xmlns:r="http://schemas.openxmlformats.org/officeDocument/2006/relationships" xmlns:p="http://schemas.openxmlformats.org/presentationml/2006/main">
+  <p:cSld>
+    <p:spTree>
+      <p:nvGrpSpPr>
+        <p:cNvPr id="1" name=""/>
+        <p:cNvGrpSpPr/>
+        <p:nvPr/>
+      </p:nvGrpSpPr>
+      <p:grpSpPr>
+        <a:xfrm>
+          <a:off x="0" y="0"/>
+          <a:ext cx="0" cy="0"/>
+          <a:chOff x="0" y="0"/>
+          <a:chExt cx="0" cy="0"/>
+        </a:xfrm>
+      </p:grpSpPr>
+      <p:sp>
+        <p:nvSpPr>
+          <p:cNvPr id="2" name="Title 1">
+            <a:extLst>
+              <a:ext uri="{FF2B5EF4-FFF2-40B4-BE49-F238E27FC236}">
+                <a16:creationId xmlns:a16="http://schemas.microsoft.com/office/drawing/2014/main" id="{5439A42F-D69F-41B9-8D3A-125EEAB813ED}"/>
+              </a:ext>
+            </a:extLst>
+          </p:cNvPr>
+          <p:cNvSpPr>
+            <a:spLocks noGrp="1"/>
+          </p:cNvSpPr>
+          <p:nvPr>
+            <p:ph type="title"/>
+          </p:nvPr>
+        </p:nvSpPr>
+        <p:spPr/>
+        <p:txBody>
+          <a:bodyPr/>
+          <a:lstStyle/>
+          <a:p>
+            <a:r>
+              <a:rPr lang="en-US" dirty="0"/>
+              <a:t>Fisher’s CMake Experience</a:t>
+            </a:r>
+          </a:p>
+        </p:txBody>
+      </p:sp>
+      <p:sp>
+        <p:nvSpPr>
+          <p:cNvPr id="3" name="Content Placeholder 2">
+            <a:extLst>
+              <a:ext uri="{FF2B5EF4-FFF2-40B4-BE49-F238E27FC236}">
+                <a16:creationId xmlns:a16="http://schemas.microsoft.com/office/drawing/2014/main" id="{AED144B3-C042-4459-8D4E-0DA70C5E68DB}"/>
+              </a:ext>
+            </a:extLst>
+          </p:cNvPr>
+          <p:cNvSpPr>
+            <a:spLocks noGrp="1"/>
+          </p:cNvSpPr>
+          <p:nvPr>
+            <p:ph idx="1"/>
+          </p:nvPr>
+        </p:nvSpPr>
+        <p:spPr>
+          <a:xfrm>
+            <a:off x="1371600" y="2286000"/>
+            <a:ext cx="9601200" cy="4226668"/>
+          </a:xfrm>
+        </p:spPr>
+        <p:txBody>
+          <a:bodyPr>
+            <a:normAutofit/>
+          </a:bodyPr>
+          <a:lstStyle/>
+          <a:p>
+            <a:r>
+              <a:rPr lang="en-US" dirty="0"/>
+              <a:t>Ripple (2014 – 2015)</a:t>
+            </a:r>
+          </a:p>
+          <a:p>
+            <a:pPr lvl="1"/>
+            <a:r>
+              <a:rPr lang="en-US" dirty="0"/>
+              <a:t>Used GLOB Syntax (bad)</a:t>
+            </a:r>
+          </a:p>
+          <a:p>
+            <a:pPr lvl="1"/>
+            <a:r>
+              <a:rPr lang="en-US" dirty="0"/>
+              <a:t>Completely manual dependency management</a:t>
+            </a:r>
+          </a:p>
+          <a:p>
+            <a:pPr lvl="1"/>
+            <a:r>
+              <a:rPr lang="en-US" dirty="0"/>
+              <a:t>All global property management</a:t>
+            </a:r>
+          </a:p>
+          <a:p>
+            <a:r>
+              <a:rPr lang="en-US" dirty="0" err="1"/>
+              <a:t>Synethesia</a:t>
+            </a:r>
+            <a:r>
+              <a:rPr lang="en-US" dirty="0"/>
+              <a:t> (2015 – 2016)</a:t>
+            </a:r>
+          </a:p>
+          <a:p>
+            <a:pPr lvl="1"/>
+            <a:r>
+              <a:rPr lang="en-US" dirty="0"/>
+              <a:t>Moved large dependencies to git </a:t>
+            </a:r>
+            <a:r>
+              <a:rPr lang="en-US" dirty="0" err="1"/>
+              <a:t>lfs</a:t>
+            </a:r>
+            <a:r>
+              <a:rPr lang="en-US" dirty="0"/>
+              <a:t> (git </a:t>
+            </a:r>
+            <a:r>
+              <a:rPr lang="en-US" dirty="0" err="1"/>
+              <a:t>lfs</a:t>
+            </a:r>
+            <a:r>
+              <a:rPr lang="en-US" dirty="0"/>
+              <a:t> is the enemy, do not trust)</a:t>
+            </a:r>
+          </a:p>
+          <a:p>
+            <a:r>
+              <a:rPr lang="en-US" dirty="0"/>
+              <a:t>Lamb Planet (2017 – 2018)</a:t>
+            </a:r>
+          </a:p>
+          <a:p>
+            <a:pPr lvl="1"/>
+            <a:r>
+              <a:rPr lang="en-US" dirty="0"/>
+              <a:t>Converted to using target based commands for most work.</a:t>
+            </a:r>
+          </a:p>
+          <a:p>
+            <a:pPr lvl="1"/>
+            <a:r>
+              <a:rPr lang="en-US" dirty="0"/>
+              <a:t>Started using </a:t>
+            </a:r>
+            <a:r>
+              <a:rPr lang="en-US" dirty="0" err="1"/>
+              <a:t>subrepos</a:t>
+            </a:r>
+            <a:r>
+              <a:rPr lang="en-US" dirty="0"/>
+              <a:t> for most major dependencies.</a:t>
+            </a:r>
+          </a:p>
+          <a:p>
+            <a:pPr lvl="1"/>
+            <a:r>
+              <a:rPr lang="en-US" dirty="0"/>
+              <a:t>Started using recursive functions to hit all targets with flags. (Test your CMake limits, don’t be afraid.)</a:t>
+            </a:r>
+          </a:p>
+          <a:p>
+            <a:pPr lvl="1"/>
+            <a:endParaRPr lang="en-US" dirty="0"/>
+          </a:p>
+        </p:txBody>
+      </p:sp>
+    </p:spTree>
+    <p:extLst>
+      <p:ext uri="{BB962C8B-B14F-4D97-AF65-F5344CB8AC3E}">
+        <p14:creationId xmlns:p14="http://schemas.microsoft.com/office/powerpoint/2010/main" val="760306334"/>
+      </p:ext>
+    </p:extLst>
+  </p:cSld>
+  <p:clrMapOvr>
+    <a:masterClrMapping/>
+  </p:clrMapOvr>
+</p:sld>
+</file>
+
+<file path=ppt/slides/slide22.xml><?xml version="1.0" encoding="utf-8"?>
+<p:sld xmlns:a="http://schemas.openxmlformats.org/drawingml/2006/main" xmlns:r="http://schemas.openxmlformats.org/officeDocument/2006/relationships" xmlns:p="http://schemas.openxmlformats.org/presentationml/2006/main">
+  <p:cSld>
+    <p:spTree>
+      <p:nvGrpSpPr>
+        <p:cNvPr id="1" name=""/>
+        <p:cNvGrpSpPr/>
+        <p:nvPr/>
+      </p:nvGrpSpPr>
+      <p:grpSpPr>
+        <a:xfrm>
+          <a:off x="0" y="0"/>
+          <a:ext cx="0" cy="0"/>
+          <a:chOff x="0" y="0"/>
+          <a:chExt cx="0" cy="0"/>
+        </a:xfrm>
+      </p:grpSpPr>
+      <p:sp>
+        <p:nvSpPr>
+          <p:cNvPr id="2" name="Title 1">
+            <a:extLst>
+              <a:ext uri="{FF2B5EF4-FFF2-40B4-BE49-F238E27FC236}">
+                <a16:creationId xmlns:a16="http://schemas.microsoft.com/office/drawing/2014/main" id="{9CD1B0E8-4A5D-40BC-A74E-FDDDEEB120A8}"/>
+              </a:ext>
+            </a:extLst>
+          </p:cNvPr>
+          <p:cNvSpPr>
+            <a:spLocks noGrp="1"/>
+          </p:cNvSpPr>
+          <p:nvPr>
+            <p:ph type="title"/>
+          </p:nvPr>
+        </p:nvSpPr>
+        <p:spPr/>
+        <p:txBody>
+          <a:bodyPr/>
+          <a:lstStyle/>
+          <a:p>
+            <a:r>
+              <a:rPr lang="en-US" dirty="0"/>
+              <a:t>Testimonies (From Fisher’s Team)</a:t>
+            </a:r>
+          </a:p>
+        </p:txBody>
+      </p:sp>
+      <p:sp>
+        <p:nvSpPr>
+          <p:cNvPr id="3" name="Content Placeholder 2">
+            <a:extLst>
+              <a:ext uri="{FF2B5EF4-FFF2-40B4-BE49-F238E27FC236}">
+                <a16:creationId xmlns:a16="http://schemas.microsoft.com/office/drawing/2014/main" id="{BCA3064C-1DF7-4111-BBB3-C115C9DA4727}"/>
+              </a:ext>
+            </a:extLst>
+          </p:cNvPr>
+          <p:cNvSpPr>
+            <a:spLocks noGrp="1"/>
+          </p:cNvSpPr>
+          <p:nvPr>
+            <p:ph idx="1"/>
+          </p:nvPr>
+        </p:nvSpPr>
+        <p:spPr/>
+        <p:txBody>
+          <a:bodyPr/>
+          <a:lstStyle/>
+          <a:p>
+            <a:r>
+              <a:rPr lang="en-US" dirty="0"/>
+              <a:t>“If you ever want a project on multiple computers, you need something, I mean, fuck.” – Nicholas Ammann (Editor Programmer)</a:t>
+            </a:r>
+          </a:p>
+          <a:p>
+            <a:r>
+              <a:rPr lang="en-US" dirty="0"/>
+              <a:t>“It’s better than all the other options.” – Evan Collier (Core Programmer)</a:t>
+            </a:r>
+          </a:p>
+          <a:p>
+            <a:r>
+              <a:rPr lang="en-US" dirty="0"/>
+              <a:t>“I haven't used it a ton </a:t>
+            </a:r>
+            <a:r>
+              <a:rPr lang="en-US" dirty="0" err="1"/>
+              <a:t>tho</a:t>
+            </a:r>
+            <a:r>
+              <a:rPr lang="en-US" dirty="0"/>
+              <a:t> like I've used it a bit but have usually had weirdo problems” – </a:t>
+            </a:r>
+            <a:r>
+              <a:rPr lang="en-US" dirty="0" err="1"/>
+              <a:t>Gabryelle</a:t>
+            </a:r>
+            <a:r>
+              <a:rPr lang="en-US" dirty="0"/>
+              <a:t> Chamberlin (Graphics Programmer)</a:t>
+            </a:r>
+          </a:p>
+          <a:p>
+            <a:r>
+              <a:rPr lang="en-US" dirty="0"/>
+              <a:t>“I never think about CMake unless the file I added yesterday isn’t showing up in the Project window today.” – Isaac Dayton (Gameplay Programmer)</a:t>
+            </a:r>
+          </a:p>
+          <a:p>
+            <a:r>
+              <a:rPr lang="en-US" dirty="0"/>
+              <a:t>“God I hope I never have to work on that” – Joshua Shlemmer (a year before he did)</a:t>
+            </a:r>
+          </a:p>
+          <a:p>
+            <a:endParaRPr lang="en-US" dirty="0"/>
+          </a:p>
+        </p:txBody>
+      </p:sp>
+    </p:spTree>
+    <p:extLst>
+      <p:ext uri="{BB962C8B-B14F-4D97-AF65-F5344CB8AC3E}">
+        <p14:creationId xmlns:p14="http://schemas.microsoft.com/office/powerpoint/2010/main" val="305148900"/>
+      </p:ext>
+    </p:extLst>
+  </p:cSld>
+  <p:clrMapOvr>
+    <a:masterClrMapping/>
+  </p:clrMapOvr>
+</p:sld>
+</file>
+
+<file path=ppt/slides/slide23.xml><?xml version="1.0" encoding="utf-8"?>
+<p:sld xmlns:a="http://schemas.openxmlformats.org/drawingml/2006/main" xmlns:r="http://schemas.openxmlformats.org/officeDocument/2006/relationships" xmlns:p="http://schemas.openxmlformats.org/presentationml/2006/main">
+  <p:cSld>
+    <p:spTree>
+      <p:nvGrpSpPr>
+        <p:cNvPr id="1" name=""/>
+        <p:cNvGrpSpPr/>
+        <p:nvPr/>
+      </p:nvGrpSpPr>
+      <p:grpSpPr>
+        <a:xfrm>
+          <a:off x="0" y="0"/>
+          <a:ext cx="0" cy="0"/>
+          <a:chOff x="0" y="0"/>
+          <a:chExt cx="0" cy="0"/>
+        </a:xfrm>
+      </p:grpSpPr>
+      <p:sp>
+        <p:nvSpPr>
+          <p:cNvPr id="2" name="Title 1">
+            <a:extLst>
+              <a:ext uri="{FF2B5EF4-FFF2-40B4-BE49-F238E27FC236}">
+                <a16:creationId xmlns:a16="http://schemas.microsoft.com/office/drawing/2014/main" id="{31EA04C8-0333-41F9-9A98-8A1B134D763A}"/>
+              </a:ext>
+            </a:extLst>
+          </p:cNvPr>
+          <p:cNvSpPr>
+            <a:spLocks noGrp="1"/>
+          </p:cNvSpPr>
+          <p:nvPr>
+            <p:ph type="title"/>
+          </p:nvPr>
+        </p:nvSpPr>
+        <p:spPr/>
+        <p:txBody>
+          <a:bodyPr/>
+          <a:lstStyle/>
+          <a:p>
+            <a:r>
+              <a:rPr lang="en-US" dirty="0" err="1"/>
+              <a:t>Shlemmer’s</a:t>
+            </a:r>
+            <a:r>
+              <a:rPr lang="en-US" dirty="0"/>
+              <a:t> Experience</a:t>
+            </a:r>
+          </a:p>
+        </p:txBody>
+      </p:sp>
+      <p:sp>
+        <p:nvSpPr>
+          <p:cNvPr id="3" name="Content Placeholder 2">
+            <a:extLst>
+              <a:ext uri="{FF2B5EF4-FFF2-40B4-BE49-F238E27FC236}">
+                <a16:creationId xmlns:a16="http://schemas.microsoft.com/office/drawing/2014/main" id="{6751B5F3-9FC6-4019-AA56-A83C89018229}"/>
+              </a:ext>
+            </a:extLst>
+          </p:cNvPr>
+          <p:cNvSpPr>
+            <a:spLocks noGrp="1"/>
+          </p:cNvSpPr>
+          <p:nvPr>
+            <p:ph idx="1"/>
+          </p:nvPr>
+        </p:nvSpPr>
+        <p:spPr/>
+        <p:txBody>
+          <a:bodyPr/>
+          <a:lstStyle/>
+          <a:p>
+            <a:r>
+              <a:rPr lang="en-US" dirty="0"/>
+              <a:t>Converting Zero Engine to CMake (February 2018 – Now)</a:t>
+            </a:r>
+          </a:p>
+          <a:p>
+            <a:r>
+              <a:rPr lang="en-US" dirty="0"/>
+              <a:t>The Journey</a:t>
+            </a:r>
+          </a:p>
+          <a:p>
+            <a:pPr lvl="1"/>
+            <a:r>
+              <a:rPr lang="en-US" dirty="0"/>
+              <a:t>CMake is bad and I hate it lol</a:t>
+            </a:r>
+          </a:p>
+          <a:p>
+            <a:pPr lvl="1"/>
+            <a:r>
+              <a:rPr lang="en-US" dirty="0"/>
+              <a:t>Oh I guess it’s okay I guess, I got this sweet dependencies thing to work</a:t>
+            </a:r>
+          </a:p>
+          <a:p>
+            <a:pPr lvl="1"/>
+            <a:r>
+              <a:rPr lang="en-US" dirty="0"/>
+              <a:t>Oh I need to do some fancy multi-configuration stuff, I guess I will try generator expressions</a:t>
+            </a:r>
+          </a:p>
+          <a:p>
+            <a:pPr lvl="1"/>
+            <a:r>
+              <a:rPr lang="en-US" dirty="0"/>
+              <a:t>Oh god please no</a:t>
+            </a:r>
+          </a:p>
+          <a:p>
+            <a:pPr lvl="1"/>
+            <a:r>
+              <a:rPr lang="en-US" dirty="0"/>
+              <a:t>WHAT ELDRICH HORROR IS THIS?!?!</a:t>
+            </a:r>
+          </a:p>
+          <a:p>
+            <a:pPr lvl="1"/>
+            <a:r>
+              <a:rPr lang="en-US" dirty="0"/>
+              <a:t>Huh, it works now</a:t>
+            </a:r>
+          </a:p>
+          <a:p>
+            <a:pPr marL="0" indent="0">
+              <a:buNone/>
+            </a:pPr>
+            <a:endParaRPr lang="en-US" dirty="0"/>
+          </a:p>
+        </p:txBody>
+      </p:sp>
+    </p:spTree>
+    <p:extLst>
+      <p:ext uri="{BB962C8B-B14F-4D97-AF65-F5344CB8AC3E}">
+        <p14:creationId xmlns:p14="http://schemas.microsoft.com/office/powerpoint/2010/main" val="2795907999"/>
+      </p:ext>
+    </p:extLst>
+  </p:cSld>
+  <p:clrMapOvr>
+    <a:masterClrMapping/>
+  </p:clrMapOvr>
+</p:sld>
+</file>
+
+<file path=ppt/slides/slide24.xml><?xml version="1.0" encoding="utf-8"?>
+<p:sld xmlns:a="http://schemas.openxmlformats.org/drawingml/2006/main" xmlns:r="http://schemas.openxmlformats.org/officeDocument/2006/relationships" xmlns:p="http://schemas.openxmlformats.org/presentationml/2006/main">
+  <p:cSld>
+    <p:spTree>
+      <p:nvGrpSpPr>
+        <p:cNvPr id="1" name=""/>
+        <p:cNvGrpSpPr/>
+        <p:nvPr/>
+      </p:nvGrpSpPr>
+      <p:grpSpPr>
+        <a:xfrm>
+          <a:off x="0" y="0"/>
+          <a:ext cx="0" cy="0"/>
+          <a:chOff x="0" y="0"/>
+          <a:chExt cx="0" cy="0"/>
+        </a:xfrm>
+      </p:grpSpPr>
+      <p:sp>
+        <p:nvSpPr>
+          <p:cNvPr id="2" name="Title 1">
+            <a:extLst>
+              <a:ext uri="{FF2B5EF4-FFF2-40B4-BE49-F238E27FC236}">
+                <a16:creationId xmlns:a16="http://schemas.microsoft.com/office/drawing/2014/main" id="{91DF5347-844B-4C15-B6AE-F284AFD2F324}"/>
+              </a:ext>
+            </a:extLst>
+          </p:cNvPr>
+          <p:cNvSpPr>
+            <a:spLocks noGrp="1"/>
+          </p:cNvSpPr>
+          <p:nvPr>
+            <p:ph type="title"/>
+          </p:nvPr>
+        </p:nvSpPr>
+        <p:spPr/>
+        <p:txBody>
+          <a:bodyPr/>
+          <a:lstStyle/>
+          <a:p>
+            <a:r>
+              <a:rPr lang="en-US" dirty="0"/>
+              <a:t>Tips &amp; Tidbits</a:t>
+            </a:r>
+          </a:p>
+        </p:txBody>
+      </p:sp>
+      <p:sp>
+        <p:nvSpPr>
+          <p:cNvPr id="3" name="Content Placeholder 2">
+            <a:extLst>
+              <a:ext uri="{FF2B5EF4-FFF2-40B4-BE49-F238E27FC236}">
+                <a16:creationId xmlns:a16="http://schemas.microsoft.com/office/drawing/2014/main" id="{8B61951D-42A5-4407-A6EE-97C22244D142}"/>
+              </a:ext>
+            </a:extLst>
+          </p:cNvPr>
+          <p:cNvSpPr>
+            <a:spLocks noGrp="1"/>
+          </p:cNvSpPr>
+          <p:nvPr>
+            <p:ph idx="1"/>
+          </p:nvPr>
+        </p:nvSpPr>
+        <p:spPr/>
+        <p:txBody>
+          <a:bodyPr>
+            <a:normAutofit lnSpcReduction="10000"/>
+          </a:bodyPr>
+          <a:lstStyle/>
+          <a:p>
+            <a:r>
+              <a:rPr lang="en-US" dirty="0"/>
+              <a:t>Use (and require) a new version, it’s just helpful to get better versions of commands </a:t>
+            </a:r>
+            <a:r>
+              <a:rPr lang="en-US" dirty="0" err="1"/>
+              <a:t>source_group</a:t>
+            </a:r>
+            <a:r>
+              <a:rPr lang="en-US" dirty="0"/>
+              <a:t>(TREE), despite your bugs, I’m looking at you</a:t>
+            </a:r>
+          </a:p>
+          <a:p>
+            <a:r>
+              <a:rPr lang="en-US" dirty="0"/>
+              <a:t>Use target based commands, be careful of PUBLIC/PRIVATE with each one, PUBLIC is transitive to targets that depend on the given target.</a:t>
+            </a:r>
+          </a:p>
+          <a:p>
+            <a:r>
+              <a:rPr lang="en-US" dirty="0" err="1"/>
+              <a:t>GLOBing</a:t>
+            </a:r>
+            <a:r>
+              <a:rPr lang="en-US" dirty="0"/>
+              <a:t> sources is “considered harmful”, but we won’t tell anyone if you do it. (We will try to talk you out of it though.)</a:t>
+            </a:r>
+          </a:p>
+          <a:p>
+            <a:r>
+              <a:rPr lang="en-US" dirty="0"/>
+              <a:t>Guard your compiler/linker flags based on the compiler (similarly, if you’re manually managing your dependencies, guard your libraries based on platform)</a:t>
+            </a:r>
+          </a:p>
+          <a:p>
+            <a:r>
+              <a:rPr lang="en-US" dirty="0"/>
+              <a:t>Remember that some repetitiveness is okay, some is awful, evaluate and abstract</a:t>
+            </a:r>
+          </a:p>
+          <a:p>
+            <a:r>
+              <a:rPr lang="en-US" dirty="0"/>
+              <a:t>Find a medium sized project that uses modern CMake to base your work off of</a:t>
+            </a:r>
+          </a:p>
+        </p:txBody>
+      </p:sp>
+    </p:spTree>
+    <p:extLst>
+      <p:ext uri="{BB962C8B-B14F-4D97-AF65-F5344CB8AC3E}">
+        <p14:creationId xmlns:p14="http://schemas.microsoft.com/office/powerpoint/2010/main" val="4238354831"/>
+      </p:ext>
+    </p:extLst>
+  </p:cSld>
+  <p:clrMapOvr>
+    <a:masterClrMapping/>
+  </p:clrMapOvr>
+</p:sld>
+</file>
+
+<file path=ppt/slides/slide25.xml><?xml version="1.0" encoding="utf-8"?>
+<p:sld xmlns:a="http://schemas.openxmlformats.org/drawingml/2006/main" xmlns:r="http://schemas.openxmlformats.org/officeDocument/2006/relationships" xmlns:p="http://schemas.openxmlformats.org/presentationml/2006/main">
+  <p:cSld>
+    <p:spTree>
+      <p:nvGrpSpPr>
+        <p:cNvPr id="1" name=""/>
+        <p:cNvGrpSpPr/>
+        <p:nvPr/>
+      </p:nvGrpSpPr>
+      <p:grpSpPr>
+        <a:xfrm>
+          <a:off x="0" y="0"/>
+          <a:ext cx="0" cy="0"/>
+          <a:chOff x="0" y="0"/>
+          <a:chExt cx="0" cy="0"/>
+        </a:xfrm>
+      </p:grpSpPr>
+      <p:sp>
+        <p:nvSpPr>
+          <p:cNvPr id="2" name="Title 1">
+            <a:extLst>
+              <a:ext uri="{FF2B5EF4-FFF2-40B4-BE49-F238E27FC236}">
+                <a16:creationId xmlns:a16="http://schemas.microsoft.com/office/drawing/2014/main" id="{67315A8A-8C97-47B9-973E-C95712B9A6F7}"/>
+              </a:ext>
+            </a:extLst>
+          </p:cNvPr>
+          <p:cNvSpPr>
+            <a:spLocks noGrp="1"/>
+          </p:cNvSpPr>
+          <p:nvPr>
+            <p:ph type="title"/>
+          </p:nvPr>
+        </p:nvSpPr>
+        <p:spPr/>
+        <p:txBody>
+          <a:bodyPr/>
+          <a:lstStyle/>
+          <a:p>
+            <a:r>
+              <a:rPr lang="en-US" dirty="0"/>
+              <a:t>Tips &amp; Tidbits, </a:t>
+            </a:r>
+            <a:r>
+              <a:rPr lang="en-US" dirty="0" err="1"/>
+              <a:t>Kitware</a:t>
+            </a:r>
+            <a:r>
+              <a:rPr lang="en-US" dirty="0"/>
+              <a:t> Strikes Back</a:t>
+            </a:r>
+          </a:p>
+        </p:txBody>
+      </p:sp>
+      <p:sp>
+        <p:nvSpPr>
+          <p:cNvPr id="3" name="Content Placeholder 2">
+            <a:extLst>
+              <a:ext uri="{FF2B5EF4-FFF2-40B4-BE49-F238E27FC236}">
+                <a16:creationId xmlns:a16="http://schemas.microsoft.com/office/drawing/2014/main" id="{936103B9-9D0B-4F94-B236-6C52CF2D6E4C}"/>
+              </a:ext>
+            </a:extLst>
+          </p:cNvPr>
+          <p:cNvSpPr>
+            <a:spLocks noGrp="1"/>
+          </p:cNvSpPr>
+          <p:nvPr>
+            <p:ph idx="1"/>
+          </p:nvPr>
+        </p:nvSpPr>
+        <p:spPr/>
+        <p:txBody>
+          <a:bodyPr/>
+          <a:lstStyle/>
+          <a:p>
+            <a:r>
+              <a:rPr lang="en-US" dirty="0"/>
+              <a:t>(Typically) Use your local copy of the doc pages, not the website.</a:t>
+            </a:r>
+          </a:p>
+          <a:p>
+            <a:pPr lvl="1"/>
+            <a:r>
+              <a:rPr lang="en-US" dirty="0"/>
+              <a:t>It will load way faster</a:t>
+            </a:r>
+          </a:p>
+          <a:p>
+            <a:pPr lvl="1"/>
+            <a:r>
+              <a:rPr lang="en-US" dirty="0"/>
+              <a:t>You will for sure be looking at documentation for your version of </a:t>
+            </a:r>
+            <a:r>
+              <a:rPr lang="en-US" dirty="0" err="1"/>
+              <a:t>Cmake</a:t>
+            </a:r>
+            <a:endParaRPr lang="en-US" dirty="0"/>
+          </a:p>
+          <a:p>
+            <a:r>
+              <a:rPr lang="en-US" dirty="0"/>
+              <a:t>Avoid Generator Expressions until you know you actually need them</a:t>
+            </a:r>
+          </a:p>
+          <a:p>
+            <a:pPr lvl="1"/>
+            <a:r>
+              <a:rPr lang="en-US" dirty="0"/>
+              <a:t>They are very frustrating to debug</a:t>
+            </a:r>
+          </a:p>
+          <a:p>
+            <a:r>
+              <a:rPr lang="en-US" dirty="0"/>
+              <a:t>Some options exist to help in debugging (in the </a:t>
+            </a:r>
+            <a:r>
+              <a:rPr lang="en-US" dirty="0">
+                <a:hlinkClick r:id="rId2"/>
+              </a:rPr>
+              <a:t>CMake(1) doc page</a:t>
+            </a:r>
+            <a:r>
+              <a:rPr lang="en-US" dirty="0"/>
+              <a:t>)</a:t>
+            </a:r>
+          </a:p>
+          <a:p>
+            <a:pPr lvl="1"/>
+            <a:r>
+              <a:rPr lang="en-US" i="0" dirty="0"/>
+              <a:t> '--warn-uninitialized' and '--warn-unused-vars' </a:t>
+            </a:r>
+            <a:endParaRPr lang="en-US" dirty="0"/>
+          </a:p>
+        </p:txBody>
+      </p:sp>
+    </p:spTree>
+    <p:extLst>
+      <p:ext uri="{BB962C8B-B14F-4D97-AF65-F5344CB8AC3E}">
+        <p14:creationId xmlns:p14="http://schemas.microsoft.com/office/powerpoint/2010/main" val="1301922853"/>
+      </p:ext>
+    </p:extLst>
+  </p:cSld>
+  <p:clrMapOvr>
+    <a:masterClrMapping/>
+  </p:clrMapOvr>
+</p:sld>
+</file>
+
+<file path=ppt/slides/slide26.xml><?xml version="1.0" encoding="utf-8"?>
+<p:sld xmlns:a="http://schemas.openxmlformats.org/drawingml/2006/main" xmlns:r="http://schemas.openxmlformats.org/officeDocument/2006/relationships" xmlns:p="http://schemas.openxmlformats.org/presentationml/2006/main">
+  <p:cSld>
+    <p:spTree>
+      <p:nvGrpSpPr>
+        <p:cNvPr id="1" name=""/>
+        <p:cNvGrpSpPr/>
+        <p:nvPr/>
+      </p:nvGrpSpPr>
+      <p:grpSpPr>
+        <a:xfrm>
+          <a:off x="0" y="0"/>
+          <a:ext cx="0" cy="0"/>
+          <a:chOff x="0" y="0"/>
+          <a:chExt cx="0" cy="0"/>
+        </a:xfrm>
+      </p:grpSpPr>
+      <p:sp>
+        <p:nvSpPr>
+          <p:cNvPr id="2" name="Title 1">
+            <a:extLst>
+              <a:ext uri="{FF2B5EF4-FFF2-40B4-BE49-F238E27FC236}">
+                <a16:creationId xmlns:a16="http://schemas.microsoft.com/office/drawing/2014/main" id="{B3EB5296-4B53-4E29-B4CC-D988B1170D71}"/>
+              </a:ext>
+            </a:extLst>
+          </p:cNvPr>
+          <p:cNvSpPr>
+            <a:spLocks noGrp="1"/>
+          </p:cNvSpPr>
+          <p:nvPr>
+            <p:ph type="title"/>
+          </p:nvPr>
+        </p:nvSpPr>
+        <p:spPr/>
+        <p:txBody>
+          <a:bodyPr/>
+          <a:lstStyle/>
+          <a:p>
+            <a:r>
+              <a:rPr lang="en-US" dirty="0"/>
+              <a:t>Going Forward</a:t>
+            </a:r>
+          </a:p>
+        </p:txBody>
+      </p:sp>
+      <p:sp>
+        <p:nvSpPr>
+          <p:cNvPr id="3" name="Content Placeholder 2">
+            <a:extLst>
+              <a:ext uri="{FF2B5EF4-FFF2-40B4-BE49-F238E27FC236}">
+                <a16:creationId xmlns:a16="http://schemas.microsoft.com/office/drawing/2014/main" id="{4A539FCB-5E30-4B26-868B-4EFF5C8C2C5D}"/>
+              </a:ext>
+            </a:extLst>
+          </p:cNvPr>
+          <p:cNvSpPr>
+            <a:spLocks noGrp="1"/>
+          </p:cNvSpPr>
+          <p:nvPr>
+            <p:ph idx="1"/>
+          </p:nvPr>
+        </p:nvSpPr>
+        <p:spPr/>
+        <p:txBody>
+          <a:bodyPr/>
+          <a:lstStyle/>
+          <a:p>
+            <a:r>
+              <a:rPr lang="en-US" dirty="0"/>
+              <a:t>Watch Danial Pfeifer’s talk, and check out the awesome-</a:t>
+            </a:r>
+            <a:r>
+              <a:rPr lang="en-US" dirty="0" err="1"/>
+              <a:t>cmake</a:t>
+            </a:r>
+            <a:r>
+              <a:rPr lang="en-US" dirty="0"/>
+              <a:t> references</a:t>
+            </a:r>
+          </a:p>
+          <a:p>
+            <a:r>
+              <a:rPr lang="en-US" dirty="0"/>
+              <a:t>Explore some of the package managers, we haven’t had time to evaluate them</a:t>
+            </a:r>
+          </a:p>
+          <a:p>
+            <a:endParaRPr lang="en-US" dirty="0"/>
+          </a:p>
+          <a:p>
+            <a:endParaRPr lang="en-US" dirty="0"/>
+          </a:p>
+        </p:txBody>
+      </p:sp>
+    </p:spTree>
+    <p:extLst>
+      <p:ext uri="{BB962C8B-B14F-4D97-AF65-F5344CB8AC3E}">
+        <p14:creationId xmlns:p14="http://schemas.microsoft.com/office/powerpoint/2010/main" val="674164296"/>
+      </p:ext>
+    </p:extLst>
+  </p:cSld>
+  <p:clrMapOvr>
+    <a:masterClrMapping/>
+  </p:clrMapOvr>
+</p:sld>
+</file>
+
+<file path=ppt/slides/slide27.xml><?xml version="1.0" encoding="utf-8"?>
+<p:sld xmlns:a="http://schemas.openxmlformats.org/drawingml/2006/main" xmlns:r="http://schemas.openxmlformats.org/officeDocument/2006/relationships" xmlns:p="http://schemas.openxmlformats.org/presentationml/2006/main">
+  <p:cSld>
+    <p:spTree>
+      <p:nvGrpSpPr>
+        <p:cNvPr id="1" name=""/>
+        <p:cNvGrpSpPr/>
+        <p:nvPr/>
+      </p:nvGrpSpPr>
+      <p:grpSpPr>
+        <a:xfrm>
+          <a:off x="0" y="0"/>
+          <a:ext cx="0" cy="0"/>
+          <a:chOff x="0" y="0"/>
+          <a:chExt cx="0" cy="0"/>
+        </a:xfrm>
+      </p:grpSpPr>
+      <p:sp>
+        <p:nvSpPr>
+          <p:cNvPr id="2" name="Title 1">
+            <a:extLst>
+              <a:ext uri="{FF2B5EF4-FFF2-40B4-BE49-F238E27FC236}">
+                <a16:creationId xmlns:a16="http://schemas.microsoft.com/office/drawing/2014/main" id="{3A192FE3-1AD2-4EA8-8F28-43393CB4BAA5}"/>
+              </a:ext>
+            </a:extLst>
+          </p:cNvPr>
+          <p:cNvSpPr>
+            <a:spLocks noGrp="1"/>
+          </p:cNvSpPr>
+          <p:nvPr>
+            <p:ph type="title"/>
+          </p:nvPr>
+        </p:nvSpPr>
+        <p:spPr/>
+        <p:txBody>
+          <a:bodyPr/>
+          <a:lstStyle/>
+          <a:p>
+            <a:r>
+              <a:rPr lang="en-US" dirty="0"/>
+              <a:t>References</a:t>
+            </a:r>
+          </a:p>
+        </p:txBody>
+      </p:sp>
+      <p:sp>
+        <p:nvSpPr>
+          <p:cNvPr id="3" name="Content Placeholder 2">
+            <a:extLst>
+              <a:ext uri="{FF2B5EF4-FFF2-40B4-BE49-F238E27FC236}">
+                <a16:creationId xmlns:a16="http://schemas.microsoft.com/office/drawing/2014/main" id="{90FD264D-72FB-49FD-9E95-F55D98EB1EDD}"/>
+              </a:ext>
+            </a:extLst>
+          </p:cNvPr>
+          <p:cNvSpPr>
+            <a:spLocks noGrp="1"/>
+          </p:cNvSpPr>
+          <p:nvPr>
+            <p:ph idx="1"/>
+          </p:nvPr>
+        </p:nvSpPr>
+        <p:spPr/>
+        <p:txBody>
+          <a:bodyPr>
+            <a:normAutofit fontScale="92500" lnSpcReduction="20000"/>
+          </a:bodyPr>
+          <a:lstStyle/>
+          <a:p>
+            <a:r>
+              <a:rPr lang="en-US" dirty="0"/>
+              <a:t>Daniel Pfeifer “Effective CMake"</a:t>
+            </a:r>
+          </a:p>
+          <a:p>
+            <a:pPr lvl="1"/>
+            <a:r>
+              <a:rPr lang="en-US" dirty="0">
+                <a:hlinkClick r:id="rId2"/>
+              </a:rPr>
+              <a:t>https://www.youtube.com/watch?v=bsXLMQ6WgIk</a:t>
+            </a:r>
+            <a:endParaRPr lang="en-US" dirty="0"/>
+          </a:p>
+          <a:p>
+            <a:r>
+              <a:rPr lang="en-US" dirty="0" err="1"/>
+              <a:t>CGold</a:t>
+            </a:r>
+            <a:r>
+              <a:rPr lang="en-US" dirty="0"/>
+              <a:t>: The Hitchhiker’s Guide to the </a:t>
+            </a:r>
+            <a:r>
+              <a:rPr lang="en-US" dirty="0" err="1"/>
+              <a:t>Cmake</a:t>
+            </a:r>
+            <a:endParaRPr lang="en-US" dirty="0"/>
+          </a:p>
+          <a:p>
+            <a:pPr lvl="1"/>
+            <a:r>
+              <a:rPr lang="en-US" dirty="0">
+                <a:hlinkClick r:id="rId3"/>
+              </a:rPr>
+              <a:t>https://cgold.readthedocs.io/en/latest/</a:t>
+            </a:r>
+            <a:endParaRPr lang="en-US" dirty="0"/>
+          </a:p>
+          <a:p>
+            <a:r>
+              <a:rPr lang="en-US" dirty="0"/>
+              <a:t>awesome-</a:t>
+            </a:r>
+            <a:r>
+              <a:rPr lang="en-US" dirty="0" err="1"/>
+              <a:t>cmake</a:t>
+            </a:r>
+            <a:endParaRPr lang="en-US" dirty="0"/>
+          </a:p>
+          <a:p>
+            <a:pPr lvl="1"/>
+            <a:r>
+              <a:rPr lang="en-US" dirty="0">
+                <a:hlinkClick r:id="rId4"/>
+              </a:rPr>
+              <a:t>https://github.com/onqtam/awesome-cmake</a:t>
+            </a:r>
+            <a:r>
+              <a:rPr lang="en-US" dirty="0"/>
+              <a:t> </a:t>
+            </a:r>
+          </a:p>
+          <a:p>
+            <a:r>
+              <a:rPr lang="en-US" dirty="0"/>
+              <a:t>Reddit AMA with CMake </a:t>
+            </a:r>
+            <a:r>
+              <a:rPr lang="en-US" dirty="0" err="1"/>
+              <a:t>devs</a:t>
+            </a:r>
+            <a:endParaRPr lang="en-US" dirty="0"/>
+          </a:p>
+          <a:p>
+            <a:pPr lvl="1"/>
+            <a:r>
+              <a:rPr lang="en-US" dirty="0">
+                <a:hlinkClick r:id="rId5"/>
+              </a:rPr>
+              <a:t>https://www.reddit.com/r/cpp/comments/8sie4b/i_manage_the_release_cycle_for_cmake_the_build/</a:t>
+            </a:r>
+            <a:r>
+              <a:rPr lang="en-US" dirty="0"/>
+              <a:t> </a:t>
+            </a:r>
+          </a:p>
+          <a:p>
+            <a:r>
+              <a:rPr lang="en-US" dirty="0"/>
+              <a:t>CMake documentation pages</a:t>
+            </a:r>
+          </a:p>
+          <a:p>
+            <a:pPr lvl="1"/>
+            <a:r>
+              <a:rPr lang="en-US" dirty="0">
+                <a:hlinkClick r:id="rId6"/>
+              </a:rPr>
+              <a:t>https://cmake.org/cmake/help/latest/</a:t>
+            </a:r>
+            <a:r>
+              <a:rPr lang="en-US" dirty="0"/>
+              <a:t>  </a:t>
+            </a:r>
+          </a:p>
+        </p:txBody>
+      </p:sp>
+    </p:spTree>
+    <p:extLst>
+      <p:ext uri="{BB962C8B-B14F-4D97-AF65-F5344CB8AC3E}">
+        <p14:creationId xmlns:p14="http://schemas.microsoft.com/office/powerpoint/2010/main" val="229397432"/>
+      </p:ext>
+    </p:extLst>
+  </p:cSld>
+  <p:clrMapOvr>
+    <a:masterClrMapping/>
+  </p:clrMapOvr>
+</p:sld>
+</file>
+
+<file path=ppt/slides/slide28.xml><?xml version="1.0" encoding="utf-8"?>
+<p:sld xmlns:a="http://schemas.openxmlformats.org/drawingml/2006/main" xmlns:r="http://schemas.openxmlformats.org/officeDocument/2006/relationships" xmlns:p="http://schemas.openxmlformats.org/presentationml/2006/main">
+  <p:cSld>
+    <p:spTree>
+      <p:nvGrpSpPr>
+        <p:cNvPr id="1" name=""/>
+        <p:cNvGrpSpPr/>
+        <p:nvPr/>
+      </p:nvGrpSpPr>
+      <p:grpSpPr>
+        <a:xfrm>
+          <a:off x="0" y="0"/>
+          <a:ext cx="0" cy="0"/>
+          <a:chOff x="0" y="0"/>
+          <a:chExt cx="0" cy="0"/>
+        </a:xfrm>
+      </p:grpSpPr>
+      <p:sp>
+        <p:nvSpPr>
+          <p:cNvPr id="2" name="Title 1">
+            <a:extLst>
+              <a:ext uri="{FF2B5EF4-FFF2-40B4-BE49-F238E27FC236}">
+                <a16:creationId xmlns:a16="http://schemas.microsoft.com/office/drawing/2014/main" id="{DD32FAF3-4508-4D2E-AB89-AEC6552093AB}"/>
+              </a:ext>
+            </a:extLst>
+          </p:cNvPr>
+          <p:cNvSpPr>
+            <a:spLocks noGrp="1"/>
+          </p:cNvSpPr>
+          <p:nvPr>
+            <p:ph type="title"/>
+          </p:nvPr>
+        </p:nvSpPr>
+        <p:spPr/>
+        <p:txBody>
+          <a:bodyPr/>
+          <a:lstStyle/>
+          <a:p>
+            <a:r>
+              <a:rPr lang="en-US" dirty="0"/>
+              <a:t>Presenters and Q&amp;A</a:t>
+            </a:r>
+          </a:p>
+        </p:txBody>
+      </p:sp>
+      <p:sp>
+        <p:nvSpPr>
+          <p:cNvPr id="3" name="Content Placeholder 2">
+            <a:extLst>
+              <a:ext uri="{FF2B5EF4-FFF2-40B4-BE49-F238E27FC236}">
+                <a16:creationId xmlns:a16="http://schemas.microsoft.com/office/drawing/2014/main" id="{175829B1-6984-4FF3-8A4A-21A22ECF1569}"/>
+              </a:ext>
+            </a:extLst>
+          </p:cNvPr>
+          <p:cNvSpPr>
+            <a:spLocks noGrp="1"/>
+          </p:cNvSpPr>
+          <p:nvPr>
+            <p:ph idx="1"/>
+          </p:nvPr>
+        </p:nvSpPr>
+        <p:spPr/>
+        <p:txBody>
+          <a:bodyPr/>
+          <a:lstStyle/>
+          <a:p>
+            <a:r>
+              <a:rPr lang="en-US" dirty="0"/>
+              <a:t>Joshua T. Fisher (@</a:t>
+            </a:r>
+            <a:r>
+              <a:rPr lang="en-US" dirty="0" err="1"/>
+              <a:t>Timewatcher</a:t>
+            </a:r>
+            <a:r>
+              <a:rPr lang="en-US" dirty="0"/>
+              <a:t>, playmer@gmail.com)</a:t>
+            </a:r>
+          </a:p>
+          <a:p>
+            <a:r>
+              <a:rPr lang="en-US" dirty="0"/>
+              <a:t>Joshua Shlemmer (@</a:t>
+            </a:r>
+            <a:r>
+              <a:rPr lang="en-US" dirty="0" err="1"/>
+              <a:t>joshshlemmer</a:t>
+            </a:r>
+            <a:r>
+              <a:rPr lang="en-US" dirty="0"/>
+              <a:t>, joshua.shlemmer@digipen.edu)</a:t>
+            </a:r>
+          </a:p>
+        </p:txBody>
+      </p:sp>
+    </p:spTree>
+    <p:extLst>
+      <p:ext uri="{BB962C8B-B14F-4D97-AF65-F5344CB8AC3E}">
+        <p14:creationId xmlns:p14="http://schemas.microsoft.com/office/powerpoint/2010/main" val="2758591046"/>
+      </p:ext>
+    </p:extLst>
+  </p:cSld>
+  <p:clrMapOvr>
+    <a:masterClrMapping/>
+  </p:clrMapOvr>
+</p:sld>
+</file>
+
+<file path=ppt/slides/slide29.xml><?xml version="1.0" encoding="utf-8"?>
+<p:sld xmlns:a="http://schemas.openxmlformats.org/drawingml/2006/main" xmlns:r="http://schemas.openxmlformats.org/officeDocument/2006/relationships" xmlns:p="http://schemas.openxmlformats.org/presentationml/2006/main">
+  <p:cSld>
+    <p:spTree>
+      <p:nvGrpSpPr>
+        <p:cNvPr id="1" name=""/>
+        <p:cNvGrpSpPr/>
+        <p:nvPr/>
+      </p:nvGrpSpPr>
+      <p:grpSpPr>
+        <a:xfrm>
+          <a:off x="0" y="0"/>
+          <a:ext cx="0" cy="0"/>
+          <a:chOff x="0" y="0"/>
+          <a:chExt cx="0" cy="0"/>
+        </a:xfrm>
+      </p:grpSpPr>
+      <p:sp>
+        <p:nvSpPr>
+          <p:cNvPr id="2" name="Title 1">
+            <a:extLst>
+              <a:ext uri="{FF2B5EF4-FFF2-40B4-BE49-F238E27FC236}">
                 <a16:creationId xmlns:a16="http://schemas.microsoft.com/office/drawing/2014/main" id="{B489D53A-804D-4F91-B68D-0A5631447FC2}"/>
               </a:ext>
             </a:extLst>
@@ -5985,6 +7844,13 @@
             </a:r>
           </a:p>
           <a:p>
+            <a:pPr lvl="1"/>
+            <a:r>
+              <a:rPr lang="en-US" dirty="0"/>
+              <a:t>Much more platform independent</a:t>
+            </a:r>
+          </a:p>
+          <a:p>
             <a:endParaRPr lang="en-US" dirty="0"/>
           </a:p>
         </p:txBody>
@@ -6077,6 +7943,12 @@
             <a:r>
               <a:rPr lang="en-US" dirty="0"/>
               <a:t>Supported by Blizzard</a:t>
+            </a:r>
+          </a:p>
+          <a:p>
+            <a:r>
+              <a:rPr lang="en-US" dirty="0"/>
+              <a:t>Supports most major build systems you would want to target</a:t>
             </a:r>
           </a:p>
         </p:txBody>
@@ -6314,9 +8186,6 @@
               <a:t>)</a:t>
             </a:r>
           </a:p>
-          <a:p>
-            <a:endParaRPr lang="en-US" dirty="0"/>
-          </a:p>
         </p:txBody>
       </p:sp>
     </p:spTree>
@@ -6395,7 +8264,9 @@
         </p:nvSpPr>
         <p:spPr/>
         <p:txBody>
-          <a:bodyPr/>
+          <a:bodyPr>
+            <a:normAutofit lnSpcReduction="10000"/>
+          </a:bodyPr>
           <a:lstStyle/>
           <a:p>
             <a:r>
@@ -6437,10 +8308,29 @@
             </a:r>
           </a:p>
           <a:p>
+            <a:pPr lvl="1"/>
+            <a:r>
+              <a:rPr lang="en-US" dirty="0"/>
+              <a:t>Under the strings are more strings</a:t>
+            </a:r>
+          </a:p>
+          <a:p>
+            <a:r>
+              <a:rPr lang="en-US" dirty="0"/>
+              <a:t>Supports pretty much everything under the sun</a:t>
+            </a:r>
+          </a:p>
+          <a:p>
             <a:r>
               <a:rPr lang="en-US" dirty="0"/>
               <a:t>Most people use it, and you should too.</a:t>
             </a:r>
+          </a:p>
+          <a:p>
+            <a:pPr marL="0" indent="0">
+              <a:buNone/>
+            </a:pPr>
+            <a:endParaRPr lang="en-US" dirty="0"/>
           </a:p>
           <a:p>
             <a:pPr lvl="1"/>
@@ -6463,7 +8353,7 @@
           <p:nvPr/>
         </p:nvPicPr>
         <p:blipFill>
-          <a:blip r:embed="rId2">
+          <a:blip r:embed="rId3">
             <a:extLst>
               <a:ext uri="{28A0092B-C50C-407E-A947-70E740481C1C}">
                 <a14:useLocalDpi xmlns:a14="http://schemas.microsoft.com/office/drawing/2010/main" val="0"/>
@@ -6753,4 +8643,299 @@
     </a:ext>
   </a:extLst>
 </a:theme>
+</file>
+
+<file path=ppt/theme/theme2.xml><?xml version="1.0" encoding="utf-8"?>
+<a:theme xmlns:a="http://schemas.openxmlformats.org/drawingml/2006/main" name="Office Theme">
+  <a:themeElements>
+    <a:clrScheme name="Office">
+      <a:dk1>
+        <a:sysClr val="windowText" lastClr="000000"/>
+      </a:dk1>
+      <a:lt1>
+        <a:sysClr val="window" lastClr="FFFFFF"/>
+      </a:lt1>
+      <a:dk2>
+        <a:srgbClr val="44546A"/>
+      </a:dk2>
+      <a:lt2>
+        <a:srgbClr val="E7E6E6"/>
+      </a:lt2>
+      <a:accent1>
+        <a:srgbClr val="4472C4"/>
+      </a:accent1>
+      <a:accent2>
+        <a:srgbClr val="ED7D31"/>
+      </a:accent2>
+      <a:accent3>
+        <a:srgbClr val="A5A5A5"/>
+      </a:accent3>
+      <a:accent4>
+        <a:srgbClr val="FFC000"/>
+      </a:accent4>
+      <a:accent5>
+        <a:srgbClr val="5B9BD5"/>
+      </a:accent5>
+      <a:accent6>
+        <a:srgbClr val="70AD47"/>
+      </a:accent6>
+      <a:hlink>
+        <a:srgbClr val="0563C1"/>
+      </a:hlink>
+      <a:folHlink>
+        <a:srgbClr val="954F72"/>
+      </a:folHlink>
+    </a:clrScheme>
+    <a:fontScheme name="Office">
+      <a:majorFont>
+        <a:latin typeface="Calibri Light" panose="020F0302020204030204"/>
+        <a:ea typeface=""/>
+        <a:cs typeface=""/>
+        <a:font script="Jpan" typeface="游ゴシック Light"/>
+        <a:font script="Hang" typeface="맑은 고딕"/>
+        <a:font script="Hans" typeface="等线 Light"/>
+        <a:font script="Hant" typeface="新細明體"/>
+        <a:font script="Arab" typeface="Times New Roman"/>
+        <a:font script="Hebr" typeface="Times New Roman"/>
+        <a:font script="Thai" typeface="Angsana New"/>
+        <a:font script="Ethi" typeface="Nyala"/>
+        <a:font script="Beng" typeface="Vrinda"/>
+        <a:font script="Gujr" typeface="Shruti"/>
+        <a:font script="Khmr" typeface="MoolBoran"/>
+        <a:font script="Knda" typeface="Tunga"/>
+        <a:font script="Guru" typeface="Raavi"/>
+        <a:font script="Cans" typeface="Euphemia"/>
+        <a:font script="Cher" typeface="Plantagenet Cherokee"/>
+        <a:font script="Yiii" typeface="Microsoft Yi Baiti"/>
+        <a:font script="Tibt" typeface="Microsoft Himalaya"/>
+        <a:font script="Thaa" typeface="MV Boli"/>
+        <a:font script="Deva" typeface="Mangal"/>
+        <a:font script="Telu" typeface="Gautami"/>
+        <a:font script="Taml" typeface="Latha"/>
+        <a:font script="Syrc" typeface="Estrangelo Edessa"/>
+        <a:font script="Orya" typeface="Kalinga"/>
+        <a:font script="Mlym" typeface="Kartika"/>
+        <a:font script="Laoo" typeface="DokChampa"/>
+        <a:font script="Sinh" typeface="Iskoola Pota"/>
+        <a:font script="Mong" typeface="Mongolian Baiti"/>
+        <a:font script="Viet" typeface="Times New Roman"/>
+        <a:font script="Uigh" typeface="Microsoft Uighur"/>
+        <a:font script="Geor" typeface="Sylfaen"/>
+        <a:font script="Armn" typeface="Arial"/>
+        <a:font script="Bugi" typeface="Leelawadee UI"/>
+        <a:font script="Bopo" typeface="Microsoft JhengHei"/>
+        <a:font script="Java" typeface="Javanese Text"/>
+        <a:font script="Lisu" typeface="Segoe UI"/>
+        <a:font script="Mymr" typeface="Myanmar Text"/>
+        <a:font script="Nkoo" typeface="Ebrima"/>
+        <a:font script="Olck" typeface="Nirmala UI"/>
+        <a:font script="Osma" typeface="Ebrima"/>
+        <a:font script="Phag" typeface="Phagspa"/>
+        <a:font script="Syrn" typeface="Estrangelo Edessa"/>
+        <a:font script="Syrj" typeface="Estrangelo Edessa"/>
+        <a:font script="Syre" typeface="Estrangelo Edessa"/>
+        <a:font script="Sora" typeface="Nirmala UI"/>
+        <a:font script="Tale" typeface="Microsoft Tai Le"/>
+        <a:font script="Talu" typeface="Microsoft New Tai Lue"/>
+        <a:font script="Tfng" typeface="Ebrima"/>
+      </a:majorFont>
+      <a:minorFont>
+        <a:latin typeface="Calibri" panose="020F0502020204030204"/>
+        <a:ea typeface=""/>
+        <a:cs typeface=""/>
+        <a:font script="Jpan" typeface="游ゴシック"/>
+        <a:font script="Hang" typeface="맑은 고딕"/>
+        <a:font script="Hans" typeface="等线"/>
+        <a:font script="Hant" typeface="新細明體"/>
+        <a:font script="Arab" typeface="Arial"/>
+        <a:font script="Hebr" typeface="Arial"/>
+        <a:font script="Thai" typeface="Cordia New"/>
+        <a:font script="Ethi" typeface="Nyala"/>
+        <a:font script="Beng" typeface="Vrinda"/>
+        <a:font script="Gujr" typeface="Shruti"/>
+        <a:font script="Khmr" typeface="DaunPenh"/>
+        <a:font script="Knda" typeface="Tunga"/>
+        <a:font script="Guru" typeface="Raavi"/>
+        <a:font script="Cans" typeface="Euphemia"/>
+        <a:font script="Cher" typeface="Plantagenet Cherokee"/>
+        <a:font script="Yiii" typeface="Microsoft Yi Baiti"/>
+        <a:font script="Tibt" typeface="Microsoft Himalaya"/>
+        <a:font script="Thaa" typeface="MV Boli"/>
+        <a:font script="Deva" typeface="Mangal"/>
+        <a:font script="Telu" typeface="Gautami"/>
+        <a:font script="Taml" typeface="Latha"/>
+        <a:font script="Syrc" typeface="Estrangelo Edessa"/>
+        <a:font script="Orya" typeface="Kalinga"/>
+        <a:font script="Mlym" typeface="Kartika"/>
+        <a:font script="Laoo" typeface="DokChampa"/>
+        <a:font script="Sinh" typeface="Iskoola Pota"/>
+        <a:font script="Mong" typeface="Mongolian Baiti"/>
+        <a:font script="Viet" typeface="Arial"/>
+        <a:font script="Uigh" typeface="Microsoft Uighur"/>
+        <a:font script="Geor" typeface="Sylfaen"/>
+        <a:font script="Armn" typeface="Arial"/>
+        <a:font script="Bugi" typeface="Leelawadee UI"/>
+        <a:font script="Bopo" typeface="Microsoft JhengHei"/>
+        <a:font script="Java" typeface="Javanese Text"/>
+        <a:font script="Lisu" typeface="Segoe UI"/>
+        <a:font script="Mymr" typeface="Myanmar Text"/>
+        <a:font script="Nkoo" typeface="Ebrima"/>
+        <a:font script="Olck" typeface="Nirmala UI"/>
+        <a:font script="Osma" typeface="Ebrima"/>
+        <a:font script="Phag" typeface="Phagspa"/>
+        <a:font script="Syrn" typeface="Estrangelo Edessa"/>
+        <a:font script="Syrj" typeface="Estrangelo Edessa"/>
+        <a:font script="Syre" typeface="Estrangelo Edessa"/>
+        <a:font script="Sora" typeface="Nirmala UI"/>
+        <a:font script="Tale" typeface="Microsoft Tai Le"/>
+        <a:font script="Talu" typeface="Microsoft New Tai Lue"/>
+        <a:font script="Tfng" typeface="Ebrima"/>
+      </a:minorFont>
+    </a:fontScheme>
+    <a:fmtScheme name="Office">
+      <a:fillStyleLst>
+        <a:solidFill>
+          <a:schemeClr val="phClr"/>
+        </a:solidFill>
+        <a:gradFill rotWithShape="1">
+          <a:gsLst>
+            <a:gs pos="0">
+              <a:schemeClr val="phClr">
+                <a:lumMod val="110000"/>
+                <a:satMod val="105000"/>
+                <a:tint val="67000"/>
+              </a:schemeClr>
+            </a:gs>
+            <a:gs pos="50000">
+              <a:schemeClr val="phClr">
+                <a:lumMod val="105000"/>
+                <a:satMod val="103000"/>
+                <a:tint val="73000"/>
+              </a:schemeClr>
+            </a:gs>
+            <a:gs pos="100000">
+              <a:schemeClr val="phClr">
+                <a:lumMod val="105000"/>
+                <a:satMod val="109000"/>
+                <a:tint val="81000"/>
+              </a:schemeClr>
+            </a:gs>
+          </a:gsLst>
+          <a:lin ang="5400000" scaled="0"/>
+        </a:gradFill>
+        <a:gradFill rotWithShape="1">
+          <a:gsLst>
+            <a:gs pos="0">
+              <a:schemeClr val="phClr">
+                <a:satMod val="103000"/>
+                <a:lumMod val="102000"/>
+                <a:tint val="94000"/>
+              </a:schemeClr>
+            </a:gs>
+            <a:gs pos="50000">
+              <a:schemeClr val="phClr">
+                <a:satMod val="110000"/>
+                <a:lumMod val="100000"/>
+                <a:shade val="100000"/>
+              </a:schemeClr>
+            </a:gs>
+            <a:gs pos="100000">
+              <a:schemeClr val="phClr">
+                <a:lumMod val="99000"/>
+                <a:satMod val="120000"/>
+                <a:shade val="78000"/>
+              </a:schemeClr>
+            </a:gs>
+          </a:gsLst>
+          <a:lin ang="5400000" scaled="0"/>
+        </a:gradFill>
+      </a:fillStyleLst>
+      <a:lnStyleLst>
+        <a:ln w="6350" cap="flat" cmpd="sng" algn="ctr">
+          <a:solidFill>
+            <a:schemeClr val="phClr"/>
+          </a:solidFill>
+          <a:prstDash val="solid"/>
+          <a:miter lim="800000"/>
+        </a:ln>
+        <a:ln w="12700" cap="flat" cmpd="sng" algn="ctr">
+          <a:solidFill>
+            <a:schemeClr val="phClr"/>
+          </a:solidFill>
+          <a:prstDash val="solid"/>
+          <a:miter lim="800000"/>
+        </a:ln>
+        <a:ln w="19050" cap="flat" cmpd="sng" algn="ctr">
+          <a:solidFill>
+            <a:schemeClr val="phClr"/>
+          </a:solidFill>
+          <a:prstDash val="solid"/>
+          <a:miter lim="800000"/>
+        </a:ln>
+      </a:lnStyleLst>
+      <a:effectStyleLst>
+        <a:effectStyle>
+          <a:effectLst/>
+        </a:effectStyle>
+        <a:effectStyle>
+          <a:effectLst/>
+        </a:effectStyle>
+        <a:effectStyle>
+          <a:effectLst>
+            <a:outerShdw blurRad="57150" dist="19050" dir="5400000" algn="ctr" rotWithShape="0">
+              <a:srgbClr val="000000">
+                <a:alpha val="63000"/>
+              </a:srgbClr>
+            </a:outerShdw>
+          </a:effectLst>
+        </a:effectStyle>
+      </a:effectStyleLst>
+      <a:bgFillStyleLst>
+        <a:solidFill>
+          <a:schemeClr val="phClr"/>
+        </a:solidFill>
+        <a:solidFill>
+          <a:schemeClr val="phClr">
+            <a:tint val="95000"/>
+            <a:satMod val="170000"/>
+          </a:schemeClr>
+        </a:solidFill>
+        <a:gradFill rotWithShape="1">
+          <a:gsLst>
+            <a:gs pos="0">
+              <a:schemeClr val="phClr">
+                <a:tint val="93000"/>
+                <a:satMod val="150000"/>
+                <a:shade val="98000"/>
+                <a:lumMod val="102000"/>
+              </a:schemeClr>
+            </a:gs>
+            <a:gs pos="50000">
+              <a:schemeClr val="phClr">
+                <a:tint val="98000"/>
+                <a:satMod val="130000"/>
+                <a:shade val="90000"/>
+                <a:lumMod val="103000"/>
+              </a:schemeClr>
+            </a:gs>
+            <a:gs pos="100000">
+              <a:schemeClr val="phClr">
+                <a:shade val="63000"/>
+                <a:satMod val="120000"/>
+              </a:schemeClr>
+            </a:gs>
+          </a:gsLst>
+          <a:lin ang="5400000" scaled="0"/>
+        </a:gradFill>
+      </a:bgFillStyleLst>
+    </a:fmtScheme>
+  </a:themeElements>
+  <a:objectDefaults/>
+  <a:extraClrSchemeLst/>
+  <a:extLst>
+    <a:ext uri="{05A4C25C-085E-4340-85A3-A5531E510DB2}">
+      <thm15:themeFamily xmlns:thm15="http://schemas.microsoft.com/office/thememl/2012/main" name="Office Theme" id="{62F939B6-93AF-4DB8-9C6B-D6C7DFDC589F}" vid="{4A3C46E8-61CC-4603-A589-7422A47A8E4A}"/>
+    </a:ext>
+  </a:extLst>
+</a:theme>
 </file>
</xml_diff>

<commit_message>
Added the most important part...pictures.
</commit_message>
<xml_diff>
--- a/PreBuild Systems.pptx
+++ b/PreBuild Systems.pptx
@@ -5,7 +5,7 @@
     <p:sldMasterId id="2147483949" r:id="rId1"/>
   </p:sldMasterIdLst>
   <p:notesMasterIdLst>
-    <p:notesMasterId r:id="rId31"/>
+    <p:notesMasterId r:id="rId32"/>
   </p:notesMasterIdLst>
   <p:sldIdLst>
     <p:sldId id="256" r:id="rId2"/>
@@ -26,17 +26,18 @@
     <p:sldId id="343" r:id="rId17"/>
     <p:sldId id="344" r:id="rId18"/>
     <p:sldId id="342" r:id="rId19"/>
-    <p:sldId id="345" r:id="rId20"/>
-    <p:sldId id="333" r:id="rId21"/>
-    <p:sldId id="329" r:id="rId22"/>
-    <p:sldId id="265" r:id="rId23"/>
-    <p:sldId id="330" r:id="rId24"/>
-    <p:sldId id="335" r:id="rId25"/>
-    <p:sldId id="337" r:id="rId26"/>
-    <p:sldId id="336" r:id="rId27"/>
-    <p:sldId id="331" r:id="rId28"/>
-    <p:sldId id="332" r:id="rId29"/>
-    <p:sldId id="334" r:id="rId30"/>
+    <p:sldId id="347" r:id="rId20"/>
+    <p:sldId id="345" r:id="rId21"/>
+    <p:sldId id="333" r:id="rId22"/>
+    <p:sldId id="329" r:id="rId23"/>
+    <p:sldId id="265" r:id="rId24"/>
+    <p:sldId id="330" r:id="rId25"/>
+    <p:sldId id="335" r:id="rId26"/>
+    <p:sldId id="337" r:id="rId27"/>
+    <p:sldId id="336" r:id="rId28"/>
+    <p:sldId id="331" r:id="rId29"/>
+    <p:sldId id="332" r:id="rId30"/>
+    <p:sldId id="334" r:id="rId31"/>
   </p:sldIdLst>
   <p:sldSz cx="12192000" cy="6858000"/>
   <p:notesSz cx="6858000" cy="9144000"/>
@@ -225,7 +226,7 @@
           <a:p>
             <a:fld id="{70F6FF9A-81B4-4162-AD96-D5958648E4E9}" type="datetimeFigureOut">
               <a:rPr lang="en-US" smtClean="0"/>
-              <a:t>7/9/2018</a:t>
+              <a:t>7/10/2018</a:t>
             </a:fld>
             <a:endParaRPr lang="en-US"/>
           </a:p>
@@ -835,7 +836,7 @@
           <a:p>
             <a:fld id="{78BCEC26-79C5-4FF5-83A1-CBBD9A11ECDD}" type="datetimeFigureOut">
               <a:rPr lang="en-US" smtClean="0"/>
-              <a:t>7/9/2018</a:t>
+              <a:t>7/10/2018</a:t>
             </a:fld>
             <a:endParaRPr lang="en-US"/>
           </a:p>
@@ -1165,7 +1166,7 @@
           <a:p>
             <a:fld id="{78BCEC26-79C5-4FF5-83A1-CBBD9A11ECDD}" type="datetimeFigureOut">
               <a:rPr lang="en-US" smtClean="0"/>
-              <a:t>7/9/2018</a:t>
+              <a:t>7/10/2018</a:t>
             </a:fld>
             <a:endParaRPr lang="en-US"/>
           </a:p>
@@ -1345,7 +1346,7 @@
           <a:p>
             <a:fld id="{78BCEC26-79C5-4FF5-83A1-CBBD9A11ECDD}" type="datetimeFigureOut">
               <a:rPr lang="en-US" smtClean="0"/>
-              <a:t>7/9/2018</a:t>
+              <a:t>7/10/2018</a:t>
             </a:fld>
             <a:endParaRPr lang="en-US"/>
           </a:p>
@@ -1515,7 +1516,7 @@
           <a:p>
             <a:fld id="{78BCEC26-79C5-4FF5-83A1-CBBD9A11ECDD}" type="datetimeFigureOut">
               <a:rPr lang="en-US" smtClean="0"/>
-              <a:t>7/9/2018</a:t>
+              <a:t>7/10/2018</a:t>
             </a:fld>
             <a:endParaRPr lang="en-US"/>
           </a:p>
@@ -1792,7 +1793,7 @@
           <a:p>
             <a:fld id="{78BCEC26-79C5-4FF5-83A1-CBBD9A11ECDD}" type="datetimeFigureOut">
               <a:rPr lang="en-US" smtClean="0"/>
-              <a:t>7/9/2018</a:t>
+              <a:t>7/10/2018</a:t>
             </a:fld>
             <a:endParaRPr lang="en-US"/>
           </a:p>
@@ -2186,7 +2187,7 @@
           <a:p>
             <a:fld id="{78BCEC26-79C5-4FF5-83A1-CBBD9A11ECDD}" type="datetimeFigureOut">
               <a:rPr lang="en-US" smtClean="0"/>
-              <a:t>7/9/2018</a:t>
+              <a:t>7/10/2018</a:t>
             </a:fld>
             <a:endParaRPr lang="en-US"/>
           </a:p>
@@ -2663,7 +2664,7 @@
           <a:p>
             <a:fld id="{78BCEC26-79C5-4FF5-83A1-CBBD9A11ECDD}" type="datetimeFigureOut">
               <a:rPr lang="en-US" smtClean="0"/>
-              <a:t>7/9/2018</a:t>
+              <a:t>7/10/2018</a:t>
             </a:fld>
             <a:endParaRPr lang="en-US"/>
           </a:p>
@@ -2781,7 +2782,7 @@
           <a:p>
             <a:fld id="{78BCEC26-79C5-4FF5-83A1-CBBD9A11ECDD}" type="datetimeFigureOut">
               <a:rPr lang="en-US" smtClean="0"/>
-              <a:t>7/9/2018</a:t>
+              <a:t>7/10/2018</a:t>
             </a:fld>
             <a:endParaRPr lang="en-US"/>
           </a:p>
@@ -2876,7 +2877,7 @@
           <a:p>
             <a:fld id="{78BCEC26-79C5-4FF5-83A1-CBBD9A11ECDD}" type="datetimeFigureOut">
               <a:rPr lang="en-US" smtClean="0"/>
-              <a:t>7/9/2018</a:t>
+              <a:t>7/10/2018</a:t>
             </a:fld>
             <a:endParaRPr lang="en-US"/>
           </a:p>
@@ -3222,7 +3223,7 @@
           <a:p>
             <a:fld id="{78BCEC26-79C5-4FF5-83A1-CBBD9A11ECDD}" type="datetimeFigureOut">
               <a:rPr lang="en-US" smtClean="0"/>
-              <a:t>7/9/2018</a:t>
+              <a:t>7/10/2018</a:t>
             </a:fld>
             <a:endParaRPr lang="en-US"/>
           </a:p>
@@ -3610,7 +3611,7 @@
           <a:p>
             <a:fld id="{78BCEC26-79C5-4FF5-83A1-CBBD9A11ECDD}" type="datetimeFigureOut">
               <a:rPr lang="en-US" smtClean="0"/>
-              <a:t>7/9/2018</a:t>
+              <a:t>7/10/2018</a:t>
             </a:fld>
             <a:endParaRPr lang="en-US"/>
           </a:p>
@@ -3888,7 +3889,7 @@
           <a:p>
             <a:fld id="{78BCEC26-79C5-4FF5-83A1-CBBD9A11ECDD}" type="datetimeFigureOut">
               <a:rPr lang="en-US" smtClean="0"/>
-              <a:t>7/9/2018</a:t>
+              <a:t>7/10/2018</a:t>
             </a:fld>
             <a:endParaRPr lang="en-US"/>
           </a:p>
@@ -4870,6 +4871,42 @@
           </a:p>
         </p:txBody>
       </p:sp>
+      <p:pic>
+        <p:nvPicPr>
+          <p:cNvPr id="5" name="Picture 4">
+            <a:extLst>
+              <a:ext uri="{FF2B5EF4-FFF2-40B4-BE49-F238E27FC236}">
+                <a16:creationId xmlns:a16="http://schemas.microsoft.com/office/drawing/2014/main" id="{6489D208-52B6-42D8-8D0F-58887DBB38E3}"/>
+              </a:ext>
+            </a:extLst>
+          </p:cNvPr>
+          <p:cNvPicPr>
+            <a:picLocks noChangeAspect="1"/>
+          </p:cNvPicPr>
+          <p:nvPr/>
+        </p:nvPicPr>
+        <p:blipFill>
+          <a:blip r:embed="rId2">
+            <a:extLst>
+              <a:ext uri="{28A0092B-C50C-407E-A947-70E740481C1C}">
+                <a14:useLocalDpi xmlns:a14="http://schemas.microsoft.com/office/drawing/2010/main" val="0"/>
+              </a:ext>
+            </a:extLst>
+          </a:blip>
+          <a:stretch>
+            <a:fillRect/>
+          </a:stretch>
+        </p:blipFill>
+        <p:spPr>
+          <a:xfrm>
+            <a:off x="3578691" y="4574032"/>
+            <a:ext cx="3121152" cy="2078736"/>
+          </a:xfrm>
+          <a:prstGeom prst="rect">
+            <a:avLst/>
+          </a:prstGeom>
+        </p:spPr>
+      </p:pic>
     </p:spTree>
     <p:extLst>
       <p:ext uri="{BB962C8B-B14F-4D97-AF65-F5344CB8AC3E}">
@@ -4992,6 +5029,45 @@
           </a:p>
         </p:txBody>
       </p:sp>
+      <p:pic>
+        <p:nvPicPr>
+          <p:cNvPr id="5" name="Graphic 4" descr="Lecturer">
+            <a:extLst>
+              <a:ext uri="{FF2B5EF4-FFF2-40B4-BE49-F238E27FC236}">
+                <a16:creationId xmlns:a16="http://schemas.microsoft.com/office/drawing/2014/main" id="{41384B86-BCA9-42E5-9910-95664FED3D35}"/>
+              </a:ext>
+            </a:extLst>
+          </p:cNvPr>
+          <p:cNvPicPr>
+            <a:picLocks noChangeAspect="1"/>
+          </p:cNvPicPr>
+          <p:nvPr/>
+        </p:nvPicPr>
+        <p:blipFill>
+          <a:blip r:embed="rId2">
+            <a:extLst>
+              <a:ext uri="{28A0092B-C50C-407E-A947-70E740481C1C}">
+                <a14:useLocalDpi xmlns:a14="http://schemas.microsoft.com/office/drawing/2010/main" val="0"/>
+              </a:ext>
+              <a:ext uri="{96DAC541-7B7A-43D3-8B79-37D633B846F1}">
+                <asvg:svgBlip xmlns:asvg="http://schemas.microsoft.com/office/drawing/2016/SVG/main" r:embed="rId3"/>
+              </a:ext>
+            </a:extLst>
+          </a:blip>
+          <a:stretch>
+            <a:fillRect/>
+          </a:stretch>
+        </p:blipFill>
+        <p:spPr>
+          <a:xfrm>
+            <a:off x="3759200" y="514350"/>
+            <a:ext cx="914400" cy="914400"/>
+          </a:xfrm>
+          <a:prstGeom prst="rect">
+            <a:avLst/>
+          </a:prstGeom>
+        </p:spPr>
+      </p:pic>
     </p:spTree>
     <p:extLst>
       <p:ext uri="{BB962C8B-B14F-4D97-AF65-F5344CB8AC3E}">
@@ -5118,6 +5194,42 @@
           </a:p>
         </p:txBody>
       </p:sp>
+      <p:pic>
+        <p:nvPicPr>
+          <p:cNvPr id="5" name="Picture 4">
+            <a:extLst>
+              <a:ext uri="{FF2B5EF4-FFF2-40B4-BE49-F238E27FC236}">
+                <a16:creationId xmlns:a16="http://schemas.microsoft.com/office/drawing/2014/main" id="{EABC0DCF-DAAC-459D-91DA-A93745E82280}"/>
+              </a:ext>
+            </a:extLst>
+          </p:cNvPr>
+          <p:cNvPicPr>
+            <a:picLocks noChangeAspect="1"/>
+          </p:cNvPicPr>
+          <p:nvPr/>
+        </p:nvPicPr>
+        <p:blipFill>
+          <a:blip r:embed="rId2">
+            <a:extLst>
+              <a:ext uri="{28A0092B-C50C-407E-A947-70E740481C1C}">
+                <a14:useLocalDpi xmlns:a14="http://schemas.microsoft.com/office/drawing/2010/main" val="0"/>
+              </a:ext>
+            </a:extLst>
+          </a:blip>
+          <a:stretch>
+            <a:fillRect/>
+          </a:stretch>
+        </p:blipFill>
+        <p:spPr>
+          <a:xfrm>
+            <a:off x="9076267" y="990600"/>
+            <a:ext cx="2438400" cy="1630680"/>
+          </a:xfrm>
+          <a:prstGeom prst="rect">
+            <a:avLst/>
+          </a:prstGeom>
+        </p:spPr>
+      </p:pic>
     </p:spTree>
     <p:extLst>
       <p:ext uri="{BB962C8B-B14F-4D97-AF65-F5344CB8AC3E}">
@@ -5240,6 +5352,36 @@
           </a:p>
         </p:txBody>
       </p:sp>
+      <p:pic>
+        <p:nvPicPr>
+          <p:cNvPr id="5" name="Picture 4">
+            <a:extLst>
+              <a:ext uri="{FF2B5EF4-FFF2-40B4-BE49-F238E27FC236}">
+                <a16:creationId xmlns:a16="http://schemas.microsoft.com/office/drawing/2014/main" id="{76D062A4-2315-4B9B-B569-B6D4EC5E7C63}"/>
+              </a:ext>
+            </a:extLst>
+          </p:cNvPr>
+          <p:cNvPicPr>
+            <a:picLocks noChangeAspect="1"/>
+          </p:cNvPicPr>
+          <p:nvPr/>
+        </p:nvPicPr>
+        <p:blipFill>
+          <a:blip r:embed="rId2"/>
+          <a:stretch>
+            <a:fillRect/>
+          </a:stretch>
+        </p:blipFill>
+        <p:spPr>
+          <a:xfrm>
+            <a:off x="5424747" y="1382155"/>
+            <a:ext cx="5966775" cy="649846"/>
+          </a:xfrm>
+          <a:prstGeom prst="rect">
+            <a:avLst/>
+          </a:prstGeom>
+        </p:spPr>
+      </p:pic>
     </p:spTree>
     <p:extLst>
       <p:ext uri="{BB962C8B-B14F-4D97-AF65-F5344CB8AC3E}">
@@ -5612,6 +5754,374 @@
           </a:p>
         </p:txBody>
       </p:sp>
+      <mc:AlternateContent xmlns:mc="http://schemas.openxmlformats.org/markup-compatibility/2006">
+        <mc:Choice xmlns:a14="http://schemas.microsoft.com/office/drawing/2010/main" Requires="a14">
+          <p:sp>
+            <p:nvSpPr>
+              <p:cNvPr id="4" name="TextBox 3">
+                <a:extLst>
+                  <a:ext uri="{FF2B5EF4-FFF2-40B4-BE49-F238E27FC236}">
+                    <a16:creationId xmlns:a16="http://schemas.microsoft.com/office/drawing/2014/main" id="{E41E58A9-0F2D-462C-B278-3468408D5DAB}"/>
+                  </a:ext>
+                </a:extLst>
+              </p:cNvPr>
+              <p:cNvSpPr txBox="1"/>
+              <p:nvPr/>
+            </p:nvSpPr>
+            <p:spPr>
+              <a:xfrm>
+                <a:off x="6760019" y="680783"/>
+                <a:ext cx="4212781" cy="747967"/>
+              </a:xfrm>
+              <a:prstGeom prst="rect">
+                <a:avLst/>
+              </a:prstGeom>
+              <a:noFill/>
+            </p:spPr>
+            <p:txBody>
+              <a:bodyPr wrap="none" lIns="0" tIns="0" rIns="0" bIns="0" rtlCol="0">
+                <a:spAutoFit/>
+              </a:bodyPr>
+              <a:lstStyle/>
+              <a:p>
+                <a14:m>
+                  <m:oMathPara xmlns:m="http://schemas.openxmlformats.org/officeDocument/2006/math">
+                    <m:oMathParaPr>
+                      <m:jc m:val="centerGroup"/>
+                    </m:oMathParaPr>
+                    <m:oMath xmlns:m="http://schemas.openxmlformats.org/officeDocument/2006/math">
+                      <m:r>
+                        <a:rPr lang="pt-BR" i="1" smtClean="0">
+                          <a:latin typeface="Cambria Math" panose="02040503050406030204" pitchFamily="18" charset="0"/>
+                        </a:rPr>
+                        <m:t>𝑓</m:t>
+                      </m:r>
+                      <m:d>
+                        <m:dPr>
+                          <m:ctrlPr>
+                            <a:rPr lang="pt-BR" i="1" smtClean="0">
+                              <a:latin typeface="Cambria Math" panose="02040503050406030204" pitchFamily="18" charset="0"/>
+                            </a:rPr>
+                          </m:ctrlPr>
+                        </m:dPr>
+                        <m:e>
+                          <m:r>
+                            <a:rPr lang="pt-BR" i="1" smtClean="0">
+                              <a:latin typeface="Cambria Math" panose="02040503050406030204" pitchFamily="18" charset="0"/>
+                            </a:rPr>
+                            <m:t>𝑥</m:t>
+                          </m:r>
+                        </m:e>
+                      </m:d>
+                      <m:r>
+                        <a:rPr lang="pt-BR" i="1" smtClean="0">
+                          <a:latin typeface="Cambria Math" panose="02040503050406030204" pitchFamily="18" charset="0"/>
+                        </a:rPr>
+                        <m:t>=</m:t>
+                      </m:r>
+                      <m:sSub>
+                        <m:sSubPr>
+                          <m:ctrlPr>
+                            <a:rPr lang="pt-BR" i="1" smtClean="0">
+                              <a:latin typeface="Cambria Math" panose="02040503050406030204" pitchFamily="18" charset="0"/>
+                            </a:rPr>
+                          </m:ctrlPr>
+                        </m:sSubPr>
+                        <m:e>
+                          <m:r>
+                            <a:rPr lang="pt-BR" i="1" smtClean="0">
+                              <a:latin typeface="Cambria Math" panose="02040503050406030204" pitchFamily="18" charset="0"/>
+                            </a:rPr>
+                            <m:t>𝑎</m:t>
+                          </m:r>
+                        </m:e>
+                        <m:sub>
+                          <m:r>
+                            <a:rPr lang="pt-BR" i="1" smtClean="0">
+                              <a:latin typeface="Cambria Math" panose="02040503050406030204" pitchFamily="18" charset="0"/>
+                            </a:rPr>
+                            <m:t>0</m:t>
+                          </m:r>
+                        </m:sub>
+                      </m:sSub>
+                      <m:r>
+                        <a:rPr lang="pt-BR" i="1" smtClean="0">
+                          <a:latin typeface="Cambria Math" panose="02040503050406030204" pitchFamily="18" charset="0"/>
+                        </a:rPr>
+                        <m:t>+</m:t>
+                      </m:r>
+                      <m:nary>
+                        <m:naryPr>
+                          <m:chr m:val="∑"/>
+                          <m:ctrlPr>
+                            <a:rPr lang="pt-BR" i="1" smtClean="0">
+                              <a:latin typeface="Cambria Math" panose="02040503050406030204" pitchFamily="18" charset="0"/>
+                            </a:rPr>
+                          </m:ctrlPr>
+                        </m:naryPr>
+                        <m:sub>
+                          <m:r>
+                            <a:rPr lang="pt-BR" i="1" smtClean="0">
+                              <a:latin typeface="Cambria Math" panose="02040503050406030204" pitchFamily="18" charset="0"/>
+                            </a:rPr>
+                            <m:t>𝑛</m:t>
+                          </m:r>
+                          <m:r>
+                            <a:rPr lang="pt-BR" i="1" smtClean="0">
+                              <a:latin typeface="Cambria Math" panose="02040503050406030204" pitchFamily="18" charset="0"/>
+                            </a:rPr>
+                            <m:t>=1</m:t>
+                          </m:r>
+                        </m:sub>
+                        <m:sup>
+                          <m:r>
+                            <a:rPr lang="pt-BR" i="1" smtClean="0">
+                              <a:latin typeface="Cambria Math" panose="02040503050406030204" pitchFamily="18" charset="0"/>
+                            </a:rPr>
+                            <m:t>∞</m:t>
+                          </m:r>
+                        </m:sup>
+                        <m:e>
+                          <m:d>
+                            <m:dPr>
+                              <m:ctrlPr>
+                                <a:rPr lang="pt-BR" i="1" smtClean="0">
+                                  <a:latin typeface="Cambria Math" panose="02040503050406030204" pitchFamily="18" charset="0"/>
+                                </a:rPr>
+                              </m:ctrlPr>
+                            </m:dPr>
+                            <m:e>
+                              <m:sSub>
+                                <m:sSubPr>
+                                  <m:ctrlPr>
+                                    <a:rPr lang="pt-BR" i="1" smtClean="0">
+                                      <a:latin typeface="Cambria Math" panose="02040503050406030204" pitchFamily="18" charset="0"/>
+                                    </a:rPr>
+                                  </m:ctrlPr>
+                                </m:sSubPr>
+                                <m:e>
+                                  <m:r>
+                                    <a:rPr lang="pt-BR" i="1" smtClean="0">
+                                      <a:latin typeface="Cambria Math" panose="02040503050406030204" pitchFamily="18" charset="0"/>
+                                    </a:rPr>
+                                    <m:t>𝑎</m:t>
+                                  </m:r>
+                                </m:e>
+                                <m:sub>
+                                  <m:r>
+                                    <a:rPr lang="pt-BR" i="1" smtClean="0">
+                                      <a:latin typeface="Cambria Math" panose="02040503050406030204" pitchFamily="18" charset="0"/>
+                                    </a:rPr>
+                                    <m:t>𝑛</m:t>
+                                  </m:r>
+                                </m:sub>
+                              </m:sSub>
+                              <m:func>
+                                <m:funcPr>
+                                  <m:ctrlPr>
+                                    <a:rPr lang="pt-BR" i="1" smtClean="0">
+                                      <a:latin typeface="Cambria Math" panose="02040503050406030204" pitchFamily="18" charset="0"/>
+                                    </a:rPr>
+                                  </m:ctrlPr>
+                                </m:funcPr>
+                                <m:fName>
+                                  <m:r>
+                                    <m:rPr>
+                                      <m:sty m:val="p"/>
+                                    </m:rPr>
+                                    <a:rPr lang="pt-BR" i="0" smtClean="0">
+                                      <a:latin typeface="Cambria Math" panose="02040503050406030204" pitchFamily="18" charset="0"/>
+                                    </a:rPr>
+                                    <m:t>cos</m:t>
+                                  </m:r>
+                                </m:fName>
+                                <m:e>
+                                  <m:f>
+                                    <m:fPr>
+                                      <m:ctrlPr>
+                                        <a:rPr lang="pt-BR" i="1" smtClean="0">
+                                          <a:latin typeface="Cambria Math" panose="02040503050406030204" pitchFamily="18" charset="0"/>
+                                        </a:rPr>
+                                      </m:ctrlPr>
+                                    </m:fPr>
+                                    <m:num>
+                                      <m:r>
+                                        <a:rPr lang="pt-BR" i="1" smtClean="0">
+                                          <a:latin typeface="Cambria Math" panose="02040503050406030204" pitchFamily="18" charset="0"/>
+                                        </a:rPr>
+                                        <m:t>𝑛</m:t>
+                                      </m:r>
+                                      <m:r>
+                                        <a:rPr lang="pt-BR" i="1" smtClean="0">
+                                          <a:latin typeface="Cambria Math" panose="02040503050406030204" pitchFamily="18" charset="0"/>
+                                        </a:rPr>
+                                        <m:t>𝜋</m:t>
+                                      </m:r>
+                                      <m:r>
+                                        <a:rPr lang="pt-BR" i="1" smtClean="0">
+                                          <a:latin typeface="Cambria Math" panose="02040503050406030204" pitchFamily="18" charset="0"/>
+                                        </a:rPr>
+                                        <m:t>𝑥</m:t>
+                                      </m:r>
+                                    </m:num>
+                                    <m:den>
+                                      <m:r>
+                                        <a:rPr lang="pt-BR" i="1" smtClean="0">
+                                          <a:latin typeface="Cambria Math" panose="02040503050406030204" pitchFamily="18" charset="0"/>
+                                        </a:rPr>
+                                        <m:t>𝐿</m:t>
+                                      </m:r>
+                                    </m:den>
+                                  </m:f>
+                                </m:e>
+                              </m:func>
+                              <m:r>
+                                <a:rPr lang="pt-BR" i="1" smtClean="0">
+                                  <a:latin typeface="Cambria Math" panose="02040503050406030204" pitchFamily="18" charset="0"/>
+                                </a:rPr>
+                                <m:t>+</m:t>
+                              </m:r>
+                              <m:sSub>
+                                <m:sSubPr>
+                                  <m:ctrlPr>
+                                    <a:rPr lang="pt-BR" i="1" smtClean="0">
+                                      <a:latin typeface="Cambria Math" panose="02040503050406030204" pitchFamily="18" charset="0"/>
+                                    </a:rPr>
+                                  </m:ctrlPr>
+                                </m:sSubPr>
+                                <m:e>
+                                  <m:r>
+                                    <a:rPr lang="pt-BR" i="1" smtClean="0">
+                                      <a:latin typeface="Cambria Math" panose="02040503050406030204" pitchFamily="18" charset="0"/>
+                                    </a:rPr>
+                                    <m:t>𝑏</m:t>
+                                  </m:r>
+                                </m:e>
+                                <m:sub>
+                                  <m:r>
+                                    <a:rPr lang="pt-BR" i="1" smtClean="0">
+                                      <a:latin typeface="Cambria Math" panose="02040503050406030204" pitchFamily="18" charset="0"/>
+                                    </a:rPr>
+                                    <m:t>𝑛</m:t>
+                                  </m:r>
+                                </m:sub>
+                              </m:sSub>
+                              <m:func>
+                                <m:funcPr>
+                                  <m:ctrlPr>
+                                    <a:rPr lang="pt-BR" i="1" smtClean="0">
+                                      <a:latin typeface="Cambria Math" panose="02040503050406030204" pitchFamily="18" charset="0"/>
+                                    </a:rPr>
+                                  </m:ctrlPr>
+                                </m:funcPr>
+                                <m:fName>
+                                  <m:r>
+                                    <m:rPr>
+                                      <m:sty m:val="p"/>
+                                    </m:rPr>
+                                    <a:rPr lang="pt-BR" i="0" smtClean="0">
+                                      <a:latin typeface="Cambria Math" panose="02040503050406030204" pitchFamily="18" charset="0"/>
+                                    </a:rPr>
+                                    <m:t>sin</m:t>
+                                  </m:r>
+                                </m:fName>
+                                <m:e>
+                                  <m:f>
+                                    <m:fPr>
+                                      <m:ctrlPr>
+                                        <a:rPr lang="pt-BR" i="1" smtClean="0">
+                                          <a:latin typeface="Cambria Math" panose="02040503050406030204" pitchFamily="18" charset="0"/>
+                                        </a:rPr>
+                                      </m:ctrlPr>
+                                    </m:fPr>
+                                    <m:num>
+                                      <m:r>
+                                        <a:rPr lang="pt-BR" i="1" smtClean="0">
+                                          <a:latin typeface="Cambria Math" panose="02040503050406030204" pitchFamily="18" charset="0"/>
+                                        </a:rPr>
+                                        <m:t>𝑛</m:t>
+                                      </m:r>
+                                      <m:r>
+                                        <a:rPr lang="pt-BR" i="1" smtClean="0">
+                                          <a:latin typeface="Cambria Math" panose="02040503050406030204" pitchFamily="18" charset="0"/>
+                                        </a:rPr>
+                                        <m:t>𝜋</m:t>
+                                      </m:r>
+                                      <m:r>
+                                        <a:rPr lang="pt-BR" i="1" smtClean="0">
+                                          <a:latin typeface="Cambria Math" panose="02040503050406030204" pitchFamily="18" charset="0"/>
+                                        </a:rPr>
+                                        <m:t>𝑥</m:t>
+                                      </m:r>
+                                    </m:num>
+                                    <m:den>
+                                      <m:r>
+                                        <a:rPr lang="pt-BR" i="1" smtClean="0">
+                                          <a:latin typeface="Cambria Math" panose="02040503050406030204" pitchFamily="18" charset="0"/>
+                                        </a:rPr>
+                                        <m:t>𝐿</m:t>
+                                      </m:r>
+                                    </m:den>
+                                  </m:f>
+                                </m:e>
+                              </m:func>
+                            </m:e>
+                          </m:d>
+                        </m:e>
+                      </m:nary>
+                    </m:oMath>
+                  </m:oMathPara>
+                </a14:m>
+                <a:endParaRPr lang="en-US" dirty="0"/>
+              </a:p>
+            </p:txBody>
+          </p:sp>
+        </mc:Choice>
+        <mc:Fallback>
+          <p:sp>
+            <p:nvSpPr>
+              <p:cNvPr id="4" name="TextBox 3">
+                <a:extLst>
+                  <a:ext uri="{FF2B5EF4-FFF2-40B4-BE49-F238E27FC236}">
+                    <a16:creationId xmlns:a16="http://schemas.microsoft.com/office/drawing/2014/main" id="{E41E58A9-0F2D-462C-B278-3468408D5DAB}"/>
+                  </a:ext>
+                </a:extLst>
+              </p:cNvPr>
+              <p:cNvSpPr txBox="1">
+                <a:spLocks noRot="1" noChangeAspect="1" noMove="1" noResize="1" noEditPoints="1" noAdjustHandles="1" noChangeArrowheads="1" noChangeShapeType="1" noTextEdit="1"/>
+              </p:cNvSpPr>
+              <p:nvPr/>
+            </p:nvSpPr>
+            <p:spPr>
+              <a:xfrm>
+                <a:off x="6760019" y="680783"/>
+                <a:ext cx="4212781" cy="747967"/>
+              </a:xfrm>
+              <a:prstGeom prst="rect">
+                <a:avLst/>
+              </a:prstGeom>
+              <a:blipFill>
+                <a:blip r:embed="rId2"/>
+                <a:stretch>
+                  <a:fillRect b="-820"/>
+                </a:stretch>
+              </a:blipFill>
+            </p:spPr>
+            <p:txBody>
+              <a:bodyPr/>
+              <a:lstStyle/>
+              <a:p>
+                <a:r>
+                  <a:rPr lang="en-US">
+                    <a:noFill/>
+                  </a:rPr>
+                  <a:t> </a:t>
+                </a:r>
+              </a:p>
+            </p:txBody>
+          </p:sp>
+        </mc:Fallback>
+      </mc:AlternateContent>
     </p:spTree>
     <p:extLst>
       <p:ext uri="{BB962C8B-B14F-4D97-AF65-F5344CB8AC3E}">
@@ -5733,6 +6243,117 @@
           </a:p>
         </p:txBody>
       </p:sp>
+      <p:pic>
+        <p:nvPicPr>
+          <p:cNvPr id="7" name="Picture 6">
+            <a:extLst>
+              <a:ext uri="{FF2B5EF4-FFF2-40B4-BE49-F238E27FC236}">
+                <a16:creationId xmlns:a16="http://schemas.microsoft.com/office/drawing/2014/main" id="{04BEBDF5-7983-4760-AE00-D6D5C02B1B66}"/>
+              </a:ext>
+            </a:extLst>
+          </p:cNvPr>
+          <p:cNvPicPr>
+            <a:picLocks noChangeAspect="1"/>
+          </p:cNvPicPr>
+          <p:nvPr/>
+        </p:nvPicPr>
+        <p:blipFill>
+          <a:blip r:embed="rId2">
+            <a:extLst>
+              <a:ext uri="{28A0092B-C50C-407E-A947-70E740481C1C}">
+                <a14:useLocalDpi xmlns:a14="http://schemas.microsoft.com/office/drawing/2010/main" val="0"/>
+              </a:ext>
+            </a:extLst>
+          </a:blip>
+          <a:stretch>
+            <a:fillRect/>
+          </a:stretch>
+        </p:blipFill>
+        <p:spPr>
+          <a:xfrm>
+            <a:off x="8986903" y="742951"/>
+            <a:ext cx="2669975" cy="1898649"/>
+          </a:xfrm>
+          <a:prstGeom prst="rect">
+            <a:avLst/>
+          </a:prstGeom>
+        </p:spPr>
+      </p:pic>
+      <p:pic>
+        <p:nvPicPr>
+          <p:cNvPr id="10" name="Picture 9">
+            <a:extLst>
+              <a:ext uri="{FF2B5EF4-FFF2-40B4-BE49-F238E27FC236}">
+                <a16:creationId xmlns:a16="http://schemas.microsoft.com/office/drawing/2014/main" id="{99C09B03-4BF0-4463-B8D8-86A236B24AF5}"/>
+              </a:ext>
+            </a:extLst>
+          </p:cNvPr>
+          <p:cNvPicPr>
+            <a:picLocks noChangeAspect="1"/>
+          </p:cNvPicPr>
+          <p:nvPr/>
+        </p:nvPicPr>
+        <p:blipFill>
+          <a:blip r:embed="rId3">
+            <a:extLst>
+              <a:ext uri="{28A0092B-C50C-407E-A947-70E740481C1C}">
+                <a14:useLocalDpi xmlns:a14="http://schemas.microsoft.com/office/drawing/2010/main" val="0"/>
+              </a:ext>
+            </a:extLst>
+          </a:blip>
+          <a:stretch>
+            <a:fillRect/>
+          </a:stretch>
+        </p:blipFill>
+        <p:spPr>
+          <a:xfrm>
+            <a:off x="5028460" y="558800"/>
+            <a:ext cx="3569494" cy="2082800"/>
+          </a:xfrm>
+          <a:prstGeom prst="rect">
+            <a:avLst/>
+          </a:prstGeom>
+        </p:spPr>
+      </p:pic>
+      <p:sp>
+        <p:nvSpPr>
+          <p:cNvPr id="11" name="TextBox 10">
+            <a:extLst>
+              <a:ext uri="{FF2B5EF4-FFF2-40B4-BE49-F238E27FC236}">
+                <a16:creationId xmlns:a16="http://schemas.microsoft.com/office/drawing/2014/main" id="{D1F00870-42CB-4BCD-9B17-648136D1D26B}"/>
+              </a:ext>
+            </a:extLst>
+          </p:cNvPr>
+          <p:cNvSpPr txBox="1"/>
+          <p:nvPr/>
+        </p:nvSpPr>
+        <p:spPr>
+          <a:xfrm>
+            <a:off x="5376334" y="1916668"/>
+            <a:ext cx="900246" cy="369332"/>
+          </a:xfrm>
+          <a:prstGeom prst="rect">
+            <a:avLst/>
+          </a:prstGeom>
+          <a:noFill/>
+        </p:spPr>
+        <p:txBody>
+          <a:bodyPr wrap="none" rtlCol="0">
+            <a:spAutoFit/>
+          </a:bodyPr>
+          <a:lstStyle/>
+          <a:p>
+            <a:r>
+              <a:rPr lang="en-US" dirty="0">
+                <a:solidFill>
+                  <a:srgbClr val="FFFF00"/>
+                </a:solidFill>
+              </a:rPr>
+              <a:t>macros</a:t>
+            </a:r>
+          </a:p>
+        </p:txBody>
+      </p:sp>
     </p:spTree>
     <p:extLst>
       <p:ext uri="{BB962C8B-B14F-4D97-AF65-F5344CB8AC3E}">
@@ -5901,6 +6522,45 @@
           </a:p>
         </p:txBody>
       </p:sp>
+      <p:pic>
+        <p:nvPicPr>
+          <p:cNvPr id="5" name="Graphic 4" descr="Worried Face with Solid Fill">
+            <a:extLst>
+              <a:ext uri="{FF2B5EF4-FFF2-40B4-BE49-F238E27FC236}">
+                <a16:creationId xmlns:a16="http://schemas.microsoft.com/office/drawing/2014/main" id="{1E7226B3-4FBE-4F64-8034-4A70542AADD8}"/>
+              </a:ext>
+            </a:extLst>
+          </p:cNvPr>
+          <p:cNvPicPr>
+            <a:picLocks noChangeAspect="1"/>
+          </p:cNvPicPr>
+          <p:nvPr/>
+        </p:nvPicPr>
+        <p:blipFill>
+          <a:blip r:embed="rId3">
+            <a:extLst>
+              <a:ext uri="{28A0092B-C50C-407E-A947-70E740481C1C}">
+                <a14:useLocalDpi xmlns:a14="http://schemas.microsoft.com/office/drawing/2010/main" val="0"/>
+              </a:ext>
+              <a:ext uri="{96DAC541-7B7A-43D3-8B79-37D633B846F1}">
+                <asvg:svgBlip xmlns:asvg="http://schemas.microsoft.com/office/drawing/2016/SVG/main" r:embed="rId4"/>
+              </a:ext>
+            </a:extLst>
+          </a:blip>
+          <a:stretch>
+            <a:fillRect/>
+          </a:stretch>
+        </p:blipFill>
+        <p:spPr>
+          <a:xfrm>
+            <a:off x="10515600" y="719667"/>
+            <a:ext cx="914400" cy="914400"/>
+          </a:xfrm>
+          <a:prstGeom prst="rect">
+            <a:avLst/>
+          </a:prstGeom>
+        </p:spPr>
+      </p:pic>
     </p:spTree>
     <p:extLst>
       <p:ext uri="{BB962C8B-B14F-4D97-AF65-F5344CB8AC3E}">
@@ -5936,7 +6596,7 @@
           <p:cNvPr id="2" name="Title 1">
             <a:extLst>
               <a:ext uri="{FF2B5EF4-FFF2-40B4-BE49-F238E27FC236}">
-                <a16:creationId xmlns:a16="http://schemas.microsoft.com/office/drawing/2014/main" id="{E0611D94-657B-4FCB-9CAA-145EF0771201}"/>
+                <a16:creationId xmlns:a16="http://schemas.microsoft.com/office/drawing/2014/main" id="{02AAA9FF-7E3C-4A2E-A922-EEC91FF680A0}"/>
               </a:ext>
             </a:extLst>
           </p:cNvPr>
@@ -5954,7 +6614,7 @@
           <a:p>
             <a:r>
               <a:rPr lang="en-US" dirty="0"/>
-              <a:t>Old way versus new way</a:t>
+              <a:t>Generators</a:t>
             </a:r>
           </a:p>
         </p:txBody>
@@ -5964,7 +6624,7 @@
           <p:cNvPr id="3" name="Content Placeholder 2">
             <a:extLst>
               <a:ext uri="{FF2B5EF4-FFF2-40B4-BE49-F238E27FC236}">
-                <a16:creationId xmlns:a16="http://schemas.microsoft.com/office/drawing/2014/main" id="{3344F37A-ABD3-4B30-AF92-4970A78B54A9}"/>
+                <a16:creationId xmlns:a16="http://schemas.microsoft.com/office/drawing/2014/main" id="{A5689D1A-2BB9-4A2B-8499-1455E5F445FE}"/>
               </a:ext>
             </a:extLst>
           </p:cNvPr>
@@ -5982,49 +6642,91 @@
           <a:p>
             <a:r>
               <a:rPr lang="en-US" dirty="0"/>
-              <a:t>In the old times, when dinosaurs roamed the earth, and C++14 was still a dream, targets were very limited. At least this is what the lore books say, we never used it during the dark ages.</a:t>
+              <a:t>The most important generator to you (probably)</a:t>
             </a:r>
           </a:p>
           <a:p>
             <a:pPr lvl="1"/>
             <a:r>
               <a:rPr lang="en-US" dirty="0"/>
-              <a:t>Everything was global</a:t>
+              <a:t>-G “Visual Studio 15 2017 Win64”</a:t>
+            </a:r>
+          </a:p>
+          <a:p>
+            <a:r>
+              <a:rPr lang="en-US" dirty="0"/>
+              <a:t>Generators are what write the input files for a native build system.</a:t>
+            </a:r>
+          </a:p>
+          <a:p>
+            <a:r>
+              <a:rPr lang="en-US" dirty="0"/>
+              <a:t>Some are platform specific (like the Visual Studio generators)</a:t>
             </a:r>
           </a:p>
           <a:p>
             <a:pPr lvl="1"/>
             <a:r>
               <a:rPr lang="en-US" dirty="0"/>
-              <a:t>Target properties didn’t exist</a:t>
+              <a:t>That means yes, you cannot generate a Visual Studio project on Linux</a:t>
             </a:r>
           </a:p>
           <a:p>
             <a:pPr lvl="1"/>
             <a:r>
               <a:rPr lang="en-US" dirty="0"/>
-              <a:t>Your dependencies would set variables that you were using, and break your CMake project.</a:t>
-            </a:r>
-          </a:p>
-          <a:p>
-            <a:r>
-              <a:rPr lang="en-US" dirty="0"/>
-              <a:t>Now, you can set almost everything on your targets, and everything is safe, right?</a:t>
+              <a:t>This is also true for the Cygwin version of CMake</a:t>
             </a:r>
           </a:p>
           <a:p>
             <a:pPr lvl="1"/>
             <a:r>
               <a:rPr lang="en-US" dirty="0"/>
-              <a:t>No because the demons from the past still exist, and sometimes you still need them. </a:t>
-            </a:r>
-          </a:p>
-        </p:txBody>
-      </p:sp>
+              <a:t>No VS for you, sorry fam</a:t>
+            </a:r>
+          </a:p>
+        </p:txBody>
+      </p:sp>
+      <p:pic>
+        <p:nvPicPr>
+          <p:cNvPr id="5" name="Picture 4">
+            <a:extLst>
+              <a:ext uri="{FF2B5EF4-FFF2-40B4-BE49-F238E27FC236}">
+                <a16:creationId xmlns:a16="http://schemas.microsoft.com/office/drawing/2014/main" id="{F5FD321C-25BB-47B4-9B48-47005A613073}"/>
+              </a:ext>
+            </a:extLst>
+          </p:cNvPr>
+          <p:cNvPicPr>
+            <a:picLocks noChangeAspect="1"/>
+          </p:cNvPicPr>
+          <p:nvPr/>
+        </p:nvPicPr>
+        <p:blipFill>
+          <a:blip r:embed="rId2">
+            <a:extLst>
+              <a:ext uri="{28A0092B-C50C-407E-A947-70E740481C1C}">
+                <a14:useLocalDpi xmlns:a14="http://schemas.microsoft.com/office/drawing/2010/main" val="0"/>
+              </a:ext>
+            </a:extLst>
+          </a:blip>
+          <a:stretch>
+            <a:fillRect/>
+          </a:stretch>
+        </p:blipFill>
+        <p:spPr>
+          <a:xfrm>
+            <a:off x="9435570" y="554037"/>
+            <a:ext cx="2143125" cy="2143125"/>
+          </a:xfrm>
+          <a:prstGeom prst="rect">
+            <a:avLst/>
+          </a:prstGeom>
+        </p:spPr>
+      </p:pic>
     </p:spTree>
     <p:extLst>
       <p:ext uri="{BB962C8B-B14F-4D97-AF65-F5344CB8AC3E}">
-        <p14:creationId xmlns:p14="http://schemas.microsoft.com/office/powerpoint/2010/main" val="3916434147"/>
+        <p14:creationId xmlns:p14="http://schemas.microsoft.com/office/powerpoint/2010/main" val="463195224"/>
       </p:ext>
     </p:extLst>
   </p:cSld>
@@ -6067,7 +6769,12 @@
             <p:ph type="title"/>
           </p:nvPr>
         </p:nvSpPr>
-        <p:spPr/>
+        <p:spPr>
+          <a:xfrm>
+            <a:off x="1371600" y="685800"/>
+            <a:ext cx="4331658" cy="693211"/>
+          </a:xfrm>
+        </p:spPr>
         <p:txBody>
           <a:bodyPr/>
           <a:lstStyle/>
@@ -6191,6 +6898,100 @@
           </a:p>
         </p:txBody>
       </p:sp>
+      <p:pic>
+        <p:nvPicPr>
+          <p:cNvPr id="1026" name="Picture 2" descr="https://pbs.twimg.com/profile_images/715076514749030400/Z7xk2GU4_400x400.jpg">
+            <a:extLst>
+              <a:ext uri="{FF2B5EF4-FFF2-40B4-BE49-F238E27FC236}">
+                <a16:creationId xmlns:a16="http://schemas.microsoft.com/office/drawing/2014/main" id="{1F7E13BF-B534-4A9B-832B-850A3F0FCC53}"/>
+              </a:ext>
+            </a:extLst>
+          </p:cNvPr>
+          <p:cNvPicPr>
+            <a:picLocks noChangeAspect="1" noChangeArrowheads="1"/>
+          </p:cNvPicPr>
+          <p:nvPr/>
+        </p:nvPicPr>
+        <p:blipFill>
+          <a:blip r:embed="rId2">
+            <a:extLst>
+              <a:ext uri="{28A0092B-C50C-407E-A947-70E740481C1C}">
+                <a14:useLocalDpi xmlns:a14="http://schemas.microsoft.com/office/drawing/2010/main" val="0"/>
+              </a:ext>
+            </a:extLst>
+          </a:blip>
+          <a:srcRect/>
+          <a:stretch>
+            <a:fillRect/>
+          </a:stretch>
+        </p:blipFill>
+        <p:spPr bwMode="auto">
+          <a:xfrm>
+            <a:off x="10401300" y="4076700"/>
+            <a:ext cx="1143000" cy="1143000"/>
+          </a:xfrm>
+          <a:prstGeom prst="rect">
+            <a:avLst/>
+          </a:prstGeom>
+          <a:noFill/>
+          <a:extLst>
+            <a:ext uri="{909E8E84-426E-40DD-AFC4-6F175D3DCCD1}">
+              <a14:hiddenFill xmlns:a14="http://schemas.microsoft.com/office/drawing/2010/main">
+                <a:solidFill>
+                  <a:srgbClr val="FFFFFF"/>
+                </a:solidFill>
+              </a14:hiddenFill>
+            </a:ext>
+          </a:extLst>
+        </p:spPr>
+      </p:pic>
+      <p:pic>
+        <p:nvPicPr>
+          <p:cNvPr id="1028" name="Picture 4" descr="https://pbs.twimg.com/profile_images/976588952399372288/7aafNen5_400x400.jpg">
+            <a:extLst>
+              <a:ext uri="{FF2B5EF4-FFF2-40B4-BE49-F238E27FC236}">
+                <a16:creationId xmlns:a16="http://schemas.microsoft.com/office/drawing/2014/main" id="{1B33CF67-B2FD-490E-A191-F08E8F98EA3D}"/>
+              </a:ext>
+            </a:extLst>
+          </p:cNvPr>
+          <p:cNvPicPr>
+            <a:picLocks noChangeAspect="1" noChangeArrowheads="1"/>
+          </p:cNvPicPr>
+          <p:nvPr/>
+        </p:nvPicPr>
+        <p:blipFill>
+          <a:blip r:embed="rId3">
+            <a:extLst>
+              <a:ext uri="{28A0092B-C50C-407E-A947-70E740481C1C}">
+                <a14:useLocalDpi xmlns:a14="http://schemas.microsoft.com/office/drawing/2010/main" val="0"/>
+              </a:ext>
+            </a:extLst>
+          </a:blip>
+          <a:srcRect/>
+          <a:stretch>
+            <a:fillRect/>
+          </a:stretch>
+        </p:blipFill>
+        <p:spPr bwMode="auto">
+          <a:xfrm>
+            <a:off x="10401300" y="1714500"/>
+            <a:ext cx="1143000" cy="1143000"/>
+          </a:xfrm>
+          <a:prstGeom prst="rect">
+            <a:avLst/>
+          </a:prstGeom>
+          <a:noFill/>
+          <a:extLst>
+            <a:ext uri="{909E8E84-426E-40DD-AFC4-6F175D3DCCD1}">
+              <a14:hiddenFill xmlns:a14="http://schemas.microsoft.com/office/drawing/2010/main">
+                <a:solidFill>
+                  <a:srgbClr val="FFFFFF"/>
+                </a:solidFill>
+              </a14:hiddenFill>
+            </a:ext>
+          </a:extLst>
+        </p:spPr>
+      </p:pic>
     </p:spTree>
     <p:extLst>
       <p:ext uri="{BB962C8B-B14F-4D97-AF65-F5344CB8AC3E}">
@@ -6226,7 +7027,7 @@
           <p:cNvPr id="2" name="Title 1">
             <a:extLst>
               <a:ext uri="{FF2B5EF4-FFF2-40B4-BE49-F238E27FC236}">
-                <a16:creationId xmlns:a16="http://schemas.microsoft.com/office/drawing/2014/main" id="{5A51E9F4-2D05-45CB-87FC-C2B791FD1FCC}"/>
+                <a16:creationId xmlns:a16="http://schemas.microsoft.com/office/drawing/2014/main" id="{E0611D94-657B-4FCB-9CAA-145EF0771201}"/>
               </a:ext>
             </a:extLst>
           </p:cNvPr>
@@ -6234,22 +7035,79 @@
             <a:spLocks noGrp="1"/>
           </p:cNvSpPr>
           <p:nvPr>
-            <p:ph type="ctrTitle"/>
-          </p:nvPr>
-        </p:nvSpPr>
-        <p:spPr>
-          <a:xfrm>
-            <a:off x="1066800" y="2825750"/>
-            <a:ext cx="10058400" cy="1206500"/>
-          </a:xfrm>
-        </p:spPr>
+            <p:ph type="title"/>
+          </p:nvPr>
+        </p:nvSpPr>
+        <p:spPr/>
         <p:txBody>
           <a:bodyPr/>
           <a:lstStyle/>
           <a:p>
             <a:r>
               <a:rPr lang="en-US" dirty="0"/>
-              <a:t>Live Demo</a:t>
+              <a:t>Old way versus new way</a:t>
+            </a:r>
+          </a:p>
+        </p:txBody>
+      </p:sp>
+      <p:sp>
+        <p:nvSpPr>
+          <p:cNvPr id="3" name="Content Placeholder 2">
+            <a:extLst>
+              <a:ext uri="{FF2B5EF4-FFF2-40B4-BE49-F238E27FC236}">
+                <a16:creationId xmlns:a16="http://schemas.microsoft.com/office/drawing/2014/main" id="{3344F37A-ABD3-4B30-AF92-4970A78B54A9}"/>
+              </a:ext>
+            </a:extLst>
+          </p:cNvPr>
+          <p:cNvSpPr>
+            <a:spLocks noGrp="1"/>
+          </p:cNvSpPr>
+          <p:nvPr>
+            <p:ph idx="1"/>
+          </p:nvPr>
+        </p:nvSpPr>
+        <p:spPr/>
+        <p:txBody>
+          <a:bodyPr/>
+          <a:lstStyle/>
+          <a:p>
+            <a:r>
+              <a:rPr lang="en-US" dirty="0"/>
+              <a:t>In the old times, when dinosaurs roamed the earth, and C++14 was still a dream, targets were very limited. At least this is what the lore books say, we never used it during the dark ages.</a:t>
+            </a:r>
+          </a:p>
+          <a:p>
+            <a:pPr lvl="1"/>
+            <a:r>
+              <a:rPr lang="en-US" dirty="0"/>
+              <a:t>Everything was global</a:t>
+            </a:r>
+          </a:p>
+          <a:p>
+            <a:pPr lvl="1"/>
+            <a:r>
+              <a:rPr lang="en-US" dirty="0"/>
+              <a:t>Target properties didn’t exist</a:t>
+            </a:r>
+          </a:p>
+          <a:p>
+            <a:pPr lvl="1"/>
+            <a:r>
+              <a:rPr lang="en-US" dirty="0"/>
+              <a:t>Your dependencies would set variables that you were using, and break your CMake project.</a:t>
+            </a:r>
+          </a:p>
+          <a:p>
+            <a:r>
+              <a:rPr lang="en-US" dirty="0"/>
+              <a:t>Now, you can set almost everything on your targets, and everything is safe, right?</a:t>
+            </a:r>
+          </a:p>
+          <a:p>
+            <a:pPr lvl="1"/>
+            <a:r>
+              <a:rPr lang="en-US" dirty="0"/>
+              <a:t>No because the demons from the past still exist, and sometimes you still need them. </a:t>
             </a:r>
           </a:p>
         </p:txBody>
@@ -6257,7 +7115,7 @@
     </p:spTree>
     <p:extLst>
       <p:ext uri="{BB962C8B-B14F-4D97-AF65-F5344CB8AC3E}">
-        <p14:creationId xmlns:p14="http://schemas.microsoft.com/office/powerpoint/2010/main" val="2381102007"/>
+        <p14:creationId xmlns:p14="http://schemas.microsoft.com/office/powerpoint/2010/main" val="3916434147"/>
       </p:ext>
     </p:extLst>
   </p:cSld>
@@ -6289,7 +7147,7 @@
           <p:cNvPr id="2" name="Title 1">
             <a:extLst>
               <a:ext uri="{FF2B5EF4-FFF2-40B4-BE49-F238E27FC236}">
-                <a16:creationId xmlns:a16="http://schemas.microsoft.com/office/drawing/2014/main" id="{5439A42F-D69F-41B9-8D3A-125EEAB813ED}"/>
+                <a16:creationId xmlns:a16="http://schemas.microsoft.com/office/drawing/2014/main" id="{5A51E9F4-2D05-45CB-87FC-C2B791FD1FCC}"/>
               </a:ext>
             </a:extLst>
           </p:cNvPr>
@@ -6297,153 +7155,30 @@
             <a:spLocks noGrp="1"/>
           </p:cNvSpPr>
           <p:nvPr>
-            <p:ph type="title"/>
-          </p:nvPr>
-        </p:nvSpPr>
-        <p:spPr/>
+            <p:ph type="ctrTitle"/>
+          </p:nvPr>
+        </p:nvSpPr>
+        <p:spPr>
+          <a:xfrm>
+            <a:off x="1066800" y="2825750"/>
+            <a:ext cx="10058400" cy="1206500"/>
+          </a:xfrm>
+        </p:spPr>
         <p:txBody>
           <a:bodyPr/>
           <a:lstStyle/>
           <a:p>
             <a:r>
               <a:rPr lang="en-US" dirty="0"/>
-              <a:t>Fisher’s CMake Experience</a:t>
-            </a:r>
-          </a:p>
-        </p:txBody>
-      </p:sp>
-      <p:sp>
-        <p:nvSpPr>
-          <p:cNvPr id="3" name="Content Placeholder 2">
-            <a:extLst>
-              <a:ext uri="{FF2B5EF4-FFF2-40B4-BE49-F238E27FC236}">
-                <a16:creationId xmlns:a16="http://schemas.microsoft.com/office/drawing/2014/main" id="{AED144B3-C042-4459-8D4E-0DA70C5E68DB}"/>
-              </a:ext>
-            </a:extLst>
-          </p:cNvPr>
-          <p:cNvSpPr>
-            <a:spLocks noGrp="1"/>
-          </p:cNvSpPr>
-          <p:nvPr>
-            <p:ph idx="1"/>
-          </p:nvPr>
-        </p:nvSpPr>
-        <p:spPr>
-          <a:xfrm>
-            <a:off x="1371600" y="2286000"/>
-            <a:ext cx="9601200" cy="4226668"/>
-          </a:xfrm>
-        </p:spPr>
-        <p:txBody>
-          <a:bodyPr>
-            <a:normAutofit/>
-          </a:bodyPr>
-          <a:lstStyle/>
-          <a:p>
-            <a:r>
-              <a:rPr lang="en-US" dirty="0"/>
-              <a:t>Ripple (2014 – 2015)</a:t>
-            </a:r>
-          </a:p>
-          <a:p>
-            <a:pPr lvl="1"/>
-            <a:r>
-              <a:rPr lang="en-US" dirty="0"/>
-              <a:t>Used GLOB Syntax (bad)</a:t>
-            </a:r>
-          </a:p>
-          <a:p>
-            <a:pPr lvl="1"/>
-            <a:r>
-              <a:rPr lang="en-US" dirty="0"/>
-              <a:t>Completely manual dependency management</a:t>
-            </a:r>
-          </a:p>
-          <a:p>
-            <a:pPr lvl="1"/>
-            <a:r>
-              <a:rPr lang="en-US" dirty="0"/>
-              <a:t>All global property management</a:t>
-            </a:r>
-          </a:p>
-          <a:p>
-            <a:r>
-              <a:rPr lang="en-US" dirty="0" err="1"/>
-              <a:t>Synethesia</a:t>
-            </a:r>
-            <a:r>
-              <a:rPr lang="en-US" dirty="0"/>
-              <a:t> (2015 – 2016)</a:t>
-            </a:r>
-          </a:p>
-          <a:p>
-            <a:pPr lvl="1"/>
-            <a:r>
-              <a:rPr lang="en-US" dirty="0"/>
-              <a:t>Moved large dependencies to git </a:t>
-            </a:r>
-            <a:r>
-              <a:rPr lang="en-US" dirty="0" err="1"/>
-              <a:t>lfs</a:t>
-            </a:r>
-            <a:r>
-              <a:rPr lang="en-US" dirty="0"/>
-              <a:t> (git </a:t>
-            </a:r>
-            <a:r>
-              <a:rPr lang="en-US" dirty="0" err="1"/>
-              <a:t>lfs</a:t>
-            </a:r>
-            <a:r>
-              <a:rPr lang="en-US" dirty="0"/>
-              <a:t> is the enemy, do not trust)</a:t>
-            </a:r>
-          </a:p>
-          <a:p>
-            <a:r>
-              <a:rPr lang="en-US" dirty="0"/>
-              <a:t>Lamb Planet (2017 – 2018)</a:t>
-            </a:r>
-          </a:p>
-          <a:p>
-            <a:pPr lvl="1"/>
-            <a:r>
-              <a:rPr lang="en-US" dirty="0"/>
-              <a:t>Converted to using target based commands for most work.</a:t>
-            </a:r>
-          </a:p>
-          <a:p>
-            <a:pPr lvl="1"/>
-            <a:r>
-              <a:rPr lang="en-US" dirty="0"/>
-              <a:t>Started using </a:t>
-            </a:r>
-            <a:r>
-              <a:rPr lang="en-US" dirty="0" err="1"/>
-              <a:t>subrepos</a:t>
-            </a:r>
-            <a:r>
-              <a:rPr lang="en-US" dirty="0"/>
-              <a:t> for most major dependencies.</a:t>
-            </a:r>
-          </a:p>
-          <a:p>
-            <a:pPr lvl="1"/>
-            <a:r>
-              <a:rPr lang="en-US" dirty="0"/>
-              <a:t>Started using recursive functions to hit all targets with flags. (Test your CMake limits, don’t be afraid.)</a:t>
-            </a:r>
-          </a:p>
-          <a:p>
-            <a:pPr lvl="1"/>
-            <a:endParaRPr lang="en-US" dirty="0"/>
+              <a:t>Live Demo</a:t>
+            </a:r>
           </a:p>
         </p:txBody>
       </p:sp>
     </p:spTree>
     <p:extLst>
       <p:ext uri="{BB962C8B-B14F-4D97-AF65-F5344CB8AC3E}">
-        <p14:creationId xmlns:p14="http://schemas.microsoft.com/office/powerpoint/2010/main" val="760306334"/>
+        <p14:creationId xmlns:p14="http://schemas.microsoft.com/office/powerpoint/2010/main" val="2381102007"/>
       </p:ext>
     </p:extLst>
   </p:cSld>
@@ -6475,7 +7210,7 @@
           <p:cNvPr id="2" name="Title 1">
             <a:extLst>
               <a:ext uri="{FF2B5EF4-FFF2-40B4-BE49-F238E27FC236}">
-                <a16:creationId xmlns:a16="http://schemas.microsoft.com/office/drawing/2014/main" id="{9CD1B0E8-4A5D-40BC-A74E-FDDDEEB120A8}"/>
+                <a16:creationId xmlns:a16="http://schemas.microsoft.com/office/drawing/2014/main" id="{5439A42F-D69F-41B9-8D3A-125EEAB813ED}"/>
               </a:ext>
             </a:extLst>
           </p:cNvPr>
@@ -6493,7 +7228,7 @@
           <a:p>
             <a:r>
               <a:rPr lang="en-US" dirty="0"/>
-              <a:t>Testimonies (From Fisher’s Team)</a:t>
+              <a:t>Fisher’s CMake Experience</a:t>
             </a:r>
           </a:p>
         </p:txBody>
@@ -6503,7 +7238,7 @@
           <p:cNvPr id="3" name="Content Placeholder 2">
             <a:extLst>
               <a:ext uri="{FF2B5EF4-FFF2-40B4-BE49-F238E27FC236}">
-                <a16:creationId xmlns:a16="http://schemas.microsoft.com/office/drawing/2014/main" id="{BCA3064C-1DF7-4111-BBB3-C115C9DA4727}"/>
+                <a16:creationId xmlns:a16="http://schemas.microsoft.com/office/drawing/2014/main" id="{AED144B3-C042-4459-8D4E-0DA70C5E68DB}"/>
               </a:ext>
             </a:extLst>
           </p:cNvPr>
@@ -6514,57 +7249,114 @@
             <p:ph idx="1"/>
           </p:nvPr>
         </p:nvSpPr>
-        <p:spPr/>
-        <p:txBody>
-          <a:bodyPr/>
+        <p:spPr>
+          <a:xfrm>
+            <a:off x="1371600" y="2286000"/>
+            <a:ext cx="9601200" cy="4226668"/>
+          </a:xfrm>
+        </p:spPr>
+        <p:txBody>
+          <a:bodyPr>
+            <a:normAutofit/>
+          </a:bodyPr>
           <a:lstStyle/>
           <a:p>
             <a:r>
               <a:rPr lang="en-US" dirty="0"/>
-              <a:t>“If you ever want a project on multiple computers, you need something, I mean, fuck.” – Nicholas Ammann (Editor Programmer)</a:t>
-            </a:r>
-          </a:p>
-          <a:p>
-            <a:r>
-              <a:rPr lang="en-US" dirty="0"/>
-              <a:t>“It’s better than all the other options.” – Evan Collier (Core Programmer)</a:t>
-            </a:r>
-          </a:p>
-          <a:p>
-            <a:r>
-              <a:rPr lang="en-US" dirty="0"/>
-              <a:t>“I haven't used it a ton </a:t>
-            </a:r>
+              <a:t>Ripple (2014 – 2015)</a:t>
+            </a:r>
+          </a:p>
+          <a:p>
+            <a:pPr lvl="1"/>
+            <a:r>
+              <a:rPr lang="en-US" dirty="0"/>
+              <a:t>Used GLOB Syntax (bad)</a:t>
+            </a:r>
+          </a:p>
+          <a:p>
+            <a:pPr lvl="1"/>
+            <a:r>
+              <a:rPr lang="en-US" dirty="0"/>
+              <a:t>Completely manual dependency management</a:t>
+            </a:r>
+          </a:p>
+          <a:p>
+            <a:pPr lvl="1"/>
+            <a:r>
+              <a:rPr lang="en-US" dirty="0"/>
+              <a:t>All global property management</a:t>
+            </a:r>
+          </a:p>
+          <a:p>
             <a:r>
               <a:rPr lang="en-US" dirty="0" err="1"/>
-              <a:t>tho</a:t>
-            </a:r>
-            <a:r>
-              <a:rPr lang="en-US" dirty="0"/>
-              <a:t> like I've used it a bit but have usually had weirdo problems” – </a:t>
+              <a:t>Synethesia</a:t>
+            </a:r>
+            <a:r>
+              <a:rPr lang="en-US" dirty="0"/>
+              <a:t> (2015 – 2016)</a:t>
+            </a:r>
+          </a:p>
+          <a:p>
+            <a:pPr lvl="1"/>
+            <a:r>
+              <a:rPr lang="en-US" dirty="0"/>
+              <a:t>Moved large dependencies to git </a:t>
             </a:r>
             <a:r>
               <a:rPr lang="en-US" dirty="0" err="1"/>
-              <a:t>Gabryelle</a:t>
-            </a:r>
-            <a:r>
-              <a:rPr lang="en-US" dirty="0"/>
-              <a:t> Chamberlin (Graphics Programmer)</a:t>
-            </a:r>
-          </a:p>
-          <a:p>
-            <a:r>
-              <a:rPr lang="en-US" dirty="0"/>
-              <a:t>“I never think about CMake unless the file I added yesterday isn’t showing up in the Project window today.” – Isaac Dayton (Gameplay Programmer)</a:t>
-            </a:r>
-          </a:p>
-          <a:p>
-            <a:r>
-              <a:rPr lang="en-US" dirty="0"/>
-              <a:t>“God I hope I never have to work on that” – Joshua Shlemmer (a year before he did)</a:t>
-            </a:r>
-          </a:p>
-          <a:p>
+              <a:t>lfs</a:t>
+            </a:r>
+            <a:r>
+              <a:rPr lang="en-US" dirty="0"/>
+              <a:t> (git </a:t>
+            </a:r>
+            <a:r>
+              <a:rPr lang="en-US" dirty="0" err="1"/>
+              <a:t>lfs</a:t>
+            </a:r>
+            <a:r>
+              <a:rPr lang="en-US" dirty="0"/>
+              <a:t> is the enemy, do not trust)</a:t>
+            </a:r>
+          </a:p>
+          <a:p>
+            <a:r>
+              <a:rPr lang="en-US" dirty="0"/>
+              <a:t>Lamb Planet (2017 – 2018)</a:t>
+            </a:r>
+          </a:p>
+          <a:p>
+            <a:pPr lvl="1"/>
+            <a:r>
+              <a:rPr lang="en-US" dirty="0"/>
+              <a:t>Converted to using target based commands for most work.</a:t>
+            </a:r>
+          </a:p>
+          <a:p>
+            <a:pPr lvl="1"/>
+            <a:r>
+              <a:rPr lang="en-US" dirty="0"/>
+              <a:t>Started using </a:t>
+            </a:r>
+            <a:r>
+              <a:rPr lang="en-US" dirty="0" err="1"/>
+              <a:t>subrepos</a:t>
+            </a:r>
+            <a:r>
+              <a:rPr lang="en-US" dirty="0"/>
+              <a:t> for most major dependencies.</a:t>
+            </a:r>
+          </a:p>
+          <a:p>
+            <a:pPr lvl="1"/>
+            <a:r>
+              <a:rPr lang="en-US" dirty="0"/>
+              <a:t>Started using recursive functions to hit all targets with flags. (Test your CMake limits, don’t be afraid.)</a:t>
+            </a:r>
+          </a:p>
+          <a:p>
+            <a:pPr lvl="1"/>
             <a:endParaRPr lang="en-US" dirty="0"/>
           </a:p>
         </p:txBody>
@@ -6572,7 +7364,7 @@
     </p:spTree>
     <p:extLst>
       <p:ext uri="{BB962C8B-B14F-4D97-AF65-F5344CB8AC3E}">
-        <p14:creationId xmlns:p14="http://schemas.microsoft.com/office/powerpoint/2010/main" val="305148900"/>
+        <p14:creationId xmlns:p14="http://schemas.microsoft.com/office/powerpoint/2010/main" val="760306334"/>
       </p:ext>
     </p:extLst>
   </p:cSld>
@@ -6604,7 +7396,7 @@
           <p:cNvPr id="2" name="Title 1">
             <a:extLst>
               <a:ext uri="{FF2B5EF4-FFF2-40B4-BE49-F238E27FC236}">
-                <a16:creationId xmlns:a16="http://schemas.microsoft.com/office/drawing/2014/main" id="{31EA04C8-0333-41F9-9A98-8A1B134D763A}"/>
+                <a16:creationId xmlns:a16="http://schemas.microsoft.com/office/drawing/2014/main" id="{9CD1B0E8-4A5D-40BC-A74E-FDDDEEB120A8}"/>
               </a:ext>
             </a:extLst>
           </p:cNvPr>
@@ -6621,12 +7413,8 @@
           <a:lstStyle/>
           <a:p>
             <a:r>
-              <a:rPr lang="en-US" dirty="0" err="1"/>
-              <a:t>Shlemmer’s</a:t>
-            </a:r>
-            <a:r>
-              <a:rPr lang="en-US" dirty="0"/>
-              <a:t> Experience</a:t>
+              <a:rPr lang="en-US" dirty="0"/>
+              <a:t>Testimonies (From Fisher’s Team)</a:t>
             </a:r>
           </a:p>
         </p:txBody>
@@ -6636,7 +7424,7 @@
           <p:cNvPr id="3" name="Content Placeholder 2">
             <a:extLst>
               <a:ext uri="{FF2B5EF4-FFF2-40B4-BE49-F238E27FC236}">
-                <a16:creationId xmlns:a16="http://schemas.microsoft.com/office/drawing/2014/main" id="{6751B5F3-9FC6-4019-AA56-A83C89018229}"/>
+                <a16:creationId xmlns:a16="http://schemas.microsoft.com/office/drawing/2014/main" id="{BCA3064C-1DF7-4111-BBB3-C115C9DA4727}"/>
               </a:ext>
             </a:extLst>
           </p:cNvPr>
@@ -6654,61 +7442,50 @@
           <a:p>
             <a:r>
               <a:rPr lang="en-US" dirty="0"/>
-              <a:t>Converting Zero Engine to CMake (February 2018 – Now)</a:t>
-            </a:r>
-          </a:p>
-          <a:p>
-            <a:r>
-              <a:rPr lang="en-US" dirty="0"/>
-              <a:t>The Journey</a:t>
-            </a:r>
-          </a:p>
-          <a:p>
-            <a:pPr lvl="1"/>
-            <a:r>
-              <a:rPr lang="en-US" dirty="0"/>
-              <a:t>CMake is bad and I hate it lol</a:t>
-            </a:r>
-          </a:p>
-          <a:p>
-            <a:pPr lvl="1"/>
-            <a:r>
-              <a:rPr lang="en-US" dirty="0"/>
-              <a:t>Oh I guess it’s okay I guess, I got this sweet dependencies thing to work</a:t>
-            </a:r>
-          </a:p>
-          <a:p>
-            <a:pPr lvl="1"/>
-            <a:r>
-              <a:rPr lang="en-US" dirty="0"/>
-              <a:t>Oh I need to do some fancy multi-configuration stuff, I guess I will try generator expressions</a:t>
-            </a:r>
-          </a:p>
-          <a:p>
-            <a:pPr lvl="1"/>
-            <a:r>
-              <a:rPr lang="en-US" dirty="0"/>
-              <a:t>Oh god please no</a:t>
-            </a:r>
-          </a:p>
-          <a:p>
-            <a:pPr lvl="1"/>
-            <a:r>
-              <a:rPr lang="en-US" dirty="0"/>
-              <a:t>WHAT ELDRICH HORROR IS THIS?!?!</a:t>
-            </a:r>
-          </a:p>
-          <a:p>
-            <a:pPr lvl="1"/>
-            <a:r>
-              <a:rPr lang="en-US" dirty="0"/>
-              <a:t>Huh, it works now</a:t>
-            </a:r>
-          </a:p>
-          <a:p>
-            <a:pPr marL="0" indent="0">
-              <a:buNone/>
-            </a:pPr>
+              <a:t>“If you ever want a project on multiple computers, you need something, I mean, fuck.” – Nicholas Ammann (Editor Programmer)</a:t>
+            </a:r>
+          </a:p>
+          <a:p>
+            <a:r>
+              <a:rPr lang="en-US" dirty="0"/>
+              <a:t>“It’s better than all the other options.” – Evan Collier (Core Programmer)</a:t>
+            </a:r>
+          </a:p>
+          <a:p>
+            <a:r>
+              <a:rPr lang="en-US" dirty="0"/>
+              <a:t>“I haven't used it a ton </a:t>
+            </a:r>
+            <a:r>
+              <a:rPr lang="en-US" dirty="0" err="1"/>
+              <a:t>tho</a:t>
+            </a:r>
+            <a:r>
+              <a:rPr lang="en-US" dirty="0"/>
+              <a:t> like I've used it a bit but have usually had weirdo problems” – </a:t>
+            </a:r>
+            <a:r>
+              <a:rPr lang="en-US" dirty="0" err="1"/>
+              <a:t>Gabryelle</a:t>
+            </a:r>
+            <a:r>
+              <a:rPr lang="en-US" dirty="0"/>
+              <a:t> Chamberlin (Graphics Programmer)</a:t>
+            </a:r>
+          </a:p>
+          <a:p>
+            <a:r>
+              <a:rPr lang="en-US" dirty="0"/>
+              <a:t>“I never think about CMake unless the file I added yesterday isn’t showing up in the Project window today.” – Isaac Dayton (Gameplay Programmer)</a:t>
+            </a:r>
+          </a:p>
+          <a:p>
+            <a:r>
+              <a:rPr lang="en-US" dirty="0"/>
+              <a:t>“God I hope I never have to work on that” – Joshua Shlemmer (a year before he did)</a:t>
+            </a:r>
+          </a:p>
+          <a:p>
             <a:endParaRPr lang="en-US" dirty="0"/>
           </a:p>
         </p:txBody>
@@ -6716,7 +7493,7 @@
     </p:spTree>
     <p:extLst>
       <p:ext uri="{BB962C8B-B14F-4D97-AF65-F5344CB8AC3E}">
-        <p14:creationId xmlns:p14="http://schemas.microsoft.com/office/powerpoint/2010/main" val="2795907999"/>
+        <p14:creationId xmlns:p14="http://schemas.microsoft.com/office/powerpoint/2010/main" val="305148900"/>
       </p:ext>
     </p:extLst>
   </p:cSld>
@@ -6748,7 +7525,7 @@
           <p:cNvPr id="2" name="Title 1">
             <a:extLst>
               <a:ext uri="{FF2B5EF4-FFF2-40B4-BE49-F238E27FC236}">
-                <a16:creationId xmlns:a16="http://schemas.microsoft.com/office/drawing/2014/main" id="{91DF5347-844B-4C15-B6AE-F284AFD2F324}"/>
+                <a16:creationId xmlns:a16="http://schemas.microsoft.com/office/drawing/2014/main" id="{31EA04C8-0333-41F9-9A98-8A1B134D763A}"/>
               </a:ext>
             </a:extLst>
           </p:cNvPr>
@@ -6766,7 +7543,7 @@
           <a:p>
             <a:r>
               <a:rPr lang="en-US" dirty="0"/>
-              <a:t>Tips &amp; Tidbits</a:t>
+              <a:t>Shlemmer’s Experience</a:t>
             </a:r>
           </a:p>
         </p:txBody>
@@ -6776,7 +7553,7 @@
           <p:cNvPr id="3" name="Content Placeholder 2">
             <a:extLst>
               <a:ext uri="{FF2B5EF4-FFF2-40B4-BE49-F238E27FC236}">
-                <a16:creationId xmlns:a16="http://schemas.microsoft.com/office/drawing/2014/main" id="{8B61951D-42A5-4407-A6EE-97C22244D142}"/>
+                <a16:creationId xmlns:a16="http://schemas.microsoft.com/office/drawing/2014/main" id="{6751B5F3-9FC6-4019-AA56-A83C89018229}"/>
               </a:ext>
             </a:extLst>
           </p:cNvPr>
@@ -6789,64 +7566,110 @@
         </p:nvSpPr>
         <p:spPr/>
         <p:txBody>
-          <a:bodyPr>
-            <a:normAutofit lnSpcReduction="10000"/>
-          </a:bodyPr>
+          <a:bodyPr/>
           <a:lstStyle/>
           <a:p>
             <a:r>
               <a:rPr lang="en-US" dirty="0"/>
-              <a:t>Use (and require) a new version, it’s just helpful to get better versions of commands </a:t>
-            </a:r>
-            <a:r>
-              <a:rPr lang="en-US" dirty="0" err="1"/>
-              <a:t>source_group</a:t>
-            </a:r>
-            <a:r>
-              <a:rPr lang="en-US" dirty="0"/>
-              <a:t>(TREE), despite your bugs, I’m looking at you</a:t>
-            </a:r>
-          </a:p>
-          <a:p>
-            <a:r>
-              <a:rPr lang="en-US" dirty="0"/>
-              <a:t>Use target based commands, be careful of PUBLIC/PRIVATE with each one, PUBLIC is transitive to targets that depend on the given target.</a:t>
-            </a:r>
-          </a:p>
-          <a:p>
-            <a:r>
-              <a:rPr lang="en-US" dirty="0" err="1"/>
-              <a:t>GLOBing</a:t>
-            </a:r>
-            <a:r>
-              <a:rPr lang="en-US" dirty="0"/>
-              <a:t> sources is “considered harmful”, but we won’t tell anyone if you do it. (We will try to talk you out of it though.)</a:t>
-            </a:r>
-          </a:p>
-          <a:p>
-            <a:r>
-              <a:rPr lang="en-US" dirty="0"/>
-              <a:t>Guard your compiler/linker flags based on the compiler (similarly, if you’re manually managing your dependencies, guard your libraries based on platform)</a:t>
-            </a:r>
-          </a:p>
-          <a:p>
-            <a:r>
-              <a:rPr lang="en-US" dirty="0"/>
-              <a:t>Remember that some repetitiveness is okay, some is awful, evaluate and abstract</a:t>
-            </a:r>
-          </a:p>
-          <a:p>
-            <a:r>
-              <a:rPr lang="en-US" dirty="0"/>
-              <a:t>Find a medium sized project that uses modern CMake to base your work off of</a:t>
-            </a:r>
-          </a:p>
-        </p:txBody>
-      </p:sp>
+              <a:t>Converting Zero Engine to CMake (February 2018 – Now)</a:t>
+            </a:r>
+          </a:p>
+          <a:p>
+            <a:r>
+              <a:rPr lang="en-US" dirty="0"/>
+              <a:t>The Journey</a:t>
+            </a:r>
+          </a:p>
+          <a:p>
+            <a:pPr lvl="1"/>
+            <a:r>
+              <a:rPr lang="en-US" dirty="0"/>
+              <a:t>CMake is evil and I hate it</a:t>
+            </a:r>
+          </a:p>
+          <a:p>
+            <a:pPr lvl="1"/>
+            <a:r>
+              <a:rPr lang="en-US" dirty="0"/>
+              <a:t>Oh I guess it’s okay, I got this sweet dependencies thing to work</a:t>
+            </a:r>
+          </a:p>
+          <a:p>
+            <a:pPr lvl="1"/>
+            <a:r>
+              <a:rPr lang="en-US" dirty="0"/>
+              <a:t>I need to do some fancy multi-configuration stuff, I guess I will try generator expressions</a:t>
+            </a:r>
+          </a:p>
+          <a:p>
+            <a:pPr lvl="1"/>
+            <a:r>
+              <a:rPr lang="en-US" dirty="0"/>
+              <a:t>Oh god please no</a:t>
+            </a:r>
+          </a:p>
+          <a:p>
+            <a:pPr lvl="1"/>
+            <a:r>
+              <a:rPr lang="en-US" dirty="0"/>
+              <a:t>WHAT ELDRICH HORROR IS THIS?!?!</a:t>
+            </a:r>
+          </a:p>
+          <a:p>
+            <a:pPr lvl="1"/>
+            <a:r>
+              <a:rPr lang="en-US" dirty="0"/>
+              <a:t>Huh, it works now, this is nice</a:t>
+            </a:r>
+          </a:p>
+          <a:p>
+            <a:pPr marL="0" indent="0">
+              <a:buNone/>
+            </a:pPr>
+            <a:endParaRPr lang="en-US" dirty="0"/>
+          </a:p>
+        </p:txBody>
+      </p:sp>
+      <p:pic>
+        <p:nvPicPr>
+          <p:cNvPr id="5" name="Picture 4">
+            <a:extLst>
+              <a:ext uri="{FF2B5EF4-FFF2-40B4-BE49-F238E27FC236}">
+                <a16:creationId xmlns:a16="http://schemas.microsoft.com/office/drawing/2014/main" id="{6FC7A0D2-64E4-41D2-88BA-8FDF57F44741}"/>
+              </a:ext>
+            </a:extLst>
+          </p:cNvPr>
+          <p:cNvPicPr>
+            <a:picLocks noChangeAspect="1"/>
+          </p:cNvPicPr>
+          <p:nvPr/>
+        </p:nvPicPr>
+        <p:blipFill>
+          <a:blip r:embed="rId2">
+            <a:extLst>
+              <a:ext uri="{28A0092B-C50C-407E-A947-70E740481C1C}">
+                <a14:useLocalDpi xmlns:a14="http://schemas.microsoft.com/office/drawing/2010/main" val="0"/>
+              </a:ext>
+            </a:extLst>
+          </a:blip>
+          <a:stretch>
+            <a:fillRect/>
+          </a:stretch>
+        </p:blipFill>
+        <p:spPr>
+          <a:xfrm>
+            <a:off x="9833811" y="560872"/>
+            <a:ext cx="1735756" cy="1735756"/>
+          </a:xfrm>
+          <a:prstGeom prst="rect">
+            <a:avLst/>
+          </a:prstGeom>
+        </p:spPr>
+      </p:pic>
     </p:spTree>
     <p:extLst>
       <p:ext uri="{BB962C8B-B14F-4D97-AF65-F5344CB8AC3E}">
-        <p14:creationId xmlns:p14="http://schemas.microsoft.com/office/powerpoint/2010/main" val="4238354831"/>
+        <p14:creationId xmlns:p14="http://schemas.microsoft.com/office/powerpoint/2010/main" val="2795907999"/>
       </p:ext>
     </p:extLst>
   </p:cSld>
@@ -6878,7 +7701,7 @@
           <p:cNvPr id="2" name="Title 1">
             <a:extLst>
               <a:ext uri="{FF2B5EF4-FFF2-40B4-BE49-F238E27FC236}">
-                <a16:creationId xmlns:a16="http://schemas.microsoft.com/office/drawing/2014/main" id="{67315A8A-8C97-47B9-973E-C95712B9A6F7}"/>
+                <a16:creationId xmlns:a16="http://schemas.microsoft.com/office/drawing/2014/main" id="{91DF5347-844B-4C15-B6AE-F284AFD2F324}"/>
               </a:ext>
             </a:extLst>
           </p:cNvPr>
@@ -6896,107 +7719,129 @@
           <a:p>
             <a:r>
               <a:rPr lang="en-US" dirty="0"/>
-              <a:t>Tips &amp; Tidbits, </a:t>
-            </a:r>
+              <a:t>Tips &amp; Tidbits</a:t>
+            </a:r>
+          </a:p>
+        </p:txBody>
+      </p:sp>
+      <p:sp>
+        <p:nvSpPr>
+          <p:cNvPr id="3" name="Content Placeholder 2">
+            <a:extLst>
+              <a:ext uri="{FF2B5EF4-FFF2-40B4-BE49-F238E27FC236}">
+                <a16:creationId xmlns:a16="http://schemas.microsoft.com/office/drawing/2014/main" id="{8B61951D-42A5-4407-A6EE-97C22244D142}"/>
+              </a:ext>
+            </a:extLst>
+          </p:cNvPr>
+          <p:cNvSpPr>
+            <a:spLocks noGrp="1"/>
+          </p:cNvSpPr>
+          <p:nvPr>
+            <p:ph idx="1"/>
+          </p:nvPr>
+        </p:nvSpPr>
+        <p:spPr/>
+        <p:txBody>
+          <a:bodyPr>
+            <a:normAutofit lnSpcReduction="10000"/>
+          </a:bodyPr>
+          <a:lstStyle/>
+          <a:p>
+            <a:r>
+              <a:rPr lang="en-US" dirty="0"/>
+              <a:t>Use (and require) a new version, it’s just helpful to get better versions of commands </a:t>
+            </a:r>
+          </a:p>
+          <a:p>
+            <a:pPr lvl="1"/>
             <a:r>
               <a:rPr lang="en-US" dirty="0" err="1"/>
-              <a:t>Kitware</a:t>
-            </a:r>
-            <a:r>
-              <a:rPr lang="en-US" dirty="0"/>
-              <a:t> Strikes Back</a:t>
-            </a:r>
-          </a:p>
-        </p:txBody>
-      </p:sp>
-      <p:sp>
-        <p:nvSpPr>
-          <p:cNvPr id="3" name="Content Placeholder 2">
+              <a:t>source_group</a:t>
+            </a:r>
+            <a:r>
+              <a:rPr lang="en-US" dirty="0"/>
+              <a:t>(TREE), despite your bugs, I’m looking at you</a:t>
+            </a:r>
+          </a:p>
+          <a:p>
+            <a:r>
+              <a:rPr lang="en-US" dirty="0"/>
+              <a:t>Use target based commands, be careful of PUBLIC/PRIVATE with each one, PUBLIC is transitive to targets that depend on the given target.</a:t>
+            </a:r>
+          </a:p>
+          <a:p>
+            <a:r>
+              <a:rPr lang="en-US" dirty="0" err="1"/>
+              <a:t>GLOBing</a:t>
+            </a:r>
+            <a:r>
+              <a:rPr lang="en-US" dirty="0"/>
+              <a:t> sources is “considered harmful”, but we won’t tell anyone if you do it. (We will try to talk you out of it though.)</a:t>
+            </a:r>
+          </a:p>
+          <a:p>
+            <a:r>
+              <a:rPr lang="en-US" dirty="0"/>
+              <a:t>Guard your compiler/linker flags based on the compiler (similarly, if you’re manually managing your dependencies, guard your libraries based on platform)</a:t>
+            </a:r>
+          </a:p>
+          <a:p>
+            <a:r>
+              <a:rPr lang="en-US" dirty="0"/>
+              <a:t>Remember that some repetitiveness is okay, some is awful, evaluate and abstract</a:t>
+            </a:r>
+          </a:p>
+          <a:p>
+            <a:r>
+              <a:rPr lang="en-US" dirty="0"/>
+              <a:t>Find a medium sized project that uses modern CMake to base your work off of</a:t>
+            </a:r>
+          </a:p>
+        </p:txBody>
+      </p:sp>
+      <p:pic>
+        <p:nvPicPr>
+          <p:cNvPr id="5" name="Graphic 4" descr="Teacher">
             <a:extLst>
               <a:ext uri="{FF2B5EF4-FFF2-40B4-BE49-F238E27FC236}">
-                <a16:creationId xmlns:a16="http://schemas.microsoft.com/office/drawing/2014/main" id="{936103B9-9D0B-4F94-B236-6C52CF2D6E4C}"/>
+                <a16:creationId xmlns:a16="http://schemas.microsoft.com/office/drawing/2014/main" id="{7B01705E-EFC6-4FCB-AFF5-CECD449DB5CE}"/>
               </a:ext>
             </a:extLst>
           </p:cNvPr>
-          <p:cNvSpPr>
-            <a:spLocks noGrp="1"/>
-          </p:cNvSpPr>
-          <p:nvPr>
-            <p:ph idx="1"/>
-          </p:nvPr>
-        </p:nvSpPr>
-        <p:spPr/>
-        <p:txBody>
-          <a:bodyPr/>
-          <a:lstStyle/>
-          <a:p>
-            <a:r>
-              <a:rPr lang="en-US" dirty="0"/>
-              <a:t>(Typically) Use your local copy of the doc pages, not the website.</a:t>
-            </a:r>
-          </a:p>
-          <a:p>
-            <a:pPr lvl="1"/>
-            <a:r>
-              <a:rPr lang="en-US" dirty="0"/>
-              <a:t>It will load way faster</a:t>
-            </a:r>
-          </a:p>
-          <a:p>
-            <a:pPr lvl="1"/>
-            <a:r>
-              <a:rPr lang="en-US" dirty="0"/>
-              <a:t>You will for sure be looking at documentation for your version of </a:t>
-            </a:r>
-            <a:r>
-              <a:rPr lang="en-US" dirty="0" err="1"/>
-              <a:t>Cmake</a:t>
-            </a:r>
-            <a:endParaRPr lang="en-US" dirty="0"/>
-          </a:p>
-          <a:p>
-            <a:r>
-              <a:rPr lang="en-US" dirty="0"/>
-              <a:t>Avoid Generator Expressions until you know you actually need them</a:t>
-            </a:r>
-          </a:p>
-          <a:p>
-            <a:pPr lvl="1"/>
-            <a:r>
-              <a:rPr lang="en-US" dirty="0"/>
-              <a:t>They are very frustrating to debug</a:t>
-            </a:r>
-          </a:p>
-          <a:p>
-            <a:r>
-              <a:rPr lang="en-US" dirty="0"/>
-              <a:t>Some options exist to help in debugging (in the </a:t>
-            </a:r>
-            <a:r>
-              <a:rPr lang="en-US" dirty="0">
-                <a:hlinkClick r:id="rId2"/>
-              </a:rPr>
-              <a:t>CMake(1) doc page</a:t>
-            </a:r>
-            <a:r>
-              <a:rPr lang="en-US" dirty="0"/>
-              <a:t>)</a:t>
-            </a:r>
-          </a:p>
-          <a:p>
-            <a:pPr lvl="1"/>
-            <a:r>
-              <a:rPr lang="en-US" i="0" dirty="0"/>
-              <a:t> '--warn-uninitialized' and '--warn-unused-vars' </a:t>
-            </a:r>
-            <a:endParaRPr lang="en-US" dirty="0"/>
-          </a:p>
-        </p:txBody>
-      </p:sp>
+          <p:cNvPicPr>
+            <a:picLocks noChangeAspect="1"/>
+          </p:cNvPicPr>
+          <p:nvPr/>
+        </p:nvPicPr>
+        <p:blipFill>
+          <a:blip r:embed="rId2">
+            <a:extLst>
+              <a:ext uri="{28A0092B-C50C-407E-A947-70E740481C1C}">
+                <a14:useLocalDpi xmlns:a14="http://schemas.microsoft.com/office/drawing/2010/main" val="0"/>
+              </a:ext>
+              <a:ext uri="{96DAC541-7B7A-43D3-8B79-37D633B846F1}">
+                <asvg:svgBlip xmlns:asvg="http://schemas.microsoft.com/office/drawing/2016/SVG/main" r:embed="rId3"/>
+              </a:ext>
+            </a:extLst>
+          </a:blip>
+          <a:stretch>
+            <a:fillRect/>
+          </a:stretch>
+        </p:blipFill>
+        <p:spPr>
+          <a:xfrm>
+            <a:off x="4957233" y="209550"/>
+            <a:ext cx="1346200" cy="1346200"/>
+          </a:xfrm>
+          <a:prstGeom prst="rect">
+            <a:avLst/>
+          </a:prstGeom>
+        </p:spPr>
+      </p:pic>
     </p:spTree>
     <p:extLst>
       <p:ext uri="{BB962C8B-B14F-4D97-AF65-F5344CB8AC3E}">
-        <p14:creationId xmlns:p14="http://schemas.microsoft.com/office/powerpoint/2010/main" val="1301922853"/>
+        <p14:creationId xmlns:p14="http://schemas.microsoft.com/office/powerpoint/2010/main" val="4238354831"/>
       </p:ext>
     </p:extLst>
   </p:cSld>
@@ -7028,7 +7873,7 @@
           <p:cNvPr id="2" name="Title 1">
             <a:extLst>
               <a:ext uri="{FF2B5EF4-FFF2-40B4-BE49-F238E27FC236}">
-                <a16:creationId xmlns:a16="http://schemas.microsoft.com/office/drawing/2014/main" id="{B3EB5296-4B53-4E29-B4CC-D988B1170D71}"/>
+                <a16:creationId xmlns:a16="http://schemas.microsoft.com/office/drawing/2014/main" id="{67315A8A-8C97-47B9-973E-C95712B9A6F7}"/>
               </a:ext>
             </a:extLst>
           </p:cNvPr>
@@ -7046,7 +7891,15 @@
           <a:p>
             <a:r>
               <a:rPr lang="en-US" dirty="0"/>
-              <a:t>Going Forward</a:t>
+              <a:t>Tips &amp; Tidbits, </a:t>
+            </a:r>
+            <a:r>
+              <a:rPr lang="en-US" dirty="0" err="1"/>
+              <a:t>Kitware</a:t>
+            </a:r>
+            <a:r>
+              <a:rPr lang="en-US" dirty="0"/>
+              <a:t> Strikes Back</a:t>
             </a:r>
           </a:p>
         </p:txBody>
@@ -7056,7 +7909,7 @@
           <p:cNvPr id="3" name="Content Placeholder 2">
             <a:extLst>
               <a:ext uri="{FF2B5EF4-FFF2-40B4-BE49-F238E27FC236}">
-                <a16:creationId xmlns:a16="http://schemas.microsoft.com/office/drawing/2014/main" id="{4A539FCB-5E30-4B26-868B-4EFF5C8C2C5D}"/>
+                <a16:creationId xmlns:a16="http://schemas.microsoft.com/office/drawing/2014/main" id="{936103B9-9D0B-4F94-B236-6C52CF2D6E4C}"/>
               </a:ext>
             </a:extLst>
           </p:cNvPr>
@@ -7074,35 +7927,187 @@
           <a:p>
             <a:r>
               <a:rPr lang="en-US" dirty="0"/>
-              <a:t>Watch Danial Pfeifer’s talk, and check out the awesome-</a:t>
+              <a:t>(Typically) Use your local copy of the doc pages, not the website.</a:t>
+            </a:r>
+          </a:p>
+          <a:p>
+            <a:pPr lvl="1"/>
+            <a:r>
+              <a:rPr lang="en-US" dirty="0"/>
+              <a:t>It will load way faster</a:t>
+            </a:r>
+          </a:p>
+          <a:p>
+            <a:pPr lvl="1"/>
+            <a:r>
+              <a:rPr lang="en-US" dirty="0"/>
+              <a:t>You will for sure be looking at documentation for your version of </a:t>
             </a:r>
             <a:r>
               <a:rPr lang="en-US" dirty="0" err="1"/>
-              <a:t>cmake</a:t>
-            </a:r>
-            <a:r>
-              <a:rPr lang="en-US" dirty="0"/>
-              <a:t> references</a:t>
-            </a:r>
-          </a:p>
-          <a:p>
-            <a:r>
-              <a:rPr lang="en-US" dirty="0"/>
-              <a:t>Explore some of the package managers, we haven’t had time to evaluate them</a:t>
-            </a:r>
-          </a:p>
-          <a:p>
+              <a:t>Cmake</a:t>
+            </a:r>
             <a:endParaRPr lang="en-US" dirty="0"/>
           </a:p>
           <a:p>
+            <a:r>
+              <a:rPr lang="en-US" dirty="0"/>
+              <a:t>Avoid Generator Expressions until you know you actually need them</a:t>
+            </a:r>
+          </a:p>
+          <a:p>
+            <a:pPr lvl="1"/>
+            <a:r>
+              <a:rPr lang="en-US" dirty="0"/>
+              <a:t>They are very frustrating to debug</a:t>
+            </a:r>
+          </a:p>
+          <a:p>
+            <a:r>
+              <a:rPr lang="en-US" dirty="0"/>
+              <a:t>Some options exist to help in debugging (in the </a:t>
+            </a:r>
+            <a:r>
+              <a:rPr lang="en-US" dirty="0">
+                <a:hlinkClick r:id="rId2"/>
+              </a:rPr>
+              <a:t>CMake(1) doc page</a:t>
+            </a:r>
+            <a:r>
+              <a:rPr lang="en-US" dirty="0"/>
+              <a:t>)</a:t>
+            </a:r>
+          </a:p>
+          <a:p>
+            <a:pPr lvl="1"/>
+            <a:r>
+              <a:rPr lang="en-US" i="0" dirty="0"/>
+              <a:t> '--warn-uninitialized' and '--warn-unused-vars' </a:t>
+            </a:r>
             <a:endParaRPr lang="en-US" dirty="0"/>
           </a:p>
         </p:txBody>
       </p:sp>
+      <p:pic>
+        <p:nvPicPr>
+          <p:cNvPr id="5" name="Graphic 4" descr="Satellite dish">
+            <a:extLst>
+              <a:ext uri="{FF2B5EF4-FFF2-40B4-BE49-F238E27FC236}">
+                <a16:creationId xmlns:a16="http://schemas.microsoft.com/office/drawing/2014/main" id="{6916B462-662D-47CD-A8C3-E575B9E40E28}"/>
+              </a:ext>
+            </a:extLst>
+          </p:cNvPr>
+          <p:cNvPicPr>
+            <a:picLocks noChangeAspect="1"/>
+          </p:cNvPicPr>
+          <p:nvPr/>
+        </p:nvPicPr>
+        <p:blipFill>
+          <a:blip r:embed="rId3">
+            <a:extLst>
+              <a:ext uri="{28A0092B-C50C-407E-A947-70E740481C1C}">
+                <a14:useLocalDpi xmlns:a14="http://schemas.microsoft.com/office/drawing/2010/main" val="0"/>
+              </a:ext>
+              <a:ext uri="{96DAC541-7B7A-43D3-8B79-37D633B846F1}">
+                <asvg:svgBlip xmlns:asvg="http://schemas.microsoft.com/office/drawing/2016/SVG/main" r:embed="rId4"/>
+              </a:ext>
+            </a:extLst>
+          </a:blip>
+          <a:stretch>
+            <a:fillRect/>
+          </a:stretch>
+        </p:blipFill>
+        <p:spPr>
+          <a:xfrm>
+            <a:off x="10058400" y="1314450"/>
+            <a:ext cx="914400" cy="914400"/>
+          </a:xfrm>
+          <a:prstGeom prst="rect">
+            <a:avLst/>
+          </a:prstGeom>
+        </p:spPr>
+      </p:pic>
+      <p:cxnSp>
+        <p:nvCxnSpPr>
+          <p:cNvPr id="8" name="Straight Connector 7">
+            <a:extLst>
+              <a:ext uri="{FF2B5EF4-FFF2-40B4-BE49-F238E27FC236}">
+                <a16:creationId xmlns:a16="http://schemas.microsoft.com/office/drawing/2014/main" id="{C7294490-9AFE-410C-949C-1B479CBA6087}"/>
+              </a:ext>
+            </a:extLst>
+          </p:cNvPr>
+          <p:cNvCxnSpPr/>
+          <p:nvPr/>
+        </p:nvCxnSpPr>
+        <p:spPr>
+          <a:xfrm flipV="1">
+            <a:off x="10828867" y="887358"/>
+            <a:ext cx="397933" cy="541392"/>
+          </a:xfrm>
+          <a:prstGeom prst="line">
+            <a:avLst/>
+          </a:prstGeom>
+          <a:ln w="57150">
+            <a:solidFill>
+              <a:srgbClr val="C00000"/>
+            </a:solidFill>
+          </a:ln>
+        </p:spPr>
+        <p:style>
+          <a:lnRef idx="1">
+            <a:schemeClr val="accent6"/>
+          </a:lnRef>
+          <a:fillRef idx="0">
+            <a:schemeClr val="accent6"/>
+          </a:fillRef>
+          <a:effectRef idx="0">
+            <a:schemeClr val="accent6"/>
+          </a:effectRef>
+          <a:fontRef idx="minor">
+            <a:schemeClr val="tx1"/>
+          </a:fontRef>
+        </p:style>
+      </p:cxnSp>
+      <p:pic>
+        <p:nvPicPr>
+          <p:cNvPr id="10" name="Picture 9">
+            <a:extLst>
+              <a:ext uri="{FF2B5EF4-FFF2-40B4-BE49-F238E27FC236}">
+                <a16:creationId xmlns:a16="http://schemas.microsoft.com/office/drawing/2014/main" id="{C30A279B-E67A-46CD-9DA8-B49708D14B6B}"/>
+              </a:ext>
+            </a:extLst>
+          </p:cNvPr>
+          <p:cNvPicPr>
+            <a:picLocks noChangeAspect="1"/>
+          </p:cNvPicPr>
+          <p:nvPr/>
+        </p:nvPicPr>
+        <p:blipFill>
+          <a:blip r:embed="rId5">
+            <a:extLst>
+              <a:ext uri="{28A0092B-C50C-407E-A947-70E740481C1C}">
+                <a14:useLocalDpi xmlns:a14="http://schemas.microsoft.com/office/drawing/2010/main" val="0"/>
+              </a:ext>
+            </a:extLst>
+          </a:blip>
+          <a:stretch>
+            <a:fillRect/>
+          </a:stretch>
+        </p:blipFill>
+        <p:spPr>
+          <a:xfrm>
+            <a:off x="9846468" y="247887"/>
+            <a:ext cx="2252663" cy="582321"/>
+          </a:xfrm>
+          <a:prstGeom prst="rect">
+            <a:avLst/>
+          </a:prstGeom>
+        </p:spPr>
+      </p:pic>
     </p:spTree>
     <p:extLst>
       <p:ext uri="{BB962C8B-B14F-4D97-AF65-F5344CB8AC3E}">
-        <p14:creationId xmlns:p14="http://schemas.microsoft.com/office/powerpoint/2010/main" val="674164296"/>
+        <p14:creationId xmlns:p14="http://schemas.microsoft.com/office/powerpoint/2010/main" val="1301922853"/>
       </p:ext>
     </p:extLst>
   </p:cSld>
@@ -7134,7 +8139,7 @@
           <p:cNvPr id="2" name="Title 1">
             <a:extLst>
               <a:ext uri="{FF2B5EF4-FFF2-40B4-BE49-F238E27FC236}">
-                <a16:creationId xmlns:a16="http://schemas.microsoft.com/office/drawing/2014/main" id="{3A192FE3-1AD2-4EA8-8F28-43393CB4BAA5}"/>
+                <a16:creationId xmlns:a16="http://schemas.microsoft.com/office/drawing/2014/main" id="{B3EB5296-4B53-4E29-B4CC-D988B1170D71}"/>
               </a:ext>
             </a:extLst>
           </p:cNvPr>
@@ -7152,7 +8157,7 @@
           <a:p>
             <a:r>
               <a:rPr lang="en-US" dirty="0"/>
-              <a:t>References</a:t>
+              <a:t>Going Forward</a:t>
             </a:r>
           </a:p>
         </p:txBody>
@@ -7162,7 +8167,7 @@
           <p:cNvPr id="3" name="Content Placeholder 2">
             <a:extLst>
               <a:ext uri="{FF2B5EF4-FFF2-40B4-BE49-F238E27FC236}">
-                <a16:creationId xmlns:a16="http://schemas.microsoft.com/office/drawing/2014/main" id="{90FD264D-72FB-49FD-9E95-F55D98EB1EDD}"/>
+                <a16:creationId xmlns:a16="http://schemas.microsoft.com/office/drawing/2014/main" id="{4A539FCB-5E30-4B26-868B-4EFF5C8C2C5D}"/>
               </a:ext>
             </a:extLst>
           </p:cNvPr>
@@ -7175,124 +8180,95 @@
         </p:nvSpPr>
         <p:spPr/>
         <p:txBody>
-          <a:bodyPr>
-            <a:normAutofit fontScale="92500" lnSpcReduction="20000"/>
-          </a:bodyPr>
+          <a:bodyPr/>
           <a:lstStyle/>
           <a:p>
             <a:r>
               <a:rPr lang="en-US" dirty="0"/>
-              <a:t>Daniel Pfeifer “Effective CMake"</a:t>
-            </a:r>
-          </a:p>
-          <a:p>
-            <a:pPr lvl="1"/>
+              <a:t>Watch Danial Pfeifer’s talk, and check out the awesome-</a:t>
+            </a:r>
+            <a:r>
+              <a:rPr lang="en-US" dirty="0" err="1"/>
+              <a:t>cmake</a:t>
+            </a:r>
+            <a:r>
+              <a:rPr lang="en-US" dirty="0"/>
+              <a:t> references</a:t>
+            </a:r>
+          </a:p>
+          <a:p>
+            <a:r>
+              <a:rPr lang="en-US" dirty="0"/>
+              <a:t>Explore some of the package managers, we haven’t had time to evaluate them</a:t>
+            </a:r>
+          </a:p>
+          <a:p>
+            <a:r>
+              <a:rPr lang="en-US" dirty="0"/>
+              <a:t>Read over the </a:t>
+            </a:r>
             <a:r>
               <a:rPr lang="en-US" dirty="0">
                 <a:hlinkClick r:id="rId2"/>
               </a:rPr>
-              <a:t>https://www.youtube.com/watch?v=bsXLMQ6WgIk</a:t>
-            </a:r>
+              <a:t>documentation page on cross compiling</a:t>
+            </a:r>
+            <a:r>
+              <a:rPr lang="en-US" dirty="0"/>
+              <a:t>, if you are interested in that sort of thing</a:t>
+            </a:r>
+          </a:p>
+          <a:p>
             <a:endParaRPr lang="en-US" dirty="0"/>
           </a:p>
           <a:p>
-            <a:r>
-              <a:rPr lang="en-US" dirty="0" err="1"/>
-              <a:t>CGold</a:t>
-            </a:r>
-            <a:r>
-              <a:rPr lang="en-US" dirty="0"/>
-              <a:t>: The Hitchhiker’s Guide to the </a:t>
-            </a:r>
-            <a:r>
-              <a:rPr lang="en-US" dirty="0" err="1"/>
-              <a:t>Cmake</a:t>
-            </a:r>
             <a:endParaRPr lang="en-US" dirty="0"/>
           </a:p>
-          <a:p>
-            <a:pPr lvl="1"/>
-            <a:r>
-              <a:rPr lang="en-US" dirty="0">
-                <a:hlinkClick r:id="rId3"/>
-              </a:rPr>
-              <a:t>https://cgold.readthedocs.io/en/latest/</a:t>
-            </a:r>
-            <a:endParaRPr lang="en-US" dirty="0"/>
-          </a:p>
-          <a:p>
-            <a:r>
-              <a:rPr lang="en-US" dirty="0"/>
-              <a:t>awesome-</a:t>
-            </a:r>
-            <a:r>
-              <a:rPr lang="en-US" dirty="0" err="1"/>
-              <a:t>cmake</a:t>
-            </a:r>
-            <a:endParaRPr lang="en-US" dirty="0"/>
-          </a:p>
-          <a:p>
-            <a:pPr lvl="1"/>
-            <a:r>
-              <a:rPr lang="en-US" dirty="0">
-                <a:hlinkClick r:id="rId4"/>
-              </a:rPr>
-              <a:t>https://github.com/onqtam/awesome-cmake</a:t>
-            </a:r>
-            <a:r>
-              <a:rPr lang="en-US" dirty="0"/>
-              <a:t> </a:t>
-            </a:r>
-          </a:p>
-          <a:p>
-            <a:r>
-              <a:rPr lang="en-US" dirty="0"/>
-              <a:t>Reddit AMA with CMake </a:t>
-            </a:r>
-            <a:r>
-              <a:rPr lang="en-US" dirty="0" err="1"/>
-              <a:t>devs</a:t>
-            </a:r>
-            <a:endParaRPr lang="en-US" dirty="0"/>
-          </a:p>
-          <a:p>
-            <a:pPr lvl="1"/>
-            <a:r>
-              <a:rPr lang="en-US" dirty="0">
-                <a:hlinkClick r:id="rId5"/>
-              </a:rPr>
-              <a:t>https://www.reddit.com/r/cpp/comments/8sie4b/i_manage_the_release_cycle_for_cmake_the_build/</a:t>
-            </a:r>
-            <a:r>
-              <a:rPr lang="en-US" dirty="0"/>
-              <a:t> </a:t>
-            </a:r>
-          </a:p>
-          <a:p>
-            <a:r>
-              <a:rPr lang="en-US" dirty="0"/>
-              <a:t>CMake documentation pages</a:t>
-            </a:r>
-          </a:p>
-          <a:p>
-            <a:pPr lvl="1"/>
-            <a:r>
-              <a:rPr lang="en-US" dirty="0">
-                <a:hlinkClick r:id="rId6"/>
-              </a:rPr>
-              <a:t>https://cmake.org/cmake/help/latest/</a:t>
-            </a:r>
-            <a:r>
-              <a:rPr lang="en-US" dirty="0"/>
-              <a:t>  </a:t>
-            </a:r>
-          </a:p>
-        </p:txBody>
-      </p:sp>
+        </p:txBody>
+      </p:sp>
+      <p:pic>
+        <p:nvPicPr>
+          <p:cNvPr id="5" name="Graphic 4" descr="Shooting star">
+            <a:extLst>
+              <a:ext uri="{FF2B5EF4-FFF2-40B4-BE49-F238E27FC236}">
+                <a16:creationId xmlns:a16="http://schemas.microsoft.com/office/drawing/2014/main" id="{298B7570-A4D5-4D50-807B-386136015D24}"/>
+              </a:ext>
+            </a:extLst>
+          </p:cNvPr>
+          <p:cNvPicPr>
+            <a:picLocks noChangeAspect="1"/>
+          </p:cNvPicPr>
+          <p:nvPr/>
+        </p:nvPicPr>
+        <p:blipFill>
+          <a:blip r:embed="rId3">
+            <a:extLst>
+              <a:ext uri="{28A0092B-C50C-407E-A947-70E740481C1C}">
+                <a14:useLocalDpi xmlns:a14="http://schemas.microsoft.com/office/drawing/2010/main" val="0"/>
+              </a:ext>
+              <a:ext uri="{96DAC541-7B7A-43D3-8B79-37D633B846F1}">
+                <asvg:svgBlip xmlns:asvg="http://schemas.microsoft.com/office/drawing/2016/SVG/main" r:embed="rId4"/>
+              </a:ext>
+            </a:extLst>
+          </a:blip>
+          <a:stretch>
+            <a:fillRect/>
+          </a:stretch>
+        </p:blipFill>
+        <p:spPr>
+          <a:xfrm>
+            <a:off x="5181600" y="579967"/>
+            <a:ext cx="914400" cy="914400"/>
+          </a:xfrm>
+          <a:prstGeom prst="rect">
+            <a:avLst/>
+          </a:prstGeom>
+        </p:spPr>
+      </p:pic>
     </p:spTree>
     <p:extLst>
       <p:ext uri="{BB962C8B-B14F-4D97-AF65-F5344CB8AC3E}">
-        <p14:creationId xmlns:p14="http://schemas.microsoft.com/office/powerpoint/2010/main" val="229397432"/>
+        <p14:creationId xmlns:p14="http://schemas.microsoft.com/office/powerpoint/2010/main" val="674164296"/>
       </p:ext>
     </p:extLst>
   </p:cSld>
@@ -7324,7 +8300,7 @@
           <p:cNvPr id="2" name="Title 1">
             <a:extLst>
               <a:ext uri="{FF2B5EF4-FFF2-40B4-BE49-F238E27FC236}">
-                <a16:creationId xmlns:a16="http://schemas.microsoft.com/office/drawing/2014/main" id="{DD32FAF3-4508-4D2E-AB89-AEC6552093AB}"/>
+                <a16:creationId xmlns:a16="http://schemas.microsoft.com/office/drawing/2014/main" id="{3A192FE3-1AD2-4EA8-8F28-43393CB4BAA5}"/>
               </a:ext>
             </a:extLst>
           </p:cNvPr>
@@ -7342,7 +8318,7 @@
           <a:p>
             <a:r>
               <a:rPr lang="en-US" dirty="0"/>
-              <a:t>Presenters and Q&amp;A</a:t>
+              <a:t>References</a:t>
             </a:r>
           </a:p>
         </p:txBody>
@@ -7352,7 +8328,7 @@
           <p:cNvPr id="3" name="Content Placeholder 2">
             <a:extLst>
               <a:ext uri="{FF2B5EF4-FFF2-40B4-BE49-F238E27FC236}">
-                <a16:creationId xmlns:a16="http://schemas.microsoft.com/office/drawing/2014/main" id="{175829B1-6984-4FF3-8A4A-21A22ECF1569}"/>
+                <a16:creationId xmlns:a16="http://schemas.microsoft.com/office/drawing/2014/main" id="{90FD264D-72FB-49FD-9E95-F55D98EB1EDD}"/>
               </a:ext>
             </a:extLst>
           </p:cNvPr>
@@ -7365,34 +8341,116 @@
         </p:nvSpPr>
         <p:spPr/>
         <p:txBody>
-          <a:bodyPr/>
+          <a:bodyPr>
+            <a:normAutofit fontScale="92500" lnSpcReduction="20000"/>
+          </a:bodyPr>
           <a:lstStyle/>
           <a:p>
             <a:r>
               <a:rPr lang="en-US" dirty="0"/>
-              <a:t>Joshua T. Fisher (@</a:t>
-            </a:r>
+              <a:t>Daniel Pfeifer “Effective CMake"</a:t>
+            </a:r>
+          </a:p>
+          <a:p>
+            <a:pPr lvl="1"/>
+            <a:r>
+              <a:rPr lang="en-US" dirty="0">
+                <a:hlinkClick r:id="rId2"/>
+              </a:rPr>
+              <a:t>https://www.youtube.com/watch?v=bsXLMQ6WgIk</a:t>
+            </a:r>
+            <a:endParaRPr lang="en-US" dirty="0"/>
+          </a:p>
+          <a:p>
             <a:r>
               <a:rPr lang="en-US" dirty="0" err="1"/>
-              <a:t>Timewatcher</a:t>
-            </a:r>
-            <a:r>
-              <a:rPr lang="en-US" dirty="0"/>
-              <a:t>, playmer@gmail.com)</a:t>
-            </a:r>
-          </a:p>
-          <a:p>
-            <a:r>
-              <a:rPr lang="en-US" dirty="0"/>
-              <a:t>Joshua Shlemmer (@</a:t>
+              <a:t>CGold</a:t>
+            </a:r>
+            <a:r>
+              <a:rPr lang="en-US" dirty="0"/>
+              <a:t>: The Hitchhiker’s Guide to the </a:t>
             </a:r>
             <a:r>
               <a:rPr lang="en-US" dirty="0" err="1"/>
-              <a:t>joshshlemmer</a:t>
-            </a:r>
-            <a:r>
-              <a:rPr lang="en-US" dirty="0"/>
-              <a:t>, joshua.shlemmer@digipen.edu)</a:t>
+              <a:t>Cmake</a:t>
+            </a:r>
+            <a:endParaRPr lang="en-US" dirty="0"/>
+          </a:p>
+          <a:p>
+            <a:pPr lvl="1"/>
+            <a:r>
+              <a:rPr lang="en-US" dirty="0">
+                <a:hlinkClick r:id="rId3"/>
+              </a:rPr>
+              <a:t>https://cgold.readthedocs.io/en/latest/</a:t>
+            </a:r>
+            <a:endParaRPr lang="en-US" dirty="0"/>
+          </a:p>
+          <a:p>
+            <a:r>
+              <a:rPr lang="en-US" dirty="0"/>
+              <a:t>awesome-</a:t>
+            </a:r>
+            <a:r>
+              <a:rPr lang="en-US" dirty="0" err="1"/>
+              <a:t>cmake</a:t>
+            </a:r>
+            <a:endParaRPr lang="en-US" dirty="0"/>
+          </a:p>
+          <a:p>
+            <a:pPr lvl="1"/>
+            <a:r>
+              <a:rPr lang="en-US" dirty="0">
+                <a:hlinkClick r:id="rId4"/>
+              </a:rPr>
+              <a:t>https://github.com/onqtam/awesome-cmake</a:t>
+            </a:r>
+            <a:r>
+              <a:rPr lang="en-US" dirty="0"/>
+              <a:t> </a:t>
+            </a:r>
+          </a:p>
+          <a:p>
+            <a:r>
+              <a:rPr lang="en-US" dirty="0"/>
+              <a:t>Reddit AMA with CMake </a:t>
+            </a:r>
+            <a:r>
+              <a:rPr lang="en-US" dirty="0" err="1"/>
+              <a:t>devs</a:t>
+            </a:r>
+            <a:endParaRPr lang="en-US" dirty="0"/>
+          </a:p>
+          <a:p>
+            <a:pPr lvl="1"/>
+            <a:r>
+              <a:rPr lang="en-US" dirty="0">
+                <a:hlinkClick r:id="rId5"/>
+              </a:rPr>
+              <a:t>https://www.reddit.com/r/cpp/comments/8sie4b/i_manage_the_release_cycle_for_cmake_the_build/</a:t>
+            </a:r>
+            <a:r>
+              <a:rPr lang="en-US" dirty="0"/>
+              <a:t> </a:t>
+            </a:r>
+          </a:p>
+          <a:p>
+            <a:r>
+              <a:rPr lang="en-US" dirty="0"/>
+              <a:t>CMake documentation pages</a:t>
+            </a:r>
+          </a:p>
+          <a:p>
+            <a:pPr lvl="1"/>
+            <a:r>
+              <a:rPr lang="en-US" dirty="0">
+                <a:hlinkClick r:id="rId6"/>
+              </a:rPr>
+              <a:t>https://cmake.org/cmake/help/latest/</a:t>
+            </a:r>
+            <a:r>
+              <a:rPr lang="en-US" dirty="0"/>
+              <a:t>  </a:t>
             </a:r>
           </a:p>
         </p:txBody>
@@ -7400,7 +8458,7 @@
     </p:spTree>
     <p:extLst>
       <p:ext uri="{BB962C8B-B14F-4D97-AF65-F5344CB8AC3E}">
-        <p14:creationId xmlns:p14="http://schemas.microsoft.com/office/powerpoint/2010/main" val="2758591046"/>
+        <p14:creationId xmlns:p14="http://schemas.microsoft.com/office/powerpoint/2010/main" val="229397432"/>
       </p:ext>
     </p:extLst>
   </p:cSld>
@@ -7432,7 +8490,7 @@
           <p:cNvPr id="2" name="Title 1">
             <a:extLst>
               <a:ext uri="{FF2B5EF4-FFF2-40B4-BE49-F238E27FC236}">
-                <a16:creationId xmlns:a16="http://schemas.microsoft.com/office/drawing/2014/main" id="{B489D53A-804D-4F91-B68D-0A5631447FC2}"/>
+                <a16:creationId xmlns:a16="http://schemas.microsoft.com/office/drawing/2014/main" id="{DD32FAF3-4508-4D2E-AB89-AEC6552093AB}"/>
               </a:ext>
             </a:extLst>
           </p:cNvPr>
@@ -7443,22 +8501,64 @@
             <p:ph type="title"/>
           </p:nvPr>
         </p:nvSpPr>
-        <p:spPr>
-          <a:xfrm>
-            <a:off x="1066800" y="2703621"/>
-            <a:ext cx="10058400" cy="1450757"/>
-          </a:xfrm>
-        </p:spPr>
-        <p:txBody>
-          <a:bodyPr anchor="ctr">
-            <a:normAutofit/>
-          </a:bodyPr>
+        <p:spPr/>
+        <p:txBody>
+          <a:bodyPr/>
           <a:lstStyle/>
           <a:p>
-            <a:pPr algn="ctr"/>
-            <a:r>
-              <a:rPr lang="en-US" sz="6600" dirty="0"/>
-              <a:t>Thank you!</a:t>
+            <a:r>
+              <a:rPr lang="en-US" dirty="0"/>
+              <a:t>Presenters and Q&amp;A</a:t>
+            </a:r>
+          </a:p>
+        </p:txBody>
+      </p:sp>
+      <p:sp>
+        <p:nvSpPr>
+          <p:cNvPr id="3" name="Content Placeholder 2">
+            <a:extLst>
+              <a:ext uri="{FF2B5EF4-FFF2-40B4-BE49-F238E27FC236}">
+                <a16:creationId xmlns:a16="http://schemas.microsoft.com/office/drawing/2014/main" id="{175829B1-6984-4FF3-8A4A-21A22ECF1569}"/>
+              </a:ext>
+            </a:extLst>
+          </p:cNvPr>
+          <p:cNvSpPr>
+            <a:spLocks noGrp="1"/>
+          </p:cNvSpPr>
+          <p:nvPr>
+            <p:ph idx="1"/>
+          </p:nvPr>
+        </p:nvSpPr>
+        <p:spPr/>
+        <p:txBody>
+          <a:bodyPr/>
+          <a:lstStyle/>
+          <a:p>
+            <a:r>
+              <a:rPr lang="en-US" dirty="0"/>
+              <a:t>Joshua T. Fisher (@</a:t>
+            </a:r>
+            <a:r>
+              <a:rPr lang="en-US" dirty="0" err="1"/>
+              <a:t>Timewatcher</a:t>
+            </a:r>
+            <a:r>
+              <a:rPr lang="en-US" dirty="0"/>
+              <a:t>, playmer@gmail.com)</a:t>
+            </a:r>
+          </a:p>
+          <a:p>
+            <a:r>
+              <a:rPr lang="en-US" dirty="0"/>
+              <a:t>Joshua Shlemmer (@</a:t>
+            </a:r>
+            <a:r>
+              <a:rPr lang="en-US" dirty="0" err="1"/>
+              <a:t>joshshlemmer</a:t>
+            </a:r>
+            <a:r>
+              <a:rPr lang="en-US" dirty="0"/>
+              <a:t>, joshua.shlemmer@digipen.edu)</a:t>
             </a:r>
           </a:p>
         </p:txBody>
@@ -7466,7 +8566,7 @@
     </p:spTree>
     <p:extLst>
       <p:ext uri="{BB962C8B-B14F-4D97-AF65-F5344CB8AC3E}">
-        <p14:creationId xmlns:p14="http://schemas.microsoft.com/office/powerpoint/2010/main" val="1842934418"/>
+        <p14:creationId xmlns:p14="http://schemas.microsoft.com/office/powerpoint/2010/main" val="2758591046"/>
       </p:ext>
     </p:extLst>
   </p:cSld>
@@ -7588,10 +8688,359 @@
           </a:p>
         </p:txBody>
       </p:sp>
+      <p:pic>
+        <p:nvPicPr>
+          <p:cNvPr id="9" name="Picture 8">
+            <a:extLst>
+              <a:ext uri="{FF2B5EF4-FFF2-40B4-BE49-F238E27FC236}">
+                <a16:creationId xmlns:a16="http://schemas.microsoft.com/office/drawing/2014/main" id="{6CDEFCC2-B9C3-4320-8A36-CB7BCD5D67A1}"/>
+              </a:ext>
+            </a:extLst>
+          </p:cNvPr>
+          <p:cNvPicPr>
+            <a:picLocks noChangeAspect="1"/>
+          </p:cNvPicPr>
+          <p:nvPr/>
+        </p:nvPicPr>
+        <p:blipFill>
+          <a:blip r:embed="rId2">
+            <a:extLst>
+              <a:ext uri="{28A0092B-C50C-407E-A947-70E740481C1C}">
+                <a14:useLocalDpi xmlns:a14="http://schemas.microsoft.com/office/drawing/2010/main" val="0"/>
+              </a:ext>
+            </a:extLst>
+          </a:blip>
+          <a:stretch>
+            <a:fillRect/>
+          </a:stretch>
+        </p:blipFill>
+        <p:spPr>
+          <a:xfrm>
+            <a:off x="10044112" y="1357312"/>
+            <a:ext cx="1857375" cy="1857375"/>
+          </a:xfrm>
+          <a:prstGeom prst="rect">
+            <a:avLst/>
+          </a:prstGeom>
+        </p:spPr>
+      </p:pic>
+      <p:pic>
+        <p:nvPicPr>
+          <p:cNvPr id="14" name="Picture 13">
+            <a:extLst>
+              <a:ext uri="{FF2B5EF4-FFF2-40B4-BE49-F238E27FC236}">
+                <a16:creationId xmlns:a16="http://schemas.microsoft.com/office/drawing/2014/main" id="{6EDE8F24-68DE-4C6F-9976-DEF697DEE809}"/>
+              </a:ext>
+            </a:extLst>
+          </p:cNvPr>
+          <p:cNvPicPr>
+            <a:picLocks noChangeAspect="1"/>
+          </p:cNvPicPr>
+          <p:nvPr/>
+        </p:nvPicPr>
+        <p:blipFill>
+          <a:blip r:embed="rId3">
+            <a:extLst>
+              <a:ext uri="{28A0092B-C50C-407E-A947-70E740481C1C}">
+                <a14:useLocalDpi xmlns:a14="http://schemas.microsoft.com/office/drawing/2010/main" val="0"/>
+              </a:ext>
+            </a:extLst>
+          </a:blip>
+          <a:stretch>
+            <a:fillRect/>
+          </a:stretch>
+        </p:blipFill>
+        <p:spPr>
+          <a:xfrm>
+            <a:off x="8615217" y="3691006"/>
+            <a:ext cx="1428895" cy="1809682"/>
+          </a:xfrm>
+          <a:prstGeom prst="rect">
+            <a:avLst/>
+          </a:prstGeom>
+        </p:spPr>
+      </p:pic>
     </p:spTree>
     <p:extLst>
       <p:ext uri="{BB962C8B-B14F-4D97-AF65-F5344CB8AC3E}">
         <p14:creationId xmlns:p14="http://schemas.microsoft.com/office/powerpoint/2010/main" val="1375849409"/>
+      </p:ext>
+    </p:extLst>
+  </p:cSld>
+  <p:clrMapOvr>
+    <a:masterClrMapping/>
+  </p:clrMapOvr>
+</p:sld>
+</file>
+
+<file path=ppt/slides/slide30.xml><?xml version="1.0" encoding="utf-8"?>
+<p:sld xmlns:a="http://schemas.openxmlformats.org/drawingml/2006/main" xmlns:r="http://schemas.openxmlformats.org/officeDocument/2006/relationships" xmlns:p="http://schemas.openxmlformats.org/presentationml/2006/main">
+  <p:cSld>
+    <p:spTree>
+      <p:nvGrpSpPr>
+        <p:cNvPr id="1" name=""/>
+        <p:cNvGrpSpPr/>
+        <p:nvPr/>
+      </p:nvGrpSpPr>
+      <p:grpSpPr>
+        <a:xfrm>
+          <a:off x="0" y="0"/>
+          <a:ext cx="0" cy="0"/>
+          <a:chOff x="0" y="0"/>
+          <a:chExt cx="0" cy="0"/>
+        </a:xfrm>
+      </p:grpSpPr>
+      <p:sp>
+        <p:nvSpPr>
+          <p:cNvPr id="2" name="Title 1">
+            <a:extLst>
+              <a:ext uri="{FF2B5EF4-FFF2-40B4-BE49-F238E27FC236}">
+                <a16:creationId xmlns:a16="http://schemas.microsoft.com/office/drawing/2014/main" id="{B489D53A-804D-4F91-B68D-0A5631447FC2}"/>
+              </a:ext>
+            </a:extLst>
+          </p:cNvPr>
+          <p:cNvSpPr>
+            <a:spLocks noGrp="1"/>
+          </p:cNvSpPr>
+          <p:nvPr>
+            <p:ph type="title"/>
+          </p:nvPr>
+        </p:nvSpPr>
+        <p:spPr>
+          <a:xfrm>
+            <a:off x="1066800" y="2703621"/>
+            <a:ext cx="10058400" cy="1450757"/>
+          </a:xfrm>
+        </p:spPr>
+        <p:txBody>
+          <a:bodyPr anchor="ctr">
+            <a:normAutofit/>
+          </a:bodyPr>
+          <a:lstStyle/>
+          <a:p>
+            <a:pPr algn="ctr"/>
+            <a:r>
+              <a:rPr lang="en-US" sz="6600" dirty="0"/>
+              <a:t>Thank you!</a:t>
+            </a:r>
+          </a:p>
+        </p:txBody>
+      </p:sp>
+      <p:pic>
+        <p:nvPicPr>
+          <p:cNvPr id="4" name="Graphic 3" descr="Streamers">
+            <a:extLst>
+              <a:ext uri="{FF2B5EF4-FFF2-40B4-BE49-F238E27FC236}">
+                <a16:creationId xmlns:a16="http://schemas.microsoft.com/office/drawing/2014/main" id="{0B85D653-AB3C-41D3-8D2B-F706B57E0264}"/>
+              </a:ext>
+            </a:extLst>
+          </p:cNvPr>
+          <p:cNvPicPr>
+            <a:picLocks noChangeAspect="1"/>
+          </p:cNvPicPr>
+          <p:nvPr/>
+        </p:nvPicPr>
+        <p:blipFill>
+          <a:blip r:embed="rId2">
+            <a:extLst>
+              <a:ext uri="{28A0092B-C50C-407E-A947-70E740481C1C}">
+                <a14:useLocalDpi xmlns:a14="http://schemas.microsoft.com/office/drawing/2010/main" val="0"/>
+              </a:ext>
+              <a:ext uri="{96DAC541-7B7A-43D3-8B79-37D633B846F1}">
+                <asvg:svgBlip xmlns:asvg="http://schemas.microsoft.com/office/drawing/2016/SVG/main" r:embed="rId3"/>
+              </a:ext>
+            </a:extLst>
+          </a:blip>
+          <a:stretch>
+            <a:fillRect/>
+          </a:stretch>
+        </p:blipFill>
+        <p:spPr>
+          <a:xfrm>
+            <a:off x="2743200" y="2943822"/>
+            <a:ext cx="914400" cy="914400"/>
+          </a:xfrm>
+          <a:prstGeom prst="rect">
+            <a:avLst/>
+          </a:prstGeom>
+        </p:spPr>
+      </p:pic>
+      <p:pic>
+        <p:nvPicPr>
+          <p:cNvPr id="6" name="Graphic 5" descr="Dance">
+            <a:extLst>
+              <a:ext uri="{FF2B5EF4-FFF2-40B4-BE49-F238E27FC236}">
+                <a16:creationId xmlns:a16="http://schemas.microsoft.com/office/drawing/2014/main" id="{D2D6EE1F-9513-4ED8-95D6-20388EA67DA2}"/>
+              </a:ext>
+            </a:extLst>
+          </p:cNvPr>
+          <p:cNvPicPr>
+            <a:picLocks noChangeAspect="1"/>
+          </p:cNvPicPr>
+          <p:nvPr/>
+        </p:nvPicPr>
+        <p:blipFill>
+          <a:blip r:embed="rId4">
+            <a:extLst>
+              <a:ext uri="{28A0092B-C50C-407E-A947-70E740481C1C}">
+                <a14:useLocalDpi xmlns:a14="http://schemas.microsoft.com/office/drawing/2010/main" val="0"/>
+              </a:ext>
+              <a:ext uri="{96DAC541-7B7A-43D3-8B79-37D633B846F1}">
+                <asvg:svgBlip xmlns:asvg="http://schemas.microsoft.com/office/drawing/2016/SVG/main" r:embed="rId5"/>
+              </a:ext>
+            </a:extLst>
+          </a:blip>
+          <a:stretch>
+            <a:fillRect/>
+          </a:stretch>
+        </p:blipFill>
+        <p:spPr>
+          <a:xfrm>
+            <a:off x="4965699" y="4255977"/>
+            <a:ext cx="2535768" cy="2535768"/>
+          </a:xfrm>
+          <a:prstGeom prst="rect">
+            <a:avLst/>
+          </a:prstGeom>
+        </p:spPr>
+      </p:pic>
+      <p:pic>
+        <p:nvPicPr>
+          <p:cNvPr id="9" name="Graphic 8" descr="Streamers">
+            <a:extLst>
+              <a:ext uri="{FF2B5EF4-FFF2-40B4-BE49-F238E27FC236}">
+                <a16:creationId xmlns:a16="http://schemas.microsoft.com/office/drawing/2014/main" id="{23D5DBA4-9DB8-43BC-9ED4-D8C9572B82CA}"/>
+              </a:ext>
+            </a:extLst>
+          </p:cNvPr>
+          <p:cNvPicPr>
+            <a:picLocks noChangeAspect="1"/>
+          </p:cNvPicPr>
+          <p:nvPr/>
+        </p:nvPicPr>
+        <p:blipFill>
+          <a:blip r:embed="rId2">
+            <a:extLst>
+              <a:ext uri="{28A0092B-C50C-407E-A947-70E740481C1C}">
+                <a14:useLocalDpi xmlns:a14="http://schemas.microsoft.com/office/drawing/2010/main" val="0"/>
+              </a:ext>
+              <a:ext uri="{96DAC541-7B7A-43D3-8B79-37D633B846F1}">
+                <asvg:svgBlip xmlns:asvg="http://schemas.microsoft.com/office/drawing/2016/SVG/main" r:embed="rId3"/>
+              </a:ext>
+            </a:extLst>
+          </a:blip>
+          <a:stretch>
+            <a:fillRect/>
+          </a:stretch>
+        </p:blipFill>
+        <p:spPr>
+          <a:xfrm>
+            <a:off x="8534402" y="3018822"/>
+            <a:ext cx="914400" cy="914400"/>
+          </a:xfrm>
+          <a:prstGeom prst="rect">
+            <a:avLst/>
+          </a:prstGeom>
+        </p:spPr>
+      </p:pic>
+      <p:pic>
+        <p:nvPicPr>
+          <p:cNvPr id="10" name="Picture 4" descr="https://pbs.twimg.com/profile_images/976588952399372288/7aafNen5_400x400.jpg">
+            <a:extLst>
+              <a:ext uri="{FF2B5EF4-FFF2-40B4-BE49-F238E27FC236}">
+                <a16:creationId xmlns:a16="http://schemas.microsoft.com/office/drawing/2014/main" id="{950AB3A9-A13C-4CDB-80C1-8588410A78F6}"/>
+              </a:ext>
+            </a:extLst>
+          </p:cNvPr>
+          <p:cNvPicPr>
+            <a:picLocks noChangeAspect="1" noChangeArrowheads="1"/>
+          </p:cNvPicPr>
+          <p:nvPr/>
+        </p:nvPicPr>
+        <p:blipFill>
+          <a:blip r:embed="rId6">
+            <a:extLst>
+              <a:ext uri="{28A0092B-C50C-407E-A947-70E740481C1C}">
+                <a14:useLocalDpi xmlns:a14="http://schemas.microsoft.com/office/drawing/2010/main" val="0"/>
+              </a:ext>
+            </a:extLst>
+          </a:blip>
+          <a:srcRect/>
+          <a:stretch>
+            <a:fillRect/>
+          </a:stretch>
+        </p:blipFill>
+        <p:spPr bwMode="auto">
+          <a:xfrm rot="20946675">
+            <a:off x="6426197" y="4416845"/>
+            <a:ext cx="576910" cy="576910"/>
+          </a:xfrm>
+          <a:prstGeom prst="rect">
+            <a:avLst/>
+          </a:prstGeom>
+          <a:noFill/>
+          <a:extLst>
+            <a:ext uri="{909E8E84-426E-40DD-AFC4-6F175D3DCCD1}">
+              <a14:hiddenFill xmlns:a14="http://schemas.microsoft.com/office/drawing/2010/main">
+                <a:solidFill>
+                  <a:srgbClr val="FFFFFF"/>
+                </a:solidFill>
+              </a14:hiddenFill>
+            </a:ext>
+          </a:extLst>
+        </p:spPr>
+      </p:pic>
+      <p:pic>
+        <p:nvPicPr>
+          <p:cNvPr id="11" name="Picture 2" descr="https://pbs.twimg.com/profile_images/715076514749030400/Z7xk2GU4_400x400.jpg">
+            <a:extLst>
+              <a:ext uri="{FF2B5EF4-FFF2-40B4-BE49-F238E27FC236}">
+                <a16:creationId xmlns:a16="http://schemas.microsoft.com/office/drawing/2014/main" id="{9A3690BA-9963-4691-B00C-3BF19B1347C8}"/>
+              </a:ext>
+            </a:extLst>
+          </p:cNvPr>
+          <p:cNvPicPr>
+            <a:picLocks noChangeAspect="1" noChangeArrowheads="1"/>
+          </p:cNvPicPr>
+          <p:nvPr/>
+        </p:nvPicPr>
+        <p:blipFill>
+          <a:blip r:embed="rId7">
+            <a:extLst>
+              <a:ext uri="{28A0092B-C50C-407E-A947-70E740481C1C}">
+                <a14:useLocalDpi xmlns:a14="http://schemas.microsoft.com/office/drawing/2010/main" val="0"/>
+              </a:ext>
+            </a:extLst>
+          </a:blip>
+          <a:srcRect/>
+          <a:stretch>
+            <a:fillRect/>
+          </a:stretch>
+        </p:blipFill>
+        <p:spPr bwMode="auto">
+          <a:xfrm rot="532015">
+            <a:off x="5450998" y="4705300"/>
+            <a:ext cx="576909" cy="576909"/>
+          </a:xfrm>
+          <a:prstGeom prst="rect">
+            <a:avLst/>
+          </a:prstGeom>
+          <a:noFill/>
+          <a:extLst>
+            <a:ext uri="{909E8E84-426E-40DD-AFC4-6F175D3DCCD1}">
+              <a14:hiddenFill xmlns:a14="http://schemas.microsoft.com/office/drawing/2010/main">
+                <a:solidFill>
+                  <a:srgbClr val="FFFFFF"/>
+                </a:solidFill>
+              </a14:hiddenFill>
+            </a:ext>
+          </a:extLst>
+        </p:spPr>
+      </p:pic>
+    </p:spTree>
+    <p:extLst>
+      <p:ext uri="{BB962C8B-B14F-4D97-AF65-F5344CB8AC3E}">
+        <p14:creationId xmlns:p14="http://schemas.microsoft.com/office/powerpoint/2010/main" val="1842934418"/>
       </p:ext>
     </p:extLst>
   </p:cSld>
@@ -7718,6 +9167,78 @@
           </a:p>
         </p:txBody>
       </p:sp>
+      <p:pic>
+        <p:nvPicPr>
+          <p:cNvPr id="5" name="Picture 4">
+            <a:extLst>
+              <a:ext uri="{FF2B5EF4-FFF2-40B4-BE49-F238E27FC236}">
+                <a16:creationId xmlns:a16="http://schemas.microsoft.com/office/drawing/2014/main" id="{91E3A566-2D2A-48EF-B07D-B3CC1EF8DE67}"/>
+              </a:ext>
+            </a:extLst>
+          </p:cNvPr>
+          <p:cNvPicPr>
+            <a:picLocks noChangeAspect="1"/>
+          </p:cNvPicPr>
+          <p:nvPr/>
+        </p:nvPicPr>
+        <p:blipFill>
+          <a:blip r:embed="rId3">
+            <a:extLst>
+              <a:ext uri="{28A0092B-C50C-407E-A947-70E740481C1C}">
+                <a14:useLocalDpi xmlns:a14="http://schemas.microsoft.com/office/drawing/2010/main" val="0"/>
+              </a:ext>
+            </a:extLst>
+          </a:blip>
+          <a:stretch>
+            <a:fillRect/>
+          </a:stretch>
+        </p:blipFill>
+        <p:spPr>
+          <a:xfrm>
+            <a:off x="10342563" y="1320600"/>
+            <a:ext cx="955674" cy="955674"/>
+          </a:xfrm>
+          <a:prstGeom prst="rect">
+            <a:avLst/>
+          </a:prstGeom>
+        </p:spPr>
+      </p:pic>
+      <p:pic>
+        <p:nvPicPr>
+          <p:cNvPr id="6" name="Picture 5">
+            <a:extLst>
+              <a:ext uri="{FF2B5EF4-FFF2-40B4-BE49-F238E27FC236}">
+                <a16:creationId xmlns:a16="http://schemas.microsoft.com/office/drawing/2014/main" id="{87A5B784-3643-4EB1-9221-DC4CFA9D0C07}"/>
+              </a:ext>
+            </a:extLst>
+          </p:cNvPr>
+          <p:cNvPicPr>
+            <a:picLocks noChangeAspect="1"/>
+          </p:cNvPicPr>
+          <p:nvPr/>
+        </p:nvPicPr>
+        <p:blipFill>
+          <a:blip r:embed="rId4">
+            <a:extLst>
+              <a:ext uri="{28A0092B-C50C-407E-A947-70E740481C1C}">
+                <a14:useLocalDpi xmlns:a14="http://schemas.microsoft.com/office/drawing/2010/main" val="0"/>
+              </a:ext>
+            </a:extLst>
+          </a:blip>
+          <a:stretch>
+            <a:fillRect/>
+          </a:stretch>
+        </p:blipFill>
+        <p:spPr>
+          <a:xfrm>
+            <a:off x="8968772" y="1783999"/>
+            <a:ext cx="1851628" cy="1047750"/>
+          </a:xfrm>
+          <a:prstGeom prst="rect">
+            <a:avLst/>
+          </a:prstGeom>
+        </p:spPr>
+      </p:pic>
     </p:spTree>
     <p:extLst>
       <p:ext uri="{BB962C8B-B14F-4D97-AF65-F5344CB8AC3E}">
@@ -8366,7 +9887,7 @@
         </p:blipFill>
         <p:spPr>
           <a:xfrm>
-            <a:off x="9121172" y="381000"/>
+            <a:off x="10046986" y="381000"/>
             <a:ext cx="1851628" cy="1047750"/>
           </a:xfrm>
           <a:prstGeom prst="rect">

</xml_diff>

<commit_message>
Copied over the changes Josu made to the newest version of the slides.
</commit_message>
<xml_diff>
--- a/PreBuild Systems.pptx
+++ b/PreBuild Systems.pptx
@@ -226,7 +226,7 @@
           <a:p>
             <a:fld id="{70F6FF9A-81B4-4162-AD96-D5958648E4E9}" type="datetimeFigureOut">
               <a:rPr lang="en-US" smtClean="0"/>
-              <a:t>7/10/2018</a:t>
+              <a:t>7/11/2018</a:t>
             </a:fld>
             <a:endParaRPr lang="en-US"/>
           </a:p>
@@ -836,7 +836,7 @@
           <a:p>
             <a:fld id="{78BCEC26-79C5-4FF5-83A1-CBBD9A11ECDD}" type="datetimeFigureOut">
               <a:rPr lang="en-US" smtClean="0"/>
-              <a:t>7/10/2018</a:t>
+              <a:t>7/11/2018</a:t>
             </a:fld>
             <a:endParaRPr lang="en-US"/>
           </a:p>
@@ -1166,7 +1166,7 @@
           <a:p>
             <a:fld id="{78BCEC26-79C5-4FF5-83A1-CBBD9A11ECDD}" type="datetimeFigureOut">
               <a:rPr lang="en-US" smtClean="0"/>
-              <a:t>7/10/2018</a:t>
+              <a:t>7/11/2018</a:t>
             </a:fld>
             <a:endParaRPr lang="en-US"/>
           </a:p>
@@ -1346,7 +1346,7 @@
           <a:p>
             <a:fld id="{78BCEC26-79C5-4FF5-83A1-CBBD9A11ECDD}" type="datetimeFigureOut">
               <a:rPr lang="en-US" smtClean="0"/>
-              <a:t>7/10/2018</a:t>
+              <a:t>7/11/2018</a:t>
             </a:fld>
             <a:endParaRPr lang="en-US"/>
           </a:p>
@@ -1516,7 +1516,7 @@
           <a:p>
             <a:fld id="{78BCEC26-79C5-4FF5-83A1-CBBD9A11ECDD}" type="datetimeFigureOut">
               <a:rPr lang="en-US" smtClean="0"/>
-              <a:t>7/10/2018</a:t>
+              <a:t>7/11/2018</a:t>
             </a:fld>
             <a:endParaRPr lang="en-US"/>
           </a:p>
@@ -1793,7 +1793,7 @@
           <a:p>
             <a:fld id="{78BCEC26-79C5-4FF5-83A1-CBBD9A11ECDD}" type="datetimeFigureOut">
               <a:rPr lang="en-US" smtClean="0"/>
-              <a:t>7/10/2018</a:t>
+              <a:t>7/11/2018</a:t>
             </a:fld>
             <a:endParaRPr lang="en-US"/>
           </a:p>
@@ -2187,7 +2187,7 @@
           <a:p>
             <a:fld id="{78BCEC26-79C5-4FF5-83A1-CBBD9A11ECDD}" type="datetimeFigureOut">
               <a:rPr lang="en-US" smtClean="0"/>
-              <a:t>7/10/2018</a:t>
+              <a:t>7/11/2018</a:t>
             </a:fld>
             <a:endParaRPr lang="en-US"/>
           </a:p>
@@ -2664,7 +2664,7 @@
           <a:p>
             <a:fld id="{78BCEC26-79C5-4FF5-83A1-CBBD9A11ECDD}" type="datetimeFigureOut">
               <a:rPr lang="en-US" smtClean="0"/>
-              <a:t>7/10/2018</a:t>
+              <a:t>7/11/2018</a:t>
             </a:fld>
             <a:endParaRPr lang="en-US"/>
           </a:p>
@@ -2782,7 +2782,7 @@
           <a:p>
             <a:fld id="{78BCEC26-79C5-4FF5-83A1-CBBD9A11ECDD}" type="datetimeFigureOut">
               <a:rPr lang="en-US" smtClean="0"/>
-              <a:t>7/10/2018</a:t>
+              <a:t>7/11/2018</a:t>
             </a:fld>
             <a:endParaRPr lang="en-US"/>
           </a:p>
@@ -2877,7 +2877,7 @@
           <a:p>
             <a:fld id="{78BCEC26-79C5-4FF5-83A1-CBBD9A11ECDD}" type="datetimeFigureOut">
               <a:rPr lang="en-US" smtClean="0"/>
-              <a:t>7/10/2018</a:t>
+              <a:t>7/11/2018</a:t>
             </a:fld>
             <a:endParaRPr lang="en-US"/>
           </a:p>
@@ -3223,7 +3223,7 @@
           <a:p>
             <a:fld id="{78BCEC26-79C5-4FF5-83A1-CBBD9A11ECDD}" type="datetimeFigureOut">
               <a:rPr lang="en-US" smtClean="0"/>
-              <a:t>7/10/2018</a:t>
+              <a:t>7/11/2018</a:t>
             </a:fld>
             <a:endParaRPr lang="en-US"/>
           </a:p>
@@ -3611,7 +3611,7 @@
           <a:p>
             <a:fld id="{78BCEC26-79C5-4FF5-83A1-CBBD9A11ECDD}" type="datetimeFigureOut">
               <a:rPr lang="en-US" smtClean="0"/>
-              <a:t>7/10/2018</a:t>
+              <a:t>7/11/2018</a:t>
             </a:fld>
             <a:endParaRPr lang="en-US"/>
           </a:p>
@@ -3889,7 +3889,7 @@
           <a:p>
             <a:fld id="{78BCEC26-79C5-4FF5-83A1-CBBD9A11ECDD}" type="datetimeFigureOut">
               <a:rPr lang="en-US" smtClean="0"/>
-              <a:t>7/10/2018</a:t>
+              <a:t>7/11/2018</a:t>
             </a:fld>
             <a:endParaRPr lang="en-US"/>
           </a:p>
@@ -4873,10 +4873,10 @@
       </p:sp>
       <p:pic>
         <p:nvPicPr>
-          <p:cNvPr id="5" name="Picture 4">
+          <p:cNvPr id="6" name="Graphic 5" descr="Crying Face with Solid Fill">
             <a:extLst>
               <a:ext uri="{FF2B5EF4-FFF2-40B4-BE49-F238E27FC236}">
-                <a16:creationId xmlns:a16="http://schemas.microsoft.com/office/drawing/2014/main" id="{6489D208-52B6-42D8-8D0F-58887DBB38E3}"/>
+                <a16:creationId xmlns:a16="http://schemas.microsoft.com/office/drawing/2014/main" id="{94B6E006-2C16-45E7-A86F-D2AA316BB574}"/>
               </a:ext>
             </a:extLst>
           </p:cNvPr>
@@ -4891,6 +4891,9 @@
               <a:ext uri="{28A0092B-C50C-407E-A947-70E740481C1C}">
                 <a14:useLocalDpi xmlns:a14="http://schemas.microsoft.com/office/drawing/2010/main" val="0"/>
               </a:ext>
+              <a:ext uri="{96DAC541-7B7A-43D3-8B79-37D633B846F1}">
+                <asvg:svgBlip xmlns:asvg="http://schemas.microsoft.com/office/drawing/2016/SVG/main" r:embed="rId3"/>
+              </a:ext>
             </a:extLst>
           </a:blip>
           <a:stretch>
@@ -4899,8 +4902,8 @@
         </p:blipFill>
         <p:spPr>
           <a:xfrm>
-            <a:off x="3578691" y="4574032"/>
-            <a:ext cx="3121152" cy="2078736"/>
+            <a:off x="5058833" y="4546600"/>
+            <a:ext cx="2074333" cy="2074333"/>
           </a:xfrm>
           <a:prstGeom prst="rect">
             <a:avLst/>
@@ -5142,7 +5145,12 @@
             <p:ph idx="1"/>
           </p:nvPr>
         </p:nvSpPr>
-        <p:spPr/>
+        <p:spPr>
+          <a:xfrm>
+            <a:off x="1371600" y="2286000"/>
+            <a:ext cx="9601200" cy="3581400"/>
+          </a:xfrm>
+        </p:spPr>
         <p:txBody>
           <a:bodyPr/>
           <a:lstStyle/>
@@ -5194,42 +5202,6 @@
           </a:p>
         </p:txBody>
       </p:sp>
-      <p:pic>
-        <p:nvPicPr>
-          <p:cNvPr id="5" name="Picture 4">
-            <a:extLst>
-              <a:ext uri="{FF2B5EF4-FFF2-40B4-BE49-F238E27FC236}">
-                <a16:creationId xmlns:a16="http://schemas.microsoft.com/office/drawing/2014/main" id="{EABC0DCF-DAAC-459D-91DA-A93745E82280}"/>
-              </a:ext>
-            </a:extLst>
-          </p:cNvPr>
-          <p:cNvPicPr>
-            <a:picLocks noChangeAspect="1"/>
-          </p:cNvPicPr>
-          <p:nvPr/>
-        </p:nvPicPr>
-        <p:blipFill>
-          <a:blip r:embed="rId2">
-            <a:extLst>
-              <a:ext uri="{28A0092B-C50C-407E-A947-70E740481C1C}">
-                <a14:useLocalDpi xmlns:a14="http://schemas.microsoft.com/office/drawing/2010/main" val="0"/>
-              </a:ext>
-            </a:extLst>
-          </a:blip>
-          <a:stretch>
-            <a:fillRect/>
-          </a:stretch>
-        </p:blipFill>
-        <p:spPr>
-          <a:xfrm>
-            <a:off x="9076267" y="990600"/>
-            <a:ext cx="2438400" cy="1630680"/>
-          </a:xfrm>
-          <a:prstGeom prst="rect">
-            <a:avLst/>
-          </a:prstGeom>
-        </p:spPr>
-      </p:pic>
     </p:spTree>
     <p:extLst>
       <p:ext uri="{BB962C8B-B14F-4D97-AF65-F5344CB8AC3E}">
@@ -6246,10 +6218,10 @@
       </p:sp>
       <p:pic>
         <p:nvPicPr>
-          <p:cNvPr id="7" name="Picture 6">
+          <p:cNvPr id="5" name="Graphic 4" descr="Sad Face with Solid Fill">
             <a:extLst>
               <a:ext uri="{FF2B5EF4-FFF2-40B4-BE49-F238E27FC236}">
-                <a16:creationId xmlns:a16="http://schemas.microsoft.com/office/drawing/2014/main" id="{04BEBDF5-7983-4760-AE00-D6D5C02B1B66}"/>
+                <a16:creationId xmlns:a16="http://schemas.microsoft.com/office/drawing/2014/main" id="{7FB8D53C-22E8-4F6D-9F4E-43DCECBED639}"/>
               </a:ext>
             </a:extLst>
           </p:cNvPr>
@@ -6264,6 +6236,9 @@
               <a:ext uri="{28A0092B-C50C-407E-A947-70E740481C1C}">
                 <a14:useLocalDpi xmlns:a14="http://schemas.microsoft.com/office/drawing/2010/main" val="0"/>
               </a:ext>
+              <a:ext uri="{96DAC541-7B7A-43D3-8B79-37D633B846F1}">
+                <asvg:svgBlip xmlns:asvg="http://schemas.microsoft.com/office/drawing/2016/SVG/main" r:embed="rId3"/>
+              </a:ext>
             </a:extLst>
           </a:blip>
           <a:stretch>
@@ -6272,89 +6247,14 @@
         </p:blipFill>
         <p:spPr>
           <a:xfrm>
-            <a:off x="8986903" y="742951"/>
-            <a:ext cx="2669975" cy="1898649"/>
+            <a:off x="3556000" y="571500"/>
+            <a:ext cx="914400" cy="914400"/>
           </a:xfrm>
           <a:prstGeom prst="rect">
             <a:avLst/>
           </a:prstGeom>
         </p:spPr>
       </p:pic>
-      <p:pic>
-        <p:nvPicPr>
-          <p:cNvPr id="10" name="Picture 9">
-            <a:extLst>
-              <a:ext uri="{FF2B5EF4-FFF2-40B4-BE49-F238E27FC236}">
-                <a16:creationId xmlns:a16="http://schemas.microsoft.com/office/drawing/2014/main" id="{99C09B03-4BF0-4463-B8D8-86A236B24AF5}"/>
-              </a:ext>
-            </a:extLst>
-          </p:cNvPr>
-          <p:cNvPicPr>
-            <a:picLocks noChangeAspect="1"/>
-          </p:cNvPicPr>
-          <p:nvPr/>
-        </p:nvPicPr>
-        <p:blipFill>
-          <a:blip r:embed="rId3">
-            <a:extLst>
-              <a:ext uri="{28A0092B-C50C-407E-A947-70E740481C1C}">
-                <a14:useLocalDpi xmlns:a14="http://schemas.microsoft.com/office/drawing/2010/main" val="0"/>
-              </a:ext>
-            </a:extLst>
-          </a:blip>
-          <a:stretch>
-            <a:fillRect/>
-          </a:stretch>
-        </p:blipFill>
-        <p:spPr>
-          <a:xfrm>
-            <a:off x="5028460" y="558800"/>
-            <a:ext cx="3569494" cy="2082800"/>
-          </a:xfrm>
-          <a:prstGeom prst="rect">
-            <a:avLst/>
-          </a:prstGeom>
-        </p:spPr>
-      </p:pic>
-      <p:sp>
-        <p:nvSpPr>
-          <p:cNvPr id="11" name="TextBox 10">
-            <a:extLst>
-              <a:ext uri="{FF2B5EF4-FFF2-40B4-BE49-F238E27FC236}">
-                <a16:creationId xmlns:a16="http://schemas.microsoft.com/office/drawing/2014/main" id="{D1F00870-42CB-4BCD-9B17-648136D1D26B}"/>
-              </a:ext>
-            </a:extLst>
-          </p:cNvPr>
-          <p:cNvSpPr txBox="1"/>
-          <p:nvPr/>
-        </p:nvSpPr>
-        <p:spPr>
-          <a:xfrm>
-            <a:off x="5376334" y="1916668"/>
-            <a:ext cx="900246" cy="369332"/>
-          </a:xfrm>
-          <a:prstGeom prst="rect">
-            <a:avLst/>
-          </a:prstGeom>
-          <a:noFill/>
-        </p:spPr>
-        <p:txBody>
-          <a:bodyPr wrap="none" rtlCol="0">
-            <a:spAutoFit/>
-          </a:bodyPr>
-          <a:lstStyle/>
-          <a:p>
-            <a:r>
-              <a:rPr lang="en-US" dirty="0">
-                <a:solidFill>
-                  <a:srgbClr val="FFFF00"/>
-                </a:solidFill>
-              </a:rPr>
-              <a:t>macros</a:t>
-            </a:r>
-          </a:p>
-        </p:txBody>
-      </p:sp>
     </p:spTree>
     <p:extLst>
       <p:ext uri="{BB962C8B-B14F-4D97-AF65-F5344CB8AC3E}">
@@ -6608,7 +6508,12 @@
             <p:ph type="title"/>
           </p:nvPr>
         </p:nvSpPr>
-        <p:spPr/>
+        <p:spPr>
+          <a:xfrm>
+            <a:off x="1371600" y="685800"/>
+            <a:ext cx="9601200" cy="1485900"/>
+          </a:xfrm>
+        </p:spPr>
         <p:txBody>
           <a:bodyPr/>
           <a:lstStyle/>
@@ -6683,22 +6588,22 @@
             <a:pPr lvl="1"/>
             <a:r>
               <a:rPr lang="en-US" dirty="0"/>
-              <a:t>No VS for you, sorry fam</a:t>
+              <a:t>No VS for you Cygwin, sorry fam</a:t>
             </a:r>
           </a:p>
         </p:txBody>
       </p:sp>
       <p:pic>
         <p:nvPicPr>
-          <p:cNvPr id="5" name="Picture 4">
+          <p:cNvPr id="2050" name="Picture 2" descr="https://upload.wikimedia.org/wikipedia/commons/7/73/Engine_Generator_Cart.jpg">
             <a:extLst>
               <a:ext uri="{FF2B5EF4-FFF2-40B4-BE49-F238E27FC236}">
-                <a16:creationId xmlns:a16="http://schemas.microsoft.com/office/drawing/2014/main" id="{F5FD321C-25BB-47B4-9B48-47005A613073}"/>
+                <a16:creationId xmlns:a16="http://schemas.microsoft.com/office/drawing/2014/main" id="{1B2185EB-5C81-4F72-9882-969ED5208999}"/>
               </a:ext>
             </a:extLst>
           </p:cNvPr>
           <p:cNvPicPr>
-            <a:picLocks noChangeAspect="1"/>
+            <a:picLocks noChangeAspect="1" noChangeArrowheads="1"/>
           </p:cNvPicPr>
           <p:nvPr/>
         </p:nvPicPr>
@@ -6710,20 +6615,273 @@
               </a:ext>
             </a:extLst>
           </a:blip>
+          <a:srcRect/>
           <a:stretch>
             <a:fillRect/>
           </a:stretch>
         </p:blipFill>
+        <p:spPr bwMode="auto">
+          <a:xfrm>
+            <a:off x="8712200" y="760802"/>
+            <a:ext cx="2414057" cy="1812144"/>
+          </a:xfrm>
+          <a:prstGeom prst="rect">
+            <a:avLst/>
+          </a:prstGeom>
+          <a:noFill/>
+          <a:extLst>
+            <a:ext uri="{909E8E84-426E-40DD-AFC4-6F175D3DCCD1}">
+              <a14:hiddenFill xmlns:a14="http://schemas.microsoft.com/office/drawing/2010/main">
+                <a:solidFill>
+                  <a:srgbClr val="FFFFFF"/>
+                </a:solidFill>
+              </a14:hiddenFill>
+            </a:ext>
+          </a:extLst>
+        </p:spPr>
+      </p:pic>
+      <p:sp>
+        <p:nvSpPr>
+          <p:cNvPr id="6" name="Content Placeholder 2">
+            <a:extLst>
+              <a:ext uri="{FF2B5EF4-FFF2-40B4-BE49-F238E27FC236}">
+                <a16:creationId xmlns:a16="http://schemas.microsoft.com/office/drawing/2014/main" id="{F357E0D0-8616-4879-A9E0-D5872E4B5825}"/>
+              </a:ext>
+            </a:extLst>
+          </p:cNvPr>
+          <p:cNvSpPr txBox="1">
+            <a:spLocks/>
+          </p:cNvSpPr>
+          <p:nvPr/>
+        </p:nvSpPr>
         <p:spPr>
           <a:xfrm>
-            <a:off x="9435570" y="554037"/>
-            <a:ext cx="2143125" cy="2143125"/>
+            <a:off x="9344026" y="6214533"/>
+            <a:ext cx="2847974" cy="558800"/>
           </a:xfrm>
           <a:prstGeom prst="rect">
             <a:avLst/>
           </a:prstGeom>
         </p:spPr>
-      </p:pic>
+        <p:txBody>
+          <a:bodyPr vert="horz" lIns="91440" tIns="45720" rIns="91440" bIns="45720" rtlCol="0">
+            <a:noAutofit/>
+          </a:bodyPr>
+          <a:lstStyle>
+            <a:lvl1pPr marL="384048" indent="-384048" algn="l" defTabSz="914400" rtl="0" eaLnBrk="1" latinLnBrk="0" hangingPunct="1">
+              <a:lnSpc>
+                <a:spcPct val="94000"/>
+              </a:lnSpc>
+              <a:spcBef>
+                <a:spcPts val="1000"/>
+              </a:spcBef>
+              <a:spcAft>
+                <a:spcPts val="200"/>
+              </a:spcAft>
+              <a:buFont typeface="Franklin Gothic Book" panose="020B0503020102020204" pitchFamily="34" charset="0"/>
+              <a:buChar char="■"/>
+              <a:defRPr sz="2000" kern="1200" baseline="0">
+                <a:solidFill>
+                  <a:schemeClr val="tx2"/>
+                </a:solidFill>
+                <a:latin typeface="+mn-lt"/>
+                <a:ea typeface="+mn-ea"/>
+                <a:cs typeface="+mn-cs"/>
+              </a:defRPr>
+            </a:lvl1pPr>
+            <a:lvl2pPr marL="914400" indent="-384048" algn="l" defTabSz="914400" rtl="0" eaLnBrk="1" latinLnBrk="0" hangingPunct="1">
+              <a:lnSpc>
+                <a:spcPct val="94000"/>
+              </a:lnSpc>
+              <a:spcBef>
+                <a:spcPts val="500"/>
+              </a:spcBef>
+              <a:spcAft>
+                <a:spcPts val="200"/>
+              </a:spcAft>
+              <a:buFont typeface="Franklin Gothic Book" panose="020B0503020102020204" pitchFamily="34" charset="0"/>
+              <a:buChar char="–"/>
+              <a:defRPr sz="2000" i="1" kern="1200" baseline="0">
+                <a:solidFill>
+                  <a:schemeClr val="tx2"/>
+                </a:solidFill>
+                <a:latin typeface="+mn-lt"/>
+                <a:ea typeface="+mn-ea"/>
+                <a:cs typeface="+mn-cs"/>
+              </a:defRPr>
+            </a:lvl2pPr>
+            <a:lvl3pPr marL="1371600" indent="-384048" algn="l" defTabSz="914400" rtl="0" eaLnBrk="1" latinLnBrk="0" hangingPunct="1">
+              <a:lnSpc>
+                <a:spcPct val="94000"/>
+              </a:lnSpc>
+              <a:spcBef>
+                <a:spcPts val="500"/>
+              </a:spcBef>
+              <a:spcAft>
+                <a:spcPts val="200"/>
+              </a:spcAft>
+              <a:buFont typeface="Franklin Gothic Book" panose="020B0503020102020204" pitchFamily="34" charset="0"/>
+              <a:buChar char="■"/>
+              <a:defRPr sz="1800" kern="1200" baseline="0">
+                <a:solidFill>
+                  <a:schemeClr val="tx2"/>
+                </a:solidFill>
+                <a:latin typeface="+mn-lt"/>
+                <a:ea typeface="+mn-ea"/>
+                <a:cs typeface="+mn-cs"/>
+              </a:defRPr>
+            </a:lvl3pPr>
+            <a:lvl4pPr marL="1828800" indent="-384048" algn="l" defTabSz="914400" rtl="0" eaLnBrk="1" latinLnBrk="0" hangingPunct="1">
+              <a:lnSpc>
+                <a:spcPct val="94000"/>
+              </a:lnSpc>
+              <a:spcBef>
+                <a:spcPts val="500"/>
+              </a:spcBef>
+              <a:spcAft>
+                <a:spcPts val="200"/>
+              </a:spcAft>
+              <a:buFont typeface="Franklin Gothic Book" panose="020B0503020102020204" pitchFamily="34" charset="0"/>
+              <a:buChar char="–"/>
+              <a:defRPr sz="1800" i="1" kern="1200" baseline="0">
+                <a:solidFill>
+                  <a:schemeClr val="tx2"/>
+                </a:solidFill>
+                <a:latin typeface="+mn-lt"/>
+                <a:ea typeface="+mn-ea"/>
+                <a:cs typeface="+mn-cs"/>
+              </a:defRPr>
+            </a:lvl4pPr>
+            <a:lvl5pPr marL="2286000" indent="-384048" algn="l" defTabSz="914400" rtl="0" eaLnBrk="1" latinLnBrk="0" hangingPunct="1">
+              <a:lnSpc>
+                <a:spcPct val="94000"/>
+              </a:lnSpc>
+              <a:spcBef>
+                <a:spcPts val="500"/>
+              </a:spcBef>
+              <a:spcAft>
+                <a:spcPts val="200"/>
+              </a:spcAft>
+              <a:buFont typeface="Franklin Gothic Book" panose="020B0503020102020204" pitchFamily="34" charset="0"/>
+              <a:buChar char="■"/>
+              <a:defRPr sz="1600" kern="1200" baseline="0">
+                <a:solidFill>
+                  <a:schemeClr val="tx2"/>
+                </a:solidFill>
+                <a:latin typeface="+mn-lt"/>
+                <a:ea typeface="+mn-ea"/>
+                <a:cs typeface="+mn-cs"/>
+              </a:defRPr>
+            </a:lvl5pPr>
+            <a:lvl6pPr marL="2743200" indent="-384048" algn="l" defTabSz="914400" rtl="0" eaLnBrk="1" latinLnBrk="0" hangingPunct="1">
+              <a:lnSpc>
+                <a:spcPct val="94000"/>
+              </a:lnSpc>
+              <a:spcBef>
+                <a:spcPts val="500"/>
+              </a:spcBef>
+              <a:spcAft>
+                <a:spcPts val="200"/>
+              </a:spcAft>
+              <a:buFont typeface="Franklin Gothic Book" panose="020B0503020102020204" pitchFamily="34" charset="0"/>
+              <a:buChar char="–"/>
+              <a:defRPr sz="1600" i="1" kern="1200" baseline="0">
+                <a:solidFill>
+                  <a:schemeClr val="tx2"/>
+                </a:solidFill>
+                <a:latin typeface="+mn-lt"/>
+                <a:ea typeface="+mn-ea"/>
+                <a:cs typeface="+mn-cs"/>
+              </a:defRPr>
+            </a:lvl6pPr>
+            <a:lvl7pPr marL="3200400" indent="-384048" algn="l" defTabSz="914400" rtl="0" eaLnBrk="1" latinLnBrk="0" hangingPunct="1">
+              <a:lnSpc>
+                <a:spcPct val="94000"/>
+              </a:lnSpc>
+              <a:spcBef>
+                <a:spcPts val="500"/>
+              </a:spcBef>
+              <a:spcAft>
+                <a:spcPts val="200"/>
+              </a:spcAft>
+              <a:buFont typeface="Franklin Gothic Book" panose="020B0503020102020204" pitchFamily="34" charset="0"/>
+              <a:buChar char="■"/>
+              <a:defRPr sz="1400" kern="1200" baseline="0">
+                <a:solidFill>
+                  <a:schemeClr val="tx2"/>
+                </a:solidFill>
+                <a:latin typeface="+mn-lt"/>
+                <a:ea typeface="+mn-ea"/>
+                <a:cs typeface="+mn-cs"/>
+              </a:defRPr>
+            </a:lvl7pPr>
+            <a:lvl8pPr marL="3657600" indent="-384048" algn="l" defTabSz="914400" rtl="0" eaLnBrk="1" latinLnBrk="0" hangingPunct="1">
+              <a:lnSpc>
+                <a:spcPct val="94000"/>
+              </a:lnSpc>
+              <a:spcBef>
+                <a:spcPts val="500"/>
+              </a:spcBef>
+              <a:spcAft>
+                <a:spcPts val="200"/>
+              </a:spcAft>
+              <a:buFont typeface="Franklin Gothic Book" panose="020B0503020102020204" pitchFamily="34" charset="0"/>
+              <a:buChar char="–"/>
+              <a:defRPr sz="1400" i="1" kern="1200" baseline="0">
+                <a:solidFill>
+                  <a:schemeClr val="tx2"/>
+                </a:solidFill>
+                <a:latin typeface="+mn-lt"/>
+                <a:ea typeface="+mn-ea"/>
+                <a:cs typeface="+mn-cs"/>
+              </a:defRPr>
+            </a:lvl8pPr>
+            <a:lvl9pPr marL="4114800" indent="-384048" algn="l" defTabSz="914400" rtl="0" eaLnBrk="1" latinLnBrk="0" hangingPunct="1">
+              <a:lnSpc>
+                <a:spcPct val="94000"/>
+              </a:lnSpc>
+              <a:spcBef>
+                <a:spcPts val="500"/>
+              </a:spcBef>
+              <a:spcAft>
+                <a:spcPts val="200"/>
+              </a:spcAft>
+              <a:buFont typeface="Franklin Gothic Book" panose="020B0503020102020204" pitchFamily="34" charset="0"/>
+              <a:buChar char="■"/>
+              <a:defRPr sz="1400" kern="1200" baseline="0">
+                <a:solidFill>
+                  <a:schemeClr val="tx2"/>
+                </a:solidFill>
+                <a:latin typeface="+mn-lt"/>
+                <a:ea typeface="+mn-ea"/>
+                <a:cs typeface="+mn-cs"/>
+              </a:defRPr>
+            </a:lvl9pPr>
+          </a:lstStyle>
+          <a:p>
+            <a:pPr marL="0" indent="0" algn="r">
+              <a:buNone/>
+            </a:pPr>
+            <a:r>
+              <a:rPr lang="en-US" sz="1100" b="1" dirty="0"/>
+              <a:t>Sources:</a:t>
+            </a:r>
+            <a:br>
+              <a:rPr lang="en-US" sz="1100" dirty="0"/>
+            </a:br>
+            <a:r>
+              <a:rPr lang="en-US" sz="1100" dirty="0">
+                <a:hlinkClick r:id="rId3"/>
+              </a:rPr>
+              <a:t>https://commons.wikimedia.org/wiki/File:Engine_Generator_Cart.jpg</a:t>
+            </a:r>
+            <a:r>
+              <a:rPr lang="en-US" sz="1100" dirty="0"/>
+              <a:t> </a:t>
+            </a:r>
+          </a:p>
+        </p:txBody>
+      </p:sp>
     </p:spTree>
     <p:extLst>
       <p:ext uri="{BB962C8B-B14F-4D97-AF65-F5344CB8AC3E}">
@@ -6756,6 +6914,98 @@
       </p:grpSpPr>
       <p:sp>
         <p:nvSpPr>
+          <p:cNvPr id="13" name="Rectangle 12">
+            <a:extLst>
+              <a:ext uri="{FF2B5EF4-FFF2-40B4-BE49-F238E27FC236}">
+                <a16:creationId xmlns:a16="http://schemas.microsoft.com/office/drawing/2014/main" id="{164D5EAE-873D-4ACA-ACB1-ADEFAC0C11C8}"/>
+              </a:ext>
+            </a:extLst>
+          </p:cNvPr>
+          <p:cNvSpPr/>
+          <p:nvPr/>
+        </p:nvSpPr>
+        <p:spPr>
+          <a:xfrm>
+            <a:off x="10221383" y="1967440"/>
+            <a:ext cx="1312334" cy="1313392"/>
+          </a:xfrm>
+          <a:prstGeom prst="rect">
+            <a:avLst/>
+          </a:prstGeom>
+        </p:spPr>
+        <p:style>
+          <a:lnRef idx="2">
+            <a:schemeClr val="accent1">
+              <a:shade val="50000"/>
+            </a:schemeClr>
+          </a:lnRef>
+          <a:fillRef idx="1">
+            <a:schemeClr val="accent1"/>
+          </a:fillRef>
+          <a:effectRef idx="0">
+            <a:schemeClr val="accent1"/>
+          </a:effectRef>
+          <a:fontRef idx="minor">
+            <a:schemeClr val="lt1"/>
+          </a:fontRef>
+        </p:style>
+        <p:txBody>
+          <a:bodyPr rtlCol="0" anchor="ctr"/>
+          <a:lstStyle/>
+          <a:p>
+            <a:pPr algn="ctr"/>
+            <a:endParaRPr lang="en-US"/>
+          </a:p>
+        </p:txBody>
+      </p:sp>
+      <p:sp>
+        <p:nvSpPr>
+          <p:cNvPr id="7" name="Rectangle 6">
+            <a:extLst>
+              <a:ext uri="{FF2B5EF4-FFF2-40B4-BE49-F238E27FC236}">
+                <a16:creationId xmlns:a16="http://schemas.microsoft.com/office/drawing/2014/main" id="{631D002A-B01A-4260-90DC-BCE14487F58A}"/>
+              </a:ext>
+            </a:extLst>
+          </p:cNvPr>
+          <p:cNvSpPr/>
+          <p:nvPr/>
+        </p:nvSpPr>
+        <p:spPr>
+          <a:xfrm>
+            <a:off x="914399" y="4734453"/>
+            <a:ext cx="1312334" cy="1313392"/>
+          </a:xfrm>
+          <a:prstGeom prst="rect">
+            <a:avLst/>
+          </a:prstGeom>
+        </p:spPr>
+        <p:style>
+          <a:lnRef idx="2">
+            <a:schemeClr val="accent1">
+              <a:shade val="50000"/>
+            </a:schemeClr>
+          </a:lnRef>
+          <a:fillRef idx="1">
+            <a:schemeClr val="accent1"/>
+          </a:fillRef>
+          <a:effectRef idx="0">
+            <a:schemeClr val="accent1"/>
+          </a:effectRef>
+          <a:fontRef idx="minor">
+            <a:schemeClr val="lt1"/>
+          </a:fontRef>
+        </p:style>
+        <p:txBody>
+          <a:bodyPr rtlCol="0" anchor="ctr"/>
+          <a:lstStyle/>
+          <a:p>
+            <a:pPr algn="ctr"/>
+            <a:endParaRPr lang="en-US"/>
+          </a:p>
+        </p:txBody>
+      </p:sp>
+      <p:sp>
+        <p:nvSpPr>
           <p:cNvPr id="2" name="Title 1">
             <a:extLst>
               <a:ext uri="{FF2B5EF4-FFF2-40B4-BE49-F238E27FC236}">
@@ -6803,7 +7053,12 @@
             <p:ph idx="1"/>
           </p:nvPr>
         </p:nvSpPr>
-        <p:spPr/>
+        <p:spPr>
+          <a:xfrm>
+            <a:off x="742950" y="1714500"/>
+            <a:ext cx="9601200" cy="1990724"/>
+          </a:xfrm>
+        </p:spPr>
         <p:txBody>
           <a:bodyPr>
             <a:normAutofit/>
@@ -6811,100 +7066,68 @@
           <a:lstStyle/>
           <a:p>
             <a:r>
-              <a:rPr lang="en-US" dirty="0"/>
+              <a:rPr lang="en-US" sz="1900" dirty="0"/>
               <a:t>Joshua T. Fisher (@</a:t>
             </a:r>
             <a:r>
-              <a:rPr lang="en-US" dirty="0" err="1"/>
+              <a:rPr lang="en-US" sz="1900" dirty="0" err="1"/>
               <a:t>Timewatcher</a:t>
             </a:r>
             <a:r>
-              <a:rPr lang="en-US" dirty="0"/>
+              <a:rPr lang="en-US" sz="1900" dirty="0"/>
               <a:t>, playmer@gmail.com)</a:t>
             </a:r>
           </a:p>
           <a:p>
             <a:pPr lvl="1"/>
             <a:r>
-              <a:rPr lang="en-US" dirty="0"/>
+              <a:rPr lang="en-US" sz="1900" dirty="0"/>
               <a:t>DigiPen (Redmond) Student (Until the end of July)</a:t>
             </a:r>
           </a:p>
           <a:p>
             <a:pPr lvl="1"/>
             <a:r>
-              <a:rPr lang="en-US" dirty="0"/>
+              <a:rPr lang="en-US" sz="1900" dirty="0"/>
               <a:t>Interned and worked on Zero Engine Continuous Integration System (</a:t>
             </a:r>
             <a:r>
-              <a:rPr lang="en-US" dirty="0" err="1"/>
+              <a:rPr lang="en-US" sz="1900" dirty="0" err="1"/>
               <a:t>Buildbot</a:t>
             </a:r>
             <a:r>
-              <a:rPr lang="en-US" dirty="0"/>
+              <a:rPr lang="en-US" sz="1900" dirty="0"/>
               <a:t>)</a:t>
             </a:r>
           </a:p>
           <a:p>
             <a:pPr lvl="1"/>
             <a:r>
-              <a:rPr lang="en-US" dirty="0"/>
+              <a:rPr lang="en-US" sz="1900" dirty="0"/>
               <a:t>Interned at Microsoft</a:t>
             </a:r>
           </a:p>
           <a:p>
             <a:pPr lvl="1"/>
             <a:r>
-              <a:rPr lang="en-US" dirty="0"/>
+              <a:rPr lang="en-US" sz="1900" dirty="0"/>
               <a:t>Starting at Microsoft in August</a:t>
             </a:r>
           </a:p>
           <a:p>
-            <a:r>
-              <a:rPr lang="en-US" dirty="0"/>
-              <a:t>Joshua Shlemmer (@</a:t>
-            </a:r>
-            <a:r>
-              <a:rPr lang="en-US" dirty="0" err="1"/>
-              <a:t>joshshlemmer</a:t>
-            </a:r>
-            <a:r>
-              <a:rPr lang="en-US" dirty="0"/>
-              <a:t>, joshua.shlemmer@digipen.edu)</a:t>
-            </a:r>
-          </a:p>
-          <a:p>
-            <a:pPr lvl="1"/>
-            <a:r>
-              <a:rPr lang="en-US" dirty="0"/>
-              <a:t>Works at DigiPen R&amp;D on Zero Engine</a:t>
-            </a:r>
-          </a:p>
-          <a:p>
-            <a:pPr lvl="1"/>
-            <a:r>
-              <a:rPr lang="en-US" dirty="0"/>
-              <a:t>Converted Zero Engine to CMake.</a:t>
-            </a:r>
-          </a:p>
-          <a:p>
-            <a:pPr lvl="1"/>
-            <a:r>
-              <a:rPr lang="en-US" dirty="0"/>
-              <a:t>Works on Zero Engine’s Documentation Tooling and Continuous Integration.</a:t>
-            </a:r>
-          </a:p>
-          <a:p>
+            <a:pPr marL="0" indent="0">
+              <a:buNone/>
+            </a:pPr>
             <a:endParaRPr lang="en-US" dirty="0"/>
           </a:p>
         </p:txBody>
       </p:sp>
       <p:pic>
         <p:nvPicPr>
-          <p:cNvPr id="1026" name="Picture 2" descr="https://pbs.twimg.com/profile_images/715076514749030400/Z7xk2GU4_400x400.jpg">
+          <p:cNvPr id="1028" name="Picture 4" descr="https://pbs.twimg.com/profile_images/976588952399372288/7aafNen5_400x400.jpg">
             <a:extLst>
               <a:ext uri="{FF2B5EF4-FFF2-40B4-BE49-F238E27FC236}">
-                <a16:creationId xmlns:a16="http://schemas.microsoft.com/office/drawing/2014/main" id="{1F7E13BF-B534-4A9B-832B-850A3F0FCC53}"/>
+                <a16:creationId xmlns:a16="http://schemas.microsoft.com/office/drawing/2014/main" id="{1B33CF67-B2FD-490E-A191-F08E8F98EA3D}"/>
               </a:ext>
             </a:extLst>
           </p:cNvPr>
@@ -6928,7 +7151,7 @@
         </p:blipFill>
         <p:spPr bwMode="auto">
           <a:xfrm>
-            <a:off x="10401300" y="4076700"/>
+            <a:off x="10306050" y="2052636"/>
             <a:ext cx="1143000" cy="1143000"/>
           </a:xfrm>
           <a:prstGeom prst="rect">
@@ -6946,12 +7169,366 @@
           </a:extLst>
         </p:spPr>
       </p:pic>
+      <p:sp>
+        <p:nvSpPr>
+          <p:cNvPr id="6" name="Left Brace 5">
+            <a:extLst>
+              <a:ext uri="{FF2B5EF4-FFF2-40B4-BE49-F238E27FC236}">
+                <a16:creationId xmlns:a16="http://schemas.microsoft.com/office/drawing/2014/main" id="{2C4DFBA0-B8D9-413C-A6E5-B57E8F1CEC9B}"/>
+              </a:ext>
+            </a:extLst>
+          </p:cNvPr>
+          <p:cNvSpPr/>
+          <p:nvPr/>
+        </p:nvSpPr>
+        <p:spPr>
+          <a:xfrm rot="10800000">
+            <a:off x="9440333" y="1543049"/>
+            <a:ext cx="609600" cy="2162175"/>
+          </a:xfrm>
+          <a:prstGeom prst="leftBrace">
+            <a:avLst>
+              <a:gd name="adj1" fmla="val 8333"/>
+              <a:gd name="adj2" fmla="val 49176"/>
+            </a:avLst>
+          </a:prstGeom>
+          <a:ln w="28575"/>
+        </p:spPr>
+        <p:style>
+          <a:lnRef idx="1">
+            <a:schemeClr val="accent1"/>
+          </a:lnRef>
+          <a:fillRef idx="0">
+            <a:schemeClr val="accent1"/>
+          </a:fillRef>
+          <a:effectRef idx="0">
+            <a:schemeClr val="accent1"/>
+          </a:effectRef>
+          <a:fontRef idx="minor">
+            <a:schemeClr val="tx1"/>
+          </a:fontRef>
+        </p:style>
+        <p:txBody>
+          <a:bodyPr rtlCol="0" anchor="ctr"/>
+          <a:lstStyle/>
+          <a:p>
+            <a:pPr algn="ctr"/>
+            <a:endParaRPr lang="en-US"/>
+          </a:p>
+        </p:txBody>
+      </p:sp>
+      <p:sp>
+        <p:nvSpPr>
+          <p:cNvPr id="8" name="Content Placeholder 2">
+            <a:extLst>
+              <a:ext uri="{FF2B5EF4-FFF2-40B4-BE49-F238E27FC236}">
+                <a16:creationId xmlns:a16="http://schemas.microsoft.com/office/drawing/2014/main" id="{AF0185FA-0E19-45D6-A6C7-ADC83642728F}"/>
+              </a:ext>
+            </a:extLst>
+          </p:cNvPr>
+          <p:cNvSpPr txBox="1">
+            <a:spLocks/>
+          </p:cNvSpPr>
+          <p:nvPr/>
+        </p:nvSpPr>
+        <p:spPr>
+          <a:xfrm>
+            <a:off x="2937933" y="4610101"/>
+            <a:ext cx="9601200" cy="1562099"/>
+          </a:xfrm>
+          <a:prstGeom prst="rect">
+            <a:avLst/>
+          </a:prstGeom>
+        </p:spPr>
+        <p:txBody>
+          <a:bodyPr vert="horz" lIns="91440" tIns="45720" rIns="91440" bIns="45720" rtlCol="0">
+            <a:normAutofit/>
+          </a:bodyPr>
+          <a:lstStyle>
+            <a:lvl1pPr marL="384048" indent="-384048" algn="l" defTabSz="914400" rtl="0" eaLnBrk="1" latinLnBrk="0" hangingPunct="1">
+              <a:lnSpc>
+                <a:spcPct val="94000"/>
+              </a:lnSpc>
+              <a:spcBef>
+                <a:spcPts val="1000"/>
+              </a:spcBef>
+              <a:spcAft>
+                <a:spcPts val="200"/>
+              </a:spcAft>
+              <a:buFont typeface="Franklin Gothic Book" panose="020B0503020102020204" pitchFamily="34" charset="0"/>
+              <a:buChar char="■"/>
+              <a:defRPr sz="2000" kern="1200" baseline="0">
+                <a:solidFill>
+                  <a:schemeClr val="tx2"/>
+                </a:solidFill>
+                <a:latin typeface="+mn-lt"/>
+                <a:ea typeface="+mn-ea"/>
+                <a:cs typeface="+mn-cs"/>
+              </a:defRPr>
+            </a:lvl1pPr>
+            <a:lvl2pPr marL="914400" indent="-384048" algn="l" defTabSz="914400" rtl="0" eaLnBrk="1" latinLnBrk="0" hangingPunct="1">
+              <a:lnSpc>
+                <a:spcPct val="94000"/>
+              </a:lnSpc>
+              <a:spcBef>
+                <a:spcPts val="500"/>
+              </a:spcBef>
+              <a:spcAft>
+                <a:spcPts val="200"/>
+              </a:spcAft>
+              <a:buFont typeface="Franklin Gothic Book" panose="020B0503020102020204" pitchFamily="34" charset="0"/>
+              <a:buChar char="–"/>
+              <a:defRPr sz="2000" i="1" kern="1200" baseline="0">
+                <a:solidFill>
+                  <a:schemeClr val="tx2"/>
+                </a:solidFill>
+                <a:latin typeface="+mn-lt"/>
+                <a:ea typeface="+mn-ea"/>
+                <a:cs typeface="+mn-cs"/>
+              </a:defRPr>
+            </a:lvl2pPr>
+            <a:lvl3pPr marL="1371600" indent="-384048" algn="l" defTabSz="914400" rtl="0" eaLnBrk="1" latinLnBrk="0" hangingPunct="1">
+              <a:lnSpc>
+                <a:spcPct val="94000"/>
+              </a:lnSpc>
+              <a:spcBef>
+                <a:spcPts val="500"/>
+              </a:spcBef>
+              <a:spcAft>
+                <a:spcPts val="200"/>
+              </a:spcAft>
+              <a:buFont typeface="Franklin Gothic Book" panose="020B0503020102020204" pitchFamily="34" charset="0"/>
+              <a:buChar char="■"/>
+              <a:defRPr sz="1800" kern="1200" baseline="0">
+                <a:solidFill>
+                  <a:schemeClr val="tx2"/>
+                </a:solidFill>
+                <a:latin typeface="+mn-lt"/>
+                <a:ea typeface="+mn-ea"/>
+                <a:cs typeface="+mn-cs"/>
+              </a:defRPr>
+            </a:lvl3pPr>
+            <a:lvl4pPr marL="1828800" indent="-384048" algn="l" defTabSz="914400" rtl="0" eaLnBrk="1" latinLnBrk="0" hangingPunct="1">
+              <a:lnSpc>
+                <a:spcPct val="94000"/>
+              </a:lnSpc>
+              <a:spcBef>
+                <a:spcPts val="500"/>
+              </a:spcBef>
+              <a:spcAft>
+                <a:spcPts val="200"/>
+              </a:spcAft>
+              <a:buFont typeface="Franklin Gothic Book" panose="020B0503020102020204" pitchFamily="34" charset="0"/>
+              <a:buChar char="–"/>
+              <a:defRPr sz="1800" i="1" kern="1200" baseline="0">
+                <a:solidFill>
+                  <a:schemeClr val="tx2"/>
+                </a:solidFill>
+                <a:latin typeface="+mn-lt"/>
+                <a:ea typeface="+mn-ea"/>
+                <a:cs typeface="+mn-cs"/>
+              </a:defRPr>
+            </a:lvl4pPr>
+            <a:lvl5pPr marL="2286000" indent="-384048" algn="l" defTabSz="914400" rtl="0" eaLnBrk="1" latinLnBrk="0" hangingPunct="1">
+              <a:lnSpc>
+                <a:spcPct val="94000"/>
+              </a:lnSpc>
+              <a:spcBef>
+                <a:spcPts val="500"/>
+              </a:spcBef>
+              <a:spcAft>
+                <a:spcPts val="200"/>
+              </a:spcAft>
+              <a:buFont typeface="Franklin Gothic Book" panose="020B0503020102020204" pitchFamily="34" charset="0"/>
+              <a:buChar char="■"/>
+              <a:defRPr sz="1600" kern="1200" baseline="0">
+                <a:solidFill>
+                  <a:schemeClr val="tx2"/>
+                </a:solidFill>
+                <a:latin typeface="+mn-lt"/>
+                <a:ea typeface="+mn-ea"/>
+                <a:cs typeface="+mn-cs"/>
+              </a:defRPr>
+            </a:lvl5pPr>
+            <a:lvl6pPr marL="2743200" indent="-384048" algn="l" defTabSz="914400" rtl="0" eaLnBrk="1" latinLnBrk="0" hangingPunct="1">
+              <a:lnSpc>
+                <a:spcPct val="94000"/>
+              </a:lnSpc>
+              <a:spcBef>
+                <a:spcPts val="500"/>
+              </a:spcBef>
+              <a:spcAft>
+                <a:spcPts val="200"/>
+              </a:spcAft>
+              <a:buFont typeface="Franklin Gothic Book" panose="020B0503020102020204" pitchFamily="34" charset="0"/>
+              <a:buChar char="–"/>
+              <a:defRPr sz="1600" i="1" kern="1200" baseline="0">
+                <a:solidFill>
+                  <a:schemeClr val="tx2"/>
+                </a:solidFill>
+                <a:latin typeface="+mn-lt"/>
+                <a:ea typeface="+mn-ea"/>
+                <a:cs typeface="+mn-cs"/>
+              </a:defRPr>
+            </a:lvl6pPr>
+            <a:lvl7pPr marL="3200400" indent="-384048" algn="l" defTabSz="914400" rtl="0" eaLnBrk="1" latinLnBrk="0" hangingPunct="1">
+              <a:lnSpc>
+                <a:spcPct val="94000"/>
+              </a:lnSpc>
+              <a:spcBef>
+                <a:spcPts val="500"/>
+              </a:spcBef>
+              <a:spcAft>
+                <a:spcPts val="200"/>
+              </a:spcAft>
+              <a:buFont typeface="Franklin Gothic Book" panose="020B0503020102020204" pitchFamily="34" charset="0"/>
+              <a:buChar char="■"/>
+              <a:defRPr sz="1400" kern="1200" baseline="0">
+                <a:solidFill>
+                  <a:schemeClr val="tx2"/>
+                </a:solidFill>
+                <a:latin typeface="+mn-lt"/>
+                <a:ea typeface="+mn-ea"/>
+                <a:cs typeface="+mn-cs"/>
+              </a:defRPr>
+            </a:lvl7pPr>
+            <a:lvl8pPr marL="3657600" indent="-384048" algn="l" defTabSz="914400" rtl="0" eaLnBrk="1" latinLnBrk="0" hangingPunct="1">
+              <a:lnSpc>
+                <a:spcPct val="94000"/>
+              </a:lnSpc>
+              <a:spcBef>
+                <a:spcPts val="500"/>
+              </a:spcBef>
+              <a:spcAft>
+                <a:spcPts val="200"/>
+              </a:spcAft>
+              <a:buFont typeface="Franklin Gothic Book" panose="020B0503020102020204" pitchFamily="34" charset="0"/>
+              <a:buChar char="–"/>
+              <a:defRPr sz="1400" i="1" kern="1200" baseline="0">
+                <a:solidFill>
+                  <a:schemeClr val="tx2"/>
+                </a:solidFill>
+                <a:latin typeface="+mn-lt"/>
+                <a:ea typeface="+mn-ea"/>
+                <a:cs typeface="+mn-cs"/>
+              </a:defRPr>
+            </a:lvl8pPr>
+            <a:lvl9pPr marL="4114800" indent="-384048" algn="l" defTabSz="914400" rtl="0" eaLnBrk="1" latinLnBrk="0" hangingPunct="1">
+              <a:lnSpc>
+                <a:spcPct val="94000"/>
+              </a:lnSpc>
+              <a:spcBef>
+                <a:spcPts val="500"/>
+              </a:spcBef>
+              <a:spcAft>
+                <a:spcPts val="200"/>
+              </a:spcAft>
+              <a:buFont typeface="Franklin Gothic Book" panose="020B0503020102020204" pitchFamily="34" charset="0"/>
+              <a:buChar char="■"/>
+              <a:defRPr sz="1400" kern="1200" baseline="0">
+                <a:solidFill>
+                  <a:schemeClr val="tx2"/>
+                </a:solidFill>
+                <a:latin typeface="+mn-lt"/>
+                <a:ea typeface="+mn-ea"/>
+                <a:cs typeface="+mn-cs"/>
+              </a:defRPr>
+            </a:lvl9pPr>
+          </a:lstStyle>
+          <a:p>
+            <a:r>
+              <a:rPr lang="en-US" sz="1900" dirty="0"/>
+              <a:t>Joshua Shlemmer (@</a:t>
+            </a:r>
+            <a:r>
+              <a:rPr lang="en-US" sz="1900" dirty="0" err="1"/>
+              <a:t>joshshlemmer</a:t>
+            </a:r>
+            <a:r>
+              <a:rPr lang="en-US" sz="1900" dirty="0"/>
+              <a:t>, joshua.shlemmer@digipen.edu)</a:t>
+            </a:r>
+          </a:p>
+          <a:p>
+            <a:pPr lvl="1"/>
+            <a:r>
+              <a:rPr lang="en-US" sz="1900" dirty="0"/>
+              <a:t>Works at DigiPen R&amp;D on Zero Engine</a:t>
+            </a:r>
+          </a:p>
+          <a:p>
+            <a:pPr lvl="1"/>
+            <a:r>
+              <a:rPr lang="en-US" sz="1900" dirty="0"/>
+              <a:t>Converted Zero Engine to CMake.</a:t>
+            </a:r>
+          </a:p>
+          <a:p>
+            <a:pPr lvl="1"/>
+            <a:r>
+              <a:rPr lang="en-US" sz="1900" dirty="0"/>
+              <a:t>Works on Zero Engine’s Documentation Tooling and Continuous Integration.</a:t>
+            </a:r>
+          </a:p>
+          <a:p>
+            <a:endParaRPr lang="en-US" sz="1900" dirty="0"/>
+          </a:p>
+        </p:txBody>
+      </p:sp>
+      <p:sp>
+        <p:nvSpPr>
+          <p:cNvPr id="9" name="Left Brace 8">
+            <a:extLst>
+              <a:ext uri="{FF2B5EF4-FFF2-40B4-BE49-F238E27FC236}">
+                <a16:creationId xmlns:a16="http://schemas.microsoft.com/office/drawing/2014/main" id="{533881EA-2D88-4469-B5C4-94BEC89F557F}"/>
+              </a:ext>
+            </a:extLst>
+          </p:cNvPr>
+          <p:cNvSpPr/>
+          <p:nvPr/>
+        </p:nvSpPr>
+        <p:spPr>
+          <a:xfrm>
+            <a:off x="2328333" y="4310062"/>
+            <a:ext cx="609600" cy="2162175"/>
+          </a:xfrm>
+          <a:prstGeom prst="leftBrace">
+            <a:avLst>
+              <a:gd name="adj1" fmla="val 8333"/>
+              <a:gd name="adj2" fmla="val 49176"/>
+            </a:avLst>
+          </a:prstGeom>
+          <a:ln w="28575"/>
+        </p:spPr>
+        <p:style>
+          <a:lnRef idx="1">
+            <a:schemeClr val="accent1"/>
+          </a:lnRef>
+          <a:fillRef idx="0">
+            <a:schemeClr val="accent1"/>
+          </a:fillRef>
+          <a:effectRef idx="0">
+            <a:schemeClr val="accent1"/>
+          </a:effectRef>
+          <a:fontRef idx="minor">
+            <a:schemeClr val="tx1"/>
+          </a:fontRef>
+        </p:style>
+        <p:txBody>
+          <a:bodyPr rtlCol="0" anchor="ctr"/>
+          <a:lstStyle/>
+          <a:p>
+            <a:pPr algn="ctr"/>
+            <a:endParaRPr lang="en-US"/>
+          </a:p>
+        </p:txBody>
+      </p:sp>
       <p:pic>
         <p:nvPicPr>
-          <p:cNvPr id="1028" name="Picture 4" descr="https://pbs.twimg.com/profile_images/976588952399372288/7aafNen5_400x400.jpg">
+          <p:cNvPr id="10" name="Picture 2" descr="https://pbs.twimg.com/profile_images/715076514749030400/Z7xk2GU4_400x400.jpg">
             <a:extLst>
               <a:ext uri="{FF2B5EF4-FFF2-40B4-BE49-F238E27FC236}">
-                <a16:creationId xmlns:a16="http://schemas.microsoft.com/office/drawing/2014/main" id="{1B33CF67-B2FD-490E-A191-F08E8F98EA3D}"/>
+                <a16:creationId xmlns:a16="http://schemas.microsoft.com/office/drawing/2014/main" id="{E6CF1780-2DCF-4CAF-A4E5-68C6F604C85F}"/>
               </a:ext>
             </a:extLst>
           </p:cNvPr>
@@ -6975,7 +7552,7 @@
         </p:blipFill>
         <p:spPr bwMode="auto">
           <a:xfrm>
-            <a:off x="10401300" y="1714500"/>
+            <a:off x="999066" y="4819649"/>
             <a:ext cx="1143000" cy="1143000"/>
           </a:xfrm>
           <a:prstGeom prst="rect">
@@ -7565,9 +8142,16 @@
             <p:ph idx="1"/>
           </p:nvPr>
         </p:nvSpPr>
-        <p:spPr/>
-        <p:txBody>
-          <a:bodyPr/>
+        <p:spPr>
+          <a:xfrm>
+            <a:off x="1371600" y="2286000"/>
+            <a:ext cx="9601200" cy="4011128"/>
+          </a:xfrm>
+        </p:spPr>
+        <p:txBody>
+          <a:bodyPr>
+            <a:normAutofit/>
+          </a:bodyPr>
           <a:lstStyle/>
           <a:p>
             <a:r>
@@ -7616,22 +8200,27 @@
             <a:pPr lvl="1"/>
             <a:r>
               <a:rPr lang="en-US" dirty="0"/>
-              <a:t>Oh god please no</a:t>
+              <a:t>WHAT ELDRICH HORROR IS THIS?!?!</a:t>
             </a:r>
           </a:p>
           <a:p>
             <a:pPr lvl="1"/>
             <a:r>
               <a:rPr lang="en-US" dirty="0"/>
-              <a:t>WHAT ELDRICH HORROR IS THIS?!?!</a:t>
+              <a:t>Huh, it works now, this is nice</a:t>
             </a:r>
           </a:p>
           <a:p>
             <a:pPr lvl="1"/>
             <a:r>
               <a:rPr lang="en-US" dirty="0"/>
-              <a:t>Huh, it works now, this is nice</a:t>
-            </a:r>
+              <a:t>CMake is great adding stuff is so easy… as long as I never touch </a:t>
+            </a:r>
+            <a:r>
+              <a:rPr lang="en-US" dirty="0" err="1"/>
+              <a:t>Source_Group</a:t>
+            </a:r>
+            <a:endParaRPr lang="en-US" dirty="0"/>
           </a:p>
           <a:p>
             <a:pPr marL="0" indent="0">
@@ -7677,6 +8266,257 @@
           </a:prstGeom>
         </p:spPr>
       </p:pic>
+      <p:sp>
+        <p:nvSpPr>
+          <p:cNvPr id="6" name="Content Placeholder 2">
+            <a:extLst>
+              <a:ext uri="{FF2B5EF4-FFF2-40B4-BE49-F238E27FC236}">
+                <a16:creationId xmlns:a16="http://schemas.microsoft.com/office/drawing/2014/main" id="{7D4A01E7-3195-4F07-B28B-B0A9B8541F6E}"/>
+              </a:ext>
+            </a:extLst>
+          </p:cNvPr>
+          <p:cNvSpPr txBox="1">
+            <a:spLocks/>
+          </p:cNvSpPr>
+          <p:nvPr/>
+        </p:nvSpPr>
+        <p:spPr>
+          <a:xfrm>
+            <a:off x="9344026" y="5983860"/>
+            <a:ext cx="2847974" cy="874139"/>
+          </a:xfrm>
+          <a:prstGeom prst="rect">
+            <a:avLst/>
+          </a:prstGeom>
+        </p:spPr>
+        <p:txBody>
+          <a:bodyPr vert="horz" lIns="91440" tIns="45720" rIns="91440" bIns="45720" rtlCol="0">
+            <a:noAutofit/>
+          </a:bodyPr>
+          <a:lstStyle>
+            <a:lvl1pPr marL="384048" indent="-384048" algn="l" defTabSz="914400" rtl="0" eaLnBrk="1" latinLnBrk="0" hangingPunct="1">
+              <a:lnSpc>
+                <a:spcPct val="94000"/>
+              </a:lnSpc>
+              <a:spcBef>
+                <a:spcPts val="1000"/>
+              </a:spcBef>
+              <a:spcAft>
+                <a:spcPts val="200"/>
+              </a:spcAft>
+              <a:buFont typeface="Franklin Gothic Book" panose="020B0503020102020204" pitchFamily="34" charset="0"/>
+              <a:buChar char="■"/>
+              <a:defRPr sz="2000" kern="1200" baseline="0">
+                <a:solidFill>
+                  <a:schemeClr val="tx2"/>
+                </a:solidFill>
+                <a:latin typeface="+mn-lt"/>
+                <a:ea typeface="+mn-ea"/>
+                <a:cs typeface="+mn-cs"/>
+              </a:defRPr>
+            </a:lvl1pPr>
+            <a:lvl2pPr marL="914400" indent="-384048" algn="l" defTabSz="914400" rtl="0" eaLnBrk="1" latinLnBrk="0" hangingPunct="1">
+              <a:lnSpc>
+                <a:spcPct val="94000"/>
+              </a:lnSpc>
+              <a:spcBef>
+                <a:spcPts val="500"/>
+              </a:spcBef>
+              <a:spcAft>
+                <a:spcPts val="200"/>
+              </a:spcAft>
+              <a:buFont typeface="Franklin Gothic Book" panose="020B0503020102020204" pitchFamily="34" charset="0"/>
+              <a:buChar char="–"/>
+              <a:defRPr sz="2000" i="1" kern="1200" baseline="0">
+                <a:solidFill>
+                  <a:schemeClr val="tx2"/>
+                </a:solidFill>
+                <a:latin typeface="+mn-lt"/>
+                <a:ea typeface="+mn-ea"/>
+                <a:cs typeface="+mn-cs"/>
+              </a:defRPr>
+            </a:lvl2pPr>
+            <a:lvl3pPr marL="1371600" indent="-384048" algn="l" defTabSz="914400" rtl="0" eaLnBrk="1" latinLnBrk="0" hangingPunct="1">
+              <a:lnSpc>
+                <a:spcPct val="94000"/>
+              </a:lnSpc>
+              <a:spcBef>
+                <a:spcPts val="500"/>
+              </a:spcBef>
+              <a:spcAft>
+                <a:spcPts val="200"/>
+              </a:spcAft>
+              <a:buFont typeface="Franklin Gothic Book" panose="020B0503020102020204" pitchFamily="34" charset="0"/>
+              <a:buChar char="■"/>
+              <a:defRPr sz="1800" kern="1200" baseline="0">
+                <a:solidFill>
+                  <a:schemeClr val="tx2"/>
+                </a:solidFill>
+                <a:latin typeface="+mn-lt"/>
+                <a:ea typeface="+mn-ea"/>
+                <a:cs typeface="+mn-cs"/>
+              </a:defRPr>
+            </a:lvl3pPr>
+            <a:lvl4pPr marL="1828800" indent="-384048" algn="l" defTabSz="914400" rtl="0" eaLnBrk="1" latinLnBrk="0" hangingPunct="1">
+              <a:lnSpc>
+                <a:spcPct val="94000"/>
+              </a:lnSpc>
+              <a:spcBef>
+                <a:spcPts val="500"/>
+              </a:spcBef>
+              <a:spcAft>
+                <a:spcPts val="200"/>
+              </a:spcAft>
+              <a:buFont typeface="Franklin Gothic Book" panose="020B0503020102020204" pitchFamily="34" charset="0"/>
+              <a:buChar char="–"/>
+              <a:defRPr sz="1800" i="1" kern="1200" baseline="0">
+                <a:solidFill>
+                  <a:schemeClr val="tx2"/>
+                </a:solidFill>
+                <a:latin typeface="+mn-lt"/>
+                <a:ea typeface="+mn-ea"/>
+                <a:cs typeface="+mn-cs"/>
+              </a:defRPr>
+            </a:lvl4pPr>
+            <a:lvl5pPr marL="2286000" indent="-384048" algn="l" defTabSz="914400" rtl="0" eaLnBrk="1" latinLnBrk="0" hangingPunct="1">
+              <a:lnSpc>
+                <a:spcPct val="94000"/>
+              </a:lnSpc>
+              <a:spcBef>
+                <a:spcPts val="500"/>
+              </a:spcBef>
+              <a:spcAft>
+                <a:spcPts val="200"/>
+              </a:spcAft>
+              <a:buFont typeface="Franklin Gothic Book" panose="020B0503020102020204" pitchFamily="34" charset="0"/>
+              <a:buChar char="■"/>
+              <a:defRPr sz="1600" kern="1200" baseline="0">
+                <a:solidFill>
+                  <a:schemeClr val="tx2"/>
+                </a:solidFill>
+                <a:latin typeface="+mn-lt"/>
+                <a:ea typeface="+mn-ea"/>
+                <a:cs typeface="+mn-cs"/>
+              </a:defRPr>
+            </a:lvl5pPr>
+            <a:lvl6pPr marL="2743200" indent="-384048" algn="l" defTabSz="914400" rtl="0" eaLnBrk="1" latinLnBrk="0" hangingPunct="1">
+              <a:lnSpc>
+                <a:spcPct val="94000"/>
+              </a:lnSpc>
+              <a:spcBef>
+                <a:spcPts val="500"/>
+              </a:spcBef>
+              <a:spcAft>
+                <a:spcPts val="200"/>
+              </a:spcAft>
+              <a:buFont typeface="Franklin Gothic Book" panose="020B0503020102020204" pitchFamily="34" charset="0"/>
+              <a:buChar char="–"/>
+              <a:defRPr sz="1600" i="1" kern="1200" baseline="0">
+                <a:solidFill>
+                  <a:schemeClr val="tx2"/>
+                </a:solidFill>
+                <a:latin typeface="+mn-lt"/>
+                <a:ea typeface="+mn-ea"/>
+                <a:cs typeface="+mn-cs"/>
+              </a:defRPr>
+            </a:lvl6pPr>
+            <a:lvl7pPr marL="3200400" indent="-384048" algn="l" defTabSz="914400" rtl="0" eaLnBrk="1" latinLnBrk="0" hangingPunct="1">
+              <a:lnSpc>
+                <a:spcPct val="94000"/>
+              </a:lnSpc>
+              <a:spcBef>
+                <a:spcPts val="500"/>
+              </a:spcBef>
+              <a:spcAft>
+                <a:spcPts val="200"/>
+              </a:spcAft>
+              <a:buFont typeface="Franklin Gothic Book" panose="020B0503020102020204" pitchFamily="34" charset="0"/>
+              <a:buChar char="■"/>
+              <a:defRPr sz="1400" kern="1200" baseline="0">
+                <a:solidFill>
+                  <a:schemeClr val="tx2"/>
+                </a:solidFill>
+                <a:latin typeface="+mn-lt"/>
+                <a:ea typeface="+mn-ea"/>
+                <a:cs typeface="+mn-cs"/>
+              </a:defRPr>
+            </a:lvl7pPr>
+            <a:lvl8pPr marL="3657600" indent="-384048" algn="l" defTabSz="914400" rtl="0" eaLnBrk="1" latinLnBrk="0" hangingPunct="1">
+              <a:lnSpc>
+                <a:spcPct val="94000"/>
+              </a:lnSpc>
+              <a:spcBef>
+                <a:spcPts val="500"/>
+              </a:spcBef>
+              <a:spcAft>
+                <a:spcPts val="200"/>
+              </a:spcAft>
+              <a:buFont typeface="Franklin Gothic Book" panose="020B0503020102020204" pitchFamily="34" charset="0"/>
+              <a:buChar char="–"/>
+              <a:defRPr sz="1400" i="1" kern="1200" baseline="0">
+                <a:solidFill>
+                  <a:schemeClr val="tx2"/>
+                </a:solidFill>
+                <a:latin typeface="+mn-lt"/>
+                <a:ea typeface="+mn-ea"/>
+                <a:cs typeface="+mn-cs"/>
+              </a:defRPr>
+            </a:lvl8pPr>
+            <a:lvl9pPr marL="4114800" indent="-384048" algn="l" defTabSz="914400" rtl="0" eaLnBrk="1" latinLnBrk="0" hangingPunct="1">
+              <a:lnSpc>
+                <a:spcPct val="94000"/>
+              </a:lnSpc>
+              <a:spcBef>
+                <a:spcPts val="500"/>
+              </a:spcBef>
+              <a:spcAft>
+                <a:spcPts val="200"/>
+              </a:spcAft>
+              <a:buFont typeface="Franklin Gothic Book" panose="020B0503020102020204" pitchFamily="34" charset="0"/>
+              <a:buChar char="■"/>
+              <a:defRPr sz="1400" kern="1200" baseline="0">
+                <a:solidFill>
+                  <a:schemeClr val="tx2"/>
+                </a:solidFill>
+                <a:latin typeface="+mn-lt"/>
+                <a:ea typeface="+mn-ea"/>
+                <a:cs typeface="+mn-cs"/>
+              </a:defRPr>
+            </a:lvl9pPr>
+          </a:lstStyle>
+          <a:p>
+            <a:pPr marL="0" indent="0" algn="r">
+              <a:buNone/>
+            </a:pPr>
+            <a:r>
+              <a:rPr lang="en-US" sz="1100" b="1" dirty="0"/>
+              <a:t>Sources:</a:t>
+            </a:r>
+            <a:br>
+              <a:rPr lang="en-US" sz="1100" dirty="0"/>
+            </a:br>
+            <a:r>
+              <a:rPr lang="en-US" sz="1100" dirty="0">
+                <a:hlinkClick r:id="rId2"/>
+              </a:rPr>
+              <a:t>https://www.zeroengine.io</a:t>
+            </a:r>
+            <a:r>
+              <a:rPr lang="en-US" sz="1100" dirty="0"/>
+              <a:t> </a:t>
+            </a:r>
+          </a:p>
+          <a:p>
+            <a:pPr marL="0" indent="0" algn="r">
+              <a:buNone/>
+            </a:pPr>
+            <a:r>
+              <a:rPr lang="en-US" sz="1100" dirty="0"/>
+              <a:t>…Hey you should totally check it out it’s a dope engine</a:t>
+            </a:r>
+          </a:p>
+        </p:txBody>
+      </p:sp>
     </p:spTree>
     <p:extLst>
       <p:ext uri="{BB962C8B-B14F-4D97-AF65-F5344CB8AC3E}">
@@ -8115,6 +8955,248 @@
           </a:prstGeom>
         </p:spPr>
       </p:pic>
+      <p:sp>
+        <p:nvSpPr>
+          <p:cNvPr id="7" name="Content Placeholder 2">
+            <a:extLst>
+              <a:ext uri="{FF2B5EF4-FFF2-40B4-BE49-F238E27FC236}">
+                <a16:creationId xmlns:a16="http://schemas.microsoft.com/office/drawing/2014/main" id="{9901297D-6DD7-46D6-8799-6988F7B57EBF}"/>
+              </a:ext>
+            </a:extLst>
+          </p:cNvPr>
+          <p:cNvSpPr txBox="1">
+            <a:spLocks/>
+          </p:cNvSpPr>
+          <p:nvPr/>
+        </p:nvSpPr>
+        <p:spPr>
+          <a:xfrm>
+            <a:off x="9344026" y="6214533"/>
+            <a:ext cx="2847974" cy="558800"/>
+          </a:xfrm>
+          <a:prstGeom prst="rect">
+            <a:avLst/>
+          </a:prstGeom>
+        </p:spPr>
+        <p:txBody>
+          <a:bodyPr vert="horz" lIns="91440" tIns="45720" rIns="91440" bIns="45720" rtlCol="0">
+            <a:noAutofit/>
+          </a:bodyPr>
+          <a:lstStyle>
+            <a:lvl1pPr marL="384048" indent="-384048" algn="l" defTabSz="914400" rtl="0" eaLnBrk="1" latinLnBrk="0" hangingPunct="1">
+              <a:lnSpc>
+                <a:spcPct val="94000"/>
+              </a:lnSpc>
+              <a:spcBef>
+                <a:spcPts val="1000"/>
+              </a:spcBef>
+              <a:spcAft>
+                <a:spcPts val="200"/>
+              </a:spcAft>
+              <a:buFont typeface="Franklin Gothic Book" panose="020B0503020102020204" pitchFamily="34" charset="0"/>
+              <a:buChar char="■"/>
+              <a:defRPr sz="2000" kern="1200" baseline="0">
+                <a:solidFill>
+                  <a:schemeClr val="tx2"/>
+                </a:solidFill>
+                <a:latin typeface="+mn-lt"/>
+                <a:ea typeface="+mn-ea"/>
+                <a:cs typeface="+mn-cs"/>
+              </a:defRPr>
+            </a:lvl1pPr>
+            <a:lvl2pPr marL="914400" indent="-384048" algn="l" defTabSz="914400" rtl="0" eaLnBrk="1" latinLnBrk="0" hangingPunct="1">
+              <a:lnSpc>
+                <a:spcPct val="94000"/>
+              </a:lnSpc>
+              <a:spcBef>
+                <a:spcPts val="500"/>
+              </a:spcBef>
+              <a:spcAft>
+                <a:spcPts val="200"/>
+              </a:spcAft>
+              <a:buFont typeface="Franklin Gothic Book" panose="020B0503020102020204" pitchFamily="34" charset="0"/>
+              <a:buChar char="–"/>
+              <a:defRPr sz="2000" i="1" kern="1200" baseline="0">
+                <a:solidFill>
+                  <a:schemeClr val="tx2"/>
+                </a:solidFill>
+                <a:latin typeface="+mn-lt"/>
+                <a:ea typeface="+mn-ea"/>
+                <a:cs typeface="+mn-cs"/>
+              </a:defRPr>
+            </a:lvl2pPr>
+            <a:lvl3pPr marL="1371600" indent="-384048" algn="l" defTabSz="914400" rtl="0" eaLnBrk="1" latinLnBrk="0" hangingPunct="1">
+              <a:lnSpc>
+                <a:spcPct val="94000"/>
+              </a:lnSpc>
+              <a:spcBef>
+                <a:spcPts val="500"/>
+              </a:spcBef>
+              <a:spcAft>
+                <a:spcPts val="200"/>
+              </a:spcAft>
+              <a:buFont typeface="Franklin Gothic Book" panose="020B0503020102020204" pitchFamily="34" charset="0"/>
+              <a:buChar char="■"/>
+              <a:defRPr sz="1800" kern="1200" baseline="0">
+                <a:solidFill>
+                  <a:schemeClr val="tx2"/>
+                </a:solidFill>
+                <a:latin typeface="+mn-lt"/>
+                <a:ea typeface="+mn-ea"/>
+                <a:cs typeface="+mn-cs"/>
+              </a:defRPr>
+            </a:lvl3pPr>
+            <a:lvl4pPr marL="1828800" indent="-384048" algn="l" defTabSz="914400" rtl="0" eaLnBrk="1" latinLnBrk="0" hangingPunct="1">
+              <a:lnSpc>
+                <a:spcPct val="94000"/>
+              </a:lnSpc>
+              <a:spcBef>
+                <a:spcPts val="500"/>
+              </a:spcBef>
+              <a:spcAft>
+                <a:spcPts val="200"/>
+              </a:spcAft>
+              <a:buFont typeface="Franklin Gothic Book" panose="020B0503020102020204" pitchFamily="34" charset="0"/>
+              <a:buChar char="–"/>
+              <a:defRPr sz="1800" i="1" kern="1200" baseline="0">
+                <a:solidFill>
+                  <a:schemeClr val="tx2"/>
+                </a:solidFill>
+                <a:latin typeface="+mn-lt"/>
+                <a:ea typeface="+mn-ea"/>
+                <a:cs typeface="+mn-cs"/>
+              </a:defRPr>
+            </a:lvl4pPr>
+            <a:lvl5pPr marL="2286000" indent="-384048" algn="l" defTabSz="914400" rtl="0" eaLnBrk="1" latinLnBrk="0" hangingPunct="1">
+              <a:lnSpc>
+                <a:spcPct val="94000"/>
+              </a:lnSpc>
+              <a:spcBef>
+                <a:spcPts val="500"/>
+              </a:spcBef>
+              <a:spcAft>
+                <a:spcPts val="200"/>
+              </a:spcAft>
+              <a:buFont typeface="Franklin Gothic Book" panose="020B0503020102020204" pitchFamily="34" charset="0"/>
+              <a:buChar char="■"/>
+              <a:defRPr sz="1600" kern="1200" baseline="0">
+                <a:solidFill>
+                  <a:schemeClr val="tx2"/>
+                </a:solidFill>
+                <a:latin typeface="+mn-lt"/>
+                <a:ea typeface="+mn-ea"/>
+                <a:cs typeface="+mn-cs"/>
+              </a:defRPr>
+            </a:lvl5pPr>
+            <a:lvl6pPr marL="2743200" indent="-384048" algn="l" defTabSz="914400" rtl="0" eaLnBrk="1" latinLnBrk="0" hangingPunct="1">
+              <a:lnSpc>
+                <a:spcPct val="94000"/>
+              </a:lnSpc>
+              <a:spcBef>
+                <a:spcPts val="500"/>
+              </a:spcBef>
+              <a:spcAft>
+                <a:spcPts val="200"/>
+              </a:spcAft>
+              <a:buFont typeface="Franklin Gothic Book" panose="020B0503020102020204" pitchFamily="34" charset="0"/>
+              <a:buChar char="–"/>
+              <a:defRPr sz="1600" i="1" kern="1200" baseline="0">
+                <a:solidFill>
+                  <a:schemeClr val="tx2"/>
+                </a:solidFill>
+                <a:latin typeface="+mn-lt"/>
+                <a:ea typeface="+mn-ea"/>
+                <a:cs typeface="+mn-cs"/>
+              </a:defRPr>
+            </a:lvl6pPr>
+            <a:lvl7pPr marL="3200400" indent="-384048" algn="l" defTabSz="914400" rtl="0" eaLnBrk="1" latinLnBrk="0" hangingPunct="1">
+              <a:lnSpc>
+                <a:spcPct val="94000"/>
+              </a:lnSpc>
+              <a:spcBef>
+                <a:spcPts val="500"/>
+              </a:spcBef>
+              <a:spcAft>
+                <a:spcPts val="200"/>
+              </a:spcAft>
+              <a:buFont typeface="Franklin Gothic Book" panose="020B0503020102020204" pitchFamily="34" charset="0"/>
+              <a:buChar char="■"/>
+              <a:defRPr sz="1400" kern="1200" baseline="0">
+                <a:solidFill>
+                  <a:schemeClr val="tx2"/>
+                </a:solidFill>
+                <a:latin typeface="+mn-lt"/>
+                <a:ea typeface="+mn-ea"/>
+                <a:cs typeface="+mn-cs"/>
+              </a:defRPr>
+            </a:lvl7pPr>
+            <a:lvl8pPr marL="3657600" indent="-384048" algn="l" defTabSz="914400" rtl="0" eaLnBrk="1" latinLnBrk="0" hangingPunct="1">
+              <a:lnSpc>
+                <a:spcPct val="94000"/>
+              </a:lnSpc>
+              <a:spcBef>
+                <a:spcPts val="500"/>
+              </a:spcBef>
+              <a:spcAft>
+                <a:spcPts val="200"/>
+              </a:spcAft>
+              <a:buFont typeface="Franklin Gothic Book" panose="020B0503020102020204" pitchFamily="34" charset="0"/>
+              <a:buChar char="–"/>
+              <a:defRPr sz="1400" i="1" kern="1200" baseline="0">
+                <a:solidFill>
+                  <a:schemeClr val="tx2"/>
+                </a:solidFill>
+                <a:latin typeface="+mn-lt"/>
+                <a:ea typeface="+mn-ea"/>
+                <a:cs typeface="+mn-cs"/>
+              </a:defRPr>
+            </a:lvl8pPr>
+            <a:lvl9pPr marL="4114800" indent="-384048" algn="l" defTabSz="914400" rtl="0" eaLnBrk="1" latinLnBrk="0" hangingPunct="1">
+              <a:lnSpc>
+                <a:spcPct val="94000"/>
+              </a:lnSpc>
+              <a:spcBef>
+                <a:spcPts val="500"/>
+              </a:spcBef>
+              <a:spcAft>
+                <a:spcPts val="200"/>
+              </a:spcAft>
+              <a:buFont typeface="Franklin Gothic Book" panose="020B0503020102020204" pitchFamily="34" charset="0"/>
+              <a:buChar char="■"/>
+              <a:defRPr sz="1400" kern="1200" baseline="0">
+                <a:solidFill>
+                  <a:schemeClr val="tx2"/>
+                </a:solidFill>
+                <a:latin typeface="+mn-lt"/>
+                <a:ea typeface="+mn-ea"/>
+                <a:cs typeface="+mn-cs"/>
+              </a:defRPr>
+            </a:lvl9pPr>
+          </a:lstStyle>
+          <a:p>
+            <a:pPr marL="0" indent="0" algn="r">
+              <a:buNone/>
+            </a:pPr>
+            <a:r>
+              <a:rPr lang="en-US" sz="1100" b="1" dirty="0"/>
+              <a:t>Sources:</a:t>
+            </a:r>
+            <a:br>
+              <a:rPr lang="en-US" sz="1100" dirty="0"/>
+            </a:br>
+            <a:r>
+              <a:rPr lang="en-US" sz="1100" dirty="0">
+                <a:hlinkClick r:id="rId6"/>
+              </a:rPr>
+              <a:t>https://www.kitware.com/img/small_logo_over.png</a:t>
+            </a:r>
+            <a:r>
+              <a:rPr lang="en-US" sz="1100" dirty="0"/>
+              <a:t> </a:t>
+            </a:r>
+          </a:p>
+        </p:txBody>
+      </p:sp>
     </p:spTree>
     <p:extLst>
       <p:ext uri="{BB962C8B-B14F-4D97-AF65-F5344CB8AC3E}">
@@ -8575,7 +9657,12 @@
             <p:ph idx="1"/>
           </p:nvPr>
         </p:nvSpPr>
-        <p:spPr/>
+        <p:spPr>
+          <a:xfrm>
+            <a:off x="1371600" y="2286000"/>
+            <a:ext cx="7065034" cy="1320800"/>
+          </a:xfrm>
+        </p:spPr>
         <p:txBody>
           <a:bodyPr/>
           <a:lstStyle/>
@@ -8593,6 +9680,504 @@
               <a:t>, playmer@gmail.com)</a:t>
             </a:r>
           </a:p>
+        </p:txBody>
+      </p:sp>
+      <p:pic>
+        <p:nvPicPr>
+          <p:cNvPr id="4" name="Picture 3" descr="Related image">
+            <a:extLst>
+              <a:ext uri="{FF2B5EF4-FFF2-40B4-BE49-F238E27FC236}">
+                <a16:creationId xmlns:a16="http://schemas.microsoft.com/office/drawing/2014/main" id="{029611A8-68CB-4A9E-B4EE-B04C9AEFE0A0}"/>
+              </a:ext>
+            </a:extLst>
+          </p:cNvPr>
+          <p:cNvPicPr>
+            <a:picLocks noChangeAspect="1" noChangeArrowheads="1"/>
+          </p:cNvPicPr>
+          <p:nvPr/>
+        </p:nvPicPr>
+        <p:blipFill>
+          <a:blip r:embed="rId2">
+            <a:extLst>
+              <a:ext uri="{28A0092B-C50C-407E-A947-70E740481C1C}">
+                <a14:useLocalDpi xmlns:a14="http://schemas.microsoft.com/office/drawing/2010/main" val="0"/>
+              </a:ext>
+            </a:extLst>
+          </a:blip>
+          <a:srcRect/>
+          <a:stretch>
+            <a:fillRect/>
+          </a:stretch>
+        </p:blipFill>
+        <p:spPr bwMode="auto">
+          <a:xfrm>
+            <a:off x="9036396" y="5618732"/>
+            <a:ext cx="2894633" cy="1063335"/>
+          </a:xfrm>
+          <a:prstGeom prst="rect">
+            <a:avLst/>
+          </a:prstGeom>
+          <a:noFill/>
+          <a:extLst>
+            <a:ext uri="{909E8E84-426E-40DD-AFC4-6F175D3DCCD1}">
+              <a14:hiddenFill xmlns:a14="http://schemas.microsoft.com/office/drawing/2010/main">
+                <a:solidFill>
+                  <a:srgbClr val="FFFFFF"/>
+                </a:solidFill>
+              </a14:hiddenFill>
+            </a:ext>
+          </a:extLst>
+        </p:spPr>
+      </p:pic>
+      <p:sp>
+        <p:nvSpPr>
+          <p:cNvPr id="5" name="Subtitle 2">
+            <a:extLst>
+              <a:ext uri="{FF2B5EF4-FFF2-40B4-BE49-F238E27FC236}">
+                <a16:creationId xmlns:a16="http://schemas.microsoft.com/office/drawing/2014/main" id="{13A72779-3A94-48B0-A4AE-48ADFB688A84}"/>
+              </a:ext>
+            </a:extLst>
+          </p:cNvPr>
+          <p:cNvSpPr txBox="1">
+            <a:spLocks/>
+          </p:cNvSpPr>
+          <p:nvPr/>
+        </p:nvSpPr>
+        <p:spPr>
+          <a:xfrm>
+            <a:off x="8934504" y="5190380"/>
+            <a:ext cx="1746565" cy="428352"/>
+          </a:xfrm>
+          <a:prstGeom prst="rect">
+            <a:avLst/>
+          </a:prstGeom>
+        </p:spPr>
+        <p:txBody>
+          <a:bodyPr vert="horz" lIns="91440" tIns="45720" rIns="91440" bIns="45720" rtlCol="0">
+            <a:normAutofit fontScale="92500" lnSpcReduction="10000"/>
+          </a:bodyPr>
+          <a:lstStyle>
+            <a:lvl1pPr marL="0" indent="0" algn="ctr" defTabSz="914400" rtl="0" eaLnBrk="1" latinLnBrk="0" hangingPunct="1">
+              <a:lnSpc>
+                <a:spcPct val="112000"/>
+              </a:lnSpc>
+              <a:spcBef>
+                <a:spcPts val="0"/>
+              </a:spcBef>
+              <a:spcAft>
+                <a:spcPts val="0"/>
+              </a:spcAft>
+              <a:buFont typeface="Franklin Gothic Book" panose="020B0503020102020204" pitchFamily="34" charset="0"/>
+              <a:buNone/>
+              <a:defRPr sz="2300" kern="1200" baseline="0">
+                <a:solidFill>
+                  <a:schemeClr val="tx2"/>
+                </a:solidFill>
+                <a:latin typeface="+mn-lt"/>
+                <a:ea typeface="+mn-ea"/>
+                <a:cs typeface="+mn-cs"/>
+              </a:defRPr>
+            </a:lvl1pPr>
+            <a:lvl2pPr marL="457200" indent="0" algn="ctr" defTabSz="914400" rtl="0" eaLnBrk="1" latinLnBrk="0" hangingPunct="1">
+              <a:lnSpc>
+                <a:spcPct val="94000"/>
+              </a:lnSpc>
+              <a:spcBef>
+                <a:spcPts val="500"/>
+              </a:spcBef>
+              <a:spcAft>
+                <a:spcPts val="200"/>
+              </a:spcAft>
+              <a:buFont typeface="Franklin Gothic Book" panose="020B0503020102020204" pitchFamily="34" charset="0"/>
+              <a:buNone/>
+              <a:defRPr sz="2000" i="1" kern="1200" baseline="0">
+                <a:solidFill>
+                  <a:schemeClr val="tx2"/>
+                </a:solidFill>
+                <a:latin typeface="+mn-lt"/>
+                <a:ea typeface="+mn-ea"/>
+                <a:cs typeface="+mn-cs"/>
+              </a:defRPr>
+            </a:lvl2pPr>
+            <a:lvl3pPr marL="914400" indent="0" algn="ctr" defTabSz="914400" rtl="0" eaLnBrk="1" latinLnBrk="0" hangingPunct="1">
+              <a:lnSpc>
+                <a:spcPct val="94000"/>
+              </a:lnSpc>
+              <a:spcBef>
+                <a:spcPts val="500"/>
+              </a:spcBef>
+              <a:spcAft>
+                <a:spcPts val="200"/>
+              </a:spcAft>
+              <a:buFont typeface="Franklin Gothic Book" panose="020B0503020102020204" pitchFamily="34" charset="0"/>
+              <a:buNone/>
+              <a:defRPr sz="1800" kern="1200" baseline="0">
+                <a:solidFill>
+                  <a:schemeClr val="tx2"/>
+                </a:solidFill>
+                <a:latin typeface="+mn-lt"/>
+                <a:ea typeface="+mn-ea"/>
+                <a:cs typeface="+mn-cs"/>
+              </a:defRPr>
+            </a:lvl3pPr>
+            <a:lvl4pPr marL="1371600" indent="0" algn="ctr" defTabSz="914400" rtl="0" eaLnBrk="1" latinLnBrk="0" hangingPunct="1">
+              <a:lnSpc>
+                <a:spcPct val="94000"/>
+              </a:lnSpc>
+              <a:spcBef>
+                <a:spcPts val="500"/>
+              </a:spcBef>
+              <a:spcAft>
+                <a:spcPts val="200"/>
+              </a:spcAft>
+              <a:buFont typeface="Franklin Gothic Book" panose="020B0503020102020204" pitchFamily="34" charset="0"/>
+              <a:buNone/>
+              <a:defRPr sz="1600" i="1" kern="1200" baseline="0">
+                <a:solidFill>
+                  <a:schemeClr val="tx2"/>
+                </a:solidFill>
+                <a:latin typeface="+mn-lt"/>
+                <a:ea typeface="+mn-ea"/>
+                <a:cs typeface="+mn-cs"/>
+              </a:defRPr>
+            </a:lvl4pPr>
+            <a:lvl5pPr marL="1828800" indent="0" algn="ctr" defTabSz="914400" rtl="0" eaLnBrk="1" latinLnBrk="0" hangingPunct="1">
+              <a:lnSpc>
+                <a:spcPct val="94000"/>
+              </a:lnSpc>
+              <a:spcBef>
+                <a:spcPts val="500"/>
+              </a:spcBef>
+              <a:spcAft>
+                <a:spcPts val="200"/>
+              </a:spcAft>
+              <a:buFont typeface="Franklin Gothic Book" panose="020B0503020102020204" pitchFamily="34" charset="0"/>
+              <a:buNone/>
+              <a:defRPr sz="1600" kern="1200" baseline="0">
+                <a:solidFill>
+                  <a:schemeClr val="tx2"/>
+                </a:solidFill>
+                <a:latin typeface="+mn-lt"/>
+                <a:ea typeface="+mn-ea"/>
+                <a:cs typeface="+mn-cs"/>
+              </a:defRPr>
+            </a:lvl5pPr>
+            <a:lvl6pPr marL="2286000" indent="0" algn="ctr" defTabSz="914400" rtl="0" eaLnBrk="1" latinLnBrk="0" hangingPunct="1">
+              <a:lnSpc>
+                <a:spcPct val="94000"/>
+              </a:lnSpc>
+              <a:spcBef>
+                <a:spcPts val="500"/>
+              </a:spcBef>
+              <a:spcAft>
+                <a:spcPts val="200"/>
+              </a:spcAft>
+              <a:buFont typeface="Franklin Gothic Book" panose="020B0503020102020204" pitchFamily="34" charset="0"/>
+              <a:buNone/>
+              <a:defRPr sz="1600" i="1" kern="1200" baseline="0">
+                <a:solidFill>
+                  <a:schemeClr val="tx2"/>
+                </a:solidFill>
+                <a:latin typeface="+mn-lt"/>
+                <a:ea typeface="+mn-ea"/>
+                <a:cs typeface="+mn-cs"/>
+              </a:defRPr>
+            </a:lvl6pPr>
+            <a:lvl7pPr marL="2743200" indent="0" algn="ctr" defTabSz="914400" rtl="0" eaLnBrk="1" latinLnBrk="0" hangingPunct="1">
+              <a:lnSpc>
+                <a:spcPct val="94000"/>
+              </a:lnSpc>
+              <a:spcBef>
+                <a:spcPts val="500"/>
+              </a:spcBef>
+              <a:spcAft>
+                <a:spcPts val="200"/>
+              </a:spcAft>
+              <a:buFont typeface="Franklin Gothic Book" panose="020B0503020102020204" pitchFamily="34" charset="0"/>
+              <a:buNone/>
+              <a:defRPr sz="1600" kern="1200" baseline="0">
+                <a:solidFill>
+                  <a:schemeClr val="tx2"/>
+                </a:solidFill>
+                <a:latin typeface="+mn-lt"/>
+                <a:ea typeface="+mn-ea"/>
+                <a:cs typeface="+mn-cs"/>
+              </a:defRPr>
+            </a:lvl7pPr>
+            <a:lvl8pPr marL="3200400" indent="0" algn="ctr" defTabSz="914400" rtl="0" eaLnBrk="1" latinLnBrk="0" hangingPunct="1">
+              <a:lnSpc>
+                <a:spcPct val="94000"/>
+              </a:lnSpc>
+              <a:spcBef>
+                <a:spcPts val="500"/>
+              </a:spcBef>
+              <a:spcAft>
+                <a:spcPts val="200"/>
+              </a:spcAft>
+              <a:buFont typeface="Franklin Gothic Book" panose="020B0503020102020204" pitchFamily="34" charset="0"/>
+              <a:buNone/>
+              <a:defRPr sz="1600" i="1" kern="1200" baseline="0">
+                <a:solidFill>
+                  <a:schemeClr val="tx2"/>
+                </a:solidFill>
+                <a:latin typeface="+mn-lt"/>
+                <a:ea typeface="+mn-ea"/>
+                <a:cs typeface="+mn-cs"/>
+              </a:defRPr>
+            </a:lvl8pPr>
+            <a:lvl9pPr marL="3657600" indent="0" algn="ctr" defTabSz="914400" rtl="0" eaLnBrk="1" latinLnBrk="0" hangingPunct="1">
+              <a:lnSpc>
+                <a:spcPct val="94000"/>
+              </a:lnSpc>
+              <a:spcBef>
+                <a:spcPts val="500"/>
+              </a:spcBef>
+              <a:spcAft>
+                <a:spcPts val="200"/>
+              </a:spcAft>
+              <a:buFont typeface="Franklin Gothic Book" panose="020B0503020102020204" pitchFamily="34" charset="0"/>
+              <a:buNone/>
+              <a:defRPr sz="1600" kern="1200" baseline="0">
+                <a:solidFill>
+                  <a:schemeClr val="tx2"/>
+                </a:solidFill>
+                <a:latin typeface="+mn-lt"/>
+                <a:ea typeface="+mn-ea"/>
+                <a:cs typeface="+mn-cs"/>
+              </a:defRPr>
+            </a:lvl9pPr>
+          </a:lstStyle>
+          <a:p>
+            <a:pPr algn="l"/>
+            <a:r>
+              <a:rPr lang="en-US" sz="2400" b="1" u="sng" dirty="0"/>
+              <a:t>Hosted by</a:t>
+            </a:r>
+            <a:r>
+              <a:rPr lang="en-US" sz="2400" b="1" dirty="0"/>
+              <a:t>: </a:t>
+            </a:r>
+          </a:p>
+        </p:txBody>
+      </p:sp>
+      <p:sp>
+        <p:nvSpPr>
+          <p:cNvPr id="6" name="Content Placeholder 2">
+            <a:extLst>
+              <a:ext uri="{FF2B5EF4-FFF2-40B4-BE49-F238E27FC236}">
+                <a16:creationId xmlns:a16="http://schemas.microsoft.com/office/drawing/2014/main" id="{62B94CA5-82B2-435F-8A40-64E4766F1DFF}"/>
+              </a:ext>
+            </a:extLst>
+          </p:cNvPr>
+          <p:cNvSpPr txBox="1">
+            <a:spLocks/>
+          </p:cNvSpPr>
+          <p:nvPr/>
+        </p:nvSpPr>
+        <p:spPr>
+          <a:xfrm>
+            <a:off x="3581400" y="3894997"/>
+            <a:ext cx="7883106" cy="1320800"/>
+          </a:xfrm>
+          <a:prstGeom prst="rect">
+            <a:avLst/>
+          </a:prstGeom>
+        </p:spPr>
+        <p:txBody>
+          <a:bodyPr vert="horz" lIns="91440" tIns="45720" rIns="91440" bIns="45720" rtlCol="0">
+            <a:normAutofit/>
+          </a:bodyPr>
+          <a:lstStyle>
+            <a:lvl1pPr marL="384048" indent="-384048" algn="l" defTabSz="914400" rtl="0" eaLnBrk="1" latinLnBrk="0" hangingPunct="1">
+              <a:lnSpc>
+                <a:spcPct val="94000"/>
+              </a:lnSpc>
+              <a:spcBef>
+                <a:spcPts val="1000"/>
+              </a:spcBef>
+              <a:spcAft>
+                <a:spcPts val="200"/>
+              </a:spcAft>
+              <a:buFont typeface="Franklin Gothic Book" panose="020B0503020102020204" pitchFamily="34" charset="0"/>
+              <a:buChar char="■"/>
+              <a:defRPr sz="2000" kern="1200" baseline="0">
+                <a:solidFill>
+                  <a:schemeClr val="tx2"/>
+                </a:solidFill>
+                <a:latin typeface="+mn-lt"/>
+                <a:ea typeface="+mn-ea"/>
+                <a:cs typeface="+mn-cs"/>
+              </a:defRPr>
+            </a:lvl1pPr>
+            <a:lvl2pPr marL="914400" indent="-384048" algn="l" defTabSz="914400" rtl="0" eaLnBrk="1" latinLnBrk="0" hangingPunct="1">
+              <a:lnSpc>
+                <a:spcPct val="94000"/>
+              </a:lnSpc>
+              <a:spcBef>
+                <a:spcPts val="500"/>
+              </a:spcBef>
+              <a:spcAft>
+                <a:spcPts val="200"/>
+              </a:spcAft>
+              <a:buFont typeface="Franklin Gothic Book" panose="020B0503020102020204" pitchFamily="34" charset="0"/>
+              <a:buChar char="–"/>
+              <a:defRPr sz="2000" i="1" kern="1200" baseline="0">
+                <a:solidFill>
+                  <a:schemeClr val="tx2"/>
+                </a:solidFill>
+                <a:latin typeface="+mn-lt"/>
+                <a:ea typeface="+mn-ea"/>
+                <a:cs typeface="+mn-cs"/>
+              </a:defRPr>
+            </a:lvl2pPr>
+            <a:lvl3pPr marL="1371600" indent="-384048" algn="l" defTabSz="914400" rtl="0" eaLnBrk="1" latinLnBrk="0" hangingPunct="1">
+              <a:lnSpc>
+                <a:spcPct val="94000"/>
+              </a:lnSpc>
+              <a:spcBef>
+                <a:spcPts val="500"/>
+              </a:spcBef>
+              <a:spcAft>
+                <a:spcPts val="200"/>
+              </a:spcAft>
+              <a:buFont typeface="Franklin Gothic Book" panose="020B0503020102020204" pitchFamily="34" charset="0"/>
+              <a:buChar char="■"/>
+              <a:defRPr sz="1800" kern="1200" baseline="0">
+                <a:solidFill>
+                  <a:schemeClr val="tx2"/>
+                </a:solidFill>
+                <a:latin typeface="+mn-lt"/>
+                <a:ea typeface="+mn-ea"/>
+                <a:cs typeface="+mn-cs"/>
+              </a:defRPr>
+            </a:lvl3pPr>
+            <a:lvl4pPr marL="1828800" indent="-384048" algn="l" defTabSz="914400" rtl="0" eaLnBrk="1" latinLnBrk="0" hangingPunct="1">
+              <a:lnSpc>
+                <a:spcPct val="94000"/>
+              </a:lnSpc>
+              <a:spcBef>
+                <a:spcPts val="500"/>
+              </a:spcBef>
+              <a:spcAft>
+                <a:spcPts val="200"/>
+              </a:spcAft>
+              <a:buFont typeface="Franklin Gothic Book" panose="020B0503020102020204" pitchFamily="34" charset="0"/>
+              <a:buChar char="–"/>
+              <a:defRPr sz="1800" i="1" kern="1200" baseline="0">
+                <a:solidFill>
+                  <a:schemeClr val="tx2"/>
+                </a:solidFill>
+                <a:latin typeface="+mn-lt"/>
+                <a:ea typeface="+mn-ea"/>
+                <a:cs typeface="+mn-cs"/>
+              </a:defRPr>
+            </a:lvl4pPr>
+            <a:lvl5pPr marL="2286000" indent="-384048" algn="l" defTabSz="914400" rtl="0" eaLnBrk="1" latinLnBrk="0" hangingPunct="1">
+              <a:lnSpc>
+                <a:spcPct val="94000"/>
+              </a:lnSpc>
+              <a:spcBef>
+                <a:spcPts val="500"/>
+              </a:spcBef>
+              <a:spcAft>
+                <a:spcPts val="200"/>
+              </a:spcAft>
+              <a:buFont typeface="Franklin Gothic Book" panose="020B0503020102020204" pitchFamily="34" charset="0"/>
+              <a:buChar char="■"/>
+              <a:defRPr sz="1600" kern="1200" baseline="0">
+                <a:solidFill>
+                  <a:schemeClr val="tx2"/>
+                </a:solidFill>
+                <a:latin typeface="+mn-lt"/>
+                <a:ea typeface="+mn-ea"/>
+                <a:cs typeface="+mn-cs"/>
+              </a:defRPr>
+            </a:lvl5pPr>
+            <a:lvl6pPr marL="2743200" indent="-384048" algn="l" defTabSz="914400" rtl="0" eaLnBrk="1" latinLnBrk="0" hangingPunct="1">
+              <a:lnSpc>
+                <a:spcPct val="94000"/>
+              </a:lnSpc>
+              <a:spcBef>
+                <a:spcPts val="500"/>
+              </a:spcBef>
+              <a:spcAft>
+                <a:spcPts val="200"/>
+              </a:spcAft>
+              <a:buFont typeface="Franklin Gothic Book" panose="020B0503020102020204" pitchFamily="34" charset="0"/>
+              <a:buChar char="–"/>
+              <a:defRPr sz="1600" i="1" kern="1200" baseline="0">
+                <a:solidFill>
+                  <a:schemeClr val="tx2"/>
+                </a:solidFill>
+                <a:latin typeface="+mn-lt"/>
+                <a:ea typeface="+mn-ea"/>
+                <a:cs typeface="+mn-cs"/>
+              </a:defRPr>
+            </a:lvl6pPr>
+            <a:lvl7pPr marL="3200400" indent="-384048" algn="l" defTabSz="914400" rtl="0" eaLnBrk="1" latinLnBrk="0" hangingPunct="1">
+              <a:lnSpc>
+                <a:spcPct val="94000"/>
+              </a:lnSpc>
+              <a:spcBef>
+                <a:spcPts val="500"/>
+              </a:spcBef>
+              <a:spcAft>
+                <a:spcPts val="200"/>
+              </a:spcAft>
+              <a:buFont typeface="Franklin Gothic Book" panose="020B0503020102020204" pitchFamily="34" charset="0"/>
+              <a:buChar char="■"/>
+              <a:defRPr sz="1400" kern="1200" baseline="0">
+                <a:solidFill>
+                  <a:schemeClr val="tx2"/>
+                </a:solidFill>
+                <a:latin typeface="+mn-lt"/>
+                <a:ea typeface="+mn-ea"/>
+                <a:cs typeface="+mn-cs"/>
+              </a:defRPr>
+            </a:lvl7pPr>
+            <a:lvl8pPr marL="3657600" indent="-384048" algn="l" defTabSz="914400" rtl="0" eaLnBrk="1" latinLnBrk="0" hangingPunct="1">
+              <a:lnSpc>
+                <a:spcPct val="94000"/>
+              </a:lnSpc>
+              <a:spcBef>
+                <a:spcPts val="500"/>
+              </a:spcBef>
+              <a:spcAft>
+                <a:spcPts val="200"/>
+              </a:spcAft>
+              <a:buFont typeface="Franklin Gothic Book" panose="020B0503020102020204" pitchFamily="34" charset="0"/>
+              <a:buChar char="–"/>
+              <a:defRPr sz="1400" i="1" kern="1200" baseline="0">
+                <a:solidFill>
+                  <a:schemeClr val="tx2"/>
+                </a:solidFill>
+                <a:latin typeface="+mn-lt"/>
+                <a:ea typeface="+mn-ea"/>
+                <a:cs typeface="+mn-cs"/>
+              </a:defRPr>
+            </a:lvl8pPr>
+            <a:lvl9pPr marL="4114800" indent="-384048" algn="l" defTabSz="914400" rtl="0" eaLnBrk="1" latinLnBrk="0" hangingPunct="1">
+              <a:lnSpc>
+                <a:spcPct val="94000"/>
+              </a:lnSpc>
+              <a:spcBef>
+                <a:spcPts val="500"/>
+              </a:spcBef>
+              <a:spcAft>
+                <a:spcPts val="200"/>
+              </a:spcAft>
+              <a:buFont typeface="Franklin Gothic Book" panose="020B0503020102020204" pitchFamily="34" charset="0"/>
+              <a:buChar char="■"/>
+              <a:defRPr sz="1400" kern="1200" baseline="0">
+                <a:solidFill>
+                  <a:schemeClr val="tx2"/>
+                </a:solidFill>
+                <a:latin typeface="+mn-lt"/>
+                <a:ea typeface="+mn-ea"/>
+                <a:cs typeface="+mn-cs"/>
+              </a:defRPr>
+            </a:lvl9pPr>
+          </a:lstStyle>
           <a:p>
             <a:r>
               <a:rPr lang="en-US" dirty="0"/>
@@ -8609,6 +10194,288 @@
           </a:p>
         </p:txBody>
       </p:sp>
+      <p:sp>
+        <p:nvSpPr>
+          <p:cNvPr id="7" name="Rectangle 6">
+            <a:extLst>
+              <a:ext uri="{FF2B5EF4-FFF2-40B4-BE49-F238E27FC236}">
+                <a16:creationId xmlns:a16="http://schemas.microsoft.com/office/drawing/2014/main" id="{AD021836-21F6-4042-BC15-55E7F5F48D8D}"/>
+              </a:ext>
+            </a:extLst>
+          </p:cNvPr>
+          <p:cNvSpPr/>
+          <p:nvPr/>
+        </p:nvSpPr>
+        <p:spPr>
+          <a:xfrm>
+            <a:off x="8436634" y="1803201"/>
+            <a:ext cx="1312334" cy="1313392"/>
+          </a:xfrm>
+          <a:prstGeom prst="rect">
+            <a:avLst/>
+          </a:prstGeom>
+        </p:spPr>
+        <p:style>
+          <a:lnRef idx="2">
+            <a:schemeClr val="accent1">
+              <a:shade val="50000"/>
+            </a:schemeClr>
+          </a:lnRef>
+          <a:fillRef idx="1">
+            <a:schemeClr val="accent1"/>
+          </a:fillRef>
+          <a:effectRef idx="0">
+            <a:schemeClr val="accent1"/>
+          </a:effectRef>
+          <a:fontRef idx="minor">
+            <a:schemeClr val="lt1"/>
+          </a:fontRef>
+        </p:style>
+        <p:txBody>
+          <a:bodyPr rtlCol="0" anchor="ctr"/>
+          <a:lstStyle/>
+          <a:p>
+            <a:pPr algn="ctr"/>
+            <a:endParaRPr lang="en-US"/>
+          </a:p>
+        </p:txBody>
+      </p:sp>
+      <p:pic>
+        <p:nvPicPr>
+          <p:cNvPr id="8" name="Picture 4" descr="https://pbs.twimg.com/profile_images/976588952399372288/7aafNen5_400x400.jpg">
+            <a:extLst>
+              <a:ext uri="{FF2B5EF4-FFF2-40B4-BE49-F238E27FC236}">
+                <a16:creationId xmlns:a16="http://schemas.microsoft.com/office/drawing/2014/main" id="{2DC2E681-BF0B-4FB5-8794-62D4E0F3F803}"/>
+              </a:ext>
+            </a:extLst>
+          </p:cNvPr>
+          <p:cNvPicPr>
+            <a:picLocks noChangeAspect="1" noChangeArrowheads="1"/>
+          </p:cNvPicPr>
+          <p:nvPr/>
+        </p:nvPicPr>
+        <p:blipFill>
+          <a:blip r:embed="rId3">
+            <a:extLst>
+              <a:ext uri="{28A0092B-C50C-407E-A947-70E740481C1C}">
+                <a14:useLocalDpi xmlns:a14="http://schemas.microsoft.com/office/drawing/2010/main" val="0"/>
+              </a:ext>
+            </a:extLst>
+          </a:blip>
+          <a:srcRect/>
+          <a:stretch>
+            <a:fillRect/>
+          </a:stretch>
+        </p:blipFill>
+        <p:spPr bwMode="auto">
+          <a:xfrm>
+            <a:off x="8521301" y="1888397"/>
+            <a:ext cx="1143000" cy="1143000"/>
+          </a:xfrm>
+          <a:prstGeom prst="rect">
+            <a:avLst/>
+          </a:prstGeom>
+          <a:noFill/>
+          <a:extLst>
+            <a:ext uri="{909E8E84-426E-40DD-AFC4-6F175D3DCCD1}">
+              <a14:hiddenFill xmlns:a14="http://schemas.microsoft.com/office/drawing/2010/main">
+                <a:solidFill>
+                  <a:srgbClr val="FFFFFF"/>
+                </a:solidFill>
+              </a14:hiddenFill>
+            </a:ext>
+          </a:extLst>
+        </p:spPr>
+      </p:pic>
+      <p:sp>
+        <p:nvSpPr>
+          <p:cNvPr id="9" name="Left Brace 8">
+            <a:extLst>
+              <a:ext uri="{FF2B5EF4-FFF2-40B4-BE49-F238E27FC236}">
+                <a16:creationId xmlns:a16="http://schemas.microsoft.com/office/drawing/2014/main" id="{67FB382A-EC68-4B9F-A0D9-797E305030BD}"/>
+              </a:ext>
+            </a:extLst>
+          </p:cNvPr>
+          <p:cNvSpPr/>
+          <p:nvPr/>
+        </p:nvSpPr>
+        <p:spPr>
+          <a:xfrm rot="10800000">
+            <a:off x="7641826" y="2011109"/>
+            <a:ext cx="609600" cy="957735"/>
+          </a:xfrm>
+          <a:prstGeom prst="leftBrace">
+            <a:avLst>
+              <a:gd name="adj1" fmla="val 8333"/>
+              <a:gd name="adj2" fmla="val 49176"/>
+            </a:avLst>
+          </a:prstGeom>
+          <a:ln w="28575"/>
+        </p:spPr>
+        <p:style>
+          <a:lnRef idx="1">
+            <a:schemeClr val="accent1"/>
+          </a:lnRef>
+          <a:fillRef idx="0">
+            <a:schemeClr val="accent1"/>
+          </a:fillRef>
+          <a:effectRef idx="0">
+            <a:schemeClr val="accent1"/>
+          </a:effectRef>
+          <a:fontRef idx="minor">
+            <a:schemeClr val="tx1"/>
+          </a:fontRef>
+        </p:style>
+        <p:txBody>
+          <a:bodyPr rtlCol="0" anchor="ctr"/>
+          <a:lstStyle/>
+          <a:p>
+            <a:pPr algn="ctr"/>
+            <a:endParaRPr lang="en-US"/>
+          </a:p>
+        </p:txBody>
+      </p:sp>
+      <p:sp>
+        <p:nvSpPr>
+          <p:cNvPr id="10" name="Rectangle 9">
+            <a:extLst>
+              <a:ext uri="{FF2B5EF4-FFF2-40B4-BE49-F238E27FC236}">
+                <a16:creationId xmlns:a16="http://schemas.microsoft.com/office/drawing/2014/main" id="{38A26A71-86DC-41BB-B589-EF95547CDB0E}"/>
+              </a:ext>
+            </a:extLst>
+          </p:cNvPr>
+          <p:cNvSpPr/>
+          <p:nvPr/>
+        </p:nvSpPr>
+        <p:spPr>
+          <a:xfrm>
+            <a:off x="1286933" y="3521604"/>
+            <a:ext cx="1312334" cy="1313392"/>
+          </a:xfrm>
+          <a:prstGeom prst="rect">
+            <a:avLst/>
+          </a:prstGeom>
+        </p:spPr>
+        <p:style>
+          <a:lnRef idx="2">
+            <a:schemeClr val="accent1">
+              <a:shade val="50000"/>
+            </a:schemeClr>
+          </a:lnRef>
+          <a:fillRef idx="1">
+            <a:schemeClr val="accent1"/>
+          </a:fillRef>
+          <a:effectRef idx="0">
+            <a:schemeClr val="accent1"/>
+          </a:effectRef>
+          <a:fontRef idx="minor">
+            <a:schemeClr val="lt1"/>
+          </a:fontRef>
+        </p:style>
+        <p:txBody>
+          <a:bodyPr rtlCol="0" anchor="ctr"/>
+          <a:lstStyle/>
+          <a:p>
+            <a:pPr algn="ctr"/>
+            <a:endParaRPr lang="en-US"/>
+          </a:p>
+        </p:txBody>
+      </p:sp>
+      <p:sp>
+        <p:nvSpPr>
+          <p:cNvPr id="11" name="Left Brace 10">
+            <a:extLst>
+              <a:ext uri="{FF2B5EF4-FFF2-40B4-BE49-F238E27FC236}">
+                <a16:creationId xmlns:a16="http://schemas.microsoft.com/office/drawing/2014/main" id="{903B64D8-46E3-4B1F-9D75-DBFD232FC239}"/>
+              </a:ext>
+            </a:extLst>
+          </p:cNvPr>
+          <p:cNvSpPr/>
+          <p:nvPr/>
+        </p:nvSpPr>
+        <p:spPr>
+          <a:xfrm>
+            <a:off x="2870199" y="3760257"/>
+            <a:ext cx="609600" cy="820738"/>
+          </a:xfrm>
+          <a:prstGeom prst="leftBrace">
+            <a:avLst>
+              <a:gd name="adj1" fmla="val 8333"/>
+              <a:gd name="adj2" fmla="val 49176"/>
+            </a:avLst>
+          </a:prstGeom>
+          <a:ln w="28575"/>
+        </p:spPr>
+        <p:style>
+          <a:lnRef idx="1">
+            <a:schemeClr val="accent1"/>
+          </a:lnRef>
+          <a:fillRef idx="0">
+            <a:schemeClr val="accent1"/>
+          </a:fillRef>
+          <a:effectRef idx="0">
+            <a:schemeClr val="accent1"/>
+          </a:effectRef>
+          <a:fontRef idx="minor">
+            <a:schemeClr val="tx1"/>
+          </a:fontRef>
+        </p:style>
+        <p:txBody>
+          <a:bodyPr rtlCol="0" anchor="ctr"/>
+          <a:lstStyle/>
+          <a:p>
+            <a:pPr algn="ctr"/>
+            <a:endParaRPr lang="en-US"/>
+          </a:p>
+        </p:txBody>
+      </p:sp>
+      <p:pic>
+        <p:nvPicPr>
+          <p:cNvPr id="12" name="Picture 2" descr="https://pbs.twimg.com/profile_images/715076514749030400/Z7xk2GU4_400x400.jpg">
+            <a:extLst>
+              <a:ext uri="{FF2B5EF4-FFF2-40B4-BE49-F238E27FC236}">
+                <a16:creationId xmlns:a16="http://schemas.microsoft.com/office/drawing/2014/main" id="{A97F2C46-3503-48CA-A1B6-593240B3B541}"/>
+              </a:ext>
+            </a:extLst>
+          </p:cNvPr>
+          <p:cNvPicPr>
+            <a:picLocks noChangeAspect="1" noChangeArrowheads="1"/>
+          </p:cNvPicPr>
+          <p:nvPr/>
+        </p:nvPicPr>
+        <p:blipFill>
+          <a:blip r:embed="rId4">
+            <a:extLst>
+              <a:ext uri="{28A0092B-C50C-407E-A947-70E740481C1C}">
+                <a14:useLocalDpi xmlns:a14="http://schemas.microsoft.com/office/drawing/2010/main" val="0"/>
+              </a:ext>
+            </a:extLst>
+          </a:blip>
+          <a:srcRect/>
+          <a:stretch>
+            <a:fillRect/>
+          </a:stretch>
+        </p:blipFill>
+        <p:spPr bwMode="auto">
+          <a:xfrm>
+            <a:off x="1371600" y="3606800"/>
+            <a:ext cx="1143000" cy="1143000"/>
+          </a:xfrm>
+          <a:prstGeom prst="rect">
+            <a:avLst/>
+          </a:prstGeom>
+          <a:noFill/>
+          <a:extLst>
+            <a:ext uri="{909E8E84-426E-40DD-AFC4-6F175D3DCCD1}">
+              <a14:hiddenFill xmlns:a14="http://schemas.microsoft.com/office/drawing/2010/main">
+                <a:solidFill>
+                  <a:srgbClr val="FFFFFF"/>
+                </a:solidFill>
+              </a14:hiddenFill>
+            </a:ext>
+          </a:extLst>
+        </p:spPr>
+      </p:pic>
     </p:spTree>
     <p:extLst>
       <p:ext uri="{BB962C8B-B14F-4D97-AF65-F5344CB8AC3E}">
@@ -8729,17 +10596,14 @@
               <a:t>, Makefile, .ninja)</a:t>
             </a:r>
           </a:p>
-          <a:p>
-            <a:endParaRPr lang="en-US" dirty="0"/>
-          </a:p>
         </p:txBody>
       </p:sp>
       <p:pic>
         <p:nvPicPr>
-          <p:cNvPr id="9" name="Picture 8">
+          <p:cNvPr id="5" name="Picture 4">
             <a:extLst>
               <a:ext uri="{FF2B5EF4-FFF2-40B4-BE49-F238E27FC236}">
-                <a16:creationId xmlns:a16="http://schemas.microsoft.com/office/drawing/2014/main" id="{6CDEFCC2-B9C3-4320-8A36-CB7BCD5D67A1}"/>
+                <a16:creationId xmlns:a16="http://schemas.microsoft.com/office/drawing/2014/main" id="{009D3CDB-531B-49EB-B035-F7AB7FA0098E}"/>
               </a:ext>
             </a:extLst>
           </p:cNvPr>
@@ -8762,48 +10626,328 @@
         </p:blipFill>
         <p:spPr>
           <a:xfrm>
-            <a:off x="10044112" y="1357312"/>
-            <a:ext cx="1857375" cy="1857375"/>
+            <a:off x="9417620" y="1618468"/>
+            <a:ext cx="1893847" cy="1958238"/>
           </a:xfrm>
           <a:prstGeom prst="rect">
             <a:avLst/>
           </a:prstGeom>
         </p:spPr>
       </p:pic>
+      <p:sp>
+        <p:nvSpPr>
+          <p:cNvPr id="8" name="Content Placeholder 2">
+            <a:extLst>
+              <a:ext uri="{FF2B5EF4-FFF2-40B4-BE49-F238E27FC236}">
+                <a16:creationId xmlns:a16="http://schemas.microsoft.com/office/drawing/2014/main" id="{0896C1BF-5A1E-47F0-9C13-6934F42540F7}"/>
+              </a:ext>
+            </a:extLst>
+          </p:cNvPr>
+          <p:cNvSpPr txBox="1">
+            <a:spLocks/>
+          </p:cNvSpPr>
+          <p:nvPr/>
+        </p:nvSpPr>
+        <p:spPr>
+          <a:xfrm>
+            <a:off x="9344026" y="5163792"/>
+            <a:ext cx="2847974" cy="1635815"/>
+          </a:xfrm>
+          <a:prstGeom prst="rect">
+            <a:avLst/>
+          </a:prstGeom>
+        </p:spPr>
+        <p:txBody>
+          <a:bodyPr vert="horz" lIns="91440" tIns="45720" rIns="91440" bIns="45720" rtlCol="0">
+            <a:noAutofit/>
+          </a:bodyPr>
+          <a:lstStyle>
+            <a:lvl1pPr marL="384048" indent="-384048" algn="l" defTabSz="914400" rtl="0" eaLnBrk="1" latinLnBrk="0" hangingPunct="1">
+              <a:lnSpc>
+                <a:spcPct val="94000"/>
+              </a:lnSpc>
+              <a:spcBef>
+                <a:spcPts val="1000"/>
+              </a:spcBef>
+              <a:spcAft>
+                <a:spcPts val="200"/>
+              </a:spcAft>
+              <a:buFont typeface="Franklin Gothic Book" panose="020B0503020102020204" pitchFamily="34" charset="0"/>
+              <a:buChar char="■"/>
+              <a:defRPr sz="2000" kern="1200" baseline="0">
+                <a:solidFill>
+                  <a:schemeClr val="tx2"/>
+                </a:solidFill>
+                <a:latin typeface="+mn-lt"/>
+                <a:ea typeface="+mn-ea"/>
+                <a:cs typeface="+mn-cs"/>
+              </a:defRPr>
+            </a:lvl1pPr>
+            <a:lvl2pPr marL="914400" indent="-384048" algn="l" defTabSz="914400" rtl="0" eaLnBrk="1" latinLnBrk="0" hangingPunct="1">
+              <a:lnSpc>
+                <a:spcPct val="94000"/>
+              </a:lnSpc>
+              <a:spcBef>
+                <a:spcPts val="500"/>
+              </a:spcBef>
+              <a:spcAft>
+                <a:spcPts val="200"/>
+              </a:spcAft>
+              <a:buFont typeface="Franklin Gothic Book" panose="020B0503020102020204" pitchFamily="34" charset="0"/>
+              <a:buChar char="–"/>
+              <a:defRPr sz="2000" i="1" kern="1200" baseline="0">
+                <a:solidFill>
+                  <a:schemeClr val="tx2"/>
+                </a:solidFill>
+                <a:latin typeface="+mn-lt"/>
+                <a:ea typeface="+mn-ea"/>
+                <a:cs typeface="+mn-cs"/>
+              </a:defRPr>
+            </a:lvl2pPr>
+            <a:lvl3pPr marL="1371600" indent="-384048" algn="l" defTabSz="914400" rtl="0" eaLnBrk="1" latinLnBrk="0" hangingPunct="1">
+              <a:lnSpc>
+                <a:spcPct val="94000"/>
+              </a:lnSpc>
+              <a:spcBef>
+                <a:spcPts val="500"/>
+              </a:spcBef>
+              <a:spcAft>
+                <a:spcPts val="200"/>
+              </a:spcAft>
+              <a:buFont typeface="Franklin Gothic Book" panose="020B0503020102020204" pitchFamily="34" charset="0"/>
+              <a:buChar char="■"/>
+              <a:defRPr sz="1800" kern="1200" baseline="0">
+                <a:solidFill>
+                  <a:schemeClr val="tx2"/>
+                </a:solidFill>
+                <a:latin typeface="+mn-lt"/>
+                <a:ea typeface="+mn-ea"/>
+                <a:cs typeface="+mn-cs"/>
+              </a:defRPr>
+            </a:lvl3pPr>
+            <a:lvl4pPr marL="1828800" indent="-384048" algn="l" defTabSz="914400" rtl="0" eaLnBrk="1" latinLnBrk="0" hangingPunct="1">
+              <a:lnSpc>
+                <a:spcPct val="94000"/>
+              </a:lnSpc>
+              <a:spcBef>
+                <a:spcPts val="500"/>
+              </a:spcBef>
+              <a:spcAft>
+                <a:spcPts val="200"/>
+              </a:spcAft>
+              <a:buFont typeface="Franklin Gothic Book" panose="020B0503020102020204" pitchFamily="34" charset="0"/>
+              <a:buChar char="–"/>
+              <a:defRPr sz="1800" i="1" kern="1200" baseline="0">
+                <a:solidFill>
+                  <a:schemeClr val="tx2"/>
+                </a:solidFill>
+                <a:latin typeface="+mn-lt"/>
+                <a:ea typeface="+mn-ea"/>
+                <a:cs typeface="+mn-cs"/>
+              </a:defRPr>
+            </a:lvl4pPr>
+            <a:lvl5pPr marL="2286000" indent="-384048" algn="l" defTabSz="914400" rtl="0" eaLnBrk="1" latinLnBrk="0" hangingPunct="1">
+              <a:lnSpc>
+                <a:spcPct val="94000"/>
+              </a:lnSpc>
+              <a:spcBef>
+                <a:spcPts val="500"/>
+              </a:spcBef>
+              <a:spcAft>
+                <a:spcPts val="200"/>
+              </a:spcAft>
+              <a:buFont typeface="Franklin Gothic Book" panose="020B0503020102020204" pitchFamily="34" charset="0"/>
+              <a:buChar char="■"/>
+              <a:defRPr sz="1600" kern="1200" baseline="0">
+                <a:solidFill>
+                  <a:schemeClr val="tx2"/>
+                </a:solidFill>
+                <a:latin typeface="+mn-lt"/>
+                <a:ea typeface="+mn-ea"/>
+                <a:cs typeface="+mn-cs"/>
+              </a:defRPr>
+            </a:lvl5pPr>
+            <a:lvl6pPr marL="2743200" indent="-384048" algn="l" defTabSz="914400" rtl="0" eaLnBrk="1" latinLnBrk="0" hangingPunct="1">
+              <a:lnSpc>
+                <a:spcPct val="94000"/>
+              </a:lnSpc>
+              <a:spcBef>
+                <a:spcPts val="500"/>
+              </a:spcBef>
+              <a:spcAft>
+                <a:spcPts val="200"/>
+              </a:spcAft>
+              <a:buFont typeface="Franklin Gothic Book" panose="020B0503020102020204" pitchFamily="34" charset="0"/>
+              <a:buChar char="–"/>
+              <a:defRPr sz="1600" i="1" kern="1200" baseline="0">
+                <a:solidFill>
+                  <a:schemeClr val="tx2"/>
+                </a:solidFill>
+                <a:latin typeface="+mn-lt"/>
+                <a:ea typeface="+mn-ea"/>
+                <a:cs typeface="+mn-cs"/>
+              </a:defRPr>
+            </a:lvl6pPr>
+            <a:lvl7pPr marL="3200400" indent="-384048" algn="l" defTabSz="914400" rtl="0" eaLnBrk="1" latinLnBrk="0" hangingPunct="1">
+              <a:lnSpc>
+                <a:spcPct val="94000"/>
+              </a:lnSpc>
+              <a:spcBef>
+                <a:spcPts val="500"/>
+              </a:spcBef>
+              <a:spcAft>
+                <a:spcPts val="200"/>
+              </a:spcAft>
+              <a:buFont typeface="Franklin Gothic Book" panose="020B0503020102020204" pitchFamily="34" charset="0"/>
+              <a:buChar char="■"/>
+              <a:defRPr sz="1400" kern="1200" baseline="0">
+                <a:solidFill>
+                  <a:schemeClr val="tx2"/>
+                </a:solidFill>
+                <a:latin typeface="+mn-lt"/>
+                <a:ea typeface="+mn-ea"/>
+                <a:cs typeface="+mn-cs"/>
+              </a:defRPr>
+            </a:lvl7pPr>
+            <a:lvl8pPr marL="3657600" indent="-384048" algn="l" defTabSz="914400" rtl="0" eaLnBrk="1" latinLnBrk="0" hangingPunct="1">
+              <a:lnSpc>
+                <a:spcPct val="94000"/>
+              </a:lnSpc>
+              <a:spcBef>
+                <a:spcPts val="500"/>
+              </a:spcBef>
+              <a:spcAft>
+                <a:spcPts val="200"/>
+              </a:spcAft>
+              <a:buFont typeface="Franklin Gothic Book" panose="020B0503020102020204" pitchFamily="34" charset="0"/>
+              <a:buChar char="–"/>
+              <a:defRPr sz="1400" i="1" kern="1200" baseline="0">
+                <a:solidFill>
+                  <a:schemeClr val="tx2"/>
+                </a:solidFill>
+                <a:latin typeface="+mn-lt"/>
+                <a:ea typeface="+mn-ea"/>
+                <a:cs typeface="+mn-cs"/>
+              </a:defRPr>
+            </a:lvl8pPr>
+            <a:lvl9pPr marL="4114800" indent="-384048" algn="l" defTabSz="914400" rtl="0" eaLnBrk="1" latinLnBrk="0" hangingPunct="1">
+              <a:lnSpc>
+                <a:spcPct val="94000"/>
+              </a:lnSpc>
+              <a:spcBef>
+                <a:spcPts val="500"/>
+              </a:spcBef>
+              <a:spcAft>
+                <a:spcPts val="200"/>
+              </a:spcAft>
+              <a:buFont typeface="Franklin Gothic Book" panose="020B0503020102020204" pitchFamily="34" charset="0"/>
+              <a:buChar char="■"/>
+              <a:defRPr sz="1400" kern="1200" baseline="0">
+                <a:solidFill>
+                  <a:schemeClr val="tx2"/>
+                </a:solidFill>
+                <a:latin typeface="+mn-lt"/>
+                <a:ea typeface="+mn-ea"/>
+                <a:cs typeface="+mn-cs"/>
+              </a:defRPr>
+            </a:lvl9pPr>
+          </a:lstStyle>
+          <a:p>
+            <a:pPr marL="0" indent="0" algn="r">
+              <a:buNone/>
+            </a:pPr>
+            <a:r>
+              <a:rPr lang="en-US" sz="1100" b="1" dirty="0"/>
+              <a:t>Sources:</a:t>
+            </a:r>
+            <a:br>
+              <a:rPr lang="en-US" sz="1100" dirty="0"/>
+            </a:br>
+            <a:r>
+              <a:rPr lang="en-US" sz="1100" dirty="0">
+                <a:hlinkClick r:id="rId3"/>
+              </a:rPr>
+              <a:t>https://commons.wikimedia.org/wiki/File:Visual_Studio_2013_Logo.svg</a:t>
+            </a:r>
+            <a:r>
+              <a:rPr lang="en-US" sz="1100" dirty="0"/>
+              <a:t> </a:t>
+            </a:r>
+          </a:p>
+          <a:p>
+            <a:pPr marL="0" indent="0" algn="r">
+              <a:buNone/>
+            </a:pPr>
+            <a:r>
+              <a:rPr lang="en-US" sz="1100" dirty="0"/>
+              <a:t>By Katsushika Hokusai derivative work: </a:t>
+            </a:r>
+            <a:r>
+              <a:rPr lang="en-US" sz="1100" dirty="0" err="1"/>
+              <a:t>AMorozov</a:t>
+            </a:r>
+            <a:r>
+              <a:rPr lang="en-US" sz="1100" dirty="0"/>
+              <a:t> - Hokusai_sketches_-_hokusai_manga_vol6.jpg, Public Domain, </a:t>
+            </a:r>
+            <a:r>
+              <a:rPr lang="en-US" sz="1100" dirty="0">
+                <a:hlinkClick r:id="rId4"/>
+              </a:rPr>
+              <a:t>https://commons.wikimedia.org/w/index.php?curid=7680391</a:t>
+            </a:r>
+            <a:r>
+              <a:rPr lang="en-US" sz="1100" dirty="0"/>
+              <a:t> </a:t>
+            </a:r>
+          </a:p>
+        </p:txBody>
+      </p:sp>
       <p:pic>
         <p:nvPicPr>
-          <p:cNvPr id="14" name="Picture 13">
+          <p:cNvPr id="1026" name="Picture 2" descr="https://upload.wikimedia.org/wikipedia/commons/thumb/7/72/Hokusai-sketches---hokusai-manga-vol6-crop.jpg/320px-Hokusai-sketches---hokusai-manga-vol6-crop.jpg">
             <a:extLst>
               <a:ext uri="{FF2B5EF4-FFF2-40B4-BE49-F238E27FC236}">
-                <a16:creationId xmlns:a16="http://schemas.microsoft.com/office/drawing/2014/main" id="{6EDE8F24-68DE-4C6F-9976-DEF697DEE809}"/>
+                <a16:creationId xmlns:a16="http://schemas.microsoft.com/office/drawing/2014/main" id="{2648AB83-72CE-4C0D-A62A-3E650852BA0A}"/>
               </a:ext>
             </a:extLst>
           </p:cNvPr>
           <p:cNvPicPr>
-            <a:picLocks noChangeAspect="1"/>
+            <a:picLocks noChangeAspect="1" noChangeArrowheads="1"/>
           </p:cNvPicPr>
           <p:nvPr/>
         </p:nvPicPr>
         <p:blipFill>
-          <a:blip r:embed="rId3">
+          <a:blip r:embed="rId5">
             <a:extLst>
               <a:ext uri="{28A0092B-C50C-407E-A947-70E740481C1C}">
                 <a14:useLocalDpi xmlns:a14="http://schemas.microsoft.com/office/drawing/2010/main" val="0"/>
               </a:ext>
             </a:extLst>
           </a:blip>
+          <a:srcRect/>
           <a:stretch>
             <a:fillRect/>
           </a:stretch>
         </p:blipFill>
-        <p:spPr>
+        <p:spPr bwMode="auto">
           <a:xfrm>
-            <a:off x="8615217" y="3691006"/>
-            <a:ext cx="1428895" cy="1809682"/>
+            <a:off x="7743734" y="3544358"/>
+            <a:ext cx="1411420" cy="2627842"/>
           </a:xfrm>
           <a:prstGeom prst="rect">
             <a:avLst/>
           </a:prstGeom>
+          <a:noFill/>
+          <a:extLst>
+            <a:ext uri="{909E8E84-426E-40DD-AFC4-6F175D3DCCD1}">
+              <a14:hiddenFill xmlns:a14="http://schemas.microsoft.com/office/drawing/2010/main">
+                <a:solidFill>
+                  <a:srgbClr val="FFFFFF"/>
+                </a:solidFill>
+              </a14:hiddenFill>
+            </a:ext>
+          </a:extLst>
         </p:spPr>
       </p:pic>
     </p:spTree>
@@ -8874,10 +11018,10 @@
       </p:sp>
       <p:pic>
         <p:nvPicPr>
-          <p:cNvPr id="4" name="Graphic 3" descr="Streamers">
+          <p:cNvPr id="6" name="Graphic 5" descr="Dance">
             <a:extLst>
               <a:ext uri="{FF2B5EF4-FFF2-40B4-BE49-F238E27FC236}">
-                <a16:creationId xmlns:a16="http://schemas.microsoft.com/office/drawing/2014/main" id="{0B85D653-AB3C-41D3-8D2B-F706B57E0264}"/>
+                <a16:creationId xmlns:a16="http://schemas.microsoft.com/office/drawing/2014/main" id="{D2D6EE1F-9513-4ED8-95D6-20388EA67DA2}"/>
               </a:ext>
             </a:extLst>
           </p:cNvPr>
@@ -8894,45 +11038,6 @@
               </a:ext>
               <a:ext uri="{96DAC541-7B7A-43D3-8B79-37D633B846F1}">
                 <asvg:svgBlip xmlns:asvg="http://schemas.microsoft.com/office/drawing/2016/SVG/main" r:embed="rId3"/>
-              </a:ext>
-            </a:extLst>
-          </a:blip>
-          <a:stretch>
-            <a:fillRect/>
-          </a:stretch>
-        </p:blipFill>
-        <p:spPr>
-          <a:xfrm>
-            <a:off x="2743200" y="2943822"/>
-            <a:ext cx="914400" cy="914400"/>
-          </a:xfrm>
-          <a:prstGeom prst="rect">
-            <a:avLst/>
-          </a:prstGeom>
-        </p:spPr>
-      </p:pic>
-      <p:pic>
-        <p:nvPicPr>
-          <p:cNvPr id="6" name="Graphic 5" descr="Dance">
-            <a:extLst>
-              <a:ext uri="{FF2B5EF4-FFF2-40B4-BE49-F238E27FC236}">
-                <a16:creationId xmlns:a16="http://schemas.microsoft.com/office/drawing/2014/main" id="{D2D6EE1F-9513-4ED8-95D6-20388EA67DA2}"/>
-              </a:ext>
-            </a:extLst>
-          </p:cNvPr>
-          <p:cNvPicPr>
-            <a:picLocks noChangeAspect="1"/>
-          </p:cNvPicPr>
-          <p:nvPr/>
-        </p:nvPicPr>
-        <p:blipFill>
-          <a:blip r:embed="rId4">
-            <a:extLst>
-              <a:ext uri="{28A0092B-C50C-407E-A947-70E740481C1C}">
-                <a14:useLocalDpi xmlns:a14="http://schemas.microsoft.com/office/drawing/2010/main" val="0"/>
-              </a:ext>
-              <a:ext uri="{96DAC541-7B7A-43D3-8B79-37D633B846F1}">
-                <asvg:svgBlip xmlns:asvg="http://schemas.microsoft.com/office/drawing/2016/SVG/main" r:embed="rId5"/>
               </a:ext>
             </a:extLst>
           </a:blip>
@@ -8952,45 +11057,6 @@
       </p:pic>
       <p:pic>
         <p:nvPicPr>
-          <p:cNvPr id="9" name="Graphic 8" descr="Streamers">
-            <a:extLst>
-              <a:ext uri="{FF2B5EF4-FFF2-40B4-BE49-F238E27FC236}">
-                <a16:creationId xmlns:a16="http://schemas.microsoft.com/office/drawing/2014/main" id="{23D5DBA4-9DB8-43BC-9ED4-D8C9572B82CA}"/>
-              </a:ext>
-            </a:extLst>
-          </p:cNvPr>
-          <p:cNvPicPr>
-            <a:picLocks noChangeAspect="1"/>
-          </p:cNvPicPr>
-          <p:nvPr/>
-        </p:nvPicPr>
-        <p:blipFill>
-          <a:blip r:embed="rId2">
-            <a:extLst>
-              <a:ext uri="{28A0092B-C50C-407E-A947-70E740481C1C}">
-                <a14:useLocalDpi xmlns:a14="http://schemas.microsoft.com/office/drawing/2010/main" val="0"/>
-              </a:ext>
-              <a:ext uri="{96DAC541-7B7A-43D3-8B79-37D633B846F1}">
-                <asvg:svgBlip xmlns:asvg="http://schemas.microsoft.com/office/drawing/2016/SVG/main" r:embed="rId3"/>
-              </a:ext>
-            </a:extLst>
-          </a:blip>
-          <a:stretch>
-            <a:fillRect/>
-          </a:stretch>
-        </p:blipFill>
-        <p:spPr>
-          <a:xfrm>
-            <a:off x="8534402" y="3018822"/>
-            <a:ext cx="914400" cy="914400"/>
-          </a:xfrm>
-          <a:prstGeom prst="rect">
-            <a:avLst/>
-          </a:prstGeom>
-        </p:spPr>
-      </p:pic>
-      <p:pic>
-        <p:nvPicPr>
           <p:cNvPr id="10" name="Picture 4" descr="https://pbs.twimg.com/profile_images/976588952399372288/7aafNen5_400x400.jpg">
             <a:extLst>
               <a:ext uri="{FF2B5EF4-FFF2-40B4-BE49-F238E27FC236}">
@@ -9004,7 +11070,7 @@
           <p:nvPr/>
         </p:nvPicPr>
         <p:blipFill>
-          <a:blip r:embed="rId6">
+          <a:blip r:embed="rId4">
             <a:extLst>
               <a:ext uri="{28A0092B-C50C-407E-A947-70E740481C1C}">
                 <a14:useLocalDpi xmlns:a14="http://schemas.microsoft.com/office/drawing/2010/main" val="0"/>
@@ -9051,7 +11117,7 @@
           <p:nvPr/>
         </p:nvPicPr>
         <p:blipFill>
-          <a:blip r:embed="rId7">
+          <a:blip r:embed="rId5">
             <a:extLst>
               <a:ext uri="{28A0092B-C50C-407E-A947-70E740481C1C}">
                 <a14:useLocalDpi xmlns:a14="http://schemas.microsoft.com/office/drawing/2010/main" val="0"/>
@@ -9285,6 +11351,486 @@
           </a:prstGeom>
         </p:spPr>
       </p:pic>
+      <p:sp>
+        <p:nvSpPr>
+          <p:cNvPr id="7" name="Content Placeholder 2">
+            <a:extLst>
+              <a:ext uri="{FF2B5EF4-FFF2-40B4-BE49-F238E27FC236}">
+                <a16:creationId xmlns:a16="http://schemas.microsoft.com/office/drawing/2014/main" id="{504D6C0D-035F-4CA3-9F10-EF53286F8ECD}"/>
+              </a:ext>
+            </a:extLst>
+          </p:cNvPr>
+          <p:cNvSpPr txBox="1">
+            <a:spLocks/>
+          </p:cNvSpPr>
+          <p:nvPr/>
+        </p:nvSpPr>
+        <p:spPr>
+          <a:xfrm>
+            <a:off x="9256185" y="6402916"/>
+            <a:ext cx="2847974" cy="390525"/>
+          </a:xfrm>
+          <a:prstGeom prst="rect">
+            <a:avLst/>
+          </a:prstGeom>
+        </p:spPr>
+        <p:txBody>
+          <a:bodyPr vert="horz" lIns="91440" tIns="45720" rIns="91440" bIns="45720" rtlCol="0">
+            <a:normAutofit lnSpcReduction="10000"/>
+          </a:bodyPr>
+          <a:lstStyle>
+            <a:lvl1pPr marL="384048" indent="-384048" algn="l" defTabSz="914400" rtl="0" eaLnBrk="1" latinLnBrk="0" hangingPunct="1">
+              <a:lnSpc>
+                <a:spcPct val="94000"/>
+              </a:lnSpc>
+              <a:spcBef>
+                <a:spcPts val="1000"/>
+              </a:spcBef>
+              <a:spcAft>
+                <a:spcPts val="200"/>
+              </a:spcAft>
+              <a:buFont typeface="Franklin Gothic Book" panose="020B0503020102020204" pitchFamily="34" charset="0"/>
+              <a:buChar char="■"/>
+              <a:defRPr sz="2000" kern="1200" baseline="0">
+                <a:solidFill>
+                  <a:schemeClr val="tx2"/>
+                </a:solidFill>
+                <a:latin typeface="+mn-lt"/>
+                <a:ea typeface="+mn-ea"/>
+                <a:cs typeface="+mn-cs"/>
+              </a:defRPr>
+            </a:lvl1pPr>
+            <a:lvl2pPr marL="914400" indent="-384048" algn="l" defTabSz="914400" rtl="0" eaLnBrk="1" latinLnBrk="0" hangingPunct="1">
+              <a:lnSpc>
+                <a:spcPct val="94000"/>
+              </a:lnSpc>
+              <a:spcBef>
+                <a:spcPts val="500"/>
+              </a:spcBef>
+              <a:spcAft>
+                <a:spcPts val="200"/>
+              </a:spcAft>
+              <a:buFont typeface="Franklin Gothic Book" panose="020B0503020102020204" pitchFamily="34" charset="0"/>
+              <a:buChar char="–"/>
+              <a:defRPr sz="2000" i="1" kern="1200" baseline="0">
+                <a:solidFill>
+                  <a:schemeClr val="tx2"/>
+                </a:solidFill>
+                <a:latin typeface="+mn-lt"/>
+                <a:ea typeface="+mn-ea"/>
+                <a:cs typeface="+mn-cs"/>
+              </a:defRPr>
+            </a:lvl2pPr>
+            <a:lvl3pPr marL="1371600" indent="-384048" algn="l" defTabSz="914400" rtl="0" eaLnBrk="1" latinLnBrk="0" hangingPunct="1">
+              <a:lnSpc>
+                <a:spcPct val="94000"/>
+              </a:lnSpc>
+              <a:spcBef>
+                <a:spcPts val="500"/>
+              </a:spcBef>
+              <a:spcAft>
+                <a:spcPts val="200"/>
+              </a:spcAft>
+              <a:buFont typeface="Franklin Gothic Book" panose="020B0503020102020204" pitchFamily="34" charset="0"/>
+              <a:buChar char="■"/>
+              <a:defRPr sz="1800" kern="1200" baseline="0">
+                <a:solidFill>
+                  <a:schemeClr val="tx2"/>
+                </a:solidFill>
+                <a:latin typeface="+mn-lt"/>
+                <a:ea typeface="+mn-ea"/>
+                <a:cs typeface="+mn-cs"/>
+              </a:defRPr>
+            </a:lvl3pPr>
+            <a:lvl4pPr marL="1828800" indent="-384048" algn="l" defTabSz="914400" rtl="0" eaLnBrk="1" latinLnBrk="0" hangingPunct="1">
+              <a:lnSpc>
+                <a:spcPct val="94000"/>
+              </a:lnSpc>
+              <a:spcBef>
+                <a:spcPts val="500"/>
+              </a:spcBef>
+              <a:spcAft>
+                <a:spcPts val="200"/>
+              </a:spcAft>
+              <a:buFont typeface="Franklin Gothic Book" panose="020B0503020102020204" pitchFamily="34" charset="0"/>
+              <a:buChar char="–"/>
+              <a:defRPr sz="1800" i="1" kern="1200" baseline="0">
+                <a:solidFill>
+                  <a:schemeClr val="tx2"/>
+                </a:solidFill>
+                <a:latin typeface="+mn-lt"/>
+                <a:ea typeface="+mn-ea"/>
+                <a:cs typeface="+mn-cs"/>
+              </a:defRPr>
+            </a:lvl4pPr>
+            <a:lvl5pPr marL="2286000" indent="-384048" algn="l" defTabSz="914400" rtl="0" eaLnBrk="1" latinLnBrk="0" hangingPunct="1">
+              <a:lnSpc>
+                <a:spcPct val="94000"/>
+              </a:lnSpc>
+              <a:spcBef>
+                <a:spcPts val="500"/>
+              </a:spcBef>
+              <a:spcAft>
+                <a:spcPts val="200"/>
+              </a:spcAft>
+              <a:buFont typeface="Franklin Gothic Book" panose="020B0503020102020204" pitchFamily="34" charset="0"/>
+              <a:buChar char="■"/>
+              <a:defRPr sz="1600" kern="1200" baseline="0">
+                <a:solidFill>
+                  <a:schemeClr val="tx2"/>
+                </a:solidFill>
+                <a:latin typeface="+mn-lt"/>
+                <a:ea typeface="+mn-ea"/>
+                <a:cs typeface="+mn-cs"/>
+              </a:defRPr>
+            </a:lvl5pPr>
+            <a:lvl6pPr marL="2743200" indent="-384048" algn="l" defTabSz="914400" rtl="0" eaLnBrk="1" latinLnBrk="0" hangingPunct="1">
+              <a:lnSpc>
+                <a:spcPct val="94000"/>
+              </a:lnSpc>
+              <a:spcBef>
+                <a:spcPts val="500"/>
+              </a:spcBef>
+              <a:spcAft>
+                <a:spcPts val="200"/>
+              </a:spcAft>
+              <a:buFont typeface="Franklin Gothic Book" panose="020B0503020102020204" pitchFamily="34" charset="0"/>
+              <a:buChar char="–"/>
+              <a:defRPr sz="1600" i="1" kern="1200" baseline="0">
+                <a:solidFill>
+                  <a:schemeClr val="tx2"/>
+                </a:solidFill>
+                <a:latin typeface="+mn-lt"/>
+                <a:ea typeface="+mn-ea"/>
+                <a:cs typeface="+mn-cs"/>
+              </a:defRPr>
+            </a:lvl6pPr>
+            <a:lvl7pPr marL="3200400" indent="-384048" algn="l" defTabSz="914400" rtl="0" eaLnBrk="1" latinLnBrk="0" hangingPunct="1">
+              <a:lnSpc>
+                <a:spcPct val="94000"/>
+              </a:lnSpc>
+              <a:spcBef>
+                <a:spcPts val="500"/>
+              </a:spcBef>
+              <a:spcAft>
+                <a:spcPts val="200"/>
+              </a:spcAft>
+              <a:buFont typeface="Franklin Gothic Book" panose="020B0503020102020204" pitchFamily="34" charset="0"/>
+              <a:buChar char="■"/>
+              <a:defRPr sz="1400" kern="1200" baseline="0">
+                <a:solidFill>
+                  <a:schemeClr val="tx2"/>
+                </a:solidFill>
+                <a:latin typeface="+mn-lt"/>
+                <a:ea typeface="+mn-ea"/>
+                <a:cs typeface="+mn-cs"/>
+              </a:defRPr>
+            </a:lvl7pPr>
+            <a:lvl8pPr marL="3657600" indent="-384048" algn="l" defTabSz="914400" rtl="0" eaLnBrk="1" latinLnBrk="0" hangingPunct="1">
+              <a:lnSpc>
+                <a:spcPct val="94000"/>
+              </a:lnSpc>
+              <a:spcBef>
+                <a:spcPts val="500"/>
+              </a:spcBef>
+              <a:spcAft>
+                <a:spcPts val="200"/>
+              </a:spcAft>
+              <a:buFont typeface="Franklin Gothic Book" panose="020B0503020102020204" pitchFamily="34" charset="0"/>
+              <a:buChar char="–"/>
+              <a:defRPr sz="1400" i="1" kern="1200" baseline="0">
+                <a:solidFill>
+                  <a:schemeClr val="tx2"/>
+                </a:solidFill>
+                <a:latin typeface="+mn-lt"/>
+                <a:ea typeface="+mn-ea"/>
+                <a:cs typeface="+mn-cs"/>
+              </a:defRPr>
+            </a:lvl8pPr>
+            <a:lvl9pPr marL="4114800" indent="-384048" algn="l" defTabSz="914400" rtl="0" eaLnBrk="1" latinLnBrk="0" hangingPunct="1">
+              <a:lnSpc>
+                <a:spcPct val="94000"/>
+              </a:lnSpc>
+              <a:spcBef>
+                <a:spcPts val="500"/>
+              </a:spcBef>
+              <a:spcAft>
+                <a:spcPts val="200"/>
+              </a:spcAft>
+              <a:buFont typeface="Franklin Gothic Book" panose="020B0503020102020204" pitchFamily="34" charset="0"/>
+              <a:buChar char="■"/>
+              <a:defRPr sz="1400" kern="1200" baseline="0">
+                <a:solidFill>
+                  <a:schemeClr val="tx2"/>
+                </a:solidFill>
+                <a:latin typeface="+mn-lt"/>
+                <a:ea typeface="+mn-ea"/>
+                <a:cs typeface="+mn-cs"/>
+              </a:defRPr>
+            </a:lvl9pPr>
+          </a:lstStyle>
+          <a:p>
+            <a:pPr marL="0" indent="0" algn="r">
+              <a:buNone/>
+            </a:pPr>
+            <a:br>
+              <a:rPr lang="en-US" sz="1100" dirty="0"/>
+            </a:br>
+            <a:r>
+              <a:rPr lang="en-US" sz="1100" dirty="0">
+                <a:hlinkClick r:id="rId5"/>
+              </a:rPr>
+              <a:t>https://github.com/premake/premake-core</a:t>
+            </a:r>
+            <a:r>
+              <a:rPr lang="en-US" sz="1100" dirty="0"/>
+              <a:t> </a:t>
+            </a:r>
+          </a:p>
+        </p:txBody>
+      </p:sp>
+      <p:sp>
+        <p:nvSpPr>
+          <p:cNvPr id="9" name="Content Placeholder 2">
+            <a:extLst>
+              <a:ext uri="{FF2B5EF4-FFF2-40B4-BE49-F238E27FC236}">
+                <a16:creationId xmlns:a16="http://schemas.microsoft.com/office/drawing/2014/main" id="{A73BBEE2-ACA7-439F-BAC0-BFFD92DFA123}"/>
+              </a:ext>
+            </a:extLst>
+          </p:cNvPr>
+          <p:cNvSpPr txBox="1">
+            <a:spLocks/>
+          </p:cNvSpPr>
+          <p:nvPr/>
+        </p:nvSpPr>
+        <p:spPr>
+          <a:xfrm>
+            <a:off x="9256185" y="5867400"/>
+            <a:ext cx="2847974" cy="421216"/>
+          </a:xfrm>
+          <a:prstGeom prst="rect">
+            <a:avLst/>
+          </a:prstGeom>
+        </p:spPr>
+        <p:txBody>
+          <a:bodyPr vert="horz" lIns="91440" tIns="45720" rIns="91440" bIns="45720" rtlCol="0">
+            <a:noAutofit/>
+          </a:bodyPr>
+          <a:lstStyle>
+            <a:lvl1pPr marL="384048" indent="-384048" algn="l" defTabSz="914400" rtl="0" eaLnBrk="1" latinLnBrk="0" hangingPunct="1">
+              <a:lnSpc>
+                <a:spcPct val="94000"/>
+              </a:lnSpc>
+              <a:spcBef>
+                <a:spcPts val="1000"/>
+              </a:spcBef>
+              <a:spcAft>
+                <a:spcPts val="200"/>
+              </a:spcAft>
+              <a:buFont typeface="Franklin Gothic Book" panose="020B0503020102020204" pitchFamily="34" charset="0"/>
+              <a:buChar char="■"/>
+              <a:defRPr sz="2000" kern="1200" baseline="0">
+                <a:solidFill>
+                  <a:schemeClr val="tx2"/>
+                </a:solidFill>
+                <a:latin typeface="+mn-lt"/>
+                <a:ea typeface="+mn-ea"/>
+                <a:cs typeface="+mn-cs"/>
+              </a:defRPr>
+            </a:lvl1pPr>
+            <a:lvl2pPr marL="914400" indent="-384048" algn="l" defTabSz="914400" rtl="0" eaLnBrk="1" latinLnBrk="0" hangingPunct="1">
+              <a:lnSpc>
+                <a:spcPct val="94000"/>
+              </a:lnSpc>
+              <a:spcBef>
+                <a:spcPts val="500"/>
+              </a:spcBef>
+              <a:spcAft>
+                <a:spcPts val="200"/>
+              </a:spcAft>
+              <a:buFont typeface="Franklin Gothic Book" panose="020B0503020102020204" pitchFamily="34" charset="0"/>
+              <a:buChar char="–"/>
+              <a:defRPr sz="2000" i="1" kern="1200" baseline="0">
+                <a:solidFill>
+                  <a:schemeClr val="tx2"/>
+                </a:solidFill>
+                <a:latin typeface="+mn-lt"/>
+                <a:ea typeface="+mn-ea"/>
+                <a:cs typeface="+mn-cs"/>
+              </a:defRPr>
+            </a:lvl2pPr>
+            <a:lvl3pPr marL="1371600" indent="-384048" algn="l" defTabSz="914400" rtl="0" eaLnBrk="1" latinLnBrk="0" hangingPunct="1">
+              <a:lnSpc>
+                <a:spcPct val="94000"/>
+              </a:lnSpc>
+              <a:spcBef>
+                <a:spcPts val="500"/>
+              </a:spcBef>
+              <a:spcAft>
+                <a:spcPts val="200"/>
+              </a:spcAft>
+              <a:buFont typeface="Franklin Gothic Book" panose="020B0503020102020204" pitchFamily="34" charset="0"/>
+              <a:buChar char="■"/>
+              <a:defRPr sz="1800" kern="1200" baseline="0">
+                <a:solidFill>
+                  <a:schemeClr val="tx2"/>
+                </a:solidFill>
+                <a:latin typeface="+mn-lt"/>
+                <a:ea typeface="+mn-ea"/>
+                <a:cs typeface="+mn-cs"/>
+              </a:defRPr>
+            </a:lvl3pPr>
+            <a:lvl4pPr marL="1828800" indent="-384048" algn="l" defTabSz="914400" rtl="0" eaLnBrk="1" latinLnBrk="0" hangingPunct="1">
+              <a:lnSpc>
+                <a:spcPct val="94000"/>
+              </a:lnSpc>
+              <a:spcBef>
+                <a:spcPts val="500"/>
+              </a:spcBef>
+              <a:spcAft>
+                <a:spcPts val="200"/>
+              </a:spcAft>
+              <a:buFont typeface="Franklin Gothic Book" panose="020B0503020102020204" pitchFamily="34" charset="0"/>
+              <a:buChar char="–"/>
+              <a:defRPr sz="1800" i="1" kern="1200" baseline="0">
+                <a:solidFill>
+                  <a:schemeClr val="tx2"/>
+                </a:solidFill>
+                <a:latin typeface="+mn-lt"/>
+                <a:ea typeface="+mn-ea"/>
+                <a:cs typeface="+mn-cs"/>
+              </a:defRPr>
+            </a:lvl4pPr>
+            <a:lvl5pPr marL="2286000" indent="-384048" algn="l" defTabSz="914400" rtl="0" eaLnBrk="1" latinLnBrk="0" hangingPunct="1">
+              <a:lnSpc>
+                <a:spcPct val="94000"/>
+              </a:lnSpc>
+              <a:spcBef>
+                <a:spcPts val="500"/>
+              </a:spcBef>
+              <a:spcAft>
+                <a:spcPts val="200"/>
+              </a:spcAft>
+              <a:buFont typeface="Franklin Gothic Book" panose="020B0503020102020204" pitchFamily="34" charset="0"/>
+              <a:buChar char="■"/>
+              <a:defRPr sz="1600" kern="1200" baseline="0">
+                <a:solidFill>
+                  <a:schemeClr val="tx2"/>
+                </a:solidFill>
+                <a:latin typeface="+mn-lt"/>
+                <a:ea typeface="+mn-ea"/>
+                <a:cs typeface="+mn-cs"/>
+              </a:defRPr>
+            </a:lvl5pPr>
+            <a:lvl6pPr marL="2743200" indent="-384048" algn="l" defTabSz="914400" rtl="0" eaLnBrk="1" latinLnBrk="0" hangingPunct="1">
+              <a:lnSpc>
+                <a:spcPct val="94000"/>
+              </a:lnSpc>
+              <a:spcBef>
+                <a:spcPts val="500"/>
+              </a:spcBef>
+              <a:spcAft>
+                <a:spcPts val="200"/>
+              </a:spcAft>
+              <a:buFont typeface="Franklin Gothic Book" panose="020B0503020102020204" pitchFamily="34" charset="0"/>
+              <a:buChar char="–"/>
+              <a:defRPr sz="1600" i="1" kern="1200" baseline="0">
+                <a:solidFill>
+                  <a:schemeClr val="tx2"/>
+                </a:solidFill>
+                <a:latin typeface="+mn-lt"/>
+                <a:ea typeface="+mn-ea"/>
+                <a:cs typeface="+mn-cs"/>
+              </a:defRPr>
+            </a:lvl6pPr>
+            <a:lvl7pPr marL="3200400" indent="-384048" algn="l" defTabSz="914400" rtl="0" eaLnBrk="1" latinLnBrk="0" hangingPunct="1">
+              <a:lnSpc>
+                <a:spcPct val="94000"/>
+              </a:lnSpc>
+              <a:spcBef>
+                <a:spcPts val="500"/>
+              </a:spcBef>
+              <a:spcAft>
+                <a:spcPts val="200"/>
+              </a:spcAft>
+              <a:buFont typeface="Franklin Gothic Book" panose="020B0503020102020204" pitchFamily="34" charset="0"/>
+              <a:buChar char="■"/>
+              <a:defRPr sz="1400" kern="1200" baseline="0">
+                <a:solidFill>
+                  <a:schemeClr val="tx2"/>
+                </a:solidFill>
+                <a:latin typeface="+mn-lt"/>
+                <a:ea typeface="+mn-ea"/>
+                <a:cs typeface="+mn-cs"/>
+              </a:defRPr>
+            </a:lvl7pPr>
+            <a:lvl8pPr marL="3657600" indent="-384048" algn="l" defTabSz="914400" rtl="0" eaLnBrk="1" latinLnBrk="0" hangingPunct="1">
+              <a:lnSpc>
+                <a:spcPct val="94000"/>
+              </a:lnSpc>
+              <a:spcBef>
+                <a:spcPts val="500"/>
+              </a:spcBef>
+              <a:spcAft>
+                <a:spcPts val="200"/>
+              </a:spcAft>
+              <a:buFont typeface="Franklin Gothic Book" panose="020B0503020102020204" pitchFamily="34" charset="0"/>
+              <a:buChar char="–"/>
+              <a:defRPr sz="1400" i="1" kern="1200" baseline="0">
+                <a:solidFill>
+                  <a:schemeClr val="tx2"/>
+                </a:solidFill>
+                <a:latin typeface="+mn-lt"/>
+                <a:ea typeface="+mn-ea"/>
+                <a:cs typeface="+mn-cs"/>
+              </a:defRPr>
+            </a:lvl8pPr>
+            <a:lvl9pPr marL="4114800" indent="-384048" algn="l" defTabSz="914400" rtl="0" eaLnBrk="1" latinLnBrk="0" hangingPunct="1">
+              <a:lnSpc>
+                <a:spcPct val="94000"/>
+              </a:lnSpc>
+              <a:spcBef>
+                <a:spcPts val="500"/>
+              </a:spcBef>
+              <a:spcAft>
+                <a:spcPts val="200"/>
+              </a:spcAft>
+              <a:buFont typeface="Franklin Gothic Book" panose="020B0503020102020204" pitchFamily="34" charset="0"/>
+              <a:buChar char="■"/>
+              <a:defRPr sz="1400" kern="1200" baseline="0">
+                <a:solidFill>
+                  <a:schemeClr val="tx2"/>
+                </a:solidFill>
+                <a:latin typeface="+mn-lt"/>
+                <a:ea typeface="+mn-ea"/>
+                <a:cs typeface="+mn-cs"/>
+              </a:defRPr>
+            </a:lvl9pPr>
+          </a:lstStyle>
+          <a:p>
+            <a:pPr marL="0" indent="0" algn="r">
+              <a:buNone/>
+            </a:pPr>
+            <a:r>
+              <a:rPr lang="en-US" sz="1100" b="1" dirty="0"/>
+              <a:t>Sources:</a:t>
+            </a:r>
+            <a:br>
+              <a:rPr lang="en-US" sz="1100" dirty="0"/>
+            </a:br>
+            <a:r>
+              <a:rPr lang="en-US" sz="1100" dirty="0">
+                <a:hlinkClick r:id="rId6"/>
+              </a:rPr>
+              <a:t>https://commons.wikimedia.org/wiki/File:Cmake.svg</a:t>
+            </a:r>
+            <a:r>
+              <a:rPr lang="en-US" sz="1100" dirty="0"/>
+              <a:t> </a:t>
+            </a:r>
+          </a:p>
+        </p:txBody>
+      </p:sp>
     </p:spTree>
     <p:extLst>
       <p:ext uri="{BB962C8B-B14F-4D97-AF65-F5344CB8AC3E}">
@@ -9556,6 +12102,248 @@
           </a:prstGeom>
         </p:spPr>
       </p:pic>
+      <p:sp>
+        <p:nvSpPr>
+          <p:cNvPr id="6" name="Content Placeholder 2">
+            <a:extLst>
+              <a:ext uri="{FF2B5EF4-FFF2-40B4-BE49-F238E27FC236}">
+                <a16:creationId xmlns:a16="http://schemas.microsoft.com/office/drawing/2014/main" id="{C4971025-8E0D-406B-AE21-1F3F9F6C670D}"/>
+              </a:ext>
+            </a:extLst>
+          </p:cNvPr>
+          <p:cNvSpPr txBox="1">
+            <a:spLocks/>
+          </p:cNvSpPr>
+          <p:nvPr/>
+        </p:nvSpPr>
+        <p:spPr>
+          <a:xfrm>
+            <a:off x="9344026" y="6360581"/>
+            <a:ext cx="2847974" cy="390525"/>
+          </a:xfrm>
+          <a:prstGeom prst="rect">
+            <a:avLst/>
+          </a:prstGeom>
+        </p:spPr>
+        <p:txBody>
+          <a:bodyPr vert="horz" lIns="91440" tIns="45720" rIns="91440" bIns="45720" rtlCol="0">
+            <a:normAutofit lnSpcReduction="10000"/>
+          </a:bodyPr>
+          <a:lstStyle>
+            <a:lvl1pPr marL="384048" indent="-384048" algn="l" defTabSz="914400" rtl="0" eaLnBrk="1" latinLnBrk="0" hangingPunct="1">
+              <a:lnSpc>
+                <a:spcPct val="94000"/>
+              </a:lnSpc>
+              <a:spcBef>
+                <a:spcPts val="1000"/>
+              </a:spcBef>
+              <a:spcAft>
+                <a:spcPts val="200"/>
+              </a:spcAft>
+              <a:buFont typeface="Franklin Gothic Book" panose="020B0503020102020204" pitchFamily="34" charset="0"/>
+              <a:buChar char="■"/>
+              <a:defRPr sz="2000" kern="1200" baseline="0">
+                <a:solidFill>
+                  <a:schemeClr val="tx2"/>
+                </a:solidFill>
+                <a:latin typeface="+mn-lt"/>
+                <a:ea typeface="+mn-ea"/>
+                <a:cs typeface="+mn-cs"/>
+              </a:defRPr>
+            </a:lvl1pPr>
+            <a:lvl2pPr marL="914400" indent="-384048" algn="l" defTabSz="914400" rtl="0" eaLnBrk="1" latinLnBrk="0" hangingPunct="1">
+              <a:lnSpc>
+                <a:spcPct val="94000"/>
+              </a:lnSpc>
+              <a:spcBef>
+                <a:spcPts val="500"/>
+              </a:spcBef>
+              <a:spcAft>
+                <a:spcPts val="200"/>
+              </a:spcAft>
+              <a:buFont typeface="Franklin Gothic Book" panose="020B0503020102020204" pitchFamily="34" charset="0"/>
+              <a:buChar char="–"/>
+              <a:defRPr sz="2000" i="1" kern="1200" baseline="0">
+                <a:solidFill>
+                  <a:schemeClr val="tx2"/>
+                </a:solidFill>
+                <a:latin typeface="+mn-lt"/>
+                <a:ea typeface="+mn-ea"/>
+                <a:cs typeface="+mn-cs"/>
+              </a:defRPr>
+            </a:lvl2pPr>
+            <a:lvl3pPr marL="1371600" indent="-384048" algn="l" defTabSz="914400" rtl="0" eaLnBrk="1" latinLnBrk="0" hangingPunct="1">
+              <a:lnSpc>
+                <a:spcPct val="94000"/>
+              </a:lnSpc>
+              <a:spcBef>
+                <a:spcPts val="500"/>
+              </a:spcBef>
+              <a:spcAft>
+                <a:spcPts val="200"/>
+              </a:spcAft>
+              <a:buFont typeface="Franklin Gothic Book" panose="020B0503020102020204" pitchFamily="34" charset="0"/>
+              <a:buChar char="■"/>
+              <a:defRPr sz="1800" kern="1200" baseline="0">
+                <a:solidFill>
+                  <a:schemeClr val="tx2"/>
+                </a:solidFill>
+                <a:latin typeface="+mn-lt"/>
+                <a:ea typeface="+mn-ea"/>
+                <a:cs typeface="+mn-cs"/>
+              </a:defRPr>
+            </a:lvl3pPr>
+            <a:lvl4pPr marL="1828800" indent="-384048" algn="l" defTabSz="914400" rtl="0" eaLnBrk="1" latinLnBrk="0" hangingPunct="1">
+              <a:lnSpc>
+                <a:spcPct val="94000"/>
+              </a:lnSpc>
+              <a:spcBef>
+                <a:spcPts val="500"/>
+              </a:spcBef>
+              <a:spcAft>
+                <a:spcPts val="200"/>
+              </a:spcAft>
+              <a:buFont typeface="Franklin Gothic Book" panose="020B0503020102020204" pitchFamily="34" charset="0"/>
+              <a:buChar char="–"/>
+              <a:defRPr sz="1800" i="1" kern="1200" baseline="0">
+                <a:solidFill>
+                  <a:schemeClr val="tx2"/>
+                </a:solidFill>
+                <a:latin typeface="+mn-lt"/>
+                <a:ea typeface="+mn-ea"/>
+                <a:cs typeface="+mn-cs"/>
+              </a:defRPr>
+            </a:lvl4pPr>
+            <a:lvl5pPr marL="2286000" indent="-384048" algn="l" defTabSz="914400" rtl="0" eaLnBrk="1" latinLnBrk="0" hangingPunct="1">
+              <a:lnSpc>
+                <a:spcPct val="94000"/>
+              </a:lnSpc>
+              <a:spcBef>
+                <a:spcPts val="500"/>
+              </a:spcBef>
+              <a:spcAft>
+                <a:spcPts val="200"/>
+              </a:spcAft>
+              <a:buFont typeface="Franklin Gothic Book" panose="020B0503020102020204" pitchFamily="34" charset="0"/>
+              <a:buChar char="■"/>
+              <a:defRPr sz="1600" kern="1200" baseline="0">
+                <a:solidFill>
+                  <a:schemeClr val="tx2"/>
+                </a:solidFill>
+                <a:latin typeface="+mn-lt"/>
+                <a:ea typeface="+mn-ea"/>
+                <a:cs typeface="+mn-cs"/>
+              </a:defRPr>
+            </a:lvl5pPr>
+            <a:lvl6pPr marL="2743200" indent="-384048" algn="l" defTabSz="914400" rtl="0" eaLnBrk="1" latinLnBrk="0" hangingPunct="1">
+              <a:lnSpc>
+                <a:spcPct val="94000"/>
+              </a:lnSpc>
+              <a:spcBef>
+                <a:spcPts val="500"/>
+              </a:spcBef>
+              <a:spcAft>
+                <a:spcPts val="200"/>
+              </a:spcAft>
+              <a:buFont typeface="Franklin Gothic Book" panose="020B0503020102020204" pitchFamily="34" charset="0"/>
+              <a:buChar char="–"/>
+              <a:defRPr sz="1600" i="1" kern="1200" baseline="0">
+                <a:solidFill>
+                  <a:schemeClr val="tx2"/>
+                </a:solidFill>
+                <a:latin typeface="+mn-lt"/>
+                <a:ea typeface="+mn-ea"/>
+                <a:cs typeface="+mn-cs"/>
+              </a:defRPr>
+            </a:lvl6pPr>
+            <a:lvl7pPr marL="3200400" indent="-384048" algn="l" defTabSz="914400" rtl="0" eaLnBrk="1" latinLnBrk="0" hangingPunct="1">
+              <a:lnSpc>
+                <a:spcPct val="94000"/>
+              </a:lnSpc>
+              <a:spcBef>
+                <a:spcPts val="500"/>
+              </a:spcBef>
+              <a:spcAft>
+                <a:spcPts val="200"/>
+              </a:spcAft>
+              <a:buFont typeface="Franklin Gothic Book" panose="020B0503020102020204" pitchFamily="34" charset="0"/>
+              <a:buChar char="■"/>
+              <a:defRPr sz="1400" kern="1200" baseline="0">
+                <a:solidFill>
+                  <a:schemeClr val="tx2"/>
+                </a:solidFill>
+                <a:latin typeface="+mn-lt"/>
+                <a:ea typeface="+mn-ea"/>
+                <a:cs typeface="+mn-cs"/>
+              </a:defRPr>
+            </a:lvl7pPr>
+            <a:lvl8pPr marL="3657600" indent="-384048" algn="l" defTabSz="914400" rtl="0" eaLnBrk="1" latinLnBrk="0" hangingPunct="1">
+              <a:lnSpc>
+                <a:spcPct val="94000"/>
+              </a:lnSpc>
+              <a:spcBef>
+                <a:spcPts val="500"/>
+              </a:spcBef>
+              <a:spcAft>
+                <a:spcPts val="200"/>
+              </a:spcAft>
+              <a:buFont typeface="Franklin Gothic Book" panose="020B0503020102020204" pitchFamily="34" charset="0"/>
+              <a:buChar char="–"/>
+              <a:defRPr sz="1400" i="1" kern="1200" baseline="0">
+                <a:solidFill>
+                  <a:schemeClr val="tx2"/>
+                </a:solidFill>
+                <a:latin typeface="+mn-lt"/>
+                <a:ea typeface="+mn-ea"/>
+                <a:cs typeface="+mn-cs"/>
+              </a:defRPr>
+            </a:lvl8pPr>
+            <a:lvl9pPr marL="4114800" indent="-384048" algn="l" defTabSz="914400" rtl="0" eaLnBrk="1" latinLnBrk="0" hangingPunct="1">
+              <a:lnSpc>
+                <a:spcPct val="94000"/>
+              </a:lnSpc>
+              <a:spcBef>
+                <a:spcPts val="500"/>
+              </a:spcBef>
+              <a:spcAft>
+                <a:spcPts val="200"/>
+              </a:spcAft>
+              <a:buFont typeface="Franklin Gothic Book" panose="020B0503020102020204" pitchFamily="34" charset="0"/>
+              <a:buChar char="■"/>
+              <a:defRPr sz="1400" kern="1200" baseline="0">
+                <a:solidFill>
+                  <a:schemeClr val="tx2"/>
+                </a:solidFill>
+                <a:latin typeface="+mn-lt"/>
+                <a:ea typeface="+mn-ea"/>
+                <a:cs typeface="+mn-cs"/>
+              </a:defRPr>
+            </a:lvl9pPr>
+          </a:lstStyle>
+          <a:p>
+            <a:pPr marL="0" indent="0" algn="r">
+              <a:buNone/>
+            </a:pPr>
+            <a:r>
+              <a:rPr lang="en-US" sz="1100" b="1" dirty="0"/>
+              <a:t>Sources:</a:t>
+            </a:r>
+            <a:br>
+              <a:rPr lang="en-US" sz="1100" dirty="0"/>
+            </a:br>
+            <a:r>
+              <a:rPr lang="en-US" sz="1100" dirty="0">
+                <a:hlinkClick r:id="rId3"/>
+              </a:rPr>
+              <a:t>https://github.com/premake/premake-core</a:t>
+            </a:r>
+            <a:r>
+              <a:rPr lang="en-US" sz="1100" dirty="0"/>
+              <a:t> </a:t>
+            </a:r>
+          </a:p>
+        </p:txBody>
+      </p:sp>
     </p:spTree>
     <p:extLst>
       <p:ext uri="{BB962C8B-B14F-4D97-AF65-F5344CB8AC3E}">
@@ -9829,10 +12617,15 @@
             <p:ph idx="1"/>
           </p:nvPr>
         </p:nvSpPr>
-        <p:spPr/>
+        <p:spPr>
+          <a:xfrm>
+            <a:off x="1371600" y="2286000"/>
+            <a:ext cx="9601200" cy="3886200"/>
+          </a:xfrm>
+        </p:spPr>
         <p:txBody>
           <a:bodyPr>
-            <a:normAutofit lnSpcReduction="10000"/>
+            <a:normAutofit/>
           </a:bodyPr>
           <a:lstStyle/>
           <a:p>
@@ -9844,7 +12637,15 @@
           <a:p>
             <a:r>
               <a:rPr lang="en-US" dirty="0"/>
-              <a:t>Hates You</a:t>
+              <a:t>Hates You, though the folks at </a:t>
+            </a:r>
+            <a:r>
+              <a:rPr lang="en-US" dirty="0" err="1"/>
+              <a:t>Kitware</a:t>
+            </a:r>
+            <a:r>
+              <a:rPr lang="en-US" dirty="0"/>
+              <a:t> who make it don’t, they are pretty cool</a:t>
             </a:r>
           </a:p>
           <a:p>
@@ -9941,6 +12742,248 @@
           </a:prstGeom>
         </p:spPr>
       </p:pic>
+      <p:sp>
+        <p:nvSpPr>
+          <p:cNvPr id="6" name="Content Placeholder 2">
+            <a:extLst>
+              <a:ext uri="{FF2B5EF4-FFF2-40B4-BE49-F238E27FC236}">
+                <a16:creationId xmlns:a16="http://schemas.microsoft.com/office/drawing/2014/main" id="{2271E3C3-C62F-4ADB-BE44-DF563955DA9D}"/>
+              </a:ext>
+            </a:extLst>
+          </p:cNvPr>
+          <p:cNvSpPr txBox="1">
+            <a:spLocks/>
+          </p:cNvSpPr>
+          <p:nvPr/>
+        </p:nvSpPr>
+        <p:spPr>
+          <a:xfrm>
+            <a:off x="9344026" y="6214533"/>
+            <a:ext cx="2847974" cy="558800"/>
+          </a:xfrm>
+          <a:prstGeom prst="rect">
+            <a:avLst/>
+          </a:prstGeom>
+        </p:spPr>
+        <p:txBody>
+          <a:bodyPr vert="horz" lIns="91440" tIns="45720" rIns="91440" bIns="45720" rtlCol="0">
+            <a:noAutofit/>
+          </a:bodyPr>
+          <a:lstStyle>
+            <a:lvl1pPr marL="384048" indent="-384048" algn="l" defTabSz="914400" rtl="0" eaLnBrk="1" latinLnBrk="0" hangingPunct="1">
+              <a:lnSpc>
+                <a:spcPct val="94000"/>
+              </a:lnSpc>
+              <a:spcBef>
+                <a:spcPts val="1000"/>
+              </a:spcBef>
+              <a:spcAft>
+                <a:spcPts val="200"/>
+              </a:spcAft>
+              <a:buFont typeface="Franklin Gothic Book" panose="020B0503020102020204" pitchFamily="34" charset="0"/>
+              <a:buChar char="■"/>
+              <a:defRPr sz="2000" kern="1200" baseline="0">
+                <a:solidFill>
+                  <a:schemeClr val="tx2"/>
+                </a:solidFill>
+                <a:latin typeface="+mn-lt"/>
+                <a:ea typeface="+mn-ea"/>
+                <a:cs typeface="+mn-cs"/>
+              </a:defRPr>
+            </a:lvl1pPr>
+            <a:lvl2pPr marL="914400" indent="-384048" algn="l" defTabSz="914400" rtl="0" eaLnBrk="1" latinLnBrk="0" hangingPunct="1">
+              <a:lnSpc>
+                <a:spcPct val="94000"/>
+              </a:lnSpc>
+              <a:spcBef>
+                <a:spcPts val="500"/>
+              </a:spcBef>
+              <a:spcAft>
+                <a:spcPts val="200"/>
+              </a:spcAft>
+              <a:buFont typeface="Franklin Gothic Book" panose="020B0503020102020204" pitchFamily="34" charset="0"/>
+              <a:buChar char="–"/>
+              <a:defRPr sz="2000" i="1" kern="1200" baseline="0">
+                <a:solidFill>
+                  <a:schemeClr val="tx2"/>
+                </a:solidFill>
+                <a:latin typeface="+mn-lt"/>
+                <a:ea typeface="+mn-ea"/>
+                <a:cs typeface="+mn-cs"/>
+              </a:defRPr>
+            </a:lvl2pPr>
+            <a:lvl3pPr marL="1371600" indent="-384048" algn="l" defTabSz="914400" rtl="0" eaLnBrk="1" latinLnBrk="0" hangingPunct="1">
+              <a:lnSpc>
+                <a:spcPct val="94000"/>
+              </a:lnSpc>
+              <a:spcBef>
+                <a:spcPts val="500"/>
+              </a:spcBef>
+              <a:spcAft>
+                <a:spcPts val="200"/>
+              </a:spcAft>
+              <a:buFont typeface="Franklin Gothic Book" panose="020B0503020102020204" pitchFamily="34" charset="0"/>
+              <a:buChar char="■"/>
+              <a:defRPr sz="1800" kern="1200" baseline="0">
+                <a:solidFill>
+                  <a:schemeClr val="tx2"/>
+                </a:solidFill>
+                <a:latin typeface="+mn-lt"/>
+                <a:ea typeface="+mn-ea"/>
+                <a:cs typeface="+mn-cs"/>
+              </a:defRPr>
+            </a:lvl3pPr>
+            <a:lvl4pPr marL="1828800" indent="-384048" algn="l" defTabSz="914400" rtl="0" eaLnBrk="1" latinLnBrk="0" hangingPunct="1">
+              <a:lnSpc>
+                <a:spcPct val="94000"/>
+              </a:lnSpc>
+              <a:spcBef>
+                <a:spcPts val="500"/>
+              </a:spcBef>
+              <a:spcAft>
+                <a:spcPts val="200"/>
+              </a:spcAft>
+              <a:buFont typeface="Franklin Gothic Book" panose="020B0503020102020204" pitchFamily="34" charset="0"/>
+              <a:buChar char="–"/>
+              <a:defRPr sz="1800" i="1" kern="1200" baseline="0">
+                <a:solidFill>
+                  <a:schemeClr val="tx2"/>
+                </a:solidFill>
+                <a:latin typeface="+mn-lt"/>
+                <a:ea typeface="+mn-ea"/>
+                <a:cs typeface="+mn-cs"/>
+              </a:defRPr>
+            </a:lvl4pPr>
+            <a:lvl5pPr marL="2286000" indent="-384048" algn="l" defTabSz="914400" rtl="0" eaLnBrk="1" latinLnBrk="0" hangingPunct="1">
+              <a:lnSpc>
+                <a:spcPct val="94000"/>
+              </a:lnSpc>
+              <a:spcBef>
+                <a:spcPts val="500"/>
+              </a:spcBef>
+              <a:spcAft>
+                <a:spcPts val="200"/>
+              </a:spcAft>
+              <a:buFont typeface="Franklin Gothic Book" panose="020B0503020102020204" pitchFamily="34" charset="0"/>
+              <a:buChar char="■"/>
+              <a:defRPr sz="1600" kern="1200" baseline="0">
+                <a:solidFill>
+                  <a:schemeClr val="tx2"/>
+                </a:solidFill>
+                <a:latin typeface="+mn-lt"/>
+                <a:ea typeface="+mn-ea"/>
+                <a:cs typeface="+mn-cs"/>
+              </a:defRPr>
+            </a:lvl5pPr>
+            <a:lvl6pPr marL="2743200" indent="-384048" algn="l" defTabSz="914400" rtl="0" eaLnBrk="1" latinLnBrk="0" hangingPunct="1">
+              <a:lnSpc>
+                <a:spcPct val="94000"/>
+              </a:lnSpc>
+              <a:spcBef>
+                <a:spcPts val="500"/>
+              </a:spcBef>
+              <a:spcAft>
+                <a:spcPts val="200"/>
+              </a:spcAft>
+              <a:buFont typeface="Franklin Gothic Book" panose="020B0503020102020204" pitchFamily="34" charset="0"/>
+              <a:buChar char="–"/>
+              <a:defRPr sz="1600" i="1" kern="1200" baseline="0">
+                <a:solidFill>
+                  <a:schemeClr val="tx2"/>
+                </a:solidFill>
+                <a:latin typeface="+mn-lt"/>
+                <a:ea typeface="+mn-ea"/>
+                <a:cs typeface="+mn-cs"/>
+              </a:defRPr>
+            </a:lvl6pPr>
+            <a:lvl7pPr marL="3200400" indent="-384048" algn="l" defTabSz="914400" rtl="0" eaLnBrk="1" latinLnBrk="0" hangingPunct="1">
+              <a:lnSpc>
+                <a:spcPct val="94000"/>
+              </a:lnSpc>
+              <a:spcBef>
+                <a:spcPts val="500"/>
+              </a:spcBef>
+              <a:spcAft>
+                <a:spcPts val="200"/>
+              </a:spcAft>
+              <a:buFont typeface="Franklin Gothic Book" panose="020B0503020102020204" pitchFamily="34" charset="0"/>
+              <a:buChar char="■"/>
+              <a:defRPr sz="1400" kern="1200" baseline="0">
+                <a:solidFill>
+                  <a:schemeClr val="tx2"/>
+                </a:solidFill>
+                <a:latin typeface="+mn-lt"/>
+                <a:ea typeface="+mn-ea"/>
+                <a:cs typeface="+mn-cs"/>
+              </a:defRPr>
+            </a:lvl7pPr>
+            <a:lvl8pPr marL="3657600" indent="-384048" algn="l" defTabSz="914400" rtl="0" eaLnBrk="1" latinLnBrk="0" hangingPunct="1">
+              <a:lnSpc>
+                <a:spcPct val="94000"/>
+              </a:lnSpc>
+              <a:spcBef>
+                <a:spcPts val="500"/>
+              </a:spcBef>
+              <a:spcAft>
+                <a:spcPts val="200"/>
+              </a:spcAft>
+              <a:buFont typeface="Franklin Gothic Book" panose="020B0503020102020204" pitchFamily="34" charset="0"/>
+              <a:buChar char="–"/>
+              <a:defRPr sz="1400" i="1" kern="1200" baseline="0">
+                <a:solidFill>
+                  <a:schemeClr val="tx2"/>
+                </a:solidFill>
+                <a:latin typeface="+mn-lt"/>
+                <a:ea typeface="+mn-ea"/>
+                <a:cs typeface="+mn-cs"/>
+              </a:defRPr>
+            </a:lvl8pPr>
+            <a:lvl9pPr marL="4114800" indent="-384048" algn="l" defTabSz="914400" rtl="0" eaLnBrk="1" latinLnBrk="0" hangingPunct="1">
+              <a:lnSpc>
+                <a:spcPct val="94000"/>
+              </a:lnSpc>
+              <a:spcBef>
+                <a:spcPts val="500"/>
+              </a:spcBef>
+              <a:spcAft>
+                <a:spcPts val="200"/>
+              </a:spcAft>
+              <a:buFont typeface="Franklin Gothic Book" panose="020B0503020102020204" pitchFamily="34" charset="0"/>
+              <a:buChar char="■"/>
+              <a:defRPr sz="1400" kern="1200" baseline="0">
+                <a:solidFill>
+                  <a:schemeClr val="tx2"/>
+                </a:solidFill>
+                <a:latin typeface="+mn-lt"/>
+                <a:ea typeface="+mn-ea"/>
+                <a:cs typeface="+mn-cs"/>
+              </a:defRPr>
+            </a:lvl9pPr>
+          </a:lstStyle>
+          <a:p>
+            <a:pPr marL="0" indent="0" algn="r">
+              <a:buNone/>
+            </a:pPr>
+            <a:r>
+              <a:rPr lang="en-US" sz="1100" b="1" dirty="0"/>
+              <a:t>Sources:</a:t>
+            </a:r>
+            <a:br>
+              <a:rPr lang="en-US" sz="1100" dirty="0"/>
+            </a:br>
+            <a:r>
+              <a:rPr lang="en-US" sz="1100" dirty="0">
+                <a:hlinkClick r:id="rId4"/>
+              </a:rPr>
+              <a:t>https://commons.wikimedia.org/wiki/File:Cmake.svg</a:t>
+            </a:r>
+            <a:r>
+              <a:rPr lang="en-US" sz="1100" dirty="0"/>
+              <a:t> </a:t>
+            </a:r>
+          </a:p>
+        </p:txBody>
+      </p:sp>
     </p:spTree>
     <p:extLst>
       <p:ext uri="{BB962C8B-B14F-4D97-AF65-F5344CB8AC3E}">

</xml_diff>